<commit_message>
Use docker-compose service name for link
</commit_message>
<xml_diff>
--- a/doc/Architecture.pptx
+++ b/doc/Architecture.pptx
@@ -8,6 +8,8 @@
     <p:sldId id="258" r:id="rId2"/>
     <p:sldId id="257" r:id="rId3"/>
     <p:sldId id="259" r:id="rId4"/>
+    <p:sldId id="260" r:id="rId5"/>
+    <p:sldId id="261" r:id="rId6"/>
   </p:sldIdLst>
   <p:sldSz cx="12192000" cy="6858000"/>
   <p:notesSz cx="6858000" cy="9144000"/>
@@ -136,7 +138,7 @@
           <p:cNvPr id="2" name="標題 1">
             <a:extLst>
               <a:ext uri="{FF2B5EF4-FFF2-40B4-BE49-F238E27FC236}">
-                <a16:creationId xmlns:a16="http://schemas.microsoft.com/office/drawing/2014/main" id="{82AC7534-00B5-40A1-A1DF-A06A703F322F}"/>
+                <a16:creationId xmlns:a16="http://schemas.microsoft.com/office/drawing/2014/main" xmlns="" id="{82AC7534-00B5-40A1-A1DF-A06A703F322F}"/>
               </a:ext>
             </a:extLst>
           </p:cNvPr>
@@ -174,7 +176,7 @@
           <p:cNvPr id="3" name="副標題 2">
             <a:extLst>
               <a:ext uri="{FF2B5EF4-FFF2-40B4-BE49-F238E27FC236}">
-                <a16:creationId xmlns:a16="http://schemas.microsoft.com/office/drawing/2014/main" id="{7B2DE1E1-AA93-4FB8-9EB7-9C50C48BD235}"/>
+                <a16:creationId xmlns:a16="http://schemas.microsoft.com/office/drawing/2014/main" xmlns="" id="{7B2DE1E1-AA93-4FB8-9EB7-9C50C48BD235}"/>
               </a:ext>
             </a:extLst>
           </p:cNvPr>
@@ -245,7 +247,7 @@
           <p:cNvPr id="4" name="日期版面配置區 3">
             <a:extLst>
               <a:ext uri="{FF2B5EF4-FFF2-40B4-BE49-F238E27FC236}">
-                <a16:creationId xmlns:a16="http://schemas.microsoft.com/office/drawing/2014/main" id="{6E3EBCEF-2893-450A-A8F0-0758F2240CCE}"/>
+                <a16:creationId xmlns:a16="http://schemas.microsoft.com/office/drawing/2014/main" xmlns="" id="{6E3EBCEF-2893-450A-A8F0-0758F2240CCE}"/>
               </a:ext>
             </a:extLst>
           </p:cNvPr>
@@ -263,7 +265,7 @@
           <a:p>
             <a:fld id="{308EF277-7957-4950-8844-43C656DF05A1}" type="datetimeFigureOut">
               <a:rPr lang="en-US" smtClean="0"/>
-              <a:t>10/7/2019</a:t>
+              <a:t>11/4/2019</a:t>
             </a:fld>
             <a:endParaRPr lang="en-US"/>
           </a:p>
@@ -274,7 +276,7 @@
           <p:cNvPr id="5" name="頁尾版面配置區 4">
             <a:extLst>
               <a:ext uri="{FF2B5EF4-FFF2-40B4-BE49-F238E27FC236}">
-                <a16:creationId xmlns:a16="http://schemas.microsoft.com/office/drawing/2014/main" id="{1BEE8A35-0BD6-4511-8A1D-D5688795A83E}"/>
+                <a16:creationId xmlns:a16="http://schemas.microsoft.com/office/drawing/2014/main" xmlns="" id="{1BEE8A35-0BD6-4511-8A1D-D5688795A83E}"/>
               </a:ext>
             </a:extLst>
           </p:cNvPr>
@@ -299,7 +301,7 @@
           <p:cNvPr id="6" name="投影片編號版面配置區 5">
             <a:extLst>
               <a:ext uri="{FF2B5EF4-FFF2-40B4-BE49-F238E27FC236}">
-                <a16:creationId xmlns:a16="http://schemas.microsoft.com/office/drawing/2014/main" id="{7B50FBC5-2F25-4A1E-8DBC-66A1E17D25A5}"/>
+                <a16:creationId xmlns:a16="http://schemas.microsoft.com/office/drawing/2014/main" xmlns="" id="{7B50FBC5-2F25-4A1E-8DBC-66A1E17D25A5}"/>
               </a:ext>
             </a:extLst>
           </p:cNvPr>
@@ -358,7 +360,7 @@
           <p:cNvPr id="2" name="標題 1">
             <a:extLst>
               <a:ext uri="{FF2B5EF4-FFF2-40B4-BE49-F238E27FC236}">
-                <a16:creationId xmlns:a16="http://schemas.microsoft.com/office/drawing/2014/main" id="{56E79B4A-E398-4D95-8AC7-01FA447EAB4C}"/>
+                <a16:creationId xmlns:a16="http://schemas.microsoft.com/office/drawing/2014/main" xmlns="" id="{56E79B4A-E398-4D95-8AC7-01FA447EAB4C}"/>
               </a:ext>
             </a:extLst>
           </p:cNvPr>
@@ -387,7 +389,7 @@
           <p:cNvPr id="3" name="直排文字版面配置區 2">
             <a:extLst>
               <a:ext uri="{FF2B5EF4-FFF2-40B4-BE49-F238E27FC236}">
-                <a16:creationId xmlns:a16="http://schemas.microsoft.com/office/drawing/2014/main" id="{F442B8C2-DCC3-49A1-BB85-2700C809526B}"/>
+                <a16:creationId xmlns:a16="http://schemas.microsoft.com/office/drawing/2014/main" xmlns="" id="{F442B8C2-DCC3-49A1-BB85-2700C809526B}"/>
               </a:ext>
             </a:extLst>
           </p:cNvPr>
@@ -445,7 +447,7 @@
           <p:cNvPr id="4" name="日期版面配置區 3">
             <a:extLst>
               <a:ext uri="{FF2B5EF4-FFF2-40B4-BE49-F238E27FC236}">
-                <a16:creationId xmlns:a16="http://schemas.microsoft.com/office/drawing/2014/main" id="{A3FBCBAA-AA9C-439D-B591-F7F033DB55E2}"/>
+                <a16:creationId xmlns:a16="http://schemas.microsoft.com/office/drawing/2014/main" xmlns="" id="{A3FBCBAA-AA9C-439D-B591-F7F033DB55E2}"/>
               </a:ext>
             </a:extLst>
           </p:cNvPr>
@@ -463,7 +465,7 @@
           <a:p>
             <a:fld id="{308EF277-7957-4950-8844-43C656DF05A1}" type="datetimeFigureOut">
               <a:rPr lang="en-US" smtClean="0"/>
-              <a:t>10/7/2019</a:t>
+              <a:t>11/4/2019</a:t>
             </a:fld>
             <a:endParaRPr lang="en-US"/>
           </a:p>
@@ -474,7 +476,7 @@
           <p:cNvPr id="5" name="頁尾版面配置區 4">
             <a:extLst>
               <a:ext uri="{FF2B5EF4-FFF2-40B4-BE49-F238E27FC236}">
-                <a16:creationId xmlns:a16="http://schemas.microsoft.com/office/drawing/2014/main" id="{E54B8732-984F-4DF1-BBE6-E627F0265A1C}"/>
+                <a16:creationId xmlns:a16="http://schemas.microsoft.com/office/drawing/2014/main" xmlns="" id="{E54B8732-984F-4DF1-BBE6-E627F0265A1C}"/>
               </a:ext>
             </a:extLst>
           </p:cNvPr>
@@ -499,7 +501,7 @@
           <p:cNvPr id="6" name="投影片編號版面配置區 5">
             <a:extLst>
               <a:ext uri="{FF2B5EF4-FFF2-40B4-BE49-F238E27FC236}">
-                <a16:creationId xmlns:a16="http://schemas.microsoft.com/office/drawing/2014/main" id="{262135CB-1B65-4F63-B7D6-54B5D36F4186}"/>
+                <a16:creationId xmlns:a16="http://schemas.microsoft.com/office/drawing/2014/main" xmlns="" id="{262135CB-1B65-4F63-B7D6-54B5D36F4186}"/>
               </a:ext>
             </a:extLst>
           </p:cNvPr>
@@ -558,7 +560,7 @@
           <p:cNvPr id="2" name="直排標題 1">
             <a:extLst>
               <a:ext uri="{FF2B5EF4-FFF2-40B4-BE49-F238E27FC236}">
-                <a16:creationId xmlns:a16="http://schemas.microsoft.com/office/drawing/2014/main" id="{6C1F94A8-6CD9-4D71-91ED-FEB1B92CB028}"/>
+                <a16:creationId xmlns:a16="http://schemas.microsoft.com/office/drawing/2014/main" xmlns="" id="{6C1F94A8-6CD9-4D71-91ED-FEB1B92CB028}"/>
               </a:ext>
             </a:extLst>
           </p:cNvPr>
@@ -592,7 +594,7 @@
           <p:cNvPr id="3" name="直排文字版面配置區 2">
             <a:extLst>
               <a:ext uri="{FF2B5EF4-FFF2-40B4-BE49-F238E27FC236}">
-                <a16:creationId xmlns:a16="http://schemas.microsoft.com/office/drawing/2014/main" id="{593FDB2A-BBAF-4BC2-A6AF-692DB1FCBB1B}"/>
+                <a16:creationId xmlns:a16="http://schemas.microsoft.com/office/drawing/2014/main" xmlns="" id="{593FDB2A-BBAF-4BC2-A6AF-692DB1FCBB1B}"/>
               </a:ext>
             </a:extLst>
           </p:cNvPr>
@@ -655,7 +657,7 @@
           <p:cNvPr id="4" name="日期版面配置區 3">
             <a:extLst>
               <a:ext uri="{FF2B5EF4-FFF2-40B4-BE49-F238E27FC236}">
-                <a16:creationId xmlns:a16="http://schemas.microsoft.com/office/drawing/2014/main" id="{557BE055-0E9F-4E67-9256-A7747084021C}"/>
+                <a16:creationId xmlns:a16="http://schemas.microsoft.com/office/drawing/2014/main" xmlns="" id="{557BE055-0E9F-4E67-9256-A7747084021C}"/>
               </a:ext>
             </a:extLst>
           </p:cNvPr>
@@ -673,7 +675,7 @@
           <a:p>
             <a:fld id="{308EF277-7957-4950-8844-43C656DF05A1}" type="datetimeFigureOut">
               <a:rPr lang="en-US" smtClean="0"/>
-              <a:t>10/7/2019</a:t>
+              <a:t>11/4/2019</a:t>
             </a:fld>
             <a:endParaRPr lang="en-US"/>
           </a:p>
@@ -684,7 +686,7 @@
           <p:cNvPr id="5" name="頁尾版面配置區 4">
             <a:extLst>
               <a:ext uri="{FF2B5EF4-FFF2-40B4-BE49-F238E27FC236}">
-                <a16:creationId xmlns:a16="http://schemas.microsoft.com/office/drawing/2014/main" id="{7E0BC5E4-04C2-4917-BD3E-1457C2E3378C}"/>
+                <a16:creationId xmlns:a16="http://schemas.microsoft.com/office/drawing/2014/main" xmlns="" id="{7E0BC5E4-04C2-4917-BD3E-1457C2E3378C}"/>
               </a:ext>
             </a:extLst>
           </p:cNvPr>
@@ -709,7 +711,7 @@
           <p:cNvPr id="6" name="投影片編號版面配置區 5">
             <a:extLst>
               <a:ext uri="{FF2B5EF4-FFF2-40B4-BE49-F238E27FC236}">
-                <a16:creationId xmlns:a16="http://schemas.microsoft.com/office/drawing/2014/main" id="{10380EEE-3F30-4C57-8BE3-6B7604BC1AA8}"/>
+                <a16:creationId xmlns:a16="http://schemas.microsoft.com/office/drawing/2014/main" xmlns="" id="{10380EEE-3F30-4C57-8BE3-6B7604BC1AA8}"/>
               </a:ext>
             </a:extLst>
           </p:cNvPr>
@@ -768,7 +770,7 @@
           <p:cNvPr id="2" name="標題 1">
             <a:extLst>
               <a:ext uri="{FF2B5EF4-FFF2-40B4-BE49-F238E27FC236}">
-                <a16:creationId xmlns:a16="http://schemas.microsoft.com/office/drawing/2014/main" id="{A6D2C37C-2357-4EDB-B035-899E0D748729}"/>
+                <a16:creationId xmlns:a16="http://schemas.microsoft.com/office/drawing/2014/main" xmlns="" id="{A6D2C37C-2357-4EDB-B035-899E0D748729}"/>
               </a:ext>
             </a:extLst>
           </p:cNvPr>
@@ -797,7 +799,7 @@
           <p:cNvPr id="3" name="內容版面配置區 2">
             <a:extLst>
               <a:ext uri="{FF2B5EF4-FFF2-40B4-BE49-F238E27FC236}">
-                <a16:creationId xmlns:a16="http://schemas.microsoft.com/office/drawing/2014/main" id="{2B0AE9A2-7646-45A6-96B2-3CEAE4360EDE}"/>
+                <a16:creationId xmlns:a16="http://schemas.microsoft.com/office/drawing/2014/main" xmlns="" id="{2B0AE9A2-7646-45A6-96B2-3CEAE4360EDE}"/>
               </a:ext>
             </a:extLst>
           </p:cNvPr>
@@ -855,7 +857,7 @@
           <p:cNvPr id="4" name="日期版面配置區 3">
             <a:extLst>
               <a:ext uri="{FF2B5EF4-FFF2-40B4-BE49-F238E27FC236}">
-                <a16:creationId xmlns:a16="http://schemas.microsoft.com/office/drawing/2014/main" id="{94C55BDD-0F39-4086-A775-A7E8303FE22F}"/>
+                <a16:creationId xmlns:a16="http://schemas.microsoft.com/office/drawing/2014/main" xmlns="" id="{94C55BDD-0F39-4086-A775-A7E8303FE22F}"/>
               </a:ext>
             </a:extLst>
           </p:cNvPr>
@@ -873,7 +875,7 @@
           <a:p>
             <a:fld id="{308EF277-7957-4950-8844-43C656DF05A1}" type="datetimeFigureOut">
               <a:rPr lang="en-US" smtClean="0"/>
-              <a:t>10/7/2019</a:t>
+              <a:t>11/4/2019</a:t>
             </a:fld>
             <a:endParaRPr lang="en-US"/>
           </a:p>
@@ -884,7 +886,7 @@
           <p:cNvPr id="5" name="頁尾版面配置區 4">
             <a:extLst>
               <a:ext uri="{FF2B5EF4-FFF2-40B4-BE49-F238E27FC236}">
-                <a16:creationId xmlns:a16="http://schemas.microsoft.com/office/drawing/2014/main" id="{C7E3F2EA-7AD8-4B6B-9F0A-D4AD30185FC2}"/>
+                <a16:creationId xmlns:a16="http://schemas.microsoft.com/office/drawing/2014/main" xmlns="" id="{C7E3F2EA-7AD8-4B6B-9F0A-D4AD30185FC2}"/>
               </a:ext>
             </a:extLst>
           </p:cNvPr>
@@ -909,7 +911,7 @@
           <p:cNvPr id="6" name="投影片編號版面配置區 5">
             <a:extLst>
               <a:ext uri="{FF2B5EF4-FFF2-40B4-BE49-F238E27FC236}">
-                <a16:creationId xmlns:a16="http://schemas.microsoft.com/office/drawing/2014/main" id="{E24C4BD1-94DF-4ADD-99E8-6D51018907E5}"/>
+                <a16:creationId xmlns:a16="http://schemas.microsoft.com/office/drawing/2014/main" xmlns="" id="{E24C4BD1-94DF-4ADD-99E8-6D51018907E5}"/>
               </a:ext>
             </a:extLst>
           </p:cNvPr>
@@ -968,7 +970,7 @@
           <p:cNvPr id="2" name="標題 1">
             <a:extLst>
               <a:ext uri="{FF2B5EF4-FFF2-40B4-BE49-F238E27FC236}">
-                <a16:creationId xmlns:a16="http://schemas.microsoft.com/office/drawing/2014/main" id="{B9490E7D-F4E0-4BA6-A441-B4E2EB19EB0E}"/>
+                <a16:creationId xmlns:a16="http://schemas.microsoft.com/office/drawing/2014/main" xmlns="" id="{B9490E7D-F4E0-4BA6-A441-B4E2EB19EB0E}"/>
               </a:ext>
             </a:extLst>
           </p:cNvPr>
@@ -1006,7 +1008,7 @@
           <p:cNvPr id="3" name="文字版面配置區 2">
             <a:extLst>
               <a:ext uri="{FF2B5EF4-FFF2-40B4-BE49-F238E27FC236}">
-                <a16:creationId xmlns:a16="http://schemas.microsoft.com/office/drawing/2014/main" id="{8E3BB02F-8F6E-41AE-8AB4-4211A0AECB85}"/>
+                <a16:creationId xmlns:a16="http://schemas.microsoft.com/office/drawing/2014/main" xmlns="" id="{8E3BB02F-8F6E-41AE-8AB4-4211A0AECB85}"/>
               </a:ext>
             </a:extLst>
           </p:cNvPr>
@@ -1131,7 +1133,7 @@
           <p:cNvPr id="4" name="日期版面配置區 3">
             <a:extLst>
               <a:ext uri="{FF2B5EF4-FFF2-40B4-BE49-F238E27FC236}">
-                <a16:creationId xmlns:a16="http://schemas.microsoft.com/office/drawing/2014/main" id="{8E00F28D-E3A0-45EE-AEBD-2437D4D7956F}"/>
+                <a16:creationId xmlns:a16="http://schemas.microsoft.com/office/drawing/2014/main" xmlns="" id="{8E00F28D-E3A0-45EE-AEBD-2437D4D7956F}"/>
               </a:ext>
             </a:extLst>
           </p:cNvPr>
@@ -1149,7 +1151,7 @@
           <a:p>
             <a:fld id="{308EF277-7957-4950-8844-43C656DF05A1}" type="datetimeFigureOut">
               <a:rPr lang="en-US" smtClean="0"/>
-              <a:t>10/7/2019</a:t>
+              <a:t>11/4/2019</a:t>
             </a:fld>
             <a:endParaRPr lang="en-US"/>
           </a:p>
@@ -1160,7 +1162,7 @@
           <p:cNvPr id="5" name="頁尾版面配置區 4">
             <a:extLst>
               <a:ext uri="{FF2B5EF4-FFF2-40B4-BE49-F238E27FC236}">
-                <a16:creationId xmlns:a16="http://schemas.microsoft.com/office/drawing/2014/main" id="{A567CB2F-F9F2-4626-8E82-5192C6784E7C}"/>
+                <a16:creationId xmlns:a16="http://schemas.microsoft.com/office/drawing/2014/main" xmlns="" id="{A567CB2F-F9F2-4626-8E82-5192C6784E7C}"/>
               </a:ext>
             </a:extLst>
           </p:cNvPr>
@@ -1185,7 +1187,7 @@
           <p:cNvPr id="6" name="投影片編號版面配置區 5">
             <a:extLst>
               <a:ext uri="{FF2B5EF4-FFF2-40B4-BE49-F238E27FC236}">
-                <a16:creationId xmlns:a16="http://schemas.microsoft.com/office/drawing/2014/main" id="{B30863E3-51AC-493D-8EE2-0B3FE0964350}"/>
+                <a16:creationId xmlns:a16="http://schemas.microsoft.com/office/drawing/2014/main" xmlns="" id="{B30863E3-51AC-493D-8EE2-0B3FE0964350}"/>
               </a:ext>
             </a:extLst>
           </p:cNvPr>
@@ -1244,7 +1246,7 @@
           <p:cNvPr id="2" name="標題 1">
             <a:extLst>
               <a:ext uri="{FF2B5EF4-FFF2-40B4-BE49-F238E27FC236}">
-                <a16:creationId xmlns:a16="http://schemas.microsoft.com/office/drawing/2014/main" id="{4936CFF5-AF5B-44FF-885B-0E5DD36575CF}"/>
+                <a16:creationId xmlns:a16="http://schemas.microsoft.com/office/drawing/2014/main" xmlns="" id="{4936CFF5-AF5B-44FF-885B-0E5DD36575CF}"/>
               </a:ext>
             </a:extLst>
           </p:cNvPr>
@@ -1273,7 +1275,7 @@
           <p:cNvPr id="3" name="內容版面配置區 2">
             <a:extLst>
               <a:ext uri="{FF2B5EF4-FFF2-40B4-BE49-F238E27FC236}">
-                <a16:creationId xmlns:a16="http://schemas.microsoft.com/office/drawing/2014/main" id="{86455A0E-4D97-45F2-8E56-10A8B565FD26}"/>
+                <a16:creationId xmlns:a16="http://schemas.microsoft.com/office/drawing/2014/main" xmlns="" id="{86455A0E-4D97-45F2-8E56-10A8B565FD26}"/>
               </a:ext>
             </a:extLst>
           </p:cNvPr>
@@ -1336,7 +1338,7 @@
           <p:cNvPr id="4" name="內容版面配置區 3">
             <a:extLst>
               <a:ext uri="{FF2B5EF4-FFF2-40B4-BE49-F238E27FC236}">
-                <a16:creationId xmlns:a16="http://schemas.microsoft.com/office/drawing/2014/main" id="{3ADFE31E-F546-4395-828F-2A116437067C}"/>
+                <a16:creationId xmlns:a16="http://schemas.microsoft.com/office/drawing/2014/main" xmlns="" id="{3ADFE31E-F546-4395-828F-2A116437067C}"/>
               </a:ext>
             </a:extLst>
           </p:cNvPr>
@@ -1399,7 +1401,7 @@
           <p:cNvPr id="5" name="日期版面配置區 4">
             <a:extLst>
               <a:ext uri="{FF2B5EF4-FFF2-40B4-BE49-F238E27FC236}">
-                <a16:creationId xmlns:a16="http://schemas.microsoft.com/office/drawing/2014/main" id="{A2B574BE-C27D-43D5-8097-A10F9FBA13F5}"/>
+                <a16:creationId xmlns:a16="http://schemas.microsoft.com/office/drawing/2014/main" xmlns="" id="{A2B574BE-C27D-43D5-8097-A10F9FBA13F5}"/>
               </a:ext>
             </a:extLst>
           </p:cNvPr>
@@ -1417,7 +1419,7 @@
           <a:p>
             <a:fld id="{308EF277-7957-4950-8844-43C656DF05A1}" type="datetimeFigureOut">
               <a:rPr lang="en-US" smtClean="0"/>
-              <a:t>10/7/2019</a:t>
+              <a:t>11/4/2019</a:t>
             </a:fld>
             <a:endParaRPr lang="en-US"/>
           </a:p>
@@ -1428,7 +1430,7 @@
           <p:cNvPr id="6" name="頁尾版面配置區 5">
             <a:extLst>
               <a:ext uri="{FF2B5EF4-FFF2-40B4-BE49-F238E27FC236}">
-                <a16:creationId xmlns:a16="http://schemas.microsoft.com/office/drawing/2014/main" id="{798AFB51-75E8-41E5-982F-47775C475673}"/>
+                <a16:creationId xmlns:a16="http://schemas.microsoft.com/office/drawing/2014/main" xmlns="" id="{798AFB51-75E8-41E5-982F-47775C475673}"/>
               </a:ext>
             </a:extLst>
           </p:cNvPr>
@@ -1453,7 +1455,7 @@
           <p:cNvPr id="7" name="投影片編號版面配置區 6">
             <a:extLst>
               <a:ext uri="{FF2B5EF4-FFF2-40B4-BE49-F238E27FC236}">
-                <a16:creationId xmlns:a16="http://schemas.microsoft.com/office/drawing/2014/main" id="{30171867-7710-4B87-8FCE-7E7DB52F969B}"/>
+                <a16:creationId xmlns:a16="http://schemas.microsoft.com/office/drawing/2014/main" xmlns="" id="{30171867-7710-4B87-8FCE-7E7DB52F969B}"/>
               </a:ext>
             </a:extLst>
           </p:cNvPr>
@@ -1512,7 +1514,7 @@
           <p:cNvPr id="2" name="標題 1">
             <a:extLst>
               <a:ext uri="{FF2B5EF4-FFF2-40B4-BE49-F238E27FC236}">
-                <a16:creationId xmlns:a16="http://schemas.microsoft.com/office/drawing/2014/main" id="{E2BF2966-8253-4F79-8EED-67C4A19E058D}"/>
+                <a16:creationId xmlns:a16="http://schemas.microsoft.com/office/drawing/2014/main" xmlns="" id="{E2BF2966-8253-4F79-8EED-67C4A19E058D}"/>
               </a:ext>
             </a:extLst>
           </p:cNvPr>
@@ -1546,7 +1548,7 @@
           <p:cNvPr id="3" name="文字版面配置區 2">
             <a:extLst>
               <a:ext uri="{FF2B5EF4-FFF2-40B4-BE49-F238E27FC236}">
-                <a16:creationId xmlns:a16="http://schemas.microsoft.com/office/drawing/2014/main" id="{82BEBD01-2B0D-4AAD-B471-B6E232DE669C}"/>
+                <a16:creationId xmlns:a16="http://schemas.microsoft.com/office/drawing/2014/main" xmlns="" id="{82BEBD01-2B0D-4AAD-B471-B6E232DE669C}"/>
               </a:ext>
             </a:extLst>
           </p:cNvPr>
@@ -1617,7 +1619,7 @@
           <p:cNvPr id="4" name="內容版面配置區 3">
             <a:extLst>
               <a:ext uri="{FF2B5EF4-FFF2-40B4-BE49-F238E27FC236}">
-                <a16:creationId xmlns:a16="http://schemas.microsoft.com/office/drawing/2014/main" id="{DB2E7D45-DA8D-4833-A154-D050CA28FD64}"/>
+                <a16:creationId xmlns:a16="http://schemas.microsoft.com/office/drawing/2014/main" xmlns="" id="{DB2E7D45-DA8D-4833-A154-D050CA28FD64}"/>
               </a:ext>
             </a:extLst>
           </p:cNvPr>
@@ -1680,7 +1682,7 @@
           <p:cNvPr id="5" name="文字版面配置區 4">
             <a:extLst>
               <a:ext uri="{FF2B5EF4-FFF2-40B4-BE49-F238E27FC236}">
-                <a16:creationId xmlns:a16="http://schemas.microsoft.com/office/drawing/2014/main" id="{22CBCF01-2639-44EA-9E8B-89013494D2E3}"/>
+                <a16:creationId xmlns:a16="http://schemas.microsoft.com/office/drawing/2014/main" xmlns="" id="{22CBCF01-2639-44EA-9E8B-89013494D2E3}"/>
               </a:ext>
             </a:extLst>
           </p:cNvPr>
@@ -1751,7 +1753,7 @@
           <p:cNvPr id="6" name="內容版面配置區 5">
             <a:extLst>
               <a:ext uri="{FF2B5EF4-FFF2-40B4-BE49-F238E27FC236}">
-                <a16:creationId xmlns:a16="http://schemas.microsoft.com/office/drawing/2014/main" id="{6B98DDC0-BADE-4764-A519-89897B39BCFE}"/>
+                <a16:creationId xmlns:a16="http://schemas.microsoft.com/office/drawing/2014/main" xmlns="" id="{6B98DDC0-BADE-4764-A519-89897B39BCFE}"/>
               </a:ext>
             </a:extLst>
           </p:cNvPr>
@@ -1814,7 +1816,7 @@
           <p:cNvPr id="7" name="日期版面配置區 6">
             <a:extLst>
               <a:ext uri="{FF2B5EF4-FFF2-40B4-BE49-F238E27FC236}">
-                <a16:creationId xmlns:a16="http://schemas.microsoft.com/office/drawing/2014/main" id="{881DD612-3847-4A0B-B7AE-EC5F1CA587C0}"/>
+                <a16:creationId xmlns:a16="http://schemas.microsoft.com/office/drawing/2014/main" xmlns="" id="{881DD612-3847-4A0B-B7AE-EC5F1CA587C0}"/>
               </a:ext>
             </a:extLst>
           </p:cNvPr>
@@ -1832,7 +1834,7 @@
           <a:p>
             <a:fld id="{308EF277-7957-4950-8844-43C656DF05A1}" type="datetimeFigureOut">
               <a:rPr lang="en-US" smtClean="0"/>
-              <a:t>10/7/2019</a:t>
+              <a:t>11/4/2019</a:t>
             </a:fld>
             <a:endParaRPr lang="en-US"/>
           </a:p>
@@ -1843,7 +1845,7 @@
           <p:cNvPr id="8" name="頁尾版面配置區 7">
             <a:extLst>
               <a:ext uri="{FF2B5EF4-FFF2-40B4-BE49-F238E27FC236}">
-                <a16:creationId xmlns:a16="http://schemas.microsoft.com/office/drawing/2014/main" id="{2EEEAD35-4196-44E7-88C9-593C8EE1DC57}"/>
+                <a16:creationId xmlns:a16="http://schemas.microsoft.com/office/drawing/2014/main" xmlns="" id="{2EEEAD35-4196-44E7-88C9-593C8EE1DC57}"/>
               </a:ext>
             </a:extLst>
           </p:cNvPr>
@@ -1868,7 +1870,7 @@
           <p:cNvPr id="9" name="投影片編號版面配置區 8">
             <a:extLst>
               <a:ext uri="{FF2B5EF4-FFF2-40B4-BE49-F238E27FC236}">
-                <a16:creationId xmlns:a16="http://schemas.microsoft.com/office/drawing/2014/main" id="{77719CE7-426B-4C82-A331-2DCA0DA2D3F1}"/>
+                <a16:creationId xmlns:a16="http://schemas.microsoft.com/office/drawing/2014/main" xmlns="" id="{77719CE7-426B-4C82-A331-2DCA0DA2D3F1}"/>
               </a:ext>
             </a:extLst>
           </p:cNvPr>
@@ -1927,7 +1929,7 @@
           <p:cNvPr id="2" name="標題 1">
             <a:extLst>
               <a:ext uri="{FF2B5EF4-FFF2-40B4-BE49-F238E27FC236}">
-                <a16:creationId xmlns:a16="http://schemas.microsoft.com/office/drawing/2014/main" id="{1FE12DCA-69A8-4E5D-8F53-3BA4C163D2B0}"/>
+                <a16:creationId xmlns:a16="http://schemas.microsoft.com/office/drawing/2014/main" xmlns="" id="{1FE12DCA-69A8-4E5D-8F53-3BA4C163D2B0}"/>
               </a:ext>
             </a:extLst>
           </p:cNvPr>
@@ -1956,7 +1958,7 @@
           <p:cNvPr id="3" name="日期版面配置區 2">
             <a:extLst>
               <a:ext uri="{FF2B5EF4-FFF2-40B4-BE49-F238E27FC236}">
-                <a16:creationId xmlns:a16="http://schemas.microsoft.com/office/drawing/2014/main" id="{6F212DE5-7CF3-447B-9B0A-5D6FA859F4A4}"/>
+                <a16:creationId xmlns:a16="http://schemas.microsoft.com/office/drawing/2014/main" xmlns="" id="{6F212DE5-7CF3-447B-9B0A-5D6FA859F4A4}"/>
               </a:ext>
             </a:extLst>
           </p:cNvPr>
@@ -1974,7 +1976,7 @@
           <a:p>
             <a:fld id="{308EF277-7957-4950-8844-43C656DF05A1}" type="datetimeFigureOut">
               <a:rPr lang="en-US" smtClean="0"/>
-              <a:t>10/7/2019</a:t>
+              <a:t>11/4/2019</a:t>
             </a:fld>
             <a:endParaRPr lang="en-US"/>
           </a:p>
@@ -1985,7 +1987,7 @@
           <p:cNvPr id="4" name="頁尾版面配置區 3">
             <a:extLst>
               <a:ext uri="{FF2B5EF4-FFF2-40B4-BE49-F238E27FC236}">
-                <a16:creationId xmlns:a16="http://schemas.microsoft.com/office/drawing/2014/main" id="{CB774918-57DB-462C-8AD5-B80AE2BE82E9}"/>
+                <a16:creationId xmlns:a16="http://schemas.microsoft.com/office/drawing/2014/main" xmlns="" id="{CB774918-57DB-462C-8AD5-B80AE2BE82E9}"/>
               </a:ext>
             </a:extLst>
           </p:cNvPr>
@@ -2010,7 +2012,7 @@
           <p:cNvPr id="5" name="投影片編號版面配置區 4">
             <a:extLst>
               <a:ext uri="{FF2B5EF4-FFF2-40B4-BE49-F238E27FC236}">
-                <a16:creationId xmlns:a16="http://schemas.microsoft.com/office/drawing/2014/main" id="{D02979A6-49E6-46D6-A408-7E9EEB24B2C8}"/>
+                <a16:creationId xmlns:a16="http://schemas.microsoft.com/office/drawing/2014/main" xmlns="" id="{D02979A6-49E6-46D6-A408-7E9EEB24B2C8}"/>
               </a:ext>
             </a:extLst>
           </p:cNvPr>
@@ -2069,7 +2071,7 @@
           <p:cNvPr id="2" name="日期版面配置區 1">
             <a:extLst>
               <a:ext uri="{FF2B5EF4-FFF2-40B4-BE49-F238E27FC236}">
-                <a16:creationId xmlns:a16="http://schemas.microsoft.com/office/drawing/2014/main" id="{E25B78D0-8299-4777-9521-7DAC1D52C7BC}"/>
+                <a16:creationId xmlns:a16="http://schemas.microsoft.com/office/drawing/2014/main" xmlns="" id="{E25B78D0-8299-4777-9521-7DAC1D52C7BC}"/>
               </a:ext>
             </a:extLst>
           </p:cNvPr>
@@ -2087,7 +2089,7 @@
           <a:p>
             <a:fld id="{308EF277-7957-4950-8844-43C656DF05A1}" type="datetimeFigureOut">
               <a:rPr lang="en-US" smtClean="0"/>
-              <a:t>10/7/2019</a:t>
+              <a:t>11/4/2019</a:t>
             </a:fld>
             <a:endParaRPr lang="en-US"/>
           </a:p>
@@ -2098,7 +2100,7 @@
           <p:cNvPr id="3" name="頁尾版面配置區 2">
             <a:extLst>
               <a:ext uri="{FF2B5EF4-FFF2-40B4-BE49-F238E27FC236}">
-                <a16:creationId xmlns:a16="http://schemas.microsoft.com/office/drawing/2014/main" id="{21C2EFF7-28C0-4A00-941E-CAB2EEB7B396}"/>
+                <a16:creationId xmlns:a16="http://schemas.microsoft.com/office/drawing/2014/main" xmlns="" id="{21C2EFF7-28C0-4A00-941E-CAB2EEB7B396}"/>
               </a:ext>
             </a:extLst>
           </p:cNvPr>
@@ -2123,7 +2125,7 @@
           <p:cNvPr id="4" name="投影片編號版面配置區 3">
             <a:extLst>
               <a:ext uri="{FF2B5EF4-FFF2-40B4-BE49-F238E27FC236}">
-                <a16:creationId xmlns:a16="http://schemas.microsoft.com/office/drawing/2014/main" id="{1A702276-6BBB-404C-9B2C-BD6371B75F93}"/>
+                <a16:creationId xmlns:a16="http://schemas.microsoft.com/office/drawing/2014/main" xmlns="" id="{1A702276-6BBB-404C-9B2C-BD6371B75F93}"/>
               </a:ext>
             </a:extLst>
           </p:cNvPr>
@@ -2182,7 +2184,7 @@
           <p:cNvPr id="2" name="標題 1">
             <a:extLst>
               <a:ext uri="{FF2B5EF4-FFF2-40B4-BE49-F238E27FC236}">
-                <a16:creationId xmlns:a16="http://schemas.microsoft.com/office/drawing/2014/main" id="{5D10841A-423A-4339-95EF-2BCB941D6E14}"/>
+                <a16:creationId xmlns:a16="http://schemas.microsoft.com/office/drawing/2014/main" xmlns="" id="{5D10841A-423A-4339-95EF-2BCB941D6E14}"/>
               </a:ext>
             </a:extLst>
           </p:cNvPr>
@@ -2220,7 +2222,7 @@
           <p:cNvPr id="3" name="內容版面配置區 2">
             <a:extLst>
               <a:ext uri="{FF2B5EF4-FFF2-40B4-BE49-F238E27FC236}">
-                <a16:creationId xmlns:a16="http://schemas.microsoft.com/office/drawing/2014/main" id="{55FA11F7-421A-4A43-8AD5-971D8E1DED8B}"/>
+                <a16:creationId xmlns:a16="http://schemas.microsoft.com/office/drawing/2014/main" xmlns="" id="{55FA11F7-421A-4A43-8AD5-971D8E1DED8B}"/>
               </a:ext>
             </a:extLst>
           </p:cNvPr>
@@ -2311,7 +2313,7 @@
           <p:cNvPr id="4" name="文字版面配置區 3">
             <a:extLst>
               <a:ext uri="{FF2B5EF4-FFF2-40B4-BE49-F238E27FC236}">
-                <a16:creationId xmlns:a16="http://schemas.microsoft.com/office/drawing/2014/main" id="{65018E35-020D-4A65-907D-3F3B32A4EF78}"/>
+                <a16:creationId xmlns:a16="http://schemas.microsoft.com/office/drawing/2014/main" xmlns="" id="{65018E35-020D-4A65-907D-3F3B32A4EF78}"/>
               </a:ext>
             </a:extLst>
           </p:cNvPr>
@@ -2382,7 +2384,7 @@
           <p:cNvPr id="5" name="日期版面配置區 4">
             <a:extLst>
               <a:ext uri="{FF2B5EF4-FFF2-40B4-BE49-F238E27FC236}">
-                <a16:creationId xmlns:a16="http://schemas.microsoft.com/office/drawing/2014/main" id="{D392C35B-8B4B-414E-B686-32E61F515A31}"/>
+                <a16:creationId xmlns:a16="http://schemas.microsoft.com/office/drawing/2014/main" xmlns="" id="{D392C35B-8B4B-414E-B686-32E61F515A31}"/>
               </a:ext>
             </a:extLst>
           </p:cNvPr>
@@ -2400,7 +2402,7 @@
           <a:p>
             <a:fld id="{308EF277-7957-4950-8844-43C656DF05A1}" type="datetimeFigureOut">
               <a:rPr lang="en-US" smtClean="0"/>
-              <a:t>10/7/2019</a:t>
+              <a:t>11/4/2019</a:t>
             </a:fld>
             <a:endParaRPr lang="en-US"/>
           </a:p>
@@ -2411,7 +2413,7 @@
           <p:cNvPr id="6" name="頁尾版面配置區 5">
             <a:extLst>
               <a:ext uri="{FF2B5EF4-FFF2-40B4-BE49-F238E27FC236}">
-                <a16:creationId xmlns:a16="http://schemas.microsoft.com/office/drawing/2014/main" id="{0B42AE15-ED07-445B-AFA3-CC17AACC47A5}"/>
+                <a16:creationId xmlns:a16="http://schemas.microsoft.com/office/drawing/2014/main" xmlns="" id="{0B42AE15-ED07-445B-AFA3-CC17AACC47A5}"/>
               </a:ext>
             </a:extLst>
           </p:cNvPr>
@@ -2436,7 +2438,7 @@
           <p:cNvPr id="7" name="投影片編號版面配置區 6">
             <a:extLst>
               <a:ext uri="{FF2B5EF4-FFF2-40B4-BE49-F238E27FC236}">
-                <a16:creationId xmlns:a16="http://schemas.microsoft.com/office/drawing/2014/main" id="{C5D38D6B-D6E9-4C6F-91D5-113E36CAB582}"/>
+                <a16:creationId xmlns:a16="http://schemas.microsoft.com/office/drawing/2014/main" xmlns="" id="{C5D38D6B-D6E9-4C6F-91D5-113E36CAB582}"/>
               </a:ext>
             </a:extLst>
           </p:cNvPr>
@@ -2495,7 +2497,7 @@
           <p:cNvPr id="2" name="標題 1">
             <a:extLst>
               <a:ext uri="{FF2B5EF4-FFF2-40B4-BE49-F238E27FC236}">
-                <a16:creationId xmlns:a16="http://schemas.microsoft.com/office/drawing/2014/main" id="{FED623AC-B2EC-4A0B-927C-11F71BB2CBAF}"/>
+                <a16:creationId xmlns:a16="http://schemas.microsoft.com/office/drawing/2014/main" xmlns="" id="{FED623AC-B2EC-4A0B-927C-11F71BB2CBAF}"/>
               </a:ext>
             </a:extLst>
           </p:cNvPr>
@@ -2533,7 +2535,7 @@
           <p:cNvPr id="3" name="圖片版面配置區 2">
             <a:extLst>
               <a:ext uri="{FF2B5EF4-FFF2-40B4-BE49-F238E27FC236}">
-                <a16:creationId xmlns:a16="http://schemas.microsoft.com/office/drawing/2014/main" id="{5EED2DAC-D0A8-4440-84BB-E2D3BC7EA389}"/>
+                <a16:creationId xmlns:a16="http://schemas.microsoft.com/office/drawing/2014/main" xmlns="" id="{5EED2DAC-D0A8-4440-84BB-E2D3BC7EA389}"/>
               </a:ext>
             </a:extLst>
           </p:cNvPr>
@@ -2600,7 +2602,7 @@
           <p:cNvPr id="4" name="文字版面配置區 3">
             <a:extLst>
               <a:ext uri="{FF2B5EF4-FFF2-40B4-BE49-F238E27FC236}">
-                <a16:creationId xmlns:a16="http://schemas.microsoft.com/office/drawing/2014/main" id="{7E5292D8-4251-448F-BABA-92BAE1AA73E6}"/>
+                <a16:creationId xmlns:a16="http://schemas.microsoft.com/office/drawing/2014/main" xmlns="" id="{7E5292D8-4251-448F-BABA-92BAE1AA73E6}"/>
               </a:ext>
             </a:extLst>
           </p:cNvPr>
@@ -2671,7 +2673,7 @@
           <p:cNvPr id="5" name="日期版面配置區 4">
             <a:extLst>
               <a:ext uri="{FF2B5EF4-FFF2-40B4-BE49-F238E27FC236}">
-                <a16:creationId xmlns:a16="http://schemas.microsoft.com/office/drawing/2014/main" id="{54357AF7-CA25-4F54-A815-87613EEFAAB5}"/>
+                <a16:creationId xmlns:a16="http://schemas.microsoft.com/office/drawing/2014/main" xmlns="" id="{54357AF7-CA25-4F54-A815-87613EEFAAB5}"/>
               </a:ext>
             </a:extLst>
           </p:cNvPr>
@@ -2689,7 +2691,7 @@
           <a:p>
             <a:fld id="{308EF277-7957-4950-8844-43C656DF05A1}" type="datetimeFigureOut">
               <a:rPr lang="en-US" smtClean="0"/>
-              <a:t>10/7/2019</a:t>
+              <a:t>11/4/2019</a:t>
             </a:fld>
             <a:endParaRPr lang="en-US"/>
           </a:p>
@@ -2700,7 +2702,7 @@
           <p:cNvPr id="6" name="頁尾版面配置區 5">
             <a:extLst>
               <a:ext uri="{FF2B5EF4-FFF2-40B4-BE49-F238E27FC236}">
-                <a16:creationId xmlns:a16="http://schemas.microsoft.com/office/drawing/2014/main" id="{BBA7B2D3-DE97-4E4A-8F05-7720C8F458A0}"/>
+                <a16:creationId xmlns:a16="http://schemas.microsoft.com/office/drawing/2014/main" xmlns="" id="{BBA7B2D3-DE97-4E4A-8F05-7720C8F458A0}"/>
               </a:ext>
             </a:extLst>
           </p:cNvPr>
@@ -2725,7 +2727,7 @@
           <p:cNvPr id="7" name="投影片編號版面配置區 6">
             <a:extLst>
               <a:ext uri="{FF2B5EF4-FFF2-40B4-BE49-F238E27FC236}">
-                <a16:creationId xmlns:a16="http://schemas.microsoft.com/office/drawing/2014/main" id="{C13ED175-CE68-4572-BF99-01C321D46AF3}"/>
+                <a16:creationId xmlns:a16="http://schemas.microsoft.com/office/drawing/2014/main" xmlns="" id="{C13ED175-CE68-4572-BF99-01C321D46AF3}"/>
               </a:ext>
             </a:extLst>
           </p:cNvPr>
@@ -2789,7 +2791,7 @@
           <p:cNvPr id="2" name="標題版面配置區 1">
             <a:extLst>
               <a:ext uri="{FF2B5EF4-FFF2-40B4-BE49-F238E27FC236}">
-                <a16:creationId xmlns:a16="http://schemas.microsoft.com/office/drawing/2014/main" id="{70952118-C09C-4914-9C11-21A076CF3E64}"/>
+                <a16:creationId xmlns:a16="http://schemas.microsoft.com/office/drawing/2014/main" xmlns="" id="{70952118-C09C-4914-9C11-21A076CF3E64}"/>
               </a:ext>
             </a:extLst>
           </p:cNvPr>
@@ -2828,7 +2830,7 @@
           <p:cNvPr id="3" name="文字版面配置區 2">
             <a:extLst>
               <a:ext uri="{FF2B5EF4-FFF2-40B4-BE49-F238E27FC236}">
-                <a16:creationId xmlns:a16="http://schemas.microsoft.com/office/drawing/2014/main" id="{3AE4C985-C2B3-4AE4-BED9-8808C6A16CEC}"/>
+                <a16:creationId xmlns:a16="http://schemas.microsoft.com/office/drawing/2014/main" xmlns="" id="{3AE4C985-C2B3-4AE4-BED9-8808C6A16CEC}"/>
               </a:ext>
             </a:extLst>
           </p:cNvPr>
@@ -2896,7 +2898,7 @@
           <p:cNvPr id="4" name="日期版面配置區 3">
             <a:extLst>
               <a:ext uri="{FF2B5EF4-FFF2-40B4-BE49-F238E27FC236}">
-                <a16:creationId xmlns:a16="http://schemas.microsoft.com/office/drawing/2014/main" id="{3739DD90-0545-43F3-A164-6D6FBE60CD63}"/>
+                <a16:creationId xmlns:a16="http://schemas.microsoft.com/office/drawing/2014/main" xmlns="" id="{3739DD90-0545-43F3-A164-6D6FBE60CD63}"/>
               </a:ext>
             </a:extLst>
           </p:cNvPr>
@@ -2932,7 +2934,7 @@
           <a:p>
             <a:fld id="{308EF277-7957-4950-8844-43C656DF05A1}" type="datetimeFigureOut">
               <a:rPr lang="en-US" smtClean="0"/>
-              <a:t>10/7/2019</a:t>
+              <a:t>11/4/2019</a:t>
             </a:fld>
             <a:endParaRPr lang="en-US"/>
           </a:p>
@@ -2943,7 +2945,7 @@
           <p:cNvPr id="5" name="頁尾版面配置區 4">
             <a:extLst>
               <a:ext uri="{FF2B5EF4-FFF2-40B4-BE49-F238E27FC236}">
-                <a16:creationId xmlns:a16="http://schemas.microsoft.com/office/drawing/2014/main" id="{0F0AF2CD-9E2E-46E3-94AC-087AB961FC07}"/>
+                <a16:creationId xmlns:a16="http://schemas.microsoft.com/office/drawing/2014/main" xmlns="" id="{0F0AF2CD-9E2E-46E3-94AC-087AB961FC07}"/>
               </a:ext>
             </a:extLst>
           </p:cNvPr>
@@ -2986,7 +2988,7 @@
           <p:cNvPr id="6" name="投影片編號版面配置區 5">
             <a:extLst>
               <a:ext uri="{FF2B5EF4-FFF2-40B4-BE49-F238E27FC236}">
-                <a16:creationId xmlns:a16="http://schemas.microsoft.com/office/drawing/2014/main" id="{5F1F57D4-AA98-40C3-BF1A-297BCFCA8558}"/>
+                <a16:creationId xmlns:a16="http://schemas.microsoft.com/office/drawing/2014/main" xmlns="" id="{5F1F57D4-AA98-40C3-BF1A-297BCFCA8558}"/>
               </a:ext>
             </a:extLst>
           </p:cNvPr>
@@ -3354,7 +3356,7 @@
           <p:cNvPr id="4" name="圓角矩形 6">
             <a:extLst>
               <a:ext uri="{FF2B5EF4-FFF2-40B4-BE49-F238E27FC236}">
-                <a16:creationId xmlns:a16="http://schemas.microsoft.com/office/drawing/2014/main" id="{9292555D-6383-47AB-94C4-8C24D05C629F}"/>
+                <a16:creationId xmlns:a16="http://schemas.microsoft.com/office/drawing/2014/main" xmlns="" id="{9292555D-6383-47AB-94C4-8C24D05C629F}"/>
               </a:ext>
             </a:extLst>
           </p:cNvPr>
@@ -3407,7 +3409,7 @@
           <p:cNvPr id="8" name="AutoShape 2" descr="data:image/jpeg;base64,/9j/4AAQSkZJRgABAQAAAQABAAD/2wCEAAkGBhASEBAQDxAODxQSEg8PEBAUEBAPEBAQFBAVFBQQFRQXHCYeFxkjGRQUHy8gIycpLCwsFR4xNTMqNSYrLCkBCQoKDgwOFw8PGiwcHBwpLCksKSkpKSwpKSktNSopLCkpLCwsNSkpKSksKSkpKSwpKiopKTUpKSkvKSwpKSkpKf/AABEIAMwAzAMBIgACEQEDEQH/xAAbAAABBQEBAAAAAAAAAAAAAAAAAgMEBQYBB//EAEUQAAEDAgIGBgYGCAUFAAAAAAEAAgMEERIhBQYxQVFxE2GBkaHBIjJCUpKxFCMzcqKyJFNiY4LR4fAHFkOTsxVEg8LD/8QAGQEBAAMBAQAAAAAAAAAAAAAAAAEDBAIF/8QAJxEBAAIBAwMDBAMAAAAAAAAAAAECEQMSIQQxQRMyYQUiQlGRocH/2gAMAwEAAhEDEQA/APcUIQgFFrtIsiDS+/pEgWF9m9Slm9bpheJu+z3HkbAfIoLSPT0B9u3MFSWV0Z2PZ8QC8j0hrUYp5IRCJAzAMQkwuJcwOIsRbK6k0+tzMsUNQ37vRyfIhd7LYzhxvrHGXrDXg7CD2pS8zbrVTb5JW/ehly7QCFLptbICbMrIr8OlwHudZc4mO7qJiez0FCydPpuY+rIH8ix/yU9mmpd7W/CQoSvUKobpx29g7yE83TTd7XDuKCxQobdKxneRzBTgr4/fHigkISGzNOxzT2hLQCEIQCEIQCEIQCEIQCEIQCEIQCx+tUmKcN91rG95J81sFh9Nz/pEznWsw+DGXQebl/SVVQ7beaQDk12EflV/R0TTuWX1ediAefau883Eu81sKIr161xSIePrzm0p8OiGFEurrCLEA9RzCn0pyUrEqpiGfdMM27VCPcxretowHvbZJGgpWZRzVEfU2aQDxK1LXJQKiaRKY17x2lmfote0+jVT8nYJB+JqdbpOvZ63QSc4iwnta7yW4hha5rTYZgLkmjmHcFmmK/p6EX1MZiWNZrPMPXpmn7krh+ZqdGt7B60E45GN/mFpH6EjO5RZdW2HcFG2ruNW6sj1upT6xlZ96Jx8W3U6DWOmPq1UV+BfgPcVHn1SadwUGXU7qUenH7TGvbzDURaQJ9WUO5Oa5SGVknHwC8/qdTyPVFuQwnwUZmhall8EszeT3jzUen8u/XjzD1Btc7eAnm1V9y8mdpTSUR9GeQgbnBr/ABIulx6+6QZ67IJOcZae8HyT0bJ9ej1oShclna1pc4hoaCSTsAG9YXVTXmeqqGwvp4mAhxc9rnXADSdhHEDvWj1lntRz9bQz4iAuLVms4lbW0WjMLljwQCCCCLgjMEcUpZ3UeoLqdzSb4Hlo5YQbeK0S5dBCEIBCEIBeZ6x1BENdIdoiqXeBA8l6RUSYWOdwa49wXkuts9qCoO0vMMXPHKCfAFTWMzEE8QzOgWWaBwAHcLLU0RWY0R6oWloSvamOHi37r+mdkpGJQ6ZykFyoZ7H2OS8SjtelY1OFMyvtGSXZbgSPPzUvEqrREnrDkVYl6yXjFperoXzSDl1wlN41wvXGF244SuBNF66HqcOdwfZNCJpOwLjpElkmanCM8o1Vo+M7goE2gYyNitJnpp0isiZwiYhD0FodsM5e232bx2lzbeak62yfopHGSMeN0/SH0nnqY3tu4n5hVut0v1UTeMjj8Lf6rNqTmzbpRisLXUqK1Lf3nvPl5K+Vdq7FhpYR+wHfFn5qxVawIQhAIQhBX6elw00p/Zt3kBeWa02dHTxHZJOXHlHC7zeO5ej63y2p7e89g7rnyXmOsp+upBwjqJO1z42D8rl3pxm0Obe2VXSxFhLTtBt/VXtE5VOloiCyRuVwGu5jYe75J+hrCOB8F7Uc1y8i8Ylp6Z6fdIqqmrRbenzVDiqtvLNdYtkS8agxzJ0SqcM1lzouT0+YIVoXrP0E1nX4Zq4MizaleWzp7/bhIxpBkTBkTZlXG1o3pBkSnSZKGJEqSVNqNxb5E2yX0gmJJUyJsxzXUVTFk6d+ajmRdqXqGZFMRw7meVlo/ZI7i8D4WD+ap9a5bvibwY93e7+ittHfZA+8+V34y3/1VJpwY6oN6omfEf6rDf3S9GnthvqJto4xwYwfhCeXGiwA4ZLq5dhCEIBCEIMtr1UWbA3i9zjyDbea831gl/TGt/V08DSOtxfKfCRvctvr7NeeNg9mMntc63kvOdKVGKuqjwl6Mco2NYPyq/QjN1erOKrOVoews4jLqI2Kvpn280/DOmaoWfcbHZ9u/wDvrXraf6edqRnlPimThqFWMmXTUK2KsdoWsVQpLao8SqSOoUls672sl6tHQ1Rzz3K5irLtB6gspQz5O5K0o6r0eRI81n1NNOlaYnC4dVJp1YoD6hR3VCq9Nqi0riKruUmSszKr4J8iUy6oUbE7k6St6kwa3MKHJMmDKuoo7iWgqan0RyUA1RvuXZJbsHJVlTNZryNzXW54TZcRV3lsdHfYQdcTHHm8Yz4uKq8OPSLR+8jB/haD8wrmNgAY0ZANY0DgA0BVOrvp1xd+1M/5gfNeVM5nL2Y4btCEKEhCEIBCEIPPNYX9JpHDwfBH2XBPzK8sgqMUkr9uKSV3fI4hei1lZ+l1M5/0vpU3+zE8jxaF5ZQus0ch8ls6SMzMqNeeIheRTqTM/EzrGYVMyZTIalejHdjkCdBnUOd9nHvCb6ZaYZ7VWcc6ksnVMyZSWTK2IZr1aKhn9F3Yp9DU7RyKz9HP6J5qbTVFj4Li1c5ZsYsuZKhR3VChyVKZE9yFVtaKroz2ZzTXTqHUVGwcAmunXE1TCa+ZIEqiGVHSZLnDvK8ZNeMKEPSc1vvPjbzvI247roppfq0rRAxVNOOErX9jLuPgCqbcRMrNPm8R8tzLLYudwxO7rlV2pMd53HhGe8uCk1Tvq5DwY/5W80vUaL7Z/wBxvzP8l473WrQhCAQhCASZH2BJ3AnuCUq/T82GlqHcIpB2lpA+aDyHS1Xho66QnN0BZfrmla0+BcsHC/Ja3Wx+HR792Oopo+qzWvkI8Asaw5L1ugpmsz8sfU25iEkSJ+OdQcSW163bGbclVD7i/BRukXS9RypxhHdKbKpDJVXhyeY9XVlVaq4pZsu1Sm1FrKpp35J8yKzDJavKyfUrtPNdyrDMnqaW1yqph3jhYyVN3FdEyrGzJ0SqmU4TxKuulUISpXSKuRdUcvoHtU/VoXqmH3WTP7DGY/nIFS0MmR/vcr3VCO88r/chDP8AclaR/wAJWXXnFJW9NzrVhpdJPtDJ1hre9w/krbUyO0Dne9I7wACo9Lu+qA4vH4Wn+a02q7bUsXXiP4yvJe6tUIQgEIQgFRa6y2opR72Fne4X8Ar1RNJaLinZglBIviFnFtja18uaDyaOdzQWgjCcy1zWPaTxLXAi6Z+g0z8WOhpX5Xc5ofA+3HFG4fJbyq/w9jP2Ur29TgHKnqdSKply3o35HMGxtwzTNq+2cSWjMMfPqpQSep9LpnHYA6OojHxAO8VDd/h87Po6unPASNlgPabOC08uhalhziflyK76TfWY9vWWuA71pr1etX8v55Vzo0nwxVXqNXsBLYOmaPaheycdgacXgqGpp3xkiVj4iNoexzLd4XqrJRtBHMbU59OkGx7+V8Q7itFfqF/yiJ/pVPS18S8jaU40r0qshgkuZqSklJ2u6LoJT/5Ii0qnn1Yo3G7W1MHUyVsrRyDxfxWin1Cn5RMKrdLbxLMwHIJxzlfP1QZ/o1beps8L4vxxl48FBqtWqppyjZMNxikZLfk0HF3gLZXrNG3a3+Mdun1InsrcSeDrN5puppZYj9dFLF99jmjvIsh8oNrEbF3uieYlVNZjiS2uTocmWlOtVcoOtcnGlNNTjVVLlNon7exavUxotUP3l8UZ/hY93/0WPgNitnqi0dA8+9NJf+FrGrH1M/ZLR0dc6ufhY6Xd9mPvH5BbPQkWGnhH7DXfEMXmsXpPN0bf2fFzit/EzC1rRuAHcLLzHtFoQhAIQhAIQhALhC6hAxJCDtAPYocmjY/caN+XonvCsrJJYgztVq5C65tn15gfI+KrKnVNvsEjk7aeRBC2LokxKwAEkgAbScggwU2rUw3X7Ae8g+Sr5dDTN9jF1tIPhkVtKvTcLdl38sm958rqrn1jJ2NYObcZHacvBE5ZSSNzfXa5n3gW/NIsOpXFdWPfm15jcPaAbY9Tm2sQqt2lXg4Z4KeT9oNMTiOIcz+SGSoauRuTJJGjgHOw/DsXJaeGU3mp6aQna7omxPPN8WEntSPp9OTnHPF91zZR3OsfFS6c0zvUq4gfdla6E9+Y8UiZjtwicT3RXaqUL/YqIDxjmEjR/BIL/iUKp1F3wVbXcGzRPiPa9uJq08VE8+rhk643sk+RSjER6wLeYIV1dfUjyqtoac+GLfqjXtuWxxzAfqpopCeTb4vBV9RHNESJoJorbccbmgdpFl6I7ZfrGdrkC+ZUptR7LZHPFr2OwZ7LG4VsdXfyot0dJ7PMYa1p3r0DVgD6JCR7XSvPbK+3gAn59GU8l+kp6Z99pMQa/wCNliFJpoGtDWMaGMFmtYLkNbsAF8+9caut6kYTodP6VpnJWDFVRt4OhZ3WK3ixGi246trv3hd2DJbdZ2sIQhAIQhAIQhAIQhAIQkveACTsAJPIII+kNIMibieeQ3krG6Q0lLMc3YRuaMgEmurXTPL3b9g90bgmmtQRjR39pc/6ceI8VPaxOMiQVJ0a7q70zPotxFiCfJaNtMummQYybRHAkcwq+o0RJuDXdtvmt5LBxAPYoktE07rckHnj6Z8Zvhcw8RceIVpo7WeqZ6PTvcNwfaVvL0rrRy6P4WPUqup0Mw7WAHiPRKCVBrG8/aQwv62h0R8MlaU2kad/syxHf6sg8M1no6fDtu7rKkxyINPBQ4wXRPa8DI3BaU7Ho6XE30CcxmPStnvtsVTofSBjeDnbeOpbgYXDMAg57kETQmjQwl/Ox457VdXUdhTrSgcQuArqAQhCAQhCAQhCAUbSQvDKP3b/AMpUlcI3IPPWtTrWqZpDR5jkwbSQXR7frGjhxeBtHIqOwIFRsUqONIjYpEYQOsjXXRpTV0oIczEzHBe6lSrlIM3DqBQV0kQDi12zceCjVEBGThy4FW2k4Mg7hkeRUSGUEdHJmD6p4FBTy0oUKSnI2K7q6UsPEbj5KG9qCPSDMf3sW7oHWYwH3R8lnNC6IL3E2u1pGI7hvw9Z48LrUsgsgfY5SGJmNifa1AsJS4AuoBCEIBCEIBCEIBCEIGaukZKwskGIHsIO4gjMHrVBXaKljscLqloyxtwipaN2Jps2Xnkea0qEGSiwl2Fj2ud+rP1cw5xuse5SOjI9YFvMEK6r9FQzjDNEyQbrjNvW121p5KH/AJfwi0FRUwjc0vE7AOGGUO+aCK1DkP0ZXNvhlop+AfBJAe10bj8kjoK32qWjd9yqlb+aNA29cpzZ3YU4aeqP/Zxc/ppt/wAaR9BrPZpaRvW6pldb4WoHJSCCDvyVMYXG4AJtfYL+KuY9A1bj6c1NGOEcBkPxPd5KX/leNw+uknn4gydGw/wR4QgzjZS4dH9o73GDpZO4ZDmSFY6M1Xe4YpvqWn2AcUrhwc7Y3kL81pKOhjibgiYyNvBrQ0c+tPoGoaZrGhrGhoGwAWCUYwloQJDF2y6hAIQhAIQhAIQhAIQhAIQhAIQhAIQhAIQhAIQhAIQhAIQhAIQhAIQhAIQhAIQhB//Z">
             <a:extLst>
               <a:ext uri="{FF2B5EF4-FFF2-40B4-BE49-F238E27FC236}">
-                <a16:creationId xmlns:a16="http://schemas.microsoft.com/office/drawing/2014/main" id="{15B92B98-B7C8-4A75-A841-F25CD0136DE7}"/>
+                <a16:creationId xmlns:a16="http://schemas.microsoft.com/office/drawing/2014/main" xmlns="" id="{15B92B98-B7C8-4A75-A841-F25CD0136DE7}"/>
               </a:ext>
             </a:extLst>
           </p:cNvPr>
@@ -3446,7 +3448,7 @@
           <p:cNvPr id="17" name="群組 16">
             <a:extLst>
               <a:ext uri="{FF2B5EF4-FFF2-40B4-BE49-F238E27FC236}">
-                <a16:creationId xmlns:a16="http://schemas.microsoft.com/office/drawing/2014/main" id="{3E62AE25-4106-44ED-8F4E-D5D956A394D2}"/>
+                <a16:creationId xmlns:a16="http://schemas.microsoft.com/office/drawing/2014/main" xmlns="" id="{3E62AE25-4106-44ED-8F4E-D5D956A394D2}"/>
               </a:ext>
             </a:extLst>
           </p:cNvPr>
@@ -3466,7 +3468,7 @@
             <p:cNvPr id="18" name="圖片 17">
               <a:extLst>
                 <a:ext uri="{FF2B5EF4-FFF2-40B4-BE49-F238E27FC236}">
-                  <a16:creationId xmlns:a16="http://schemas.microsoft.com/office/drawing/2014/main" id="{DF00FD23-F9E0-40CA-BFAD-2BC20441329D}"/>
+                  <a16:creationId xmlns:a16="http://schemas.microsoft.com/office/drawing/2014/main" xmlns="" id="{DF00FD23-F9E0-40CA-BFAD-2BC20441329D}"/>
                 </a:ext>
               </a:extLst>
             </p:cNvPr>
@@ -3502,7 +3504,7 @@
             <p:cNvPr id="19" name="文字方塊 18">
               <a:extLst>
                 <a:ext uri="{FF2B5EF4-FFF2-40B4-BE49-F238E27FC236}">
-                  <a16:creationId xmlns:a16="http://schemas.microsoft.com/office/drawing/2014/main" id="{14F08A50-B905-4E9F-B65E-EEFCE05DA4E3}"/>
+                  <a16:creationId xmlns:a16="http://schemas.microsoft.com/office/drawing/2014/main" xmlns="" id="{14F08A50-B905-4E9F-B65E-EEFCE05DA4E3}"/>
                 </a:ext>
               </a:extLst>
             </p:cNvPr>
@@ -3557,7 +3559,7 @@
           <p:cNvPr id="35" name="矩形 34">
             <a:extLst>
               <a:ext uri="{FF2B5EF4-FFF2-40B4-BE49-F238E27FC236}">
-                <a16:creationId xmlns:a16="http://schemas.microsoft.com/office/drawing/2014/main" id="{A3837EC7-3FF7-497F-B8B9-5A0B2AE1FAD0}"/>
+                <a16:creationId xmlns:a16="http://schemas.microsoft.com/office/drawing/2014/main" xmlns="" id="{A3837EC7-3FF7-497F-B8B9-5A0B2AE1FAD0}"/>
               </a:ext>
             </a:extLst>
           </p:cNvPr>
@@ -3596,7 +3598,7 @@
           <p:cNvPr id="37" name="矩形 36">
             <a:extLst>
               <a:ext uri="{FF2B5EF4-FFF2-40B4-BE49-F238E27FC236}">
-                <a16:creationId xmlns:a16="http://schemas.microsoft.com/office/drawing/2014/main" id="{79B0EFC5-385A-4CBF-8F26-44920131D317}"/>
+                <a16:creationId xmlns:a16="http://schemas.microsoft.com/office/drawing/2014/main" xmlns="" id="{79B0EFC5-385A-4CBF-8F26-44920131D317}"/>
               </a:ext>
             </a:extLst>
           </p:cNvPr>
@@ -3649,7 +3651,7 @@
           <p:cNvPr id="38" name="圓角矩形 6">
             <a:extLst>
               <a:ext uri="{FF2B5EF4-FFF2-40B4-BE49-F238E27FC236}">
-                <a16:creationId xmlns:a16="http://schemas.microsoft.com/office/drawing/2014/main" id="{AA3F0518-490B-4DDF-BB4F-AE947406C799}"/>
+                <a16:creationId xmlns:a16="http://schemas.microsoft.com/office/drawing/2014/main" xmlns="" id="{AA3F0518-490B-4DDF-BB4F-AE947406C799}"/>
               </a:ext>
             </a:extLst>
           </p:cNvPr>
@@ -3704,7 +3706,7 @@
           <p:cNvPr id="48" name="文字方塊 47">
             <a:extLst>
               <a:ext uri="{FF2B5EF4-FFF2-40B4-BE49-F238E27FC236}">
-                <a16:creationId xmlns:a16="http://schemas.microsoft.com/office/drawing/2014/main" id="{0DF6CDA6-2149-48ED-A2DB-F56C93DC8F7D}"/>
+                <a16:creationId xmlns:a16="http://schemas.microsoft.com/office/drawing/2014/main" xmlns="" id="{0DF6CDA6-2149-48ED-A2DB-F56C93DC8F7D}"/>
               </a:ext>
             </a:extLst>
           </p:cNvPr>
@@ -3758,7 +3760,7 @@
           <p:cNvPr id="49" name="矩形 48">
             <a:extLst>
               <a:ext uri="{FF2B5EF4-FFF2-40B4-BE49-F238E27FC236}">
-                <a16:creationId xmlns:a16="http://schemas.microsoft.com/office/drawing/2014/main" id="{7C6A78A2-117B-4511-A337-A22A0D832DD5}"/>
+                <a16:creationId xmlns:a16="http://schemas.microsoft.com/office/drawing/2014/main" xmlns="" id="{7C6A78A2-117B-4511-A337-A22A0D832DD5}"/>
               </a:ext>
             </a:extLst>
           </p:cNvPr>
@@ -3811,7 +3813,7 @@
           <p:cNvPr id="51" name="圖片 50">
             <a:extLst>
               <a:ext uri="{FF2B5EF4-FFF2-40B4-BE49-F238E27FC236}">
-                <a16:creationId xmlns:a16="http://schemas.microsoft.com/office/drawing/2014/main" id="{360008C4-4A7C-4F98-BDE4-D845F6D06F74}"/>
+                <a16:creationId xmlns:a16="http://schemas.microsoft.com/office/drawing/2014/main" xmlns="" id="{360008C4-4A7C-4F98-BDE4-D845F6D06F74}"/>
               </a:ext>
             </a:extLst>
           </p:cNvPr>
@@ -3821,7 +3823,7 @@
           <p:nvPr/>
         </p:nvPicPr>
         <p:blipFill>
-          <a:blip r:embed="rId3">
+          <a:blip r:embed="rId3" cstate="print">
             <a:extLst>
               <a:ext uri="{28A0092B-C50C-407E-A947-70E740481C1C}">
                 <a14:useLocalDpi xmlns:a14="http://schemas.microsoft.com/office/drawing/2010/main" val="0"/>
@@ -3847,7 +3849,7 @@
           <p:cNvPr id="52" name="矩形 51">
             <a:extLst>
               <a:ext uri="{FF2B5EF4-FFF2-40B4-BE49-F238E27FC236}">
-                <a16:creationId xmlns:a16="http://schemas.microsoft.com/office/drawing/2014/main" id="{849940C1-270B-4DDA-82FD-843CAA8ED7ED}"/>
+                <a16:creationId xmlns:a16="http://schemas.microsoft.com/office/drawing/2014/main" xmlns="" id="{849940C1-270B-4DDA-82FD-843CAA8ED7ED}"/>
               </a:ext>
             </a:extLst>
           </p:cNvPr>
@@ -3856,8 +3858,8 @@
         </p:nvSpPr>
         <p:spPr>
           <a:xfrm>
-            <a:off x="4835668" y="1440977"/>
-            <a:ext cx="2844048" cy="369332"/>
+            <a:off x="5468852" y="1440977"/>
+            <a:ext cx="1577676" cy="369332"/>
           </a:xfrm>
           <a:prstGeom prst="rect">
             <a:avLst/>
@@ -3872,12 +3874,23 @@
           <a:p>
             <a:pPr algn="ctr"/>
             <a:r>
-              <a:rPr lang="en-US" altLang="zh-TW" b="1" dirty="0">
+              <a:rPr lang="en-US" altLang="zh-TW" b="1" dirty="0" err="1" smtClean="0">
                 <a:latin typeface="Consolas" panose="020B0609020204030204" pitchFamily="49" charset="0"/>
                 <a:cs typeface="Consolas" panose="020B0609020204030204" pitchFamily="49" charset="0"/>
               </a:rPr>
-              <a:t>Authentication Server</a:t>
-            </a:r>
+              <a:t>Auth</a:t>
+            </a:r>
+            <a:r>
+              <a:rPr lang="en-US" altLang="zh-TW" b="1" dirty="0" smtClean="0">
+                <a:latin typeface="Consolas" panose="020B0609020204030204" pitchFamily="49" charset="0"/>
+                <a:cs typeface="Consolas" panose="020B0609020204030204" pitchFamily="49" charset="0"/>
+              </a:rPr>
+              <a:t> Server</a:t>
+            </a:r>
+            <a:endParaRPr lang="en-US" altLang="zh-TW" b="1" dirty="0">
+              <a:latin typeface="Consolas" panose="020B0609020204030204" pitchFamily="49" charset="0"/>
+              <a:cs typeface="Consolas" panose="020B0609020204030204" pitchFamily="49" charset="0"/>
+            </a:endParaRPr>
           </a:p>
         </p:txBody>
       </p:sp>
@@ -3886,7 +3899,7 @@
           <p:cNvPr id="55" name="直線單箭頭接點 54">
             <a:extLst>
               <a:ext uri="{FF2B5EF4-FFF2-40B4-BE49-F238E27FC236}">
-                <a16:creationId xmlns:a16="http://schemas.microsoft.com/office/drawing/2014/main" id="{A8AC5B70-F649-4DB5-AE32-A6F5581DFE4C}"/>
+                <a16:creationId xmlns:a16="http://schemas.microsoft.com/office/drawing/2014/main" xmlns="" id="{A8AC5B70-F649-4DB5-AE32-A6F5581DFE4C}"/>
               </a:ext>
             </a:extLst>
           </p:cNvPr>
@@ -3928,7 +3941,7 @@
           <p:cNvPr id="58" name="圓角矩形 6">
             <a:extLst>
               <a:ext uri="{FF2B5EF4-FFF2-40B4-BE49-F238E27FC236}">
-                <a16:creationId xmlns:a16="http://schemas.microsoft.com/office/drawing/2014/main" id="{E0994BA9-38F8-40E8-8EAA-1E120C08B215}"/>
+                <a16:creationId xmlns:a16="http://schemas.microsoft.com/office/drawing/2014/main" xmlns="" id="{E0994BA9-38F8-40E8-8EAA-1E120C08B215}"/>
               </a:ext>
             </a:extLst>
           </p:cNvPr>
@@ -3978,7 +3991,7 @@
           <p:cNvPr id="59" name="文字方塊 58">
             <a:extLst>
               <a:ext uri="{FF2B5EF4-FFF2-40B4-BE49-F238E27FC236}">
-                <a16:creationId xmlns:a16="http://schemas.microsoft.com/office/drawing/2014/main" id="{CA8B39F2-1093-4652-9183-59D4A1FA31AE}"/>
+                <a16:creationId xmlns:a16="http://schemas.microsoft.com/office/drawing/2014/main" xmlns="" id="{CA8B39F2-1093-4652-9183-59D4A1FA31AE}"/>
               </a:ext>
             </a:extLst>
           </p:cNvPr>
@@ -4032,7 +4045,7 @@
           <p:cNvPr id="60" name="矩形 59">
             <a:extLst>
               <a:ext uri="{FF2B5EF4-FFF2-40B4-BE49-F238E27FC236}">
-                <a16:creationId xmlns:a16="http://schemas.microsoft.com/office/drawing/2014/main" id="{3B93D6B4-AAC0-4BDA-8620-5B2577AB6EAB}"/>
+                <a16:creationId xmlns:a16="http://schemas.microsoft.com/office/drawing/2014/main" xmlns="" id="{3B93D6B4-AAC0-4BDA-8620-5B2577AB6EAB}"/>
               </a:ext>
             </a:extLst>
           </p:cNvPr>
@@ -4085,7 +4098,7 @@
           <p:cNvPr id="61" name="圖片 60">
             <a:extLst>
               <a:ext uri="{FF2B5EF4-FFF2-40B4-BE49-F238E27FC236}">
-                <a16:creationId xmlns:a16="http://schemas.microsoft.com/office/drawing/2014/main" id="{BE73BB19-43C0-469E-8622-D3B22AE9CFCC}"/>
+                <a16:creationId xmlns:a16="http://schemas.microsoft.com/office/drawing/2014/main" xmlns="" id="{BE73BB19-43C0-469E-8622-D3B22AE9CFCC}"/>
               </a:ext>
             </a:extLst>
           </p:cNvPr>
@@ -4121,7 +4134,7 @@
           <p:cNvPr id="2" name="圖片 1">
             <a:extLst>
               <a:ext uri="{FF2B5EF4-FFF2-40B4-BE49-F238E27FC236}">
-                <a16:creationId xmlns:a16="http://schemas.microsoft.com/office/drawing/2014/main" id="{9719C86B-CFC1-4A17-B6CA-1F6C48A30850}"/>
+                <a16:creationId xmlns:a16="http://schemas.microsoft.com/office/drawing/2014/main" xmlns="" id="{9719C86B-CFC1-4A17-B6CA-1F6C48A30850}"/>
               </a:ext>
             </a:extLst>
           </p:cNvPr>
@@ -4151,7 +4164,7 @@
           <p:cNvPr id="54" name="直線單箭頭接點 53">
             <a:extLst>
               <a:ext uri="{FF2B5EF4-FFF2-40B4-BE49-F238E27FC236}">
-                <a16:creationId xmlns:a16="http://schemas.microsoft.com/office/drawing/2014/main" id="{9CD041CD-9441-4679-8E66-FF8013D04890}"/>
+                <a16:creationId xmlns:a16="http://schemas.microsoft.com/office/drawing/2014/main" xmlns="" id="{9CD041CD-9441-4679-8E66-FF8013D04890}"/>
               </a:ext>
             </a:extLst>
           </p:cNvPr>
@@ -4224,7 +4237,7 @@
           <p:cNvPr id="2" name="圓角矩形 6">
             <a:extLst>
               <a:ext uri="{FF2B5EF4-FFF2-40B4-BE49-F238E27FC236}">
-                <a16:creationId xmlns:a16="http://schemas.microsoft.com/office/drawing/2014/main" id="{706DE702-26E5-46A9-8661-165882CFAF5B}"/>
+                <a16:creationId xmlns:a16="http://schemas.microsoft.com/office/drawing/2014/main" xmlns="" id="{706DE702-26E5-46A9-8661-165882CFAF5B}"/>
               </a:ext>
             </a:extLst>
           </p:cNvPr>
@@ -4277,7 +4290,7 @@
           <p:cNvPr id="3" name="群組 2">
             <a:extLst>
               <a:ext uri="{FF2B5EF4-FFF2-40B4-BE49-F238E27FC236}">
-                <a16:creationId xmlns:a16="http://schemas.microsoft.com/office/drawing/2014/main" id="{A91D7176-EE55-4C33-B06B-C483824D2263}"/>
+                <a16:creationId xmlns:a16="http://schemas.microsoft.com/office/drawing/2014/main" xmlns="" id="{A91D7176-EE55-4C33-B06B-C483824D2263}"/>
               </a:ext>
             </a:extLst>
           </p:cNvPr>
@@ -4297,7 +4310,7 @@
             <p:cNvPr id="4" name="圖片 3">
               <a:extLst>
                 <a:ext uri="{FF2B5EF4-FFF2-40B4-BE49-F238E27FC236}">
-                  <a16:creationId xmlns:a16="http://schemas.microsoft.com/office/drawing/2014/main" id="{A5DC711C-CC7B-4BCD-AA24-424BE899958A}"/>
+                  <a16:creationId xmlns:a16="http://schemas.microsoft.com/office/drawing/2014/main" xmlns="" id="{A5DC711C-CC7B-4BCD-AA24-424BE899958A}"/>
                 </a:ext>
               </a:extLst>
             </p:cNvPr>
@@ -4333,7 +4346,7 @@
             <p:cNvPr id="5" name="文字方塊 4">
               <a:extLst>
                 <a:ext uri="{FF2B5EF4-FFF2-40B4-BE49-F238E27FC236}">
-                  <a16:creationId xmlns:a16="http://schemas.microsoft.com/office/drawing/2014/main" id="{CC7ABC9E-01EF-425D-8E74-48A43D9C65CD}"/>
+                  <a16:creationId xmlns:a16="http://schemas.microsoft.com/office/drawing/2014/main" xmlns="" id="{CC7ABC9E-01EF-425D-8E74-48A43D9C65CD}"/>
                 </a:ext>
               </a:extLst>
             </p:cNvPr>
@@ -4388,7 +4401,7 @@
           <p:cNvPr id="6" name="矩形 5">
             <a:extLst>
               <a:ext uri="{FF2B5EF4-FFF2-40B4-BE49-F238E27FC236}">
-                <a16:creationId xmlns:a16="http://schemas.microsoft.com/office/drawing/2014/main" id="{251C348E-2D22-4DE8-B44D-1701DC2482B8}"/>
+                <a16:creationId xmlns:a16="http://schemas.microsoft.com/office/drawing/2014/main" xmlns="" id="{251C348E-2D22-4DE8-B44D-1701DC2482B8}"/>
               </a:ext>
             </a:extLst>
           </p:cNvPr>
@@ -4427,7 +4440,7 @@
           <p:cNvPr id="7" name="矩形 6">
             <a:extLst>
               <a:ext uri="{FF2B5EF4-FFF2-40B4-BE49-F238E27FC236}">
-                <a16:creationId xmlns:a16="http://schemas.microsoft.com/office/drawing/2014/main" id="{449972E5-9A5F-437C-9B35-45C93A8AFF8D}"/>
+                <a16:creationId xmlns:a16="http://schemas.microsoft.com/office/drawing/2014/main" xmlns="" id="{449972E5-9A5F-437C-9B35-45C93A8AFF8D}"/>
               </a:ext>
             </a:extLst>
           </p:cNvPr>
@@ -4480,7 +4493,7 @@
           <p:cNvPr id="8" name="圓角矩形 6">
             <a:extLst>
               <a:ext uri="{FF2B5EF4-FFF2-40B4-BE49-F238E27FC236}">
-                <a16:creationId xmlns:a16="http://schemas.microsoft.com/office/drawing/2014/main" id="{A8DE8DDB-CE73-4804-AB78-B70EFB29D495}"/>
+                <a16:creationId xmlns:a16="http://schemas.microsoft.com/office/drawing/2014/main" xmlns="" id="{A8DE8DDB-CE73-4804-AB78-B70EFB29D495}"/>
               </a:ext>
             </a:extLst>
           </p:cNvPr>
@@ -4533,7 +4546,7 @@
           <p:cNvPr id="9" name="文字方塊 8">
             <a:extLst>
               <a:ext uri="{FF2B5EF4-FFF2-40B4-BE49-F238E27FC236}">
-                <a16:creationId xmlns:a16="http://schemas.microsoft.com/office/drawing/2014/main" id="{EEFEA2BF-382A-4752-B466-E1D2FE26365D}"/>
+                <a16:creationId xmlns:a16="http://schemas.microsoft.com/office/drawing/2014/main" xmlns="" id="{EEFEA2BF-382A-4752-B466-E1D2FE26365D}"/>
               </a:ext>
             </a:extLst>
           </p:cNvPr>
@@ -4587,7 +4600,7 @@
           <p:cNvPr id="10" name="矩形 9">
             <a:extLst>
               <a:ext uri="{FF2B5EF4-FFF2-40B4-BE49-F238E27FC236}">
-                <a16:creationId xmlns:a16="http://schemas.microsoft.com/office/drawing/2014/main" id="{7FDAF179-9B2E-411A-B0C7-CD050D262008}"/>
+                <a16:creationId xmlns:a16="http://schemas.microsoft.com/office/drawing/2014/main" xmlns="" id="{7FDAF179-9B2E-411A-B0C7-CD050D262008}"/>
               </a:ext>
             </a:extLst>
           </p:cNvPr>
@@ -4640,7 +4653,7 @@
           <p:cNvPr id="11" name="圖片 10">
             <a:extLst>
               <a:ext uri="{FF2B5EF4-FFF2-40B4-BE49-F238E27FC236}">
-                <a16:creationId xmlns:a16="http://schemas.microsoft.com/office/drawing/2014/main" id="{5BE1084A-E4FD-4463-932D-30523A0449CF}"/>
+                <a16:creationId xmlns:a16="http://schemas.microsoft.com/office/drawing/2014/main" xmlns="" id="{5BE1084A-E4FD-4463-932D-30523A0449CF}"/>
               </a:ext>
             </a:extLst>
           </p:cNvPr>
@@ -4650,7 +4663,7 @@
           <p:nvPr/>
         </p:nvPicPr>
         <p:blipFill>
-          <a:blip r:embed="rId3">
+          <a:blip r:embed="rId3" cstate="print">
             <a:extLst>
               <a:ext uri="{28A0092B-C50C-407E-A947-70E740481C1C}">
                 <a14:useLocalDpi xmlns:a14="http://schemas.microsoft.com/office/drawing/2010/main" val="0"/>
@@ -4676,7 +4689,7 @@
           <p:cNvPr id="12" name="矩形 11">
             <a:extLst>
               <a:ext uri="{FF2B5EF4-FFF2-40B4-BE49-F238E27FC236}">
-                <a16:creationId xmlns:a16="http://schemas.microsoft.com/office/drawing/2014/main" id="{C50DCA4B-3556-4099-9C32-9297DAF2DB06}"/>
+                <a16:creationId xmlns:a16="http://schemas.microsoft.com/office/drawing/2014/main" xmlns="" id="{C50DCA4B-3556-4099-9C32-9297DAF2DB06}"/>
               </a:ext>
             </a:extLst>
           </p:cNvPr>
@@ -4685,8 +4698,8 @@
         </p:nvSpPr>
         <p:spPr>
           <a:xfrm>
-            <a:off x="4835668" y="1440977"/>
-            <a:ext cx="2844048" cy="369332"/>
+            <a:off x="5468852" y="1440977"/>
+            <a:ext cx="1577676" cy="369332"/>
           </a:xfrm>
           <a:prstGeom prst="rect">
             <a:avLst/>
@@ -4700,12 +4713,26 @@
           <a:lstStyle/>
           <a:p>
             <a:pPr algn="ctr"/>
+            <a:r>
+              <a:rPr lang="en-US" altLang="zh-TW" b="1" dirty="0" err="1" smtClean="0">
+                <a:latin typeface="Consolas" panose="020B0609020204030204" pitchFamily="49" charset="0"/>
+                <a:cs typeface="Consolas" panose="020B0609020204030204" pitchFamily="49" charset="0"/>
+              </a:rPr>
+              <a:t>Auth</a:t>
+            </a:r>
+            <a:r>
+              <a:rPr lang="en-US" altLang="zh-TW" b="1" dirty="0" smtClean="0">
+                <a:latin typeface="Consolas" panose="020B0609020204030204" pitchFamily="49" charset="0"/>
+                <a:cs typeface="Consolas" panose="020B0609020204030204" pitchFamily="49" charset="0"/>
+              </a:rPr>
+              <a:t> </a:t>
+            </a:r>
             <a:r>
               <a:rPr lang="en-US" altLang="zh-TW" b="1" dirty="0">
                 <a:latin typeface="Consolas" panose="020B0609020204030204" pitchFamily="49" charset="0"/>
                 <a:cs typeface="Consolas" panose="020B0609020204030204" pitchFamily="49" charset="0"/>
               </a:rPr>
-              <a:t>Authentication Server</a:t>
+              <a:t>Server</a:t>
             </a:r>
           </a:p>
         </p:txBody>
@@ -4715,7 +4742,7 @@
           <p:cNvPr id="13" name="直線單箭頭接點 12">
             <a:extLst>
               <a:ext uri="{FF2B5EF4-FFF2-40B4-BE49-F238E27FC236}">
-                <a16:creationId xmlns:a16="http://schemas.microsoft.com/office/drawing/2014/main" id="{F960792B-F82F-44F4-AC09-EEFA605794A2}"/>
+                <a16:creationId xmlns:a16="http://schemas.microsoft.com/office/drawing/2014/main" xmlns="" id="{F960792B-F82F-44F4-AC09-EEFA605794A2}"/>
               </a:ext>
             </a:extLst>
           </p:cNvPr>
@@ -4757,7 +4784,7 @@
           <p:cNvPr id="14" name="圓角矩形 6">
             <a:extLst>
               <a:ext uri="{FF2B5EF4-FFF2-40B4-BE49-F238E27FC236}">
-                <a16:creationId xmlns:a16="http://schemas.microsoft.com/office/drawing/2014/main" id="{7CD9D1F1-45AB-4A83-BAF4-DB58F90FD930}"/>
+                <a16:creationId xmlns:a16="http://schemas.microsoft.com/office/drawing/2014/main" xmlns="" id="{7CD9D1F1-45AB-4A83-BAF4-DB58F90FD930}"/>
               </a:ext>
             </a:extLst>
           </p:cNvPr>
@@ -4807,7 +4834,7 @@
           <p:cNvPr id="15" name="文字方塊 14">
             <a:extLst>
               <a:ext uri="{FF2B5EF4-FFF2-40B4-BE49-F238E27FC236}">
-                <a16:creationId xmlns:a16="http://schemas.microsoft.com/office/drawing/2014/main" id="{2A38FED3-41D3-4F5C-994A-88677072ED11}"/>
+                <a16:creationId xmlns:a16="http://schemas.microsoft.com/office/drawing/2014/main" xmlns="" id="{2A38FED3-41D3-4F5C-994A-88677072ED11}"/>
               </a:ext>
             </a:extLst>
           </p:cNvPr>
@@ -4861,7 +4888,7 @@
           <p:cNvPr id="16" name="矩形 15">
             <a:extLst>
               <a:ext uri="{FF2B5EF4-FFF2-40B4-BE49-F238E27FC236}">
-                <a16:creationId xmlns:a16="http://schemas.microsoft.com/office/drawing/2014/main" id="{9D918EDB-4CFC-4B66-9EB0-A862160D0A27}"/>
+                <a16:creationId xmlns:a16="http://schemas.microsoft.com/office/drawing/2014/main" xmlns="" id="{9D918EDB-4CFC-4B66-9EB0-A862160D0A27}"/>
               </a:ext>
             </a:extLst>
           </p:cNvPr>
@@ -4914,7 +4941,7 @@
           <p:cNvPr id="17" name="圖片 16">
             <a:extLst>
               <a:ext uri="{FF2B5EF4-FFF2-40B4-BE49-F238E27FC236}">
-                <a16:creationId xmlns:a16="http://schemas.microsoft.com/office/drawing/2014/main" id="{0EFF49B5-497B-4921-8CF6-BD4E4B674ADF}"/>
+                <a16:creationId xmlns:a16="http://schemas.microsoft.com/office/drawing/2014/main" xmlns="" id="{0EFF49B5-497B-4921-8CF6-BD4E4B674ADF}"/>
               </a:ext>
             </a:extLst>
           </p:cNvPr>
@@ -4950,7 +4977,7 @@
           <p:cNvPr id="18" name="圖片 17">
             <a:extLst>
               <a:ext uri="{FF2B5EF4-FFF2-40B4-BE49-F238E27FC236}">
-                <a16:creationId xmlns:a16="http://schemas.microsoft.com/office/drawing/2014/main" id="{65E53252-C355-4873-ABD1-69208ED76225}"/>
+                <a16:creationId xmlns:a16="http://schemas.microsoft.com/office/drawing/2014/main" xmlns="" id="{65E53252-C355-4873-ABD1-69208ED76225}"/>
               </a:ext>
             </a:extLst>
           </p:cNvPr>
@@ -4980,7 +5007,7 @@
           <p:cNvPr id="19" name="直線單箭頭接點 18">
             <a:extLst>
               <a:ext uri="{FF2B5EF4-FFF2-40B4-BE49-F238E27FC236}">
-                <a16:creationId xmlns:a16="http://schemas.microsoft.com/office/drawing/2014/main" id="{4FD714C3-D43C-4AE3-A614-B9AE37447913}"/>
+                <a16:creationId xmlns:a16="http://schemas.microsoft.com/office/drawing/2014/main" xmlns="" id="{4FD714C3-D43C-4AE3-A614-B9AE37447913}"/>
               </a:ext>
             </a:extLst>
           </p:cNvPr>
@@ -5023,7 +5050,7 @@
           <p:cNvPr id="20" name="語音泡泡: 矩形 19">
             <a:extLst>
               <a:ext uri="{FF2B5EF4-FFF2-40B4-BE49-F238E27FC236}">
-                <a16:creationId xmlns:a16="http://schemas.microsoft.com/office/drawing/2014/main" id="{B0052EBC-8056-4CFC-9B7E-870F38D20FD1}"/>
+                <a16:creationId xmlns:a16="http://schemas.microsoft.com/office/drawing/2014/main" xmlns="" id="{B0052EBC-8056-4CFC-9B7E-870F38D20FD1}"/>
               </a:ext>
             </a:extLst>
           </p:cNvPr>
@@ -5075,7 +5102,7 @@
           <p:cNvPr id="21" name="語音泡泡: 矩形 20">
             <a:extLst>
               <a:ext uri="{FF2B5EF4-FFF2-40B4-BE49-F238E27FC236}">
-                <a16:creationId xmlns:a16="http://schemas.microsoft.com/office/drawing/2014/main" id="{53CD2CE1-4D7B-4C00-BFBA-40FA2850023D}"/>
+                <a16:creationId xmlns:a16="http://schemas.microsoft.com/office/drawing/2014/main" xmlns="" id="{53CD2CE1-4D7B-4C00-BFBA-40FA2850023D}"/>
               </a:ext>
             </a:extLst>
           </p:cNvPr>
@@ -5157,7 +5184,7 @@
           <p:cNvPr id="2" name="圓角矩形 6">
             <a:extLst>
               <a:ext uri="{FF2B5EF4-FFF2-40B4-BE49-F238E27FC236}">
-                <a16:creationId xmlns:a16="http://schemas.microsoft.com/office/drawing/2014/main" id="{706DE702-26E5-46A9-8661-165882CFAF5B}"/>
+                <a16:creationId xmlns:a16="http://schemas.microsoft.com/office/drawing/2014/main" xmlns="" id="{706DE702-26E5-46A9-8661-165882CFAF5B}"/>
               </a:ext>
             </a:extLst>
           </p:cNvPr>
@@ -5210,7 +5237,7 @@
           <p:cNvPr id="3" name="群組 2">
             <a:extLst>
               <a:ext uri="{FF2B5EF4-FFF2-40B4-BE49-F238E27FC236}">
-                <a16:creationId xmlns:a16="http://schemas.microsoft.com/office/drawing/2014/main" id="{A91D7176-EE55-4C33-B06B-C483824D2263}"/>
+                <a16:creationId xmlns:a16="http://schemas.microsoft.com/office/drawing/2014/main" xmlns="" id="{A91D7176-EE55-4C33-B06B-C483824D2263}"/>
               </a:ext>
             </a:extLst>
           </p:cNvPr>
@@ -5230,7 +5257,7 @@
             <p:cNvPr id="4" name="圖片 3">
               <a:extLst>
                 <a:ext uri="{FF2B5EF4-FFF2-40B4-BE49-F238E27FC236}">
-                  <a16:creationId xmlns:a16="http://schemas.microsoft.com/office/drawing/2014/main" id="{A5DC711C-CC7B-4BCD-AA24-424BE899958A}"/>
+                  <a16:creationId xmlns:a16="http://schemas.microsoft.com/office/drawing/2014/main" xmlns="" id="{A5DC711C-CC7B-4BCD-AA24-424BE899958A}"/>
                 </a:ext>
               </a:extLst>
             </p:cNvPr>
@@ -5266,7 +5293,7 @@
             <p:cNvPr id="5" name="文字方塊 4">
               <a:extLst>
                 <a:ext uri="{FF2B5EF4-FFF2-40B4-BE49-F238E27FC236}">
-                  <a16:creationId xmlns:a16="http://schemas.microsoft.com/office/drawing/2014/main" id="{CC7ABC9E-01EF-425D-8E74-48A43D9C65CD}"/>
+                  <a16:creationId xmlns:a16="http://schemas.microsoft.com/office/drawing/2014/main" xmlns="" id="{CC7ABC9E-01EF-425D-8E74-48A43D9C65CD}"/>
                 </a:ext>
               </a:extLst>
             </p:cNvPr>
@@ -5321,7 +5348,7 @@
           <p:cNvPr id="6" name="矩形 5">
             <a:extLst>
               <a:ext uri="{FF2B5EF4-FFF2-40B4-BE49-F238E27FC236}">
-                <a16:creationId xmlns:a16="http://schemas.microsoft.com/office/drawing/2014/main" id="{251C348E-2D22-4DE8-B44D-1701DC2482B8}"/>
+                <a16:creationId xmlns:a16="http://schemas.microsoft.com/office/drawing/2014/main" xmlns="" id="{251C348E-2D22-4DE8-B44D-1701DC2482B8}"/>
               </a:ext>
             </a:extLst>
           </p:cNvPr>
@@ -5360,7 +5387,7 @@
           <p:cNvPr id="7" name="矩形 6">
             <a:extLst>
               <a:ext uri="{FF2B5EF4-FFF2-40B4-BE49-F238E27FC236}">
-                <a16:creationId xmlns:a16="http://schemas.microsoft.com/office/drawing/2014/main" id="{449972E5-9A5F-437C-9B35-45C93A8AFF8D}"/>
+                <a16:creationId xmlns:a16="http://schemas.microsoft.com/office/drawing/2014/main" xmlns="" id="{449972E5-9A5F-437C-9B35-45C93A8AFF8D}"/>
               </a:ext>
             </a:extLst>
           </p:cNvPr>
@@ -5413,7 +5440,7 @@
           <p:cNvPr id="8" name="圓角矩形 6">
             <a:extLst>
               <a:ext uri="{FF2B5EF4-FFF2-40B4-BE49-F238E27FC236}">
-                <a16:creationId xmlns:a16="http://schemas.microsoft.com/office/drawing/2014/main" id="{A8DE8DDB-CE73-4804-AB78-B70EFB29D495}"/>
+                <a16:creationId xmlns:a16="http://schemas.microsoft.com/office/drawing/2014/main" xmlns="" id="{A8DE8DDB-CE73-4804-AB78-B70EFB29D495}"/>
               </a:ext>
             </a:extLst>
           </p:cNvPr>
@@ -5466,7 +5493,7 @@
           <p:cNvPr id="9" name="文字方塊 8">
             <a:extLst>
               <a:ext uri="{FF2B5EF4-FFF2-40B4-BE49-F238E27FC236}">
-                <a16:creationId xmlns:a16="http://schemas.microsoft.com/office/drawing/2014/main" id="{EEFEA2BF-382A-4752-B466-E1D2FE26365D}"/>
+                <a16:creationId xmlns:a16="http://schemas.microsoft.com/office/drawing/2014/main" xmlns="" id="{EEFEA2BF-382A-4752-B466-E1D2FE26365D}"/>
               </a:ext>
             </a:extLst>
           </p:cNvPr>
@@ -5520,7 +5547,7 @@
           <p:cNvPr id="10" name="矩形 9">
             <a:extLst>
               <a:ext uri="{FF2B5EF4-FFF2-40B4-BE49-F238E27FC236}">
-                <a16:creationId xmlns:a16="http://schemas.microsoft.com/office/drawing/2014/main" id="{7FDAF179-9B2E-411A-B0C7-CD050D262008}"/>
+                <a16:creationId xmlns:a16="http://schemas.microsoft.com/office/drawing/2014/main" xmlns="" id="{7FDAF179-9B2E-411A-B0C7-CD050D262008}"/>
               </a:ext>
             </a:extLst>
           </p:cNvPr>
@@ -5573,7 +5600,7 @@
           <p:cNvPr id="11" name="圖片 10">
             <a:extLst>
               <a:ext uri="{FF2B5EF4-FFF2-40B4-BE49-F238E27FC236}">
-                <a16:creationId xmlns:a16="http://schemas.microsoft.com/office/drawing/2014/main" id="{5BE1084A-E4FD-4463-932D-30523A0449CF}"/>
+                <a16:creationId xmlns:a16="http://schemas.microsoft.com/office/drawing/2014/main" xmlns="" id="{5BE1084A-E4FD-4463-932D-30523A0449CF}"/>
               </a:ext>
             </a:extLst>
           </p:cNvPr>
@@ -5583,7 +5610,7 @@
           <p:nvPr/>
         </p:nvPicPr>
         <p:blipFill>
-          <a:blip r:embed="rId3">
+          <a:blip r:embed="rId3" cstate="print">
             <a:extLst>
               <a:ext uri="{28A0092B-C50C-407E-A947-70E740481C1C}">
                 <a14:useLocalDpi xmlns:a14="http://schemas.microsoft.com/office/drawing/2010/main" val="0"/>
@@ -5609,7 +5636,7 @@
           <p:cNvPr id="12" name="矩形 11">
             <a:extLst>
               <a:ext uri="{FF2B5EF4-FFF2-40B4-BE49-F238E27FC236}">
-                <a16:creationId xmlns:a16="http://schemas.microsoft.com/office/drawing/2014/main" id="{C50DCA4B-3556-4099-9C32-9297DAF2DB06}"/>
+                <a16:creationId xmlns:a16="http://schemas.microsoft.com/office/drawing/2014/main" xmlns="" id="{C50DCA4B-3556-4099-9C32-9297DAF2DB06}"/>
               </a:ext>
             </a:extLst>
           </p:cNvPr>
@@ -5618,8 +5645,8 @@
         </p:nvSpPr>
         <p:spPr>
           <a:xfrm>
-            <a:off x="4835668" y="1440977"/>
-            <a:ext cx="2844048" cy="369332"/>
+            <a:off x="5468852" y="1440977"/>
+            <a:ext cx="1577676" cy="369332"/>
           </a:xfrm>
           <a:prstGeom prst="rect">
             <a:avLst/>
@@ -5633,12 +5660,26 @@
           <a:lstStyle/>
           <a:p>
             <a:pPr algn="ctr"/>
+            <a:r>
+              <a:rPr lang="en-US" altLang="zh-TW" b="1" dirty="0" err="1" smtClean="0">
+                <a:latin typeface="Consolas" panose="020B0609020204030204" pitchFamily="49" charset="0"/>
+                <a:cs typeface="Consolas" panose="020B0609020204030204" pitchFamily="49" charset="0"/>
+              </a:rPr>
+              <a:t>Auth</a:t>
+            </a:r>
+            <a:r>
+              <a:rPr lang="en-US" altLang="zh-TW" b="1" dirty="0" smtClean="0">
+                <a:latin typeface="Consolas" panose="020B0609020204030204" pitchFamily="49" charset="0"/>
+                <a:cs typeface="Consolas" panose="020B0609020204030204" pitchFamily="49" charset="0"/>
+              </a:rPr>
+              <a:t> </a:t>
+            </a:r>
             <a:r>
               <a:rPr lang="en-US" altLang="zh-TW" b="1" dirty="0">
                 <a:latin typeface="Consolas" panose="020B0609020204030204" pitchFamily="49" charset="0"/>
                 <a:cs typeface="Consolas" panose="020B0609020204030204" pitchFamily="49" charset="0"/>
               </a:rPr>
-              <a:t>Authentication Server</a:t>
+              <a:t>Server</a:t>
             </a:r>
           </a:p>
         </p:txBody>
@@ -5648,7 +5689,7 @@
           <p:cNvPr id="13" name="直線單箭頭接點 12">
             <a:extLst>
               <a:ext uri="{FF2B5EF4-FFF2-40B4-BE49-F238E27FC236}">
-                <a16:creationId xmlns:a16="http://schemas.microsoft.com/office/drawing/2014/main" id="{F960792B-F82F-44F4-AC09-EEFA605794A2}"/>
+                <a16:creationId xmlns:a16="http://schemas.microsoft.com/office/drawing/2014/main" xmlns="" id="{F960792B-F82F-44F4-AC09-EEFA605794A2}"/>
               </a:ext>
             </a:extLst>
           </p:cNvPr>
@@ -5690,7 +5731,7 @@
           <p:cNvPr id="14" name="圓角矩形 6">
             <a:extLst>
               <a:ext uri="{FF2B5EF4-FFF2-40B4-BE49-F238E27FC236}">
-                <a16:creationId xmlns:a16="http://schemas.microsoft.com/office/drawing/2014/main" id="{7CD9D1F1-45AB-4A83-BAF4-DB58F90FD930}"/>
+                <a16:creationId xmlns:a16="http://schemas.microsoft.com/office/drawing/2014/main" xmlns="" id="{7CD9D1F1-45AB-4A83-BAF4-DB58F90FD930}"/>
               </a:ext>
             </a:extLst>
           </p:cNvPr>
@@ -5740,7 +5781,7 @@
           <p:cNvPr id="15" name="文字方塊 14">
             <a:extLst>
               <a:ext uri="{FF2B5EF4-FFF2-40B4-BE49-F238E27FC236}">
-                <a16:creationId xmlns:a16="http://schemas.microsoft.com/office/drawing/2014/main" id="{2A38FED3-41D3-4F5C-994A-88677072ED11}"/>
+                <a16:creationId xmlns:a16="http://schemas.microsoft.com/office/drawing/2014/main" xmlns="" id="{2A38FED3-41D3-4F5C-994A-88677072ED11}"/>
               </a:ext>
             </a:extLst>
           </p:cNvPr>
@@ -5794,7 +5835,7 @@
           <p:cNvPr id="16" name="矩形 15">
             <a:extLst>
               <a:ext uri="{FF2B5EF4-FFF2-40B4-BE49-F238E27FC236}">
-                <a16:creationId xmlns:a16="http://schemas.microsoft.com/office/drawing/2014/main" id="{9D918EDB-4CFC-4B66-9EB0-A862160D0A27}"/>
+                <a16:creationId xmlns:a16="http://schemas.microsoft.com/office/drawing/2014/main" xmlns="" id="{9D918EDB-4CFC-4B66-9EB0-A862160D0A27}"/>
               </a:ext>
             </a:extLst>
           </p:cNvPr>
@@ -5847,7 +5888,7 @@
           <p:cNvPr id="17" name="圖片 16">
             <a:extLst>
               <a:ext uri="{FF2B5EF4-FFF2-40B4-BE49-F238E27FC236}">
-                <a16:creationId xmlns:a16="http://schemas.microsoft.com/office/drawing/2014/main" id="{0EFF49B5-497B-4921-8CF6-BD4E4B674ADF}"/>
+                <a16:creationId xmlns:a16="http://schemas.microsoft.com/office/drawing/2014/main" xmlns="" id="{0EFF49B5-497B-4921-8CF6-BD4E4B674ADF}"/>
               </a:ext>
             </a:extLst>
           </p:cNvPr>
@@ -5883,7 +5924,7 @@
           <p:cNvPr id="18" name="圖片 17">
             <a:extLst>
               <a:ext uri="{FF2B5EF4-FFF2-40B4-BE49-F238E27FC236}">
-                <a16:creationId xmlns:a16="http://schemas.microsoft.com/office/drawing/2014/main" id="{65E53252-C355-4873-ABD1-69208ED76225}"/>
+                <a16:creationId xmlns:a16="http://schemas.microsoft.com/office/drawing/2014/main" xmlns="" id="{65E53252-C355-4873-ABD1-69208ED76225}"/>
               </a:ext>
             </a:extLst>
           </p:cNvPr>
@@ -5913,7 +5954,7 @@
           <p:cNvPr id="19" name="直線單箭頭接點 18">
             <a:extLst>
               <a:ext uri="{FF2B5EF4-FFF2-40B4-BE49-F238E27FC236}">
-                <a16:creationId xmlns:a16="http://schemas.microsoft.com/office/drawing/2014/main" id="{4FD714C3-D43C-4AE3-A614-B9AE37447913}"/>
+                <a16:creationId xmlns:a16="http://schemas.microsoft.com/office/drawing/2014/main" xmlns="" id="{4FD714C3-D43C-4AE3-A614-B9AE37447913}"/>
               </a:ext>
             </a:extLst>
           </p:cNvPr>
@@ -5956,7 +5997,7 @@
           <p:cNvPr id="20" name="語音泡泡: 矩形 19">
             <a:extLst>
               <a:ext uri="{FF2B5EF4-FFF2-40B4-BE49-F238E27FC236}">
-                <a16:creationId xmlns:a16="http://schemas.microsoft.com/office/drawing/2014/main" id="{B0052EBC-8056-4CFC-9B7E-870F38D20FD1}"/>
+                <a16:creationId xmlns:a16="http://schemas.microsoft.com/office/drawing/2014/main" xmlns="" id="{B0052EBC-8056-4CFC-9B7E-870F38D20FD1}"/>
               </a:ext>
             </a:extLst>
           </p:cNvPr>
@@ -6008,7 +6049,7 @@
           <p:cNvPr id="21" name="語音泡泡: 矩形 20">
             <a:extLst>
               <a:ext uri="{FF2B5EF4-FFF2-40B4-BE49-F238E27FC236}">
-                <a16:creationId xmlns:a16="http://schemas.microsoft.com/office/drawing/2014/main" id="{53CD2CE1-4D7B-4C00-BFBA-40FA2850023D}"/>
+                <a16:creationId xmlns:a16="http://schemas.microsoft.com/office/drawing/2014/main" xmlns="" id="{53CD2CE1-4D7B-4C00-BFBA-40FA2850023D}"/>
               </a:ext>
             </a:extLst>
           </p:cNvPr>
@@ -6059,6 +6100,2894 @@
     <p:extLst>
       <p:ext uri="{BB962C8B-B14F-4D97-AF65-F5344CB8AC3E}">
         <p14:creationId xmlns:p14="http://schemas.microsoft.com/office/powerpoint/2010/main" val="1521631976"/>
+      </p:ext>
+    </p:extLst>
+  </p:cSld>
+  <p:clrMapOvr>
+    <a:masterClrMapping/>
+  </p:clrMapOvr>
+</p:sld>
+</file>
+
+<file path=ppt/slides/slide4.xml><?xml version="1.0" encoding="utf-8"?>
+<p:sld xmlns:a="http://schemas.openxmlformats.org/drawingml/2006/main" xmlns:r="http://schemas.openxmlformats.org/officeDocument/2006/relationships" xmlns:p="http://schemas.openxmlformats.org/presentationml/2006/main">
+  <p:cSld>
+    <p:spTree>
+      <p:nvGrpSpPr>
+        <p:cNvPr id="1" name=""/>
+        <p:cNvGrpSpPr/>
+        <p:nvPr/>
+      </p:nvGrpSpPr>
+      <p:grpSpPr>
+        <a:xfrm>
+          <a:off x="0" y="0"/>
+          <a:ext cx="0" cy="0"/>
+          <a:chOff x="0" y="0"/>
+          <a:chExt cx="0" cy="0"/>
+        </a:xfrm>
+      </p:grpSpPr>
+      <p:sp>
+        <p:nvSpPr>
+          <p:cNvPr id="3" name="矩形 2"/>
+          <p:cNvSpPr/>
+          <p:nvPr/>
+        </p:nvSpPr>
+        <p:spPr>
+          <a:xfrm>
+            <a:off x="940125" y="1431559"/>
+            <a:ext cx="11044511" cy="4512039"/>
+          </a:xfrm>
+          <a:prstGeom prst="rect">
+            <a:avLst/>
+          </a:prstGeom>
+          <a:solidFill>
+            <a:schemeClr val="bg1">
+              <a:lumMod val="85000"/>
+            </a:schemeClr>
+          </a:solidFill>
+          <a:ln w="19050">
+            <a:prstDash val="sysDash"/>
+          </a:ln>
+        </p:spPr>
+        <p:style>
+          <a:lnRef idx="2">
+            <a:schemeClr val="accent1">
+              <a:shade val="50000"/>
+            </a:schemeClr>
+          </a:lnRef>
+          <a:fillRef idx="1">
+            <a:schemeClr val="accent1"/>
+          </a:fillRef>
+          <a:effectRef idx="0">
+            <a:schemeClr val="accent1"/>
+          </a:effectRef>
+          <a:fontRef idx="minor">
+            <a:schemeClr val="lt1"/>
+          </a:fontRef>
+        </p:style>
+        <p:txBody>
+          <a:bodyPr rtlCol="0" anchor="ctr"/>
+          <a:lstStyle/>
+          <a:p>
+            <a:pPr algn="ctr"/>
+            <a:endParaRPr lang="zh-TW" altLang="en-US"/>
+          </a:p>
+        </p:txBody>
+      </p:sp>
+      <p:sp>
+        <p:nvSpPr>
+          <p:cNvPr id="4" name="圓角矩形 6">
+            <a:extLst>
+              <a:ext uri="{FF2B5EF4-FFF2-40B4-BE49-F238E27FC236}">
+                <a16:creationId xmlns:a16="http://schemas.microsoft.com/office/drawing/2014/main" xmlns="" id="{9292555D-6383-47AB-94C4-8C24D05C629F}"/>
+              </a:ext>
+            </a:extLst>
+          </p:cNvPr>
+          <p:cNvSpPr/>
+          <p:nvPr/>
+        </p:nvSpPr>
+        <p:spPr>
+          <a:xfrm>
+            <a:off x="1221774" y="1825615"/>
+            <a:ext cx="3392205" cy="2142064"/>
+          </a:xfrm>
+          <a:prstGeom prst="roundRect">
+            <a:avLst/>
+          </a:prstGeom>
+          <a:ln w="25400">
+            <a:solidFill>
+              <a:schemeClr val="accent1"/>
+            </a:solidFill>
+            <a:prstDash val="sysDash"/>
+          </a:ln>
+        </p:spPr>
+        <p:style>
+          <a:lnRef idx="2">
+            <a:schemeClr val="accent1"/>
+          </a:lnRef>
+          <a:fillRef idx="1">
+            <a:schemeClr val="lt1"/>
+          </a:fillRef>
+          <a:effectRef idx="0">
+            <a:schemeClr val="accent1"/>
+          </a:effectRef>
+          <a:fontRef idx="minor">
+            <a:schemeClr val="dk1"/>
+          </a:fontRef>
+        </p:style>
+        <p:txBody>
+          <a:bodyPr rtlCol="0" anchor="ctr"/>
+          <a:lstStyle/>
+          <a:p>
+            <a:pPr algn="ctr"/>
+            <a:endParaRPr lang="zh-TW" altLang="en-US">
+              <a:latin typeface="Consolas" panose="020B0609020204030204" pitchFamily="49" charset="0"/>
+              <a:cs typeface="Consolas" panose="020B0609020204030204" pitchFamily="49" charset="0"/>
+            </a:endParaRPr>
+          </a:p>
+        </p:txBody>
+      </p:sp>
+      <p:sp>
+        <p:nvSpPr>
+          <p:cNvPr id="8" name="AutoShape 2" descr="data:image/jpeg;base64,/9j/4AAQSkZJRgABAQAAAQABAAD/2wCEAAkGBhASEBAQDxAODxQSEg8PEBAUEBAPEBAQFBAVFBQQFRQXHCYeFxkjGRQUHy8gIycpLCwsFR4xNTMqNSYrLCkBCQoKDgwOFw8PGiwcHBwpLCksKSkpKSwpKSktNSopLCkpLCwsNSkpKSksKSkpKSwpKiopKTUpKSkvKSwpKSkpKf/AABEIAMwAzAMBIgACEQEDEQH/xAAbAAABBQEBAAAAAAAAAAAAAAAAAgMEBQYBB//EAEUQAAEDAgIGBgYGCAUFAAAAAAEAAgMEERIhBQYxQVFxE2GBkaHBIjJCUpKxFCMzcqKyJFNiY4LR4fAHFkOTsxVEg8LD/8QAGQEBAAMBAQAAAAAAAAAAAAAAAAEDBAIF/8QAJxEBAAIBAwMDBAMAAAAAAAAAAAECEQMSIQQxQRMyYQUiQlGRocH/2gAMAwEAAhEDEQA/APcUIQgFFrtIsiDS+/pEgWF9m9Slm9bpheJu+z3HkbAfIoLSPT0B9u3MFSWV0Z2PZ8QC8j0hrUYp5IRCJAzAMQkwuJcwOIsRbK6k0+tzMsUNQ37vRyfIhd7LYzhxvrHGXrDXg7CD2pS8zbrVTb5JW/ehly7QCFLptbICbMrIr8OlwHudZc4mO7qJiez0FCydPpuY+rIH8ix/yU9mmpd7W/CQoSvUKobpx29g7yE83TTd7XDuKCxQobdKxneRzBTgr4/fHigkISGzNOxzT2hLQCEIQCEIQCEIQCEIQCEIQCEIQCx+tUmKcN91rG95J81sFh9Nz/pEznWsw+DGXQebl/SVVQ7beaQDk12EflV/R0TTuWX1ediAefau883Eu81sKIr161xSIePrzm0p8OiGFEurrCLEA9RzCn0pyUrEqpiGfdMM27VCPcxretowHvbZJGgpWZRzVEfU2aQDxK1LXJQKiaRKY17x2lmfote0+jVT8nYJB+JqdbpOvZ63QSc4iwnta7yW4hha5rTYZgLkmjmHcFmmK/p6EX1MZiWNZrPMPXpmn7krh+ZqdGt7B60E45GN/mFpH6EjO5RZdW2HcFG2ruNW6sj1upT6xlZ96Jx8W3U6DWOmPq1UV+BfgPcVHn1SadwUGXU7qUenH7TGvbzDURaQJ9WUO5Oa5SGVknHwC8/qdTyPVFuQwnwUZmhall8EszeT3jzUen8u/XjzD1Btc7eAnm1V9y8mdpTSUR9GeQgbnBr/ABIulx6+6QZ67IJOcZae8HyT0bJ9ej1oShclna1pc4hoaCSTsAG9YXVTXmeqqGwvp4mAhxc9rnXADSdhHEDvWj1lntRz9bQz4iAuLVms4lbW0WjMLljwQCCCCLgjMEcUpZ3UeoLqdzSb4Hlo5YQbeK0S5dBCEIBCEIBeZ6x1BENdIdoiqXeBA8l6RUSYWOdwa49wXkuts9qCoO0vMMXPHKCfAFTWMzEE8QzOgWWaBwAHcLLU0RWY0R6oWloSvamOHi37r+mdkpGJQ6ZykFyoZ7H2OS8SjtelY1OFMyvtGSXZbgSPPzUvEqrREnrDkVYl6yXjFperoXzSDl1wlN41wvXGF244SuBNF66HqcOdwfZNCJpOwLjpElkmanCM8o1Vo+M7goE2gYyNitJnpp0isiZwiYhD0FodsM5e232bx2lzbeak62yfopHGSMeN0/SH0nnqY3tu4n5hVut0v1UTeMjj8Lf6rNqTmzbpRisLXUqK1Lf3nvPl5K+Vdq7FhpYR+wHfFn5qxVawIQhAIQhBX6elw00p/Zt3kBeWa02dHTxHZJOXHlHC7zeO5ej63y2p7e89g7rnyXmOsp+upBwjqJO1z42D8rl3pxm0Obe2VXSxFhLTtBt/VXtE5VOloiCyRuVwGu5jYe75J+hrCOB8F7Uc1y8i8Ylp6Z6fdIqqmrRbenzVDiqtvLNdYtkS8agxzJ0SqcM1lzouT0+YIVoXrP0E1nX4Zq4MizaleWzp7/bhIxpBkTBkTZlXG1o3pBkSnSZKGJEqSVNqNxb5E2yX0gmJJUyJsxzXUVTFk6d+ajmRdqXqGZFMRw7meVlo/ZI7i8D4WD+ap9a5bvibwY93e7+ittHfZA+8+V34y3/1VJpwY6oN6omfEf6rDf3S9GnthvqJto4xwYwfhCeXGiwA4ZLq5dhCEIBCEIMtr1UWbA3i9zjyDbea831gl/TGt/V08DSOtxfKfCRvctvr7NeeNg9mMntc63kvOdKVGKuqjwl6Mco2NYPyq/QjN1erOKrOVoews4jLqI2Kvpn280/DOmaoWfcbHZ9u/wDvrXraf6edqRnlPimThqFWMmXTUK2KsdoWsVQpLao8SqSOoUls672sl6tHQ1Rzz3K5irLtB6gspQz5O5K0o6r0eRI81n1NNOlaYnC4dVJp1YoD6hR3VCq9Nqi0riKruUmSszKr4J8iUy6oUbE7k6St6kwa3MKHJMmDKuoo7iWgqan0RyUA1RvuXZJbsHJVlTNZryNzXW54TZcRV3lsdHfYQdcTHHm8Yz4uKq8OPSLR+8jB/haD8wrmNgAY0ZANY0DgA0BVOrvp1xd+1M/5gfNeVM5nL2Y4btCEKEhCEIBCEIPPNYX9JpHDwfBH2XBPzK8sgqMUkr9uKSV3fI4hei1lZ+l1M5/0vpU3+zE8jxaF5ZQus0ch8ls6SMzMqNeeIheRTqTM/EzrGYVMyZTIalejHdjkCdBnUOd9nHvCb6ZaYZ7VWcc6ksnVMyZSWTK2IZr1aKhn9F3Yp9DU7RyKz9HP6J5qbTVFj4Li1c5ZsYsuZKhR3VChyVKZE9yFVtaKroz2ZzTXTqHUVGwcAmunXE1TCa+ZIEqiGVHSZLnDvK8ZNeMKEPSc1vvPjbzvI247roppfq0rRAxVNOOErX9jLuPgCqbcRMrNPm8R8tzLLYudwxO7rlV2pMd53HhGe8uCk1Tvq5DwY/5W80vUaL7Z/wBxvzP8l473WrQhCAQhCASZH2BJ3AnuCUq/T82GlqHcIpB2lpA+aDyHS1Xho66QnN0BZfrmla0+BcsHC/Ja3Wx+HR792Oopo+qzWvkI8Asaw5L1ugpmsz8sfU25iEkSJ+OdQcSW163bGbclVD7i/BRukXS9RypxhHdKbKpDJVXhyeY9XVlVaq4pZsu1Sm1FrKpp35J8yKzDJavKyfUrtPNdyrDMnqaW1yqph3jhYyVN3FdEyrGzJ0SqmU4TxKuulUISpXSKuRdUcvoHtU/VoXqmH3WTP7DGY/nIFS0MmR/vcr3VCO88r/chDP8AclaR/wAJWXXnFJW9NzrVhpdJPtDJ1hre9w/krbUyO0Dne9I7wACo9Lu+qA4vH4Wn+a02q7bUsXXiP4yvJe6tUIQgEIQgFRa6y2opR72Fne4X8Ar1RNJaLinZglBIviFnFtja18uaDyaOdzQWgjCcy1zWPaTxLXAi6Z+g0z8WOhpX5Xc5ofA+3HFG4fJbyq/w9jP2Ur29TgHKnqdSKply3o35HMGxtwzTNq+2cSWjMMfPqpQSep9LpnHYA6OojHxAO8VDd/h87Po6unPASNlgPabOC08uhalhziflyK76TfWY9vWWuA71pr1etX8v55Vzo0nwxVXqNXsBLYOmaPaheycdgacXgqGpp3xkiVj4iNoexzLd4XqrJRtBHMbU59OkGx7+V8Q7itFfqF/yiJ/pVPS18S8jaU40r0qshgkuZqSklJ2u6LoJT/5Ii0qnn1Yo3G7W1MHUyVsrRyDxfxWin1Cn5RMKrdLbxLMwHIJxzlfP1QZ/o1beps8L4vxxl48FBqtWqppyjZMNxikZLfk0HF3gLZXrNG3a3+Mdun1InsrcSeDrN5puppZYj9dFLF99jmjvIsh8oNrEbF3uieYlVNZjiS2uTocmWlOtVcoOtcnGlNNTjVVLlNon7exavUxotUP3l8UZ/hY93/0WPgNitnqi0dA8+9NJf+FrGrH1M/ZLR0dc6ufhY6Xd9mPvH5BbPQkWGnhH7DXfEMXmsXpPN0bf2fFzit/EzC1rRuAHcLLzHtFoQhAIQhAIQhALhC6hAxJCDtAPYocmjY/caN+XonvCsrJJYgztVq5C65tn15gfI+KrKnVNvsEjk7aeRBC2LokxKwAEkgAbScggwU2rUw3X7Ae8g+Sr5dDTN9jF1tIPhkVtKvTcLdl38sm958rqrn1jJ2NYObcZHacvBE5ZSSNzfXa5n3gW/NIsOpXFdWPfm15jcPaAbY9Tm2sQqt2lXg4Z4KeT9oNMTiOIcz+SGSoauRuTJJGjgHOw/DsXJaeGU3mp6aQna7omxPPN8WEntSPp9OTnHPF91zZR3OsfFS6c0zvUq4gfdla6E9+Y8UiZjtwicT3RXaqUL/YqIDxjmEjR/BIL/iUKp1F3wVbXcGzRPiPa9uJq08VE8+rhk643sk+RSjER6wLeYIV1dfUjyqtoac+GLfqjXtuWxxzAfqpopCeTb4vBV9RHNESJoJorbccbmgdpFl6I7ZfrGdrkC+ZUptR7LZHPFr2OwZ7LG4VsdXfyot0dJ7PMYa1p3r0DVgD6JCR7XSvPbK+3gAn59GU8l+kp6Z99pMQa/wCNliFJpoGtDWMaGMFmtYLkNbsAF8+9caut6kYTodP6VpnJWDFVRt4OhZ3WK3ixGi246trv3hd2DJbdZ2sIQhAIQhAIQhAIQhAIQkveACTsAJPIII+kNIMibieeQ3krG6Q0lLMc3YRuaMgEmurXTPL3b9g90bgmmtQRjR39pc/6ceI8VPaxOMiQVJ0a7q70zPotxFiCfJaNtMummQYybRHAkcwq+o0RJuDXdtvmt5LBxAPYoktE07rckHnj6Z8Zvhcw8RceIVpo7WeqZ6PTvcNwfaVvL0rrRy6P4WPUqup0Mw7WAHiPRKCVBrG8/aQwv62h0R8MlaU2kad/syxHf6sg8M1no6fDtu7rKkxyINPBQ4wXRPa8DI3BaU7Ho6XE30CcxmPStnvtsVTofSBjeDnbeOpbgYXDMAg57kETQmjQwl/Ox457VdXUdhTrSgcQuArqAQhCAQhCAQhCAUbSQvDKP3b/AMpUlcI3IPPWtTrWqZpDR5jkwbSQXR7frGjhxeBtHIqOwIFRsUqONIjYpEYQOsjXXRpTV0oIczEzHBe6lSrlIM3DqBQV0kQDi12zceCjVEBGThy4FW2k4Mg7hkeRUSGUEdHJmD6p4FBTy0oUKSnI2K7q6UsPEbj5KG9qCPSDMf3sW7oHWYwH3R8lnNC6IL3E2u1pGI7hvw9Z48LrUsgsgfY5SGJmNifa1AsJS4AuoBCEIBCEIBCEIBCEIGaukZKwskGIHsIO4gjMHrVBXaKljscLqloyxtwipaN2Jps2Xnkea0qEGSiwl2Fj2ud+rP1cw5xuse5SOjI9YFvMEK6r9FQzjDNEyQbrjNvW121p5KH/AJfwi0FRUwjc0vE7AOGGUO+aCK1DkP0ZXNvhlop+AfBJAe10bj8kjoK32qWjd9yqlb+aNA29cpzZ3YU4aeqP/Zxc/ppt/wAaR9BrPZpaRvW6pldb4WoHJSCCDvyVMYXG4AJtfYL+KuY9A1bj6c1NGOEcBkPxPd5KX/leNw+uknn4gydGw/wR4QgzjZS4dH9o73GDpZO4ZDmSFY6M1Xe4YpvqWn2AcUrhwc7Y3kL81pKOhjibgiYyNvBrQ0c+tPoGoaZrGhrGhoGwAWCUYwloQJDF2y6hAIQhAIQhAIQhAIQhAIQhAIQhAIQhAIQhAIQhAIQhAIQhAIQhAIQhAIQhAIQhB//Z">
+            <a:extLst>
+              <a:ext uri="{FF2B5EF4-FFF2-40B4-BE49-F238E27FC236}">
+                <a16:creationId xmlns:a16="http://schemas.microsoft.com/office/drawing/2014/main" xmlns="" id="{15B92B98-B7C8-4A75-A841-F25CD0136DE7}"/>
+              </a:ext>
+            </a:extLst>
+          </p:cNvPr>
+          <p:cNvSpPr>
+            <a:spLocks noChangeAspect="1" noChangeArrowheads="1"/>
+          </p:cNvSpPr>
+          <p:nvPr/>
+        </p:nvSpPr>
+        <p:spPr bwMode="auto">
+          <a:xfrm>
+            <a:off x="155575" y="-721585"/>
+            <a:ext cx="304800" cy="304801"/>
+          </a:xfrm>
+          <a:prstGeom prst="rect">
+            <a:avLst/>
+          </a:prstGeom>
+          <a:noFill/>
+        </p:spPr>
+        <p:txBody>
+          <a:bodyPr vert="horz" wrap="square" lIns="91440" tIns="45720" rIns="91440" bIns="45720" numCol="1" anchor="t" anchorCtr="0" compatLnSpc="1">
+            <a:prstTxWarp prst="textNoShape">
+              <a:avLst/>
+            </a:prstTxWarp>
+          </a:bodyPr>
+          <a:lstStyle/>
+          <a:p>
+            <a:endParaRPr lang="zh-TW" altLang="en-US">
+              <a:latin typeface="Consolas" panose="020B0609020204030204" pitchFamily="49" charset="0"/>
+              <a:cs typeface="Consolas" panose="020B0609020204030204" pitchFamily="49" charset="0"/>
+            </a:endParaRPr>
+          </a:p>
+        </p:txBody>
+      </p:sp>
+      <p:grpSp>
+        <p:nvGrpSpPr>
+          <p:cNvPr id="17" name="群組 16">
+            <a:extLst>
+              <a:ext uri="{FF2B5EF4-FFF2-40B4-BE49-F238E27FC236}">
+                <a16:creationId xmlns:a16="http://schemas.microsoft.com/office/drawing/2014/main" xmlns="" id="{3E62AE25-4106-44ED-8F4E-D5D956A394D2}"/>
+              </a:ext>
+            </a:extLst>
+          </p:cNvPr>
+          <p:cNvGrpSpPr/>
+          <p:nvPr/>
+        </p:nvGrpSpPr>
+        <p:grpSpPr>
+          <a:xfrm>
+            <a:off x="1483395" y="2590023"/>
+            <a:ext cx="2936123" cy="613246"/>
+            <a:chOff x="1027702" y="2502131"/>
+            <a:chExt cx="2309308" cy="492060"/>
+          </a:xfrm>
+        </p:grpSpPr>
+        <p:pic>
+          <p:nvPicPr>
+            <p:cNvPr id="18" name="圖片 17">
+              <a:extLst>
+                <a:ext uri="{FF2B5EF4-FFF2-40B4-BE49-F238E27FC236}">
+                  <a16:creationId xmlns:a16="http://schemas.microsoft.com/office/drawing/2014/main" xmlns="" id="{DF00FD23-F9E0-40CA-BFAD-2BC20441329D}"/>
+                </a:ext>
+              </a:extLst>
+            </p:cNvPr>
+            <p:cNvPicPr>
+              <a:picLocks noChangeAspect="1"/>
+            </p:cNvPicPr>
+            <p:nvPr/>
+          </p:nvPicPr>
+          <p:blipFill>
+            <a:blip r:embed="rId2" cstate="print">
+              <a:extLst>
+                <a:ext uri="{28A0092B-C50C-407E-A947-70E740481C1C}">
+                  <a14:useLocalDpi xmlns:a14="http://schemas.microsoft.com/office/drawing/2010/main" val="0"/>
+                </a:ext>
+              </a:extLst>
+            </a:blip>
+            <a:stretch>
+              <a:fillRect/>
+            </a:stretch>
+          </p:blipFill>
+          <p:spPr>
+            <a:xfrm>
+              <a:off x="1027702" y="2502131"/>
+              <a:ext cx="348313" cy="492060"/>
+            </a:xfrm>
+            <a:prstGeom prst="rect">
+              <a:avLst/>
+            </a:prstGeom>
+          </p:spPr>
+        </p:pic>
+        <p:sp>
+          <p:nvSpPr>
+            <p:cNvPr id="19" name="文字方塊 18">
+              <a:extLst>
+                <a:ext uri="{FF2B5EF4-FFF2-40B4-BE49-F238E27FC236}">
+                  <a16:creationId xmlns:a16="http://schemas.microsoft.com/office/drawing/2014/main" xmlns="" id="{14F08A50-B905-4E9F-B65E-EEFCE05DA4E3}"/>
+                </a:ext>
+              </a:extLst>
+            </p:cNvPr>
+            <p:cNvSpPr txBox="1"/>
+            <p:nvPr/>
+          </p:nvSpPr>
+          <p:spPr>
+            <a:xfrm>
+              <a:off x="1338410" y="2618369"/>
+              <a:ext cx="1998600" cy="271651"/>
+            </a:xfrm>
+            <a:prstGeom prst="rect">
+              <a:avLst/>
+            </a:prstGeom>
+            <a:noFill/>
+          </p:spPr>
+          <p:txBody>
+            <a:bodyPr wrap="none" rtlCol="0">
+              <a:spAutoFit/>
+            </a:bodyPr>
+            <a:lstStyle/>
+            <a:p>
+              <a:r>
+                <a:rPr lang="en-US" altLang="zh-TW" sz="1600" b="1" dirty="0">
+                  <a:solidFill>
+                    <a:schemeClr val="tx2">
+                      <a:lumMod val="75000"/>
+                    </a:schemeClr>
+                  </a:solidFill>
+                  <a:latin typeface="Consolas" panose="020B0609020204030204" pitchFamily="49" charset="0"/>
+                  <a:ea typeface="微軟正黑體" panose="020B0604030504040204" pitchFamily="34" charset="-120"/>
+                  <a:cs typeface="Consolas" panose="020B0609020204030204" pitchFamily="49" charset="0"/>
+                </a:rPr>
+                <a:t> ASP.NET Core Web API</a:t>
+              </a:r>
+              <a:endParaRPr lang="zh-TW" altLang="en-US" sz="1600" b="1" dirty="0">
+                <a:solidFill>
+                  <a:schemeClr val="tx2">
+                    <a:lumMod val="75000"/>
+                  </a:schemeClr>
+                </a:solidFill>
+                <a:latin typeface="Consolas" panose="020B0609020204030204" pitchFamily="49" charset="0"/>
+                <a:ea typeface="微軟正黑體" panose="020B0604030504040204" pitchFamily="34" charset="-120"/>
+                <a:cs typeface="Consolas" panose="020B0609020204030204" pitchFamily="49" charset="0"/>
+              </a:endParaRPr>
+            </a:p>
+          </p:txBody>
+        </p:sp>
+      </p:grpSp>
+      <p:sp>
+        <p:nvSpPr>
+          <p:cNvPr id="35" name="矩形 34">
+            <a:extLst>
+              <a:ext uri="{FF2B5EF4-FFF2-40B4-BE49-F238E27FC236}">
+                <a16:creationId xmlns:a16="http://schemas.microsoft.com/office/drawing/2014/main" xmlns="" id="{A3837EC7-3FF7-497F-B8B9-5A0B2AE1FAD0}"/>
+              </a:ext>
+            </a:extLst>
+          </p:cNvPr>
+          <p:cNvSpPr/>
+          <p:nvPr/>
+        </p:nvSpPr>
+        <p:spPr>
+          <a:xfrm>
+            <a:off x="1939082" y="2025682"/>
+            <a:ext cx="1957587" cy="369332"/>
+          </a:xfrm>
+          <a:prstGeom prst="rect">
+            <a:avLst/>
+          </a:prstGeom>
+          <a:noFill/>
+        </p:spPr>
+        <p:txBody>
+          <a:bodyPr wrap="none">
+            <a:spAutoFit/>
+          </a:bodyPr>
+          <a:lstStyle/>
+          <a:p>
+            <a:pPr algn="ctr"/>
+            <a:r>
+              <a:rPr lang="en-US" altLang="zh-TW" b="1" dirty="0">
+                <a:latin typeface="Consolas" panose="020B0609020204030204" pitchFamily="49" charset="0"/>
+                <a:cs typeface="Consolas" panose="020B0609020204030204" pitchFamily="49" charset="0"/>
+              </a:rPr>
+              <a:t>Backend Server</a:t>
+            </a:r>
+          </a:p>
+        </p:txBody>
+      </p:sp>
+      <p:sp>
+        <p:nvSpPr>
+          <p:cNvPr id="38" name="圓角矩形 6">
+            <a:extLst>
+              <a:ext uri="{FF2B5EF4-FFF2-40B4-BE49-F238E27FC236}">
+                <a16:creationId xmlns:a16="http://schemas.microsoft.com/office/drawing/2014/main" xmlns="" id="{AA3F0518-490B-4DDF-BB4F-AE947406C799}"/>
+              </a:ext>
+            </a:extLst>
+          </p:cNvPr>
+          <p:cNvSpPr/>
+          <p:nvPr/>
+        </p:nvSpPr>
+        <p:spPr>
+          <a:xfrm>
+            <a:off x="5058761" y="1825615"/>
+            <a:ext cx="3055627" cy="2142064"/>
+          </a:xfrm>
+          <a:prstGeom prst="roundRect">
+            <a:avLst/>
+          </a:prstGeom>
+          <a:ln w="12700">
+            <a:solidFill>
+              <a:schemeClr val="accent5">
+                <a:lumMod val="50000"/>
+              </a:schemeClr>
+            </a:solidFill>
+            <a:prstDash val="sysDash"/>
+          </a:ln>
+        </p:spPr>
+        <p:style>
+          <a:lnRef idx="2">
+            <a:schemeClr val="accent1"/>
+          </a:lnRef>
+          <a:fillRef idx="1">
+            <a:schemeClr val="lt1"/>
+          </a:fillRef>
+          <a:effectRef idx="0">
+            <a:schemeClr val="accent1"/>
+          </a:effectRef>
+          <a:fontRef idx="minor">
+            <a:schemeClr val="dk1"/>
+          </a:fontRef>
+        </p:style>
+        <p:txBody>
+          <a:bodyPr rtlCol="0" anchor="ctr"/>
+          <a:lstStyle/>
+          <a:p>
+            <a:pPr algn="ctr"/>
+            <a:endParaRPr lang="zh-TW" altLang="en-US">
+              <a:latin typeface="Consolas" panose="020B0609020204030204" pitchFamily="49" charset="0"/>
+              <a:cs typeface="Consolas" panose="020B0609020204030204" pitchFamily="49" charset="0"/>
+            </a:endParaRPr>
+          </a:p>
+        </p:txBody>
+      </p:sp>
+      <p:sp>
+        <p:nvSpPr>
+          <p:cNvPr id="37" name="矩形 36">
+            <a:extLst>
+              <a:ext uri="{FF2B5EF4-FFF2-40B4-BE49-F238E27FC236}">
+                <a16:creationId xmlns:a16="http://schemas.microsoft.com/office/drawing/2014/main" xmlns="" id="{79B0EFC5-385A-4CBF-8F26-44920131D317}"/>
+              </a:ext>
+            </a:extLst>
+          </p:cNvPr>
+          <p:cNvSpPr/>
+          <p:nvPr/>
+        </p:nvSpPr>
+        <p:spPr>
+          <a:xfrm>
+            <a:off x="1447760" y="2575911"/>
+            <a:ext cx="2944435" cy="613245"/>
+          </a:xfrm>
+          <a:prstGeom prst="rect">
+            <a:avLst/>
+          </a:prstGeom>
+          <a:noFill/>
+          <a:ln>
+            <a:prstDash val="dash"/>
+          </a:ln>
+        </p:spPr>
+        <p:style>
+          <a:lnRef idx="2">
+            <a:schemeClr val="accent1">
+              <a:shade val="50000"/>
+            </a:schemeClr>
+          </a:lnRef>
+          <a:fillRef idx="1">
+            <a:schemeClr val="accent1"/>
+          </a:fillRef>
+          <a:effectRef idx="0">
+            <a:schemeClr val="accent1"/>
+          </a:effectRef>
+          <a:fontRef idx="minor">
+            <a:schemeClr val="lt1"/>
+          </a:fontRef>
+        </p:style>
+        <p:txBody>
+          <a:bodyPr rtlCol="0" anchor="ctr"/>
+          <a:lstStyle/>
+          <a:p>
+            <a:pPr algn="ctr"/>
+            <a:endParaRPr lang="zh-TW" altLang="en-US">
+              <a:latin typeface="Consolas" panose="020B0609020204030204" pitchFamily="49" charset="0"/>
+              <a:cs typeface="Consolas" panose="020B0609020204030204" pitchFamily="49" charset="0"/>
+            </a:endParaRPr>
+          </a:p>
+        </p:txBody>
+      </p:sp>
+      <p:sp>
+        <p:nvSpPr>
+          <p:cNvPr id="48" name="文字方塊 47">
+            <a:extLst>
+              <a:ext uri="{FF2B5EF4-FFF2-40B4-BE49-F238E27FC236}">
+                <a16:creationId xmlns:a16="http://schemas.microsoft.com/office/drawing/2014/main" xmlns="" id="{0DF6CDA6-2149-48ED-A2DB-F56C93DC8F7D}"/>
+              </a:ext>
+            </a:extLst>
+          </p:cNvPr>
+          <p:cNvSpPr txBox="1"/>
+          <p:nvPr/>
+        </p:nvSpPr>
+        <p:spPr>
+          <a:xfrm>
+            <a:off x="5771244" y="2711684"/>
+            <a:ext cx="2204450" cy="338554"/>
+          </a:xfrm>
+          <a:prstGeom prst="rect">
+            <a:avLst/>
+          </a:prstGeom>
+          <a:noFill/>
+        </p:spPr>
+        <p:txBody>
+          <a:bodyPr wrap="none" rtlCol="0">
+            <a:spAutoFit/>
+          </a:bodyPr>
+          <a:lstStyle/>
+          <a:p>
+            <a:r>
+              <a:rPr lang="en-US" altLang="zh-TW" sz="1600" b="1" dirty="0">
+                <a:solidFill>
+                  <a:schemeClr val="tx2">
+                    <a:lumMod val="75000"/>
+                  </a:schemeClr>
+                </a:solidFill>
+                <a:latin typeface="Consolas" panose="020B0609020204030204" pitchFamily="49" charset="0"/>
+                <a:ea typeface="微軟正黑體" panose="020B0604030504040204" pitchFamily="34" charset="-120"/>
+                <a:cs typeface="Consolas" panose="020B0609020204030204" pitchFamily="49" charset="0"/>
+              </a:rPr>
+              <a:t> Identity Server 4</a:t>
+            </a:r>
+            <a:endParaRPr lang="zh-TW" altLang="en-US" sz="1600" b="1" dirty="0">
+              <a:solidFill>
+                <a:schemeClr val="tx2">
+                  <a:lumMod val="75000"/>
+                </a:schemeClr>
+              </a:solidFill>
+              <a:latin typeface="Consolas" panose="020B0609020204030204" pitchFamily="49" charset="0"/>
+              <a:ea typeface="微軟正黑體" panose="020B0604030504040204" pitchFamily="34" charset="-120"/>
+              <a:cs typeface="Consolas" panose="020B0609020204030204" pitchFamily="49" charset="0"/>
+            </a:endParaRPr>
+          </a:p>
+        </p:txBody>
+      </p:sp>
+      <p:sp>
+        <p:nvSpPr>
+          <p:cNvPr id="49" name="矩形 48">
+            <a:extLst>
+              <a:ext uri="{FF2B5EF4-FFF2-40B4-BE49-F238E27FC236}">
+                <a16:creationId xmlns:a16="http://schemas.microsoft.com/office/drawing/2014/main" xmlns="" id="{7C6A78A2-117B-4511-A337-A22A0D832DD5}"/>
+              </a:ext>
+            </a:extLst>
+          </p:cNvPr>
+          <p:cNvSpPr/>
+          <p:nvPr/>
+        </p:nvSpPr>
+        <p:spPr>
+          <a:xfrm>
+            <a:off x="5251107" y="2574339"/>
+            <a:ext cx="2724587" cy="613245"/>
+          </a:xfrm>
+          <a:prstGeom prst="rect">
+            <a:avLst/>
+          </a:prstGeom>
+          <a:noFill/>
+          <a:ln>
+            <a:prstDash val="dash"/>
+          </a:ln>
+        </p:spPr>
+        <p:style>
+          <a:lnRef idx="2">
+            <a:schemeClr val="accent1">
+              <a:shade val="50000"/>
+            </a:schemeClr>
+          </a:lnRef>
+          <a:fillRef idx="1">
+            <a:schemeClr val="accent1"/>
+          </a:fillRef>
+          <a:effectRef idx="0">
+            <a:schemeClr val="accent1"/>
+          </a:effectRef>
+          <a:fontRef idx="minor">
+            <a:schemeClr val="lt1"/>
+          </a:fontRef>
+        </p:style>
+        <p:txBody>
+          <a:bodyPr rtlCol="0" anchor="ctr"/>
+          <a:lstStyle/>
+          <a:p>
+            <a:pPr algn="ctr"/>
+            <a:endParaRPr lang="zh-TW" altLang="en-US">
+              <a:latin typeface="Consolas" panose="020B0609020204030204" pitchFamily="49" charset="0"/>
+              <a:cs typeface="Consolas" panose="020B0609020204030204" pitchFamily="49" charset="0"/>
+            </a:endParaRPr>
+          </a:p>
+        </p:txBody>
+      </p:sp>
+      <p:pic>
+        <p:nvPicPr>
+          <p:cNvPr id="51" name="圖片 50">
+            <a:extLst>
+              <a:ext uri="{FF2B5EF4-FFF2-40B4-BE49-F238E27FC236}">
+                <a16:creationId xmlns:a16="http://schemas.microsoft.com/office/drawing/2014/main" xmlns="" id="{360008C4-4A7C-4F98-BDE4-D845F6D06F74}"/>
+              </a:ext>
+            </a:extLst>
+          </p:cNvPr>
+          <p:cNvPicPr>
+            <a:picLocks noChangeAspect="1"/>
+          </p:cNvPicPr>
+          <p:nvPr/>
+        </p:nvPicPr>
+        <p:blipFill>
+          <a:blip r:embed="rId3" cstate="print">
+            <a:extLst>
+              <a:ext uri="{28A0092B-C50C-407E-A947-70E740481C1C}">
+                <a14:useLocalDpi xmlns:a14="http://schemas.microsoft.com/office/drawing/2010/main" val="0"/>
+              </a:ext>
+            </a:extLst>
+          </a:blip>
+          <a:stretch>
+            <a:fillRect/>
+          </a:stretch>
+        </p:blipFill>
+        <p:spPr>
+          <a:xfrm>
+            <a:off x="5444573" y="2658508"/>
+            <a:ext cx="408171" cy="444906"/>
+          </a:xfrm>
+          <a:prstGeom prst="rect">
+            <a:avLst/>
+          </a:prstGeom>
+        </p:spPr>
+      </p:pic>
+      <p:sp>
+        <p:nvSpPr>
+          <p:cNvPr id="52" name="矩形 51">
+            <a:extLst>
+              <a:ext uri="{FF2B5EF4-FFF2-40B4-BE49-F238E27FC236}">
+                <a16:creationId xmlns:a16="http://schemas.microsoft.com/office/drawing/2014/main" xmlns="" id="{849940C1-270B-4DDA-82FD-843CAA8ED7ED}"/>
+              </a:ext>
+            </a:extLst>
+          </p:cNvPr>
+          <p:cNvSpPr/>
+          <p:nvPr/>
+        </p:nvSpPr>
+        <p:spPr>
+          <a:xfrm>
+            <a:off x="5806127" y="2025682"/>
+            <a:ext cx="1577676" cy="369332"/>
+          </a:xfrm>
+          <a:prstGeom prst="rect">
+            <a:avLst/>
+          </a:prstGeom>
+          <a:noFill/>
+        </p:spPr>
+        <p:txBody>
+          <a:bodyPr wrap="none">
+            <a:spAutoFit/>
+          </a:bodyPr>
+          <a:lstStyle/>
+          <a:p>
+            <a:pPr algn="ctr"/>
+            <a:r>
+              <a:rPr lang="en-US" altLang="zh-TW" b="1" dirty="0" err="1" smtClean="0">
+                <a:latin typeface="Consolas" panose="020B0609020204030204" pitchFamily="49" charset="0"/>
+                <a:cs typeface="Consolas" panose="020B0609020204030204" pitchFamily="49" charset="0"/>
+              </a:rPr>
+              <a:t>Auth</a:t>
+            </a:r>
+            <a:r>
+              <a:rPr lang="en-US" altLang="zh-TW" b="1" dirty="0" smtClean="0">
+                <a:latin typeface="Consolas" panose="020B0609020204030204" pitchFamily="49" charset="0"/>
+                <a:cs typeface="Consolas" panose="020B0609020204030204" pitchFamily="49" charset="0"/>
+              </a:rPr>
+              <a:t> </a:t>
+            </a:r>
+            <a:r>
+              <a:rPr lang="en-US" altLang="zh-TW" b="1" dirty="0">
+                <a:latin typeface="Consolas" panose="020B0609020204030204" pitchFamily="49" charset="0"/>
+                <a:cs typeface="Consolas" panose="020B0609020204030204" pitchFamily="49" charset="0"/>
+              </a:rPr>
+              <a:t>Server</a:t>
+            </a:r>
+          </a:p>
+        </p:txBody>
+      </p:sp>
+      <p:cxnSp>
+        <p:nvCxnSpPr>
+          <p:cNvPr id="55" name="直線單箭頭接點 54">
+            <a:extLst>
+              <a:ext uri="{FF2B5EF4-FFF2-40B4-BE49-F238E27FC236}">
+                <a16:creationId xmlns:a16="http://schemas.microsoft.com/office/drawing/2014/main" xmlns="" id="{A8AC5B70-F649-4DB5-AE32-A6F5581DFE4C}"/>
+              </a:ext>
+            </a:extLst>
+          </p:cNvPr>
+          <p:cNvCxnSpPr>
+            <a:cxnSpLocks/>
+            <a:stCxn id="4" idx="3"/>
+            <a:endCxn id="38" idx="1"/>
+          </p:cNvCxnSpPr>
+          <p:nvPr/>
+        </p:nvCxnSpPr>
+        <p:spPr>
+          <a:xfrm>
+            <a:off x="4613979" y="2896647"/>
+            <a:ext cx="444782" cy="0"/>
+          </a:xfrm>
+          <a:prstGeom prst="straightConnector1">
+            <a:avLst/>
+          </a:prstGeom>
+          <a:ln w="25400">
+            <a:tailEnd type="arrow"/>
+          </a:ln>
+        </p:spPr>
+        <p:style>
+          <a:lnRef idx="1">
+            <a:schemeClr val="accent1"/>
+          </a:lnRef>
+          <a:fillRef idx="0">
+            <a:schemeClr val="accent1"/>
+          </a:fillRef>
+          <a:effectRef idx="0">
+            <a:schemeClr val="accent1"/>
+          </a:effectRef>
+          <a:fontRef idx="minor">
+            <a:schemeClr val="tx1"/>
+          </a:fontRef>
+        </p:style>
+      </p:cxnSp>
+      <p:sp>
+        <p:nvSpPr>
+          <p:cNvPr id="58" name="圓角矩形 6">
+            <a:extLst>
+              <a:ext uri="{FF2B5EF4-FFF2-40B4-BE49-F238E27FC236}">
+                <a16:creationId xmlns:a16="http://schemas.microsoft.com/office/drawing/2014/main" xmlns="" id="{E0994BA9-38F8-40E8-8EAA-1E120C08B215}"/>
+              </a:ext>
+            </a:extLst>
+          </p:cNvPr>
+          <p:cNvSpPr/>
+          <p:nvPr/>
+        </p:nvSpPr>
+        <p:spPr>
+          <a:xfrm>
+            <a:off x="8620887" y="1825615"/>
+            <a:ext cx="3055627" cy="2142064"/>
+          </a:xfrm>
+          <a:prstGeom prst="roundRect">
+            <a:avLst/>
+          </a:prstGeom>
+          <a:ln>
+            <a:prstDash val="sysDash"/>
+          </a:ln>
+        </p:spPr>
+        <p:style>
+          <a:lnRef idx="2">
+            <a:schemeClr val="accent1"/>
+          </a:lnRef>
+          <a:fillRef idx="1">
+            <a:schemeClr val="lt1"/>
+          </a:fillRef>
+          <a:effectRef idx="0">
+            <a:schemeClr val="accent1"/>
+          </a:effectRef>
+          <a:fontRef idx="minor">
+            <a:schemeClr val="dk1"/>
+          </a:fontRef>
+        </p:style>
+        <p:txBody>
+          <a:bodyPr rtlCol="0" anchor="ctr"/>
+          <a:lstStyle/>
+          <a:p>
+            <a:pPr algn="ctr"/>
+            <a:endParaRPr lang="zh-TW" altLang="en-US" dirty="0">
+              <a:latin typeface="Consolas" panose="020B0609020204030204" pitchFamily="49" charset="0"/>
+              <a:cs typeface="Consolas" panose="020B0609020204030204" pitchFamily="49" charset="0"/>
+            </a:endParaRPr>
+          </a:p>
+        </p:txBody>
+      </p:sp>
+      <p:grpSp>
+        <p:nvGrpSpPr>
+          <p:cNvPr id="5" name="群組 4"/>
+          <p:cNvGrpSpPr/>
+          <p:nvPr/>
+        </p:nvGrpSpPr>
+        <p:grpSpPr>
+          <a:xfrm>
+            <a:off x="8786407" y="2581146"/>
+            <a:ext cx="2805903" cy="613245"/>
+            <a:chOff x="8194302" y="2551167"/>
+            <a:chExt cx="2805903" cy="613245"/>
+          </a:xfrm>
+        </p:grpSpPr>
+        <p:sp>
+          <p:nvSpPr>
+            <p:cNvPr id="59" name="文字方塊 58">
+              <a:extLst>
+                <a:ext uri="{FF2B5EF4-FFF2-40B4-BE49-F238E27FC236}">
+                  <a16:creationId xmlns:a16="http://schemas.microsoft.com/office/drawing/2014/main" xmlns="" id="{CA8B39F2-1093-4652-9183-59D4A1FA31AE}"/>
+                </a:ext>
+              </a:extLst>
+            </p:cNvPr>
+            <p:cNvSpPr txBox="1"/>
+            <p:nvPr/>
+          </p:nvSpPr>
+          <p:spPr>
+            <a:xfrm>
+              <a:off x="8795755" y="2672827"/>
+              <a:ext cx="2204450" cy="338554"/>
+            </a:xfrm>
+            <a:prstGeom prst="rect">
+              <a:avLst/>
+            </a:prstGeom>
+            <a:noFill/>
+          </p:spPr>
+          <p:txBody>
+            <a:bodyPr wrap="none" rtlCol="0">
+              <a:spAutoFit/>
+            </a:bodyPr>
+            <a:lstStyle/>
+            <a:p>
+              <a:r>
+                <a:rPr lang="en-US" altLang="zh-TW" sz="1600" b="1" dirty="0">
+                  <a:solidFill>
+                    <a:schemeClr val="tx2">
+                      <a:lumMod val="75000"/>
+                    </a:schemeClr>
+                  </a:solidFill>
+                  <a:latin typeface="Consolas" panose="020B0609020204030204" pitchFamily="49" charset="0"/>
+                  <a:ea typeface="微軟正黑體" panose="020B0604030504040204" pitchFamily="34" charset="-120"/>
+                  <a:cs typeface="Consolas" panose="020B0609020204030204" pitchFamily="49" charset="0"/>
+                </a:rPr>
+                <a:t>OpenLDAP container</a:t>
+              </a:r>
+              <a:endParaRPr lang="zh-TW" altLang="en-US" sz="1600" b="1" dirty="0">
+                <a:solidFill>
+                  <a:schemeClr val="tx2">
+                    <a:lumMod val="75000"/>
+                  </a:schemeClr>
+                </a:solidFill>
+                <a:latin typeface="Consolas" panose="020B0609020204030204" pitchFamily="49" charset="0"/>
+                <a:ea typeface="微軟正黑體" panose="020B0604030504040204" pitchFamily="34" charset="-120"/>
+                <a:cs typeface="Consolas" panose="020B0609020204030204" pitchFamily="49" charset="0"/>
+              </a:endParaRPr>
+            </a:p>
+          </p:txBody>
+        </p:sp>
+        <p:sp>
+          <p:nvSpPr>
+            <p:cNvPr id="60" name="矩形 59">
+              <a:extLst>
+                <a:ext uri="{FF2B5EF4-FFF2-40B4-BE49-F238E27FC236}">
+                  <a16:creationId xmlns:a16="http://schemas.microsoft.com/office/drawing/2014/main" xmlns="" id="{3B93D6B4-AAC0-4BDA-8620-5B2577AB6EAB}"/>
+                </a:ext>
+              </a:extLst>
+            </p:cNvPr>
+            <p:cNvSpPr/>
+            <p:nvPr/>
+          </p:nvSpPr>
+          <p:spPr>
+            <a:xfrm>
+              <a:off x="8194302" y="2551167"/>
+              <a:ext cx="2724587" cy="613245"/>
+            </a:xfrm>
+            <a:prstGeom prst="rect">
+              <a:avLst/>
+            </a:prstGeom>
+            <a:noFill/>
+            <a:ln>
+              <a:prstDash val="dash"/>
+            </a:ln>
+          </p:spPr>
+          <p:style>
+            <a:lnRef idx="2">
+              <a:schemeClr val="accent1">
+                <a:shade val="50000"/>
+              </a:schemeClr>
+            </a:lnRef>
+            <a:fillRef idx="1">
+              <a:schemeClr val="accent1"/>
+            </a:fillRef>
+            <a:effectRef idx="0">
+              <a:schemeClr val="accent1"/>
+            </a:effectRef>
+            <a:fontRef idx="minor">
+              <a:schemeClr val="lt1"/>
+            </a:fontRef>
+          </p:style>
+          <p:txBody>
+            <a:bodyPr rtlCol="0" anchor="ctr"/>
+            <a:lstStyle/>
+            <a:p>
+              <a:pPr algn="ctr"/>
+              <a:endParaRPr lang="zh-TW" altLang="en-US">
+                <a:latin typeface="Consolas" panose="020B0609020204030204" pitchFamily="49" charset="0"/>
+                <a:cs typeface="Consolas" panose="020B0609020204030204" pitchFamily="49" charset="0"/>
+              </a:endParaRPr>
+            </a:p>
+          </p:txBody>
+        </p:sp>
+        <p:pic>
+          <p:nvPicPr>
+            <p:cNvPr id="61" name="圖片 60">
+              <a:extLst>
+                <a:ext uri="{FF2B5EF4-FFF2-40B4-BE49-F238E27FC236}">
+                  <a16:creationId xmlns:a16="http://schemas.microsoft.com/office/drawing/2014/main" xmlns="" id="{BE73BB19-43C0-469E-8622-D3B22AE9CFCC}"/>
+                </a:ext>
+              </a:extLst>
+            </p:cNvPr>
+            <p:cNvPicPr>
+              <a:picLocks noChangeAspect="1"/>
+            </p:cNvPicPr>
+            <p:nvPr/>
+          </p:nvPicPr>
+          <p:blipFill>
+            <a:blip r:embed="rId2" cstate="print">
+              <a:extLst>
+                <a:ext uri="{28A0092B-C50C-407E-A947-70E740481C1C}">
+                  <a14:useLocalDpi xmlns:a14="http://schemas.microsoft.com/office/drawing/2010/main" val="0"/>
+                </a:ext>
+              </a:extLst>
+            </a:blip>
+            <a:stretch>
+              <a:fillRect/>
+            </a:stretch>
+          </p:blipFill>
+          <p:spPr>
+            <a:xfrm>
+              <a:off x="8283881" y="2612725"/>
+              <a:ext cx="422295" cy="501739"/>
+            </a:xfrm>
+            <a:prstGeom prst="rect">
+              <a:avLst/>
+            </a:prstGeom>
+          </p:spPr>
+        </p:pic>
+      </p:grpSp>
+      <p:pic>
+        <p:nvPicPr>
+          <p:cNvPr id="2" name="圖片 1">
+            <a:extLst>
+              <a:ext uri="{FF2B5EF4-FFF2-40B4-BE49-F238E27FC236}">
+                <a16:creationId xmlns:a16="http://schemas.microsoft.com/office/drawing/2014/main" xmlns="" id="{9719C86B-CFC1-4A17-B6CA-1F6C48A30850}"/>
+              </a:ext>
+            </a:extLst>
+          </p:cNvPr>
+          <p:cNvPicPr>
+            <a:picLocks noChangeAspect="1"/>
+          </p:cNvPicPr>
+          <p:nvPr/>
+        </p:nvPicPr>
+        <p:blipFill>
+          <a:blip r:embed="rId4"/>
+          <a:stretch>
+            <a:fillRect/>
+          </a:stretch>
+        </p:blipFill>
+        <p:spPr>
+          <a:xfrm>
+            <a:off x="5648658" y="1070751"/>
+            <a:ext cx="1948202" cy="507439"/>
+          </a:xfrm>
+          <a:prstGeom prst="rect">
+            <a:avLst/>
+          </a:prstGeom>
+        </p:spPr>
+      </p:pic>
+      <p:cxnSp>
+        <p:nvCxnSpPr>
+          <p:cNvPr id="54" name="直線單箭頭接點 53">
+            <a:extLst>
+              <a:ext uri="{FF2B5EF4-FFF2-40B4-BE49-F238E27FC236}">
+                <a16:creationId xmlns:a16="http://schemas.microsoft.com/office/drawing/2014/main" xmlns="" id="{9CD041CD-9441-4679-8E66-FF8013D04890}"/>
+              </a:ext>
+            </a:extLst>
+          </p:cNvPr>
+          <p:cNvCxnSpPr>
+            <a:cxnSpLocks/>
+            <a:stCxn id="38" idx="3"/>
+            <a:endCxn id="58" idx="1"/>
+          </p:cNvCxnSpPr>
+          <p:nvPr/>
+        </p:nvCxnSpPr>
+        <p:spPr>
+          <a:xfrm>
+            <a:off x="8114388" y="2896647"/>
+            <a:ext cx="506499" cy="0"/>
+          </a:xfrm>
+          <a:prstGeom prst="straightConnector1">
+            <a:avLst/>
+          </a:prstGeom>
+          <a:ln w="25400">
+            <a:tailEnd type="arrow"/>
+          </a:ln>
+        </p:spPr>
+        <p:style>
+          <a:lnRef idx="1">
+            <a:schemeClr val="accent1"/>
+          </a:lnRef>
+          <a:fillRef idx="0">
+            <a:schemeClr val="accent1"/>
+          </a:fillRef>
+          <a:effectRef idx="0">
+            <a:schemeClr val="accent1"/>
+          </a:effectRef>
+          <a:fontRef idx="minor">
+            <a:schemeClr val="tx1"/>
+          </a:fontRef>
+        </p:style>
+      </p:cxnSp>
+      <p:sp>
+        <p:nvSpPr>
+          <p:cNvPr id="22" name="圓角矩形 6">
+            <a:extLst>
+              <a:ext uri="{FF2B5EF4-FFF2-40B4-BE49-F238E27FC236}">
+                <a16:creationId xmlns:a16="http://schemas.microsoft.com/office/drawing/2014/main" xmlns="" id="{9292555D-6383-47AB-94C4-8C24D05C629F}"/>
+              </a:ext>
+            </a:extLst>
+          </p:cNvPr>
+          <p:cNvSpPr/>
+          <p:nvPr/>
+        </p:nvSpPr>
+        <p:spPr>
+          <a:xfrm>
+            <a:off x="5058761" y="4462529"/>
+            <a:ext cx="3055627" cy="1263348"/>
+          </a:xfrm>
+          <a:prstGeom prst="roundRect">
+            <a:avLst/>
+          </a:prstGeom>
+          <a:ln w="25400">
+            <a:solidFill>
+              <a:schemeClr val="accent1"/>
+            </a:solidFill>
+            <a:prstDash val="sysDash"/>
+          </a:ln>
+        </p:spPr>
+        <p:style>
+          <a:lnRef idx="2">
+            <a:schemeClr val="accent1"/>
+          </a:lnRef>
+          <a:fillRef idx="1">
+            <a:schemeClr val="lt1"/>
+          </a:fillRef>
+          <a:effectRef idx="0">
+            <a:schemeClr val="accent1"/>
+          </a:effectRef>
+          <a:fontRef idx="minor">
+            <a:schemeClr val="dk1"/>
+          </a:fontRef>
+        </p:style>
+        <p:txBody>
+          <a:bodyPr rtlCol="0" anchor="ctr"/>
+          <a:lstStyle/>
+          <a:p>
+            <a:pPr algn="ctr"/>
+            <a:endParaRPr lang="zh-TW" altLang="en-US">
+              <a:latin typeface="Consolas" panose="020B0609020204030204" pitchFamily="49" charset="0"/>
+              <a:cs typeface="Consolas" panose="020B0609020204030204" pitchFamily="49" charset="0"/>
+            </a:endParaRPr>
+          </a:p>
+        </p:txBody>
+      </p:sp>
+      <p:sp>
+        <p:nvSpPr>
+          <p:cNvPr id="23" name="矩形 22">
+            <a:extLst>
+              <a:ext uri="{FF2B5EF4-FFF2-40B4-BE49-F238E27FC236}">
+                <a16:creationId xmlns:a16="http://schemas.microsoft.com/office/drawing/2014/main" xmlns="" id="{849940C1-270B-4DDA-82FD-843CAA8ED7ED}"/>
+              </a:ext>
+            </a:extLst>
+          </p:cNvPr>
+          <p:cNvSpPr/>
+          <p:nvPr/>
+        </p:nvSpPr>
+        <p:spPr>
+          <a:xfrm>
+            <a:off x="9824680" y="2028228"/>
+            <a:ext cx="691215" cy="369332"/>
+          </a:xfrm>
+          <a:prstGeom prst="rect">
+            <a:avLst/>
+          </a:prstGeom>
+          <a:noFill/>
+        </p:spPr>
+        <p:txBody>
+          <a:bodyPr wrap="none">
+            <a:spAutoFit/>
+          </a:bodyPr>
+          <a:lstStyle/>
+          <a:p>
+            <a:pPr algn="ctr"/>
+            <a:r>
+              <a:rPr lang="en-US" altLang="zh-TW" b="1" dirty="0" smtClean="0">
+                <a:latin typeface="Consolas" panose="020B0609020204030204" pitchFamily="49" charset="0"/>
+                <a:cs typeface="Consolas" panose="020B0609020204030204" pitchFamily="49" charset="0"/>
+              </a:rPr>
+              <a:t>LDAP</a:t>
+            </a:r>
+            <a:endParaRPr lang="en-US" altLang="zh-TW" b="1" dirty="0">
+              <a:latin typeface="Consolas" panose="020B0609020204030204" pitchFamily="49" charset="0"/>
+              <a:cs typeface="Consolas" panose="020B0609020204030204" pitchFamily="49" charset="0"/>
+            </a:endParaRPr>
+          </a:p>
+        </p:txBody>
+      </p:sp>
+      <p:grpSp>
+        <p:nvGrpSpPr>
+          <p:cNvPr id="9" name="群組 8"/>
+          <p:cNvGrpSpPr/>
+          <p:nvPr/>
+        </p:nvGrpSpPr>
+        <p:grpSpPr>
+          <a:xfrm>
+            <a:off x="5251107" y="4825191"/>
+            <a:ext cx="2724587" cy="613245"/>
+            <a:chOff x="3001576" y="4769179"/>
+            <a:chExt cx="2724587" cy="613245"/>
+          </a:xfrm>
+        </p:grpSpPr>
+        <p:grpSp>
+          <p:nvGrpSpPr>
+            <p:cNvPr id="27" name="群組 26"/>
+            <p:cNvGrpSpPr/>
+            <p:nvPr/>
+          </p:nvGrpSpPr>
+          <p:grpSpPr>
+            <a:xfrm>
+              <a:off x="3001576" y="4769179"/>
+              <a:ext cx="2724587" cy="613245"/>
+              <a:chOff x="8194302" y="2551167"/>
+              <a:chExt cx="2724587" cy="613245"/>
+            </a:xfrm>
+          </p:grpSpPr>
+          <p:sp>
+            <p:nvSpPr>
+              <p:cNvPr id="28" name="文字方塊 27">
+                <a:extLst>
+                  <a:ext uri="{FF2B5EF4-FFF2-40B4-BE49-F238E27FC236}">
+                    <a16:creationId xmlns:a16="http://schemas.microsoft.com/office/drawing/2014/main" xmlns="" id="{CA8B39F2-1093-4652-9183-59D4A1FA31AE}"/>
+                  </a:ext>
+                </a:extLst>
+              </p:cNvPr>
+              <p:cNvSpPr txBox="1"/>
+              <p:nvPr/>
+            </p:nvSpPr>
+            <p:spPr>
+              <a:xfrm>
+                <a:off x="8795755" y="2672827"/>
+                <a:ext cx="745717" cy="338554"/>
+              </a:xfrm>
+              <a:prstGeom prst="rect">
+                <a:avLst/>
+              </a:prstGeom>
+              <a:noFill/>
+            </p:spPr>
+            <p:txBody>
+              <a:bodyPr wrap="none" rtlCol="0">
+                <a:spAutoFit/>
+              </a:bodyPr>
+              <a:lstStyle/>
+              <a:p>
+                <a:r>
+                  <a:rPr lang="en-US" altLang="zh-TW" sz="1600" b="1" dirty="0" err="1" smtClean="0">
+                    <a:solidFill>
+                      <a:schemeClr val="tx2">
+                        <a:lumMod val="75000"/>
+                      </a:schemeClr>
+                    </a:solidFill>
+                    <a:latin typeface="Consolas" panose="020B0609020204030204" pitchFamily="49" charset="0"/>
+                    <a:ea typeface="微軟正黑體" panose="020B0604030504040204" pitchFamily="34" charset="-120"/>
+                    <a:cs typeface="Consolas" panose="020B0609020204030204" pitchFamily="49" charset="0"/>
+                  </a:rPr>
+                  <a:t>Redis</a:t>
+                </a:r>
+                <a:endParaRPr lang="zh-TW" altLang="en-US" sz="1600" b="1" dirty="0">
+                  <a:solidFill>
+                    <a:schemeClr val="tx2">
+                      <a:lumMod val="75000"/>
+                    </a:schemeClr>
+                  </a:solidFill>
+                  <a:latin typeface="Consolas" panose="020B0609020204030204" pitchFamily="49" charset="0"/>
+                  <a:ea typeface="微軟正黑體" panose="020B0604030504040204" pitchFamily="34" charset="-120"/>
+                  <a:cs typeface="Consolas" panose="020B0609020204030204" pitchFamily="49" charset="0"/>
+                </a:endParaRPr>
+              </a:p>
+            </p:txBody>
+          </p:sp>
+          <p:sp>
+            <p:nvSpPr>
+              <p:cNvPr id="29" name="矩形 28">
+                <a:extLst>
+                  <a:ext uri="{FF2B5EF4-FFF2-40B4-BE49-F238E27FC236}">
+                    <a16:creationId xmlns:a16="http://schemas.microsoft.com/office/drawing/2014/main" xmlns="" id="{3B93D6B4-AAC0-4BDA-8620-5B2577AB6EAB}"/>
+                  </a:ext>
+                </a:extLst>
+              </p:cNvPr>
+              <p:cNvSpPr/>
+              <p:nvPr/>
+            </p:nvSpPr>
+            <p:spPr>
+              <a:xfrm>
+                <a:off x="8194302" y="2551167"/>
+                <a:ext cx="2724587" cy="613245"/>
+              </a:xfrm>
+              <a:prstGeom prst="rect">
+                <a:avLst/>
+              </a:prstGeom>
+              <a:noFill/>
+              <a:ln>
+                <a:prstDash val="dash"/>
+              </a:ln>
+            </p:spPr>
+            <p:style>
+              <a:lnRef idx="2">
+                <a:schemeClr val="accent1">
+                  <a:shade val="50000"/>
+                </a:schemeClr>
+              </a:lnRef>
+              <a:fillRef idx="1">
+                <a:schemeClr val="accent1"/>
+              </a:fillRef>
+              <a:effectRef idx="0">
+                <a:schemeClr val="accent1"/>
+              </a:effectRef>
+              <a:fontRef idx="minor">
+                <a:schemeClr val="lt1"/>
+              </a:fontRef>
+            </p:style>
+            <p:txBody>
+              <a:bodyPr rtlCol="0" anchor="ctr"/>
+              <a:lstStyle/>
+              <a:p>
+                <a:pPr algn="ctr"/>
+                <a:endParaRPr lang="zh-TW" altLang="en-US">
+                  <a:latin typeface="Consolas" panose="020B0609020204030204" pitchFamily="49" charset="0"/>
+                  <a:cs typeface="Consolas" panose="020B0609020204030204" pitchFamily="49" charset="0"/>
+                </a:endParaRPr>
+              </a:p>
+            </p:txBody>
+          </p:sp>
+        </p:grpSp>
+        <p:pic>
+          <p:nvPicPr>
+            <p:cNvPr id="6" name="圖片 5"/>
+            <p:cNvPicPr>
+              <a:picLocks noChangeAspect="1"/>
+            </p:cNvPicPr>
+            <p:nvPr/>
+          </p:nvPicPr>
+          <p:blipFill>
+            <a:blip r:embed="rId5" cstate="print">
+              <a:extLst>
+                <a:ext uri="{28A0092B-C50C-407E-A947-70E740481C1C}">
+                  <a14:useLocalDpi xmlns:a14="http://schemas.microsoft.com/office/drawing/2010/main" val="0"/>
+                </a:ext>
+              </a:extLst>
+            </a:blip>
+            <a:stretch>
+              <a:fillRect/>
+            </a:stretch>
+          </p:blipFill>
+          <p:spPr>
+            <a:xfrm>
+              <a:off x="3084023" y="4807916"/>
+              <a:ext cx="541491" cy="541491"/>
+            </a:xfrm>
+            <a:prstGeom prst="rect">
+              <a:avLst/>
+            </a:prstGeom>
+          </p:spPr>
+        </p:pic>
+      </p:grpSp>
+      <p:cxnSp>
+        <p:nvCxnSpPr>
+          <p:cNvPr id="32" name="直線單箭頭接點 31">
+            <a:extLst>
+              <a:ext uri="{FF2B5EF4-FFF2-40B4-BE49-F238E27FC236}">
+                <a16:creationId xmlns:a16="http://schemas.microsoft.com/office/drawing/2014/main" xmlns="" id="{9CD041CD-9441-4679-8E66-FF8013D04890}"/>
+              </a:ext>
+            </a:extLst>
+          </p:cNvPr>
+          <p:cNvCxnSpPr>
+            <a:cxnSpLocks/>
+          </p:cNvCxnSpPr>
+          <p:nvPr/>
+        </p:nvCxnSpPr>
+        <p:spPr>
+          <a:xfrm>
+            <a:off x="6613400" y="3958938"/>
+            <a:ext cx="0" cy="503591"/>
+          </a:xfrm>
+          <a:prstGeom prst="straightConnector1">
+            <a:avLst/>
+          </a:prstGeom>
+          <a:ln w="25400">
+            <a:tailEnd type="arrow"/>
+          </a:ln>
+        </p:spPr>
+        <p:style>
+          <a:lnRef idx="1">
+            <a:schemeClr val="accent1"/>
+          </a:lnRef>
+          <a:fillRef idx="0">
+            <a:schemeClr val="accent1"/>
+          </a:fillRef>
+          <a:effectRef idx="0">
+            <a:schemeClr val="accent1"/>
+          </a:effectRef>
+          <a:fontRef idx="minor">
+            <a:schemeClr val="tx1"/>
+          </a:fontRef>
+        </p:style>
+      </p:cxnSp>
+      <p:sp>
+        <p:nvSpPr>
+          <p:cNvPr id="21" name="向右箭號 20"/>
+          <p:cNvSpPr/>
+          <p:nvPr/>
+        </p:nvSpPr>
+        <p:spPr>
+          <a:xfrm>
+            <a:off x="74951" y="2460519"/>
+            <a:ext cx="1146823" cy="749429"/>
+          </a:xfrm>
+          <a:prstGeom prst="rightArrow">
+            <a:avLst/>
+          </a:prstGeom>
+        </p:spPr>
+        <p:style>
+          <a:lnRef idx="2">
+            <a:schemeClr val="accent6">
+              <a:shade val="50000"/>
+            </a:schemeClr>
+          </a:lnRef>
+          <a:fillRef idx="1">
+            <a:schemeClr val="accent6"/>
+          </a:fillRef>
+          <a:effectRef idx="0">
+            <a:schemeClr val="accent6"/>
+          </a:effectRef>
+          <a:fontRef idx="minor">
+            <a:schemeClr val="lt1"/>
+          </a:fontRef>
+        </p:style>
+        <p:txBody>
+          <a:bodyPr rtlCol="0" anchor="ctr"/>
+          <a:lstStyle/>
+          <a:p>
+            <a:pPr algn="ctr"/>
+            <a:r>
+              <a:rPr lang="en-US" altLang="zh-TW" dirty="0" smtClean="0"/>
+              <a:t>Client</a:t>
+            </a:r>
+            <a:endParaRPr lang="zh-TW" altLang="en-US" dirty="0"/>
+          </a:p>
+        </p:txBody>
+      </p:sp>
+    </p:spTree>
+    <p:extLst>
+      <p:ext uri="{BB962C8B-B14F-4D97-AF65-F5344CB8AC3E}">
+        <p14:creationId xmlns:p14="http://schemas.microsoft.com/office/powerpoint/2010/main" val="4020588407"/>
+      </p:ext>
+    </p:extLst>
+  </p:cSld>
+  <p:clrMapOvr>
+    <a:masterClrMapping/>
+  </p:clrMapOvr>
+</p:sld>
+</file>
+
+<file path=ppt/slides/slide5.xml><?xml version="1.0" encoding="utf-8"?>
+<p:sld xmlns:a="http://schemas.openxmlformats.org/drawingml/2006/main" xmlns:r="http://schemas.openxmlformats.org/officeDocument/2006/relationships" xmlns:p="http://schemas.openxmlformats.org/presentationml/2006/main">
+  <p:cSld>
+    <p:spTree>
+      <p:nvGrpSpPr>
+        <p:cNvPr id="1" name=""/>
+        <p:cNvGrpSpPr/>
+        <p:nvPr/>
+      </p:nvGrpSpPr>
+      <p:grpSpPr>
+        <a:xfrm>
+          <a:off x="0" y="0"/>
+          <a:ext cx="0" cy="0"/>
+          <a:chOff x="0" y="0"/>
+          <a:chExt cx="0" cy="0"/>
+        </a:xfrm>
+      </p:grpSpPr>
+      <p:sp>
+        <p:nvSpPr>
+          <p:cNvPr id="3" name="矩形 2"/>
+          <p:cNvSpPr/>
+          <p:nvPr/>
+        </p:nvSpPr>
+        <p:spPr>
+          <a:xfrm>
+            <a:off x="940125" y="472587"/>
+            <a:ext cx="11044511" cy="6048134"/>
+          </a:xfrm>
+          <a:prstGeom prst="rect">
+            <a:avLst/>
+          </a:prstGeom>
+          <a:solidFill>
+            <a:schemeClr val="bg1">
+              <a:lumMod val="85000"/>
+            </a:schemeClr>
+          </a:solidFill>
+          <a:ln w="19050">
+            <a:prstDash val="sysDash"/>
+          </a:ln>
+        </p:spPr>
+        <p:style>
+          <a:lnRef idx="2">
+            <a:schemeClr val="accent1">
+              <a:shade val="50000"/>
+            </a:schemeClr>
+          </a:lnRef>
+          <a:fillRef idx="1">
+            <a:schemeClr val="accent1"/>
+          </a:fillRef>
+          <a:effectRef idx="0">
+            <a:schemeClr val="accent1"/>
+          </a:effectRef>
+          <a:fontRef idx="minor">
+            <a:schemeClr val="lt1"/>
+          </a:fontRef>
+        </p:style>
+        <p:txBody>
+          <a:bodyPr rtlCol="0" anchor="ctr"/>
+          <a:lstStyle/>
+          <a:p>
+            <a:pPr algn="ctr"/>
+            <a:r>
+              <a:rPr lang="en-US" altLang="zh-TW" dirty="0" err="1" smtClean="0"/>
+              <a:t>Procsdfsdfsfdsdfsdfsdf</a:t>
+            </a:r>
+            <a:endParaRPr lang="zh-TW" altLang="en-US" dirty="0"/>
+          </a:p>
+        </p:txBody>
+      </p:sp>
+      <p:sp>
+        <p:nvSpPr>
+          <p:cNvPr id="4" name="圓角矩形 6">
+            <a:extLst>
+              <a:ext uri="{FF2B5EF4-FFF2-40B4-BE49-F238E27FC236}">
+                <a16:creationId xmlns:a16="http://schemas.microsoft.com/office/drawing/2014/main" xmlns="" id="{9292555D-6383-47AB-94C4-8C24D05C629F}"/>
+              </a:ext>
+            </a:extLst>
+          </p:cNvPr>
+          <p:cNvSpPr/>
+          <p:nvPr/>
+        </p:nvSpPr>
+        <p:spPr>
+          <a:xfrm>
+            <a:off x="1221774" y="2402737"/>
+            <a:ext cx="3392205" cy="2142064"/>
+          </a:xfrm>
+          <a:prstGeom prst="roundRect">
+            <a:avLst/>
+          </a:prstGeom>
+          <a:ln w="25400">
+            <a:solidFill>
+              <a:schemeClr val="accent1"/>
+            </a:solidFill>
+            <a:prstDash val="sysDash"/>
+          </a:ln>
+        </p:spPr>
+        <p:style>
+          <a:lnRef idx="2">
+            <a:schemeClr val="accent1"/>
+          </a:lnRef>
+          <a:fillRef idx="1">
+            <a:schemeClr val="lt1"/>
+          </a:fillRef>
+          <a:effectRef idx="0">
+            <a:schemeClr val="accent1"/>
+          </a:effectRef>
+          <a:fontRef idx="minor">
+            <a:schemeClr val="dk1"/>
+          </a:fontRef>
+        </p:style>
+        <p:txBody>
+          <a:bodyPr rtlCol="0" anchor="ctr"/>
+          <a:lstStyle/>
+          <a:p>
+            <a:pPr algn="ctr"/>
+            <a:endParaRPr lang="zh-TW" altLang="en-US">
+              <a:latin typeface="Consolas" panose="020B0609020204030204" pitchFamily="49" charset="0"/>
+              <a:cs typeface="Consolas" panose="020B0609020204030204" pitchFamily="49" charset="0"/>
+            </a:endParaRPr>
+          </a:p>
+        </p:txBody>
+      </p:sp>
+      <p:sp>
+        <p:nvSpPr>
+          <p:cNvPr id="8" name="AutoShape 2" descr="data:image/jpeg;base64,/9j/4AAQSkZJRgABAQAAAQABAAD/2wCEAAkGBhASEBAQDxAODxQSEg8PEBAUEBAPEBAQFBAVFBQQFRQXHCYeFxkjGRQUHy8gIycpLCwsFR4xNTMqNSYrLCkBCQoKDgwOFw8PGiwcHBwpLCksKSkpKSwpKSktNSopLCkpLCwsNSkpKSksKSkpKSwpKiopKTUpKSkvKSwpKSkpKf/AABEIAMwAzAMBIgACEQEDEQH/xAAbAAABBQEBAAAAAAAAAAAAAAAAAgMEBQYBB//EAEUQAAEDAgIGBgYGCAUFAAAAAAEAAgMEERIhBQYxQVFxE2GBkaHBIjJCUpKxFCMzcqKyJFNiY4LR4fAHFkOTsxVEg8LD/8QAGQEBAAMBAQAAAAAAAAAAAAAAAAEDBAIF/8QAJxEBAAIBAwMDBAMAAAAAAAAAAAECEQMSIQQxQRMyYQUiQlGRocH/2gAMAwEAAhEDEQA/APcUIQgFFrtIsiDS+/pEgWF9m9Slm9bpheJu+z3HkbAfIoLSPT0B9u3MFSWV0Z2PZ8QC8j0hrUYp5IRCJAzAMQkwuJcwOIsRbK6k0+tzMsUNQ37vRyfIhd7LYzhxvrHGXrDXg7CD2pS8zbrVTb5JW/ehly7QCFLptbICbMrIr8OlwHudZc4mO7qJiez0FCydPpuY+rIH8ix/yU9mmpd7W/CQoSvUKobpx29g7yE83TTd7XDuKCxQobdKxneRzBTgr4/fHigkISGzNOxzT2hLQCEIQCEIQCEIQCEIQCEIQCEIQCx+tUmKcN91rG95J81sFh9Nz/pEznWsw+DGXQebl/SVVQ7beaQDk12EflV/R0TTuWX1ediAefau883Eu81sKIr161xSIePrzm0p8OiGFEurrCLEA9RzCn0pyUrEqpiGfdMM27VCPcxretowHvbZJGgpWZRzVEfU2aQDxK1LXJQKiaRKY17x2lmfote0+jVT8nYJB+JqdbpOvZ63QSc4iwnta7yW4hha5rTYZgLkmjmHcFmmK/p6EX1MZiWNZrPMPXpmn7krh+ZqdGt7B60E45GN/mFpH6EjO5RZdW2HcFG2ruNW6sj1upT6xlZ96Jx8W3U6DWOmPq1UV+BfgPcVHn1SadwUGXU7qUenH7TGvbzDURaQJ9WUO5Oa5SGVknHwC8/qdTyPVFuQwnwUZmhall8EszeT3jzUen8u/XjzD1Btc7eAnm1V9y8mdpTSUR9GeQgbnBr/ABIulx6+6QZ67IJOcZae8HyT0bJ9ej1oShclna1pc4hoaCSTsAG9YXVTXmeqqGwvp4mAhxc9rnXADSdhHEDvWj1lntRz9bQz4iAuLVms4lbW0WjMLljwQCCCCLgjMEcUpZ3UeoLqdzSb4Hlo5YQbeK0S5dBCEIBCEIBeZ6x1BENdIdoiqXeBA8l6RUSYWOdwa49wXkuts9qCoO0vMMXPHKCfAFTWMzEE8QzOgWWaBwAHcLLU0RWY0R6oWloSvamOHi37r+mdkpGJQ6ZykFyoZ7H2OS8SjtelY1OFMyvtGSXZbgSPPzUvEqrREnrDkVYl6yXjFperoXzSDl1wlN41wvXGF244SuBNF66HqcOdwfZNCJpOwLjpElkmanCM8o1Vo+M7goE2gYyNitJnpp0isiZwiYhD0FodsM5e232bx2lzbeak62yfopHGSMeN0/SH0nnqY3tu4n5hVut0v1UTeMjj8Lf6rNqTmzbpRisLXUqK1Lf3nvPl5K+Vdq7FhpYR+wHfFn5qxVawIQhAIQhBX6elw00p/Zt3kBeWa02dHTxHZJOXHlHC7zeO5ej63y2p7e89g7rnyXmOsp+upBwjqJO1z42D8rl3pxm0Obe2VXSxFhLTtBt/VXtE5VOloiCyRuVwGu5jYe75J+hrCOB8F7Uc1y8i8Ylp6Z6fdIqqmrRbenzVDiqtvLNdYtkS8agxzJ0SqcM1lzouT0+YIVoXrP0E1nX4Zq4MizaleWzp7/bhIxpBkTBkTZlXG1o3pBkSnSZKGJEqSVNqNxb5E2yX0gmJJUyJsxzXUVTFk6d+ajmRdqXqGZFMRw7meVlo/ZI7i8D4WD+ap9a5bvibwY93e7+ittHfZA+8+V34y3/1VJpwY6oN6omfEf6rDf3S9GnthvqJto4xwYwfhCeXGiwA4ZLq5dhCEIBCEIMtr1UWbA3i9zjyDbea831gl/TGt/V08DSOtxfKfCRvctvr7NeeNg9mMntc63kvOdKVGKuqjwl6Mco2NYPyq/QjN1erOKrOVoews4jLqI2Kvpn280/DOmaoWfcbHZ9u/wDvrXraf6edqRnlPimThqFWMmXTUK2KsdoWsVQpLao8SqSOoUls672sl6tHQ1Rzz3K5irLtB6gspQz5O5K0o6r0eRI81n1NNOlaYnC4dVJp1YoD6hR3VCq9Nqi0riKruUmSszKr4J8iUy6oUbE7k6St6kwa3MKHJMmDKuoo7iWgqan0RyUA1RvuXZJbsHJVlTNZryNzXW54TZcRV3lsdHfYQdcTHHm8Yz4uKq8OPSLR+8jB/haD8wrmNgAY0ZANY0DgA0BVOrvp1xd+1M/5gfNeVM5nL2Y4btCEKEhCEIBCEIPPNYX9JpHDwfBH2XBPzK8sgqMUkr9uKSV3fI4hei1lZ+l1M5/0vpU3+zE8jxaF5ZQus0ch8ls6SMzMqNeeIheRTqTM/EzrGYVMyZTIalejHdjkCdBnUOd9nHvCb6ZaYZ7VWcc6ksnVMyZSWTK2IZr1aKhn9F3Yp9DU7RyKz9HP6J5qbTVFj4Li1c5ZsYsuZKhR3VChyVKZE9yFVtaKroz2ZzTXTqHUVGwcAmunXE1TCa+ZIEqiGVHSZLnDvK8ZNeMKEPSc1vvPjbzvI247roppfq0rRAxVNOOErX9jLuPgCqbcRMrNPm8R8tzLLYudwxO7rlV2pMd53HhGe8uCk1Tvq5DwY/5W80vUaL7Z/wBxvzP8l473WrQhCAQhCASZH2BJ3AnuCUq/T82GlqHcIpB2lpA+aDyHS1Xho66QnN0BZfrmla0+BcsHC/Ja3Wx+HR792Oopo+qzWvkI8Asaw5L1ugpmsz8sfU25iEkSJ+OdQcSW163bGbclVD7i/BRukXS9RypxhHdKbKpDJVXhyeY9XVlVaq4pZsu1Sm1FrKpp35J8yKzDJavKyfUrtPNdyrDMnqaW1yqph3jhYyVN3FdEyrGzJ0SqmU4TxKuulUISpXSKuRdUcvoHtU/VoXqmH3WTP7DGY/nIFS0MmR/vcr3VCO88r/chDP8AclaR/wAJWXXnFJW9NzrVhpdJPtDJ1hre9w/krbUyO0Dne9I7wACo9Lu+qA4vH4Wn+a02q7bUsXXiP4yvJe6tUIQgEIQgFRa6y2opR72Fne4X8Ar1RNJaLinZglBIviFnFtja18uaDyaOdzQWgjCcy1zWPaTxLXAi6Z+g0z8WOhpX5Xc5ofA+3HFG4fJbyq/w9jP2Ur29TgHKnqdSKply3o35HMGxtwzTNq+2cSWjMMfPqpQSep9LpnHYA6OojHxAO8VDd/h87Po6unPASNlgPabOC08uhalhziflyK76TfWY9vWWuA71pr1etX8v55Vzo0nwxVXqNXsBLYOmaPaheycdgacXgqGpp3xkiVj4iNoexzLd4XqrJRtBHMbU59OkGx7+V8Q7itFfqF/yiJ/pVPS18S8jaU40r0qshgkuZqSklJ2u6LoJT/5Ii0qnn1Yo3G7W1MHUyVsrRyDxfxWin1Cn5RMKrdLbxLMwHIJxzlfP1QZ/o1beps8L4vxxl48FBqtWqppyjZMNxikZLfk0HF3gLZXrNG3a3+Mdun1InsrcSeDrN5puppZYj9dFLF99jmjvIsh8oNrEbF3uieYlVNZjiS2uTocmWlOtVcoOtcnGlNNTjVVLlNon7exavUxotUP3l8UZ/hY93/0WPgNitnqi0dA8+9NJf+FrGrH1M/ZLR0dc6ufhY6Xd9mPvH5BbPQkWGnhH7DXfEMXmsXpPN0bf2fFzit/EzC1rRuAHcLLzHtFoQhAIQhAIQhALhC6hAxJCDtAPYocmjY/caN+XonvCsrJJYgztVq5C65tn15gfI+KrKnVNvsEjk7aeRBC2LokxKwAEkgAbScggwU2rUw3X7Ae8g+Sr5dDTN9jF1tIPhkVtKvTcLdl38sm958rqrn1jJ2NYObcZHacvBE5ZSSNzfXa5n3gW/NIsOpXFdWPfm15jcPaAbY9Tm2sQqt2lXg4Z4KeT9oNMTiOIcz+SGSoauRuTJJGjgHOw/DsXJaeGU3mp6aQna7omxPPN8WEntSPp9OTnHPF91zZR3OsfFS6c0zvUq4gfdla6E9+Y8UiZjtwicT3RXaqUL/YqIDxjmEjR/BIL/iUKp1F3wVbXcGzRPiPa9uJq08VE8+rhk643sk+RSjER6wLeYIV1dfUjyqtoac+GLfqjXtuWxxzAfqpopCeTb4vBV9RHNESJoJorbccbmgdpFl6I7ZfrGdrkC+ZUptR7LZHPFr2OwZ7LG4VsdXfyot0dJ7PMYa1p3r0DVgD6JCR7XSvPbK+3gAn59GU8l+kp6Z99pMQa/wCNliFJpoGtDWMaGMFmtYLkNbsAF8+9caut6kYTodP6VpnJWDFVRt4OhZ3WK3ixGi246trv3hd2DJbdZ2sIQhAIQhAIQhAIQhAIQkveACTsAJPIII+kNIMibieeQ3krG6Q0lLMc3YRuaMgEmurXTPL3b9g90bgmmtQRjR39pc/6ceI8VPaxOMiQVJ0a7q70zPotxFiCfJaNtMummQYybRHAkcwq+o0RJuDXdtvmt5LBxAPYoktE07rckHnj6Z8Zvhcw8RceIVpo7WeqZ6PTvcNwfaVvL0rrRy6P4WPUqup0Mw7WAHiPRKCVBrG8/aQwv62h0R8MlaU2kad/syxHf6sg8M1no6fDtu7rKkxyINPBQ4wXRPa8DI3BaU7Ho6XE30CcxmPStnvtsVTofSBjeDnbeOpbgYXDMAg57kETQmjQwl/Ox457VdXUdhTrSgcQuArqAQhCAQhCAQhCAUbSQvDKP3b/AMpUlcI3IPPWtTrWqZpDR5jkwbSQXR7frGjhxeBtHIqOwIFRsUqONIjYpEYQOsjXXRpTV0oIczEzHBe6lSrlIM3DqBQV0kQDi12zceCjVEBGThy4FW2k4Mg7hkeRUSGUEdHJmD6p4FBTy0oUKSnI2K7q6UsPEbj5KG9qCPSDMf3sW7oHWYwH3R8lnNC6IL3E2u1pGI7hvw9Z48LrUsgsgfY5SGJmNifa1AsJS4AuoBCEIBCEIBCEIBCEIGaukZKwskGIHsIO4gjMHrVBXaKljscLqloyxtwipaN2Jps2Xnkea0qEGSiwl2Fj2ud+rP1cw5xuse5SOjI9YFvMEK6r9FQzjDNEyQbrjNvW121p5KH/AJfwi0FRUwjc0vE7AOGGUO+aCK1DkP0ZXNvhlop+AfBJAe10bj8kjoK32qWjd9yqlb+aNA29cpzZ3YU4aeqP/Zxc/ppt/wAaR9BrPZpaRvW6pldb4WoHJSCCDvyVMYXG4AJtfYL+KuY9A1bj6c1NGOEcBkPxPd5KX/leNw+uknn4gydGw/wR4QgzjZS4dH9o73GDpZO4ZDmSFY6M1Xe4YpvqWn2AcUrhwc7Y3kL81pKOhjibgiYyNvBrQ0c+tPoGoaZrGhrGhoGwAWCUYwloQJDF2y6hAIQhAIQhAIQhAIQhAIQhAIQhAIQhAIQhAIQhAIQhAIQhAIQhAIQhAIQhAIQhB//Z">
+            <a:extLst>
+              <a:ext uri="{FF2B5EF4-FFF2-40B4-BE49-F238E27FC236}">
+                <a16:creationId xmlns:a16="http://schemas.microsoft.com/office/drawing/2014/main" xmlns="" id="{15B92B98-B7C8-4A75-A841-F25CD0136DE7}"/>
+              </a:ext>
+            </a:extLst>
+          </p:cNvPr>
+          <p:cNvSpPr>
+            <a:spLocks noChangeAspect="1" noChangeArrowheads="1"/>
+          </p:cNvSpPr>
+          <p:nvPr/>
+        </p:nvSpPr>
+        <p:spPr bwMode="auto">
+          <a:xfrm>
+            <a:off x="155575" y="-144463"/>
+            <a:ext cx="304800" cy="304801"/>
+          </a:xfrm>
+          <a:prstGeom prst="rect">
+            <a:avLst/>
+          </a:prstGeom>
+          <a:noFill/>
+        </p:spPr>
+        <p:txBody>
+          <a:bodyPr vert="horz" wrap="square" lIns="91440" tIns="45720" rIns="91440" bIns="45720" numCol="1" anchor="t" anchorCtr="0" compatLnSpc="1">
+            <a:prstTxWarp prst="textNoShape">
+              <a:avLst/>
+            </a:prstTxWarp>
+          </a:bodyPr>
+          <a:lstStyle/>
+          <a:p>
+            <a:endParaRPr lang="zh-TW" altLang="en-US">
+              <a:latin typeface="Consolas" panose="020B0609020204030204" pitchFamily="49" charset="0"/>
+              <a:cs typeface="Consolas" panose="020B0609020204030204" pitchFamily="49" charset="0"/>
+            </a:endParaRPr>
+          </a:p>
+        </p:txBody>
+      </p:sp>
+      <p:grpSp>
+        <p:nvGrpSpPr>
+          <p:cNvPr id="17" name="群組 16">
+            <a:extLst>
+              <a:ext uri="{FF2B5EF4-FFF2-40B4-BE49-F238E27FC236}">
+                <a16:creationId xmlns:a16="http://schemas.microsoft.com/office/drawing/2014/main" xmlns="" id="{3E62AE25-4106-44ED-8F4E-D5D956A394D2}"/>
+              </a:ext>
+            </a:extLst>
+          </p:cNvPr>
+          <p:cNvGrpSpPr/>
+          <p:nvPr/>
+        </p:nvGrpSpPr>
+        <p:grpSpPr>
+          <a:xfrm>
+            <a:off x="1483395" y="3167145"/>
+            <a:ext cx="2936123" cy="613246"/>
+            <a:chOff x="1027702" y="2502131"/>
+            <a:chExt cx="2309308" cy="492060"/>
+          </a:xfrm>
+        </p:grpSpPr>
+        <p:pic>
+          <p:nvPicPr>
+            <p:cNvPr id="18" name="圖片 17">
+              <a:extLst>
+                <a:ext uri="{FF2B5EF4-FFF2-40B4-BE49-F238E27FC236}">
+                  <a16:creationId xmlns:a16="http://schemas.microsoft.com/office/drawing/2014/main" xmlns="" id="{DF00FD23-F9E0-40CA-BFAD-2BC20441329D}"/>
+                </a:ext>
+              </a:extLst>
+            </p:cNvPr>
+            <p:cNvPicPr>
+              <a:picLocks noChangeAspect="1"/>
+            </p:cNvPicPr>
+            <p:nvPr/>
+          </p:nvPicPr>
+          <p:blipFill>
+            <a:blip r:embed="rId2" cstate="print">
+              <a:extLst>
+                <a:ext uri="{28A0092B-C50C-407E-A947-70E740481C1C}">
+                  <a14:useLocalDpi xmlns:a14="http://schemas.microsoft.com/office/drawing/2010/main" val="0"/>
+                </a:ext>
+              </a:extLst>
+            </a:blip>
+            <a:stretch>
+              <a:fillRect/>
+            </a:stretch>
+          </p:blipFill>
+          <p:spPr>
+            <a:xfrm>
+              <a:off x="1027702" y="2502131"/>
+              <a:ext cx="348313" cy="492060"/>
+            </a:xfrm>
+            <a:prstGeom prst="rect">
+              <a:avLst/>
+            </a:prstGeom>
+          </p:spPr>
+        </p:pic>
+        <p:sp>
+          <p:nvSpPr>
+            <p:cNvPr id="19" name="文字方塊 18">
+              <a:extLst>
+                <a:ext uri="{FF2B5EF4-FFF2-40B4-BE49-F238E27FC236}">
+                  <a16:creationId xmlns:a16="http://schemas.microsoft.com/office/drawing/2014/main" xmlns="" id="{14F08A50-B905-4E9F-B65E-EEFCE05DA4E3}"/>
+                </a:ext>
+              </a:extLst>
+            </p:cNvPr>
+            <p:cNvSpPr txBox="1"/>
+            <p:nvPr/>
+          </p:nvSpPr>
+          <p:spPr>
+            <a:xfrm>
+              <a:off x="1338410" y="2618369"/>
+              <a:ext cx="1998600" cy="271651"/>
+            </a:xfrm>
+            <a:prstGeom prst="rect">
+              <a:avLst/>
+            </a:prstGeom>
+            <a:noFill/>
+          </p:spPr>
+          <p:txBody>
+            <a:bodyPr wrap="none" rtlCol="0">
+              <a:spAutoFit/>
+            </a:bodyPr>
+            <a:lstStyle/>
+            <a:p>
+              <a:r>
+                <a:rPr lang="en-US" altLang="zh-TW" sz="1600" b="1" dirty="0">
+                  <a:solidFill>
+                    <a:schemeClr val="tx2">
+                      <a:lumMod val="75000"/>
+                    </a:schemeClr>
+                  </a:solidFill>
+                  <a:latin typeface="Consolas" panose="020B0609020204030204" pitchFamily="49" charset="0"/>
+                  <a:ea typeface="微軟正黑體" panose="020B0604030504040204" pitchFamily="34" charset="-120"/>
+                  <a:cs typeface="Consolas" panose="020B0609020204030204" pitchFamily="49" charset="0"/>
+                </a:rPr>
+                <a:t> ASP.NET Core Web API</a:t>
+              </a:r>
+              <a:endParaRPr lang="zh-TW" altLang="en-US" sz="1600" b="1" dirty="0">
+                <a:solidFill>
+                  <a:schemeClr val="tx2">
+                    <a:lumMod val="75000"/>
+                  </a:schemeClr>
+                </a:solidFill>
+                <a:latin typeface="Consolas" panose="020B0609020204030204" pitchFamily="49" charset="0"/>
+                <a:ea typeface="微軟正黑體" panose="020B0604030504040204" pitchFamily="34" charset="-120"/>
+                <a:cs typeface="Consolas" panose="020B0609020204030204" pitchFamily="49" charset="0"/>
+              </a:endParaRPr>
+            </a:p>
+          </p:txBody>
+        </p:sp>
+      </p:grpSp>
+      <p:sp>
+        <p:nvSpPr>
+          <p:cNvPr id="35" name="矩形 34">
+            <a:extLst>
+              <a:ext uri="{FF2B5EF4-FFF2-40B4-BE49-F238E27FC236}">
+                <a16:creationId xmlns:a16="http://schemas.microsoft.com/office/drawing/2014/main" xmlns="" id="{A3837EC7-3FF7-497F-B8B9-5A0B2AE1FAD0}"/>
+              </a:ext>
+            </a:extLst>
+          </p:cNvPr>
+          <p:cNvSpPr/>
+          <p:nvPr/>
+        </p:nvSpPr>
+        <p:spPr>
+          <a:xfrm>
+            <a:off x="1939082" y="2602804"/>
+            <a:ext cx="1957587" cy="369332"/>
+          </a:xfrm>
+          <a:prstGeom prst="rect">
+            <a:avLst/>
+          </a:prstGeom>
+          <a:noFill/>
+        </p:spPr>
+        <p:txBody>
+          <a:bodyPr wrap="none">
+            <a:spAutoFit/>
+          </a:bodyPr>
+          <a:lstStyle/>
+          <a:p>
+            <a:pPr algn="ctr"/>
+            <a:r>
+              <a:rPr lang="en-US" altLang="zh-TW" b="1" dirty="0">
+                <a:latin typeface="Consolas" panose="020B0609020204030204" pitchFamily="49" charset="0"/>
+                <a:cs typeface="Consolas" panose="020B0609020204030204" pitchFamily="49" charset="0"/>
+              </a:rPr>
+              <a:t>Backend Server</a:t>
+            </a:r>
+          </a:p>
+        </p:txBody>
+      </p:sp>
+      <p:sp>
+        <p:nvSpPr>
+          <p:cNvPr id="38" name="圓角矩形 6">
+            <a:extLst>
+              <a:ext uri="{FF2B5EF4-FFF2-40B4-BE49-F238E27FC236}">
+                <a16:creationId xmlns:a16="http://schemas.microsoft.com/office/drawing/2014/main" xmlns="" id="{AA3F0518-490B-4DDF-BB4F-AE947406C799}"/>
+              </a:ext>
+            </a:extLst>
+          </p:cNvPr>
+          <p:cNvSpPr/>
+          <p:nvPr/>
+        </p:nvSpPr>
+        <p:spPr>
+          <a:xfrm>
+            <a:off x="5058761" y="2402737"/>
+            <a:ext cx="3055627" cy="2142064"/>
+          </a:xfrm>
+          <a:prstGeom prst="roundRect">
+            <a:avLst/>
+          </a:prstGeom>
+          <a:ln w="12700">
+            <a:solidFill>
+              <a:schemeClr val="accent5">
+                <a:lumMod val="50000"/>
+              </a:schemeClr>
+            </a:solidFill>
+            <a:prstDash val="sysDash"/>
+          </a:ln>
+        </p:spPr>
+        <p:style>
+          <a:lnRef idx="2">
+            <a:schemeClr val="accent1"/>
+          </a:lnRef>
+          <a:fillRef idx="1">
+            <a:schemeClr val="lt1"/>
+          </a:fillRef>
+          <a:effectRef idx="0">
+            <a:schemeClr val="accent1"/>
+          </a:effectRef>
+          <a:fontRef idx="minor">
+            <a:schemeClr val="dk1"/>
+          </a:fontRef>
+        </p:style>
+        <p:txBody>
+          <a:bodyPr rtlCol="0" anchor="ctr"/>
+          <a:lstStyle/>
+          <a:p>
+            <a:pPr algn="ctr"/>
+            <a:endParaRPr lang="zh-TW" altLang="en-US">
+              <a:latin typeface="Consolas" panose="020B0609020204030204" pitchFamily="49" charset="0"/>
+              <a:cs typeface="Consolas" panose="020B0609020204030204" pitchFamily="49" charset="0"/>
+            </a:endParaRPr>
+          </a:p>
+        </p:txBody>
+      </p:sp>
+      <p:sp>
+        <p:nvSpPr>
+          <p:cNvPr id="37" name="矩形 36">
+            <a:extLst>
+              <a:ext uri="{FF2B5EF4-FFF2-40B4-BE49-F238E27FC236}">
+                <a16:creationId xmlns:a16="http://schemas.microsoft.com/office/drawing/2014/main" xmlns="" id="{79B0EFC5-385A-4CBF-8F26-44920131D317}"/>
+              </a:ext>
+            </a:extLst>
+          </p:cNvPr>
+          <p:cNvSpPr/>
+          <p:nvPr/>
+        </p:nvSpPr>
+        <p:spPr>
+          <a:xfrm>
+            <a:off x="1447760" y="3153033"/>
+            <a:ext cx="2944435" cy="613245"/>
+          </a:xfrm>
+          <a:prstGeom prst="rect">
+            <a:avLst/>
+          </a:prstGeom>
+          <a:noFill/>
+          <a:ln>
+            <a:prstDash val="dash"/>
+          </a:ln>
+        </p:spPr>
+        <p:style>
+          <a:lnRef idx="2">
+            <a:schemeClr val="accent1">
+              <a:shade val="50000"/>
+            </a:schemeClr>
+          </a:lnRef>
+          <a:fillRef idx="1">
+            <a:schemeClr val="accent1"/>
+          </a:fillRef>
+          <a:effectRef idx="0">
+            <a:schemeClr val="accent1"/>
+          </a:effectRef>
+          <a:fontRef idx="minor">
+            <a:schemeClr val="lt1"/>
+          </a:fontRef>
+        </p:style>
+        <p:txBody>
+          <a:bodyPr rtlCol="0" anchor="ctr"/>
+          <a:lstStyle/>
+          <a:p>
+            <a:pPr algn="ctr"/>
+            <a:endParaRPr lang="zh-TW" altLang="en-US">
+              <a:latin typeface="Consolas" panose="020B0609020204030204" pitchFamily="49" charset="0"/>
+              <a:cs typeface="Consolas" panose="020B0609020204030204" pitchFamily="49" charset="0"/>
+            </a:endParaRPr>
+          </a:p>
+        </p:txBody>
+      </p:sp>
+      <p:sp>
+        <p:nvSpPr>
+          <p:cNvPr id="48" name="文字方塊 47">
+            <a:extLst>
+              <a:ext uri="{FF2B5EF4-FFF2-40B4-BE49-F238E27FC236}">
+                <a16:creationId xmlns:a16="http://schemas.microsoft.com/office/drawing/2014/main" xmlns="" id="{0DF6CDA6-2149-48ED-A2DB-F56C93DC8F7D}"/>
+              </a:ext>
+            </a:extLst>
+          </p:cNvPr>
+          <p:cNvSpPr txBox="1"/>
+          <p:nvPr/>
+        </p:nvSpPr>
+        <p:spPr>
+          <a:xfrm>
+            <a:off x="5771244" y="3288806"/>
+            <a:ext cx="2204450" cy="338554"/>
+          </a:xfrm>
+          <a:prstGeom prst="rect">
+            <a:avLst/>
+          </a:prstGeom>
+          <a:noFill/>
+        </p:spPr>
+        <p:txBody>
+          <a:bodyPr wrap="none" rtlCol="0">
+            <a:spAutoFit/>
+          </a:bodyPr>
+          <a:lstStyle/>
+          <a:p>
+            <a:r>
+              <a:rPr lang="en-US" altLang="zh-TW" sz="1600" b="1" dirty="0">
+                <a:solidFill>
+                  <a:schemeClr val="tx2">
+                    <a:lumMod val="75000"/>
+                  </a:schemeClr>
+                </a:solidFill>
+                <a:latin typeface="Consolas" panose="020B0609020204030204" pitchFamily="49" charset="0"/>
+                <a:ea typeface="微軟正黑體" panose="020B0604030504040204" pitchFamily="34" charset="-120"/>
+                <a:cs typeface="Consolas" panose="020B0609020204030204" pitchFamily="49" charset="0"/>
+              </a:rPr>
+              <a:t> Identity Server 4</a:t>
+            </a:r>
+            <a:endParaRPr lang="zh-TW" altLang="en-US" sz="1600" b="1" dirty="0">
+              <a:solidFill>
+                <a:schemeClr val="tx2">
+                  <a:lumMod val="75000"/>
+                </a:schemeClr>
+              </a:solidFill>
+              <a:latin typeface="Consolas" panose="020B0609020204030204" pitchFamily="49" charset="0"/>
+              <a:ea typeface="微軟正黑體" panose="020B0604030504040204" pitchFamily="34" charset="-120"/>
+              <a:cs typeface="Consolas" panose="020B0609020204030204" pitchFamily="49" charset="0"/>
+            </a:endParaRPr>
+          </a:p>
+        </p:txBody>
+      </p:sp>
+      <p:sp>
+        <p:nvSpPr>
+          <p:cNvPr id="49" name="矩形 48">
+            <a:extLst>
+              <a:ext uri="{FF2B5EF4-FFF2-40B4-BE49-F238E27FC236}">
+                <a16:creationId xmlns:a16="http://schemas.microsoft.com/office/drawing/2014/main" xmlns="" id="{7C6A78A2-117B-4511-A337-A22A0D832DD5}"/>
+              </a:ext>
+            </a:extLst>
+          </p:cNvPr>
+          <p:cNvSpPr/>
+          <p:nvPr/>
+        </p:nvSpPr>
+        <p:spPr>
+          <a:xfrm>
+            <a:off x="5251107" y="3151461"/>
+            <a:ext cx="2724587" cy="613245"/>
+          </a:xfrm>
+          <a:prstGeom prst="rect">
+            <a:avLst/>
+          </a:prstGeom>
+          <a:noFill/>
+          <a:ln>
+            <a:prstDash val="dash"/>
+          </a:ln>
+        </p:spPr>
+        <p:style>
+          <a:lnRef idx="2">
+            <a:schemeClr val="accent1">
+              <a:shade val="50000"/>
+            </a:schemeClr>
+          </a:lnRef>
+          <a:fillRef idx="1">
+            <a:schemeClr val="accent1"/>
+          </a:fillRef>
+          <a:effectRef idx="0">
+            <a:schemeClr val="accent1"/>
+          </a:effectRef>
+          <a:fontRef idx="minor">
+            <a:schemeClr val="lt1"/>
+          </a:fontRef>
+        </p:style>
+        <p:txBody>
+          <a:bodyPr rtlCol="0" anchor="ctr"/>
+          <a:lstStyle/>
+          <a:p>
+            <a:pPr algn="ctr"/>
+            <a:endParaRPr lang="zh-TW" altLang="en-US">
+              <a:latin typeface="Consolas" panose="020B0609020204030204" pitchFamily="49" charset="0"/>
+              <a:cs typeface="Consolas" panose="020B0609020204030204" pitchFamily="49" charset="0"/>
+            </a:endParaRPr>
+          </a:p>
+        </p:txBody>
+      </p:sp>
+      <p:pic>
+        <p:nvPicPr>
+          <p:cNvPr id="51" name="圖片 50">
+            <a:extLst>
+              <a:ext uri="{FF2B5EF4-FFF2-40B4-BE49-F238E27FC236}">
+                <a16:creationId xmlns:a16="http://schemas.microsoft.com/office/drawing/2014/main" xmlns="" id="{360008C4-4A7C-4F98-BDE4-D845F6D06F74}"/>
+              </a:ext>
+            </a:extLst>
+          </p:cNvPr>
+          <p:cNvPicPr>
+            <a:picLocks noChangeAspect="1"/>
+          </p:cNvPicPr>
+          <p:nvPr/>
+        </p:nvPicPr>
+        <p:blipFill>
+          <a:blip r:embed="rId3" cstate="print">
+            <a:extLst>
+              <a:ext uri="{28A0092B-C50C-407E-A947-70E740481C1C}">
+                <a14:useLocalDpi xmlns:a14="http://schemas.microsoft.com/office/drawing/2010/main" val="0"/>
+              </a:ext>
+            </a:extLst>
+          </a:blip>
+          <a:stretch>
+            <a:fillRect/>
+          </a:stretch>
+        </p:blipFill>
+        <p:spPr>
+          <a:xfrm>
+            <a:off x="5444573" y="3235630"/>
+            <a:ext cx="408171" cy="444906"/>
+          </a:xfrm>
+          <a:prstGeom prst="rect">
+            <a:avLst/>
+          </a:prstGeom>
+        </p:spPr>
+      </p:pic>
+      <p:sp>
+        <p:nvSpPr>
+          <p:cNvPr id="52" name="矩形 51">
+            <a:extLst>
+              <a:ext uri="{FF2B5EF4-FFF2-40B4-BE49-F238E27FC236}">
+                <a16:creationId xmlns:a16="http://schemas.microsoft.com/office/drawing/2014/main" xmlns="" id="{849940C1-270B-4DDA-82FD-843CAA8ED7ED}"/>
+              </a:ext>
+            </a:extLst>
+          </p:cNvPr>
+          <p:cNvSpPr/>
+          <p:nvPr/>
+        </p:nvSpPr>
+        <p:spPr>
+          <a:xfrm>
+            <a:off x="5806127" y="2602804"/>
+            <a:ext cx="1577676" cy="369332"/>
+          </a:xfrm>
+          <a:prstGeom prst="rect">
+            <a:avLst/>
+          </a:prstGeom>
+          <a:noFill/>
+        </p:spPr>
+        <p:txBody>
+          <a:bodyPr wrap="none">
+            <a:spAutoFit/>
+          </a:bodyPr>
+          <a:lstStyle/>
+          <a:p>
+            <a:pPr algn="ctr"/>
+            <a:r>
+              <a:rPr lang="en-US" altLang="zh-TW" b="1" dirty="0" err="1" smtClean="0">
+                <a:latin typeface="Consolas" panose="020B0609020204030204" pitchFamily="49" charset="0"/>
+                <a:cs typeface="Consolas" panose="020B0609020204030204" pitchFamily="49" charset="0"/>
+              </a:rPr>
+              <a:t>Auth</a:t>
+            </a:r>
+            <a:r>
+              <a:rPr lang="en-US" altLang="zh-TW" b="1" dirty="0" smtClean="0">
+                <a:latin typeface="Consolas" panose="020B0609020204030204" pitchFamily="49" charset="0"/>
+                <a:cs typeface="Consolas" panose="020B0609020204030204" pitchFamily="49" charset="0"/>
+              </a:rPr>
+              <a:t> </a:t>
+            </a:r>
+            <a:r>
+              <a:rPr lang="en-US" altLang="zh-TW" b="1" dirty="0">
+                <a:latin typeface="Consolas" panose="020B0609020204030204" pitchFamily="49" charset="0"/>
+                <a:cs typeface="Consolas" panose="020B0609020204030204" pitchFamily="49" charset="0"/>
+              </a:rPr>
+              <a:t>Server</a:t>
+            </a:r>
+          </a:p>
+        </p:txBody>
+      </p:sp>
+      <p:cxnSp>
+        <p:nvCxnSpPr>
+          <p:cNvPr id="55" name="直線單箭頭接點 54">
+            <a:extLst>
+              <a:ext uri="{FF2B5EF4-FFF2-40B4-BE49-F238E27FC236}">
+                <a16:creationId xmlns:a16="http://schemas.microsoft.com/office/drawing/2014/main" xmlns="" id="{A8AC5B70-F649-4DB5-AE32-A6F5581DFE4C}"/>
+              </a:ext>
+            </a:extLst>
+          </p:cNvPr>
+          <p:cNvCxnSpPr>
+            <a:cxnSpLocks/>
+            <a:stCxn id="4" idx="3"/>
+            <a:endCxn id="38" idx="1"/>
+          </p:cNvCxnSpPr>
+          <p:nvPr/>
+        </p:nvCxnSpPr>
+        <p:spPr>
+          <a:xfrm>
+            <a:off x="4613979" y="3473769"/>
+            <a:ext cx="444782" cy="0"/>
+          </a:xfrm>
+          <a:prstGeom prst="straightConnector1">
+            <a:avLst/>
+          </a:prstGeom>
+          <a:ln w="25400">
+            <a:tailEnd type="arrow"/>
+          </a:ln>
+        </p:spPr>
+        <p:style>
+          <a:lnRef idx="1">
+            <a:schemeClr val="accent1"/>
+          </a:lnRef>
+          <a:fillRef idx="0">
+            <a:schemeClr val="accent1"/>
+          </a:fillRef>
+          <a:effectRef idx="0">
+            <a:schemeClr val="accent1"/>
+          </a:effectRef>
+          <a:fontRef idx="minor">
+            <a:schemeClr val="tx1"/>
+          </a:fontRef>
+        </p:style>
+      </p:cxnSp>
+      <p:sp>
+        <p:nvSpPr>
+          <p:cNvPr id="58" name="圓角矩形 6">
+            <a:extLst>
+              <a:ext uri="{FF2B5EF4-FFF2-40B4-BE49-F238E27FC236}">
+                <a16:creationId xmlns:a16="http://schemas.microsoft.com/office/drawing/2014/main" xmlns="" id="{E0994BA9-38F8-40E8-8EAA-1E120C08B215}"/>
+              </a:ext>
+            </a:extLst>
+          </p:cNvPr>
+          <p:cNvSpPr/>
+          <p:nvPr/>
+        </p:nvSpPr>
+        <p:spPr>
+          <a:xfrm>
+            <a:off x="8620887" y="2402737"/>
+            <a:ext cx="3055627" cy="2142064"/>
+          </a:xfrm>
+          <a:prstGeom prst="roundRect">
+            <a:avLst/>
+          </a:prstGeom>
+          <a:ln>
+            <a:prstDash val="sysDash"/>
+          </a:ln>
+        </p:spPr>
+        <p:style>
+          <a:lnRef idx="2">
+            <a:schemeClr val="accent1"/>
+          </a:lnRef>
+          <a:fillRef idx="1">
+            <a:schemeClr val="lt1"/>
+          </a:fillRef>
+          <a:effectRef idx="0">
+            <a:schemeClr val="accent1"/>
+          </a:effectRef>
+          <a:fontRef idx="minor">
+            <a:schemeClr val="dk1"/>
+          </a:fontRef>
+        </p:style>
+        <p:txBody>
+          <a:bodyPr rtlCol="0" anchor="ctr"/>
+          <a:lstStyle/>
+          <a:p>
+            <a:pPr algn="ctr"/>
+            <a:endParaRPr lang="zh-TW" altLang="en-US" dirty="0">
+              <a:latin typeface="Consolas" panose="020B0609020204030204" pitchFamily="49" charset="0"/>
+              <a:cs typeface="Consolas" panose="020B0609020204030204" pitchFamily="49" charset="0"/>
+            </a:endParaRPr>
+          </a:p>
+        </p:txBody>
+      </p:sp>
+      <p:grpSp>
+        <p:nvGrpSpPr>
+          <p:cNvPr id="5" name="群組 4"/>
+          <p:cNvGrpSpPr/>
+          <p:nvPr/>
+        </p:nvGrpSpPr>
+        <p:grpSpPr>
+          <a:xfrm>
+            <a:off x="8786407" y="3158268"/>
+            <a:ext cx="2805903" cy="613245"/>
+            <a:chOff x="8194302" y="2551167"/>
+            <a:chExt cx="2805903" cy="613245"/>
+          </a:xfrm>
+        </p:grpSpPr>
+        <p:sp>
+          <p:nvSpPr>
+            <p:cNvPr id="59" name="文字方塊 58">
+              <a:extLst>
+                <a:ext uri="{FF2B5EF4-FFF2-40B4-BE49-F238E27FC236}">
+                  <a16:creationId xmlns:a16="http://schemas.microsoft.com/office/drawing/2014/main" xmlns="" id="{CA8B39F2-1093-4652-9183-59D4A1FA31AE}"/>
+                </a:ext>
+              </a:extLst>
+            </p:cNvPr>
+            <p:cNvSpPr txBox="1"/>
+            <p:nvPr/>
+          </p:nvSpPr>
+          <p:spPr>
+            <a:xfrm>
+              <a:off x="8795755" y="2672827"/>
+              <a:ext cx="2204450" cy="338554"/>
+            </a:xfrm>
+            <a:prstGeom prst="rect">
+              <a:avLst/>
+            </a:prstGeom>
+            <a:noFill/>
+          </p:spPr>
+          <p:txBody>
+            <a:bodyPr wrap="none" rtlCol="0">
+              <a:spAutoFit/>
+            </a:bodyPr>
+            <a:lstStyle/>
+            <a:p>
+              <a:r>
+                <a:rPr lang="en-US" altLang="zh-TW" sz="1600" b="1" dirty="0">
+                  <a:solidFill>
+                    <a:schemeClr val="tx2">
+                      <a:lumMod val="75000"/>
+                    </a:schemeClr>
+                  </a:solidFill>
+                  <a:latin typeface="Consolas" panose="020B0609020204030204" pitchFamily="49" charset="0"/>
+                  <a:ea typeface="微軟正黑體" panose="020B0604030504040204" pitchFamily="34" charset="-120"/>
+                  <a:cs typeface="Consolas" panose="020B0609020204030204" pitchFamily="49" charset="0"/>
+                </a:rPr>
+                <a:t>OpenLDAP container</a:t>
+              </a:r>
+              <a:endParaRPr lang="zh-TW" altLang="en-US" sz="1600" b="1" dirty="0">
+                <a:solidFill>
+                  <a:schemeClr val="tx2">
+                    <a:lumMod val="75000"/>
+                  </a:schemeClr>
+                </a:solidFill>
+                <a:latin typeface="Consolas" panose="020B0609020204030204" pitchFamily="49" charset="0"/>
+                <a:ea typeface="微軟正黑體" panose="020B0604030504040204" pitchFamily="34" charset="-120"/>
+                <a:cs typeface="Consolas" panose="020B0609020204030204" pitchFamily="49" charset="0"/>
+              </a:endParaRPr>
+            </a:p>
+          </p:txBody>
+        </p:sp>
+        <p:sp>
+          <p:nvSpPr>
+            <p:cNvPr id="60" name="矩形 59">
+              <a:extLst>
+                <a:ext uri="{FF2B5EF4-FFF2-40B4-BE49-F238E27FC236}">
+                  <a16:creationId xmlns:a16="http://schemas.microsoft.com/office/drawing/2014/main" xmlns="" id="{3B93D6B4-AAC0-4BDA-8620-5B2577AB6EAB}"/>
+                </a:ext>
+              </a:extLst>
+            </p:cNvPr>
+            <p:cNvSpPr/>
+            <p:nvPr/>
+          </p:nvSpPr>
+          <p:spPr>
+            <a:xfrm>
+              <a:off x="8194302" y="2551167"/>
+              <a:ext cx="2724587" cy="613245"/>
+            </a:xfrm>
+            <a:prstGeom prst="rect">
+              <a:avLst/>
+            </a:prstGeom>
+            <a:noFill/>
+            <a:ln>
+              <a:prstDash val="dash"/>
+            </a:ln>
+          </p:spPr>
+          <p:style>
+            <a:lnRef idx="2">
+              <a:schemeClr val="accent1">
+                <a:shade val="50000"/>
+              </a:schemeClr>
+            </a:lnRef>
+            <a:fillRef idx="1">
+              <a:schemeClr val="accent1"/>
+            </a:fillRef>
+            <a:effectRef idx="0">
+              <a:schemeClr val="accent1"/>
+            </a:effectRef>
+            <a:fontRef idx="minor">
+              <a:schemeClr val="lt1"/>
+            </a:fontRef>
+          </p:style>
+          <p:txBody>
+            <a:bodyPr rtlCol="0" anchor="ctr"/>
+            <a:lstStyle/>
+            <a:p>
+              <a:pPr algn="ctr"/>
+              <a:endParaRPr lang="zh-TW" altLang="en-US">
+                <a:latin typeface="Consolas" panose="020B0609020204030204" pitchFamily="49" charset="0"/>
+                <a:cs typeface="Consolas" panose="020B0609020204030204" pitchFamily="49" charset="0"/>
+              </a:endParaRPr>
+            </a:p>
+          </p:txBody>
+        </p:sp>
+        <p:pic>
+          <p:nvPicPr>
+            <p:cNvPr id="61" name="圖片 60">
+              <a:extLst>
+                <a:ext uri="{FF2B5EF4-FFF2-40B4-BE49-F238E27FC236}">
+                  <a16:creationId xmlns:a16="http://schemas.microsoft.com/office/drawing/2014/main" xmlns="" id="{BE73BB19-43C0-469E-8622-D3B22AE9CFCC}"/>
+                </a:ext>
+              </a:extLst>
+            </p:cNvPr>
+            <p:cNvPicPr>
+              <a:picLocks noChangeAspect="1"/>
+            </p:cNvPicPr>
+            <p:nvPr/>
+          </p:nvPicPr>
+          <p:blipFill>
+            <a:blip r:embed="rId2" cstate="print">
+              <a:extLst>
+                <a:ext uri="{28A0092B-C50C-407E-A947-70E740481C1C}">
+                  <a14:useLocalDpi xmlns:a14="http://schemas.microsoft.com/office/drawing/2010/main" val="0"/>
+                </a:ext>
+              </a:extLst>
+            </a:blip>
+            <a:stretch>
+              <a:fillRect/>
+            </a:stretch>
+          </p:blipFill>
+          <p:spPr>
+            <a:xfrm>
+              <a:off x="8283881" y="2612725"/>
+              <a:ext cx="422295" cy="501739"/>
+            </a:xfrm>
+            <a:prstGeom prst="rect">
+              <a:avLst/>
+            </a:prstGeom>
+          </p:spPr>
+        </p:pic>
+      </p:grpSp>
+      <p:pic>
+        <p:nvPicPr>
+          <p:cNvPr id="2" name="圖片 1">
+            <a:extLst>
+              <a:ext uri="{FF2B5EF4-FFF2-40B4-BE49-F238E27FC236}">
+                <a16:creationId xmlns:a16="http://schemas.microsoft.com/office/drawing/2014/main" xmlns="" id="{9719C86B-CFC1-4A17-B6CA-1F6C48A30850}"/>
+              </a:ext>
+            </a:extLst>
+          </p:cNvPr>
+          <p:cNvPicPr>
+            <a:picLocks noChangeAspect="1"/>
+          </p:cNvPicPr>
+          <p:nvPr/>
+        </p:nvPicPr>
+        <p:blipFill>
+          <a:blip r:embed="rId4"/>
+          <a:stretch>
+            <a:fillRect/>
+          </a:stretch>
+        </p:blipFill>
+        <p:spPr>
+          <a:xfrm>
+            <a:off x="5612473" y="123973"/>
+            <a:ext cx="1948202" cy="507439"/>
+          </a:xfrm>
+          <a:prstGeom prst="rect">
+            <a:avLst/>
+          </a:prstGeom>
+        </p:spPr>
+      </p:pic>
+      <p:cxnSp>
+        <p:nvCxnSpPr>
+          <p:cNvPr id="54" name="直線單箭頭接點 53">
+            <a:extLst>
+              <a:ext uri="{FF2B5EF4-FFF2-40B4-BE49-F238E27FC236}">
+                <a16:creationId xmlns:a16="http://schemas.microsoft.com/office/drawing/2014/main" xmlns="" id="{9CD041CD-9441-4679-8E66-FF8013D04890}"/>
+              </a:ext>
+            </a:extLst>
+          </p:cNvPr>
+          <p:cNvCxnSpPr>
+            <a:cxnSpLocks/>
+            <a:stCxn id="38" idx="3"/>
+            <a:endCxn id="58" idx="1"/>
+          </p:cNvCxnSpPr>
+          <p:nvPr/>
+        </p:nvCxnSpPr>
+        <p:spPr>
+          <a:xfrm>
+            <a:off x="8114388" y="3473769"/>
+            <a:ext cx="506499" cy="0"/>
+          </a:xfrm>
+          <a:prstGeom prst="straightConnector1">
+            <a:avLst/>
+          </a:prstGeom>
+          <a:ln w="25400">
+            <a:tailEnd type="arrow"/>
+          </a:ln>
+        </p:spPr>
+        <p:style>
+          <a:lnRef idx="1">
+            <a:schemeClr val="accent1"/>
+          </a:lnRef>
+          <a:fillRef idx="0">
+            <a:schemeClr val="accent1"/>
+          </a:fillRef>
+          <a:effectRef idx="0">
+            <a:schemeClr val="accent1"/>
+          </a:effectRef>
+          <a:fontRef idx="minor">
+            <a:schemeClr val="tx1"/>
+          </a:fontRef>
+        </p:style>
+      </p:cxnSp>
+      <p:sp>
+        <p:nvSpPr>
+          <p:cNvPr id="22" name="圓角矩形 6">
+            <a:extLst>
+              <a:ext uri="{FF2B5EF4-FFF2-40B4-BE49-F238E27FC236}">
+                <a16:creationId xmlns:a16="http://schemas.microsoft.com/office/drawing/2014/main" xmlns="" id="{9292555D-6383-47AB-94C4-8C24D05C629F}"/>
+              </a:ext>
+            </a:extLst>
+          </p:cNvPr>
+          <p:cNvSpPr/>
+          <p:nvPr/>
+        </p:nvSpPr>
+        <p:spPr>
+          <a:xfrm>
+            <a:off x="5058761" y="5039651"/>
+            <a:ext cx="3055627" cy="1263348"/>
+          </a:xfrm>
+          <a:prstGeom prst="roundRect">
+            <a:avLst/>
+          </a:prstGeom>
+          <a:ln w="25400">
+            <a:solidFill>
+              <a:schemeClr val="accent1"/>
+            </a:solidFill>
+            <a:prstDash val="sysDash"/>
+          </a:ln>
+        </p:spPr>
+        <p:style>
+          <a:lnRef idx="2">
+            <a:schemeClr val="accent1"/>
+          </a:lnRef>
+          <a:fillRef idx="1">
+            <a:schemeClr val="lt1"/>
+          </a:fillRef>
+          <a:effectRef idx="0">
+            <a:schemeClr val="accent1"/>
+          </a:effectRef>
+          <a:fontRef idx="minor">
+            <a:schemeClr val="dk1"/>
+          </a:fontRef>
+        </p:style>
+        <p:txBody>
+          <a:bodyPr rtlCol="0" anchor="ctr"/>
+          <a:lstStyle/>
+          <a:p>
+            <a:pPr algn="ctr"/>
+            <a:endParaRPr lang="zh-TW" altLang="en-US">
+              <a:latin typeface="Consolas" panose="020B0609020204030204" pitchFamily="49" charset="0"/>
+              <a:cs typeface="Consolas" panose="020B0609020204030204" pitchFamily="49" charset="0"/>
+            </a:endParaRPr>
+          </a:p>
+        </p:txBody>
+      </p:sp>
+      <p:sp>
+        <p:nvSpPr>
+          <p:cNvPr id="23" name="矩形 22">
+            <a:extLst>
+              <a:ext uri="{FF2B5EF4-FFF2-40B4-BE49-F238E27FC236}">
+                <a16:creationId xmlns:a16="http://schemas.microsoft.com/office/drawing/2014/main" xmlns="" id="{849940C1-270B-4DDA-82FD-843CAA8ED7ED}"/>
+              </a:ext>
+            </a:extLst>
+          </p:cNvPr>
+          <p:cNvSpPr/>
+          <p:nvPr/>
+        </p:nvSpPr>
+        <p:spPr>
+          <a:xfrm>
+            <a:off x="9824680" y="2605350"/>
+            <a:ext cx="691215" cy="369332"/>
+          </a:xfrm>
+          <a:prstGeom prst="rect">
+            <a:avLst/>
+          </a:prstGeom>
+          <a:noFill/>
+        </p:spPr>
+        <p:txBody>
+          <a:bodyPr wrap="none">
+            <a:spAutoFit/>
+          </a:bodyPr>
+          <a:lstStyle/>
+          <a:p>
+            <a:pPr algn="ctr"/>
+            <a:r>
+              <a:rPr lang="en-US" altLang="zh-TW" b="1" dirty="0" smtClean="0">
+                <a:latin typeface="Consolas" panose="020B0609020204030204" pitchFamily="49" charset="0"/>
+                <a:cs typeface="Consolas" panose="020B0609020204030204" pitchFamily="49" charset="0"/>
+              </a:rPr>
+              <a:t>LDAP</a:t>
+            </a:r>
+            <a:endParaRPr lang="en-US" altLang="zh-TW" b="1" dirty="0">
+              <a:latin typeface="Consolas" panose="020B0609020204030204" pitchFamily="49" charset="0"/>
+              <a:cs typeface="Consolas" panose="020B0609020204030204" pitchFamily="49" charset="0"/>
+            </a:endParaRPr>
+          </a:p>
+        </p:txBody>
+      </p:sp>
+      <p:grpSp>
+        <p:nvGrpSpPr>
+          <p:cNvPr id="9" name="群組 8"/>
+          <p:cNvGrpSpPr/>
+          <p:nvPr/>
+        </p:nvGrpSpPr>
+        <p:grpSpPr>
+          <a:xfrm>
+            <a:off x="5251107" y="5402313"/>
+            <a:ext cx="2724587" cy="613245"/>
+            <a:chOff x="3001576" y="4769179"/>
+            <a:chExt cx="2724587" cy="613245"/>
+          </a:xfrm>
+        </p:grpSpPr>
+        <p:grpSp>
+          <p:nvGrpSpPr>
+            <p:cNvPr id="27" name="群組 26"/>
+            <p:cNvGrpSpPr/>
+            <p:nvPr/>
+          </p:nvGrpSpPr>
+          <p:grpSpPr>
+            <a:xfrm>
+              <a:off x="3001576" y="4769179"/>
+              <a:ext cx="2724587" cy="613245"/>
+              <a:chOff x="8194302" y="2551167"/>
+              <a:chExt cx="2724587" cy="613245"/>
+            </a:xfrm>
+          </p:grpSpPr>
+          <p:sp>
+            <p:nvSpPr>
+              <p:cNvPr id="28" name="文字方塊 27">
+                <a:extLst>
+                  <a:ext uri="{FF2B5EF4-FFF2-40B4-BE49-F238E27FC236}">
+                    <a16:creationId xmlns:a16="http://schemas.microsoft.com/office/drawing/2014/main" xmlns="" id="{CA8B39F2-1093-4652-9183-59D4A1FA31AE}"/>
+                  </a:ext>
+                </a:extLst>
+              </p:cNvPr>
+              <p:cNvSpPr txBox="1"/>
+              <p:nvPr/>
+            </p:nvSpPr>
+            <p:spPr>
+              <a:xfrm>
+                <a:off x="8795755" y="2672827"/>
+                <a:ext cx="745717" cy="338554"/>
+              </a:xfrm>
+              <a:prstGeom prst="rect">
+                <a:avLst/>
+              </a:prstGeom>
+              <a:noFill/>
+            </p:spPr>
+            <p:txBody>
+              <a:bodyPr wrap="none" rtlCol="0">
+                <a:spAutoFit/>
+              </a:bodyPr>
+              <a:lstStyle/>
+              <a:p>
+                <a:r>
+                  <a:rPr lang="en-US" altLang="zh-TW" sz="1600" b="1" dirty="0" err="1" smtClean="0">
+                    <a:solidFill>
+                      <a:schemeClr val="tx2">
+                        <a:lumMod val="75000"/>
+                      </a:schemeClr>
+                    </a:solidFill>
+                    <a:latin typeface="Consolas" panose="020B0609020204030204" pitchFamily="49" charset="0"/>
+                    <a:ea typeface="微軟正黑體" panose="020B0604030504040204" pitchFamily="34" charset="-120"/>
+                    <a:cs typeface="Consolas" panose="020B0609020204030204" pitchFamily="49" charset="0"/>
+                  </a:rPr>
+                  <a:t>Redis</a:t>
+                </a:r>
+                <a:endParaRPr lang="zh-TW" altLang="en-US" sz="1600" b="1" dirty="0">
+                  <a:solidFill>
+                    <a:schemeClr val="tx2">
+                      <a:lumMod val="75000"/>
+                    </a:schemeClr>
+                  </a:solidFill>
+                  <a:latin typeface="Consolas" panose="020B0609020204030204" pitchFamily="49" charset="0"/>
+                  <a:ea typeface="微軟正黑體" panose="020B0604030504040204" pitchFamily="34" charset="-120"/>
+                  <a:cs typeface="Consolas" panose="020B0609020204030204" pitchFamily="49" charset="0"/>
+                </a:endParaRPr>
+              </a:p>
+            </p:txBody>
+          </p:sp>
+          <p:sp>
+            <p:nvSpPr>
+              <p:cNvPr id="29" name="矩形 28">
+                <a:extLst>
+                  <a:ext uri="{FF2B5EF4-FFF2-40B4-BE49-F238E27FC236}">
+                    <a16:creationId xmlns:a16="http://schemas.microsoft.com/office/drawing/2014/main" xmlns="" id="{3B93D6B4-AAC0-4BDA-8620-5B2577AB6EAB}"/>
+                  </a:ext>
+                </a:extLst>
+              </p:cNvPr>
+              <p:cNvSpPr/>
+              <p:nvPr/>
+            </p:nvSpPr>
+            <p:spPr>
+              <a:xfrm>
+                <a:off x="8194302" y="2551167"/>
+                <a:ext cx="2724587" cy="613245"/>
+              </a:xfrm>
+              <a:prstGeom prst="rect">
+                <a:avLst/>
+              </a:prstGeom>
+              <a:noFill/>
+              <a:ln>
+                <a:prstDash val="dash"/>
+              </a:ln>
+            </p:spPr>
+            <p:style>
+              <a:lnRef idx="2">
+                <a:schemeClr val="accent1">
+                  <a:shade val="50000"/>
+                </a:schemeClr>
+              </a:lnRef>
+              <a:fillRef idx="1">
+                <a:schemeClr val="accent1"/>
+              </a:fillRef>
+              <a:effectRef idx="0">
+                <a:schemeClr val="accent1"/>
+              </a:effectRef>
+              <a:fontRef idx="minor">
+                <a:schemeClr val="lt1"/>
+              </a:fontRef>
+            </p:style>
+            <p:txBody>
+              <a:bodyPr rtlCol="0" anchor="ctr"/>
+              <a:lstStyle/>
+              <a:p>
+                <a:pPr algn="ctr"/>
+                <a:endParaRPr lang="zh-TW" altLang="en-US">
+                  <a:latin typeface="Consolas" panose="020B0609020204030204" pitchFamily="49" charset="0"/>
+                  <a:cs typeface="Consolas" panose="020B0609020204030204" pitchFamily="49" charset="0"/>
+                </a:endParaRPr>
+              </a:p>
+            </p:txBody>
+          </p:sp>
+        </p:grpSp>
+        <p:pic>
+          <p:nvPicPr>
+            <p:cNvPr id="6" name="圖片 5"/>
+            <p:cNvPicPr>
+              <a:picLocks noChangeAspect="1"/>
+            </p:cNvPicPr>
+            <p:nvPr/>
+          </p:nvPicPr>
+          <p:blipFill>
+            <a:blip r:embed="rId5" cstate="print">
+              <a:extLst>
+                <a:ext uri="{28A0092B-C50C-407E-A947-70E740481C1C}">
+                  <a14:useLocalDpi xmlns:a14="http://schemas.microsoft.com/office/drawing/2010/main" val="0"/>
+                </a:ext>
+              </a:extLst>
+            </a:blip>
+            <a:stretch>
+              <a:fillRect/>
+            </a:stretch>
+          </p:blipFill>
+          <p:spPr>
+            <a:xfrm>
+              <a:off x="3084023" y="4807916"/>
+              <a:ext cx="541491" cy="541491"/>
+            </a:xfrm>
+            <a:prstGeom prst="rect">
+              <a:avLst/>
+            </a:prstGeom>
+          </p:spPr>
+        </p:pic>
+      </p:grpSp>
+      <p:cxnSp>
+        <p:nvCxnSpPr>
+          <p:cNvPr id="32" name="直線單箭頭接點 31">
+            <a:extLst>
+              <a:ext uri="{FF2B5EF4-FFF2-40B4-BE49-F238E27FC236}">
+                <a16:creationId xmlns:a16="http://schemas.microsoft.com/office/drawing/2014/main" xmlns="" id="{9CD041CD-9441-4679-8E66-FF8013D04890}"/>
+              </a:ext>
+            </a:extLst>
+          </p:cNvPr>
+          <p:cNvCxnSpPr>
+            <a:cxnSpLocks/>
+          </p:cNvCxnSpPr>
+          <p:nvPr/>
+        </p:nvCxnSpPr>
+        <p:spPr>
+          <a:xfrm>
+            <a:off x="6613400" y="4536060"/>
+            <a:ext cx="0" cy="503591"/>
+          </a:xfrm>
+          <a:prstGeom prst="straightConnector1">
+            <a:avLst/>
+          </a:prstGeom>
+          <a:ln w="25400">
+            <a:tailEnd type="arrow"/>
+          </a:ln>
+        </p:spPr>
+        <p:style>
+          <a:lnRef idx="1">
+            <a:schemeClr val="accent1"/>
+          </a:lnRef>
+          <a:fillRef idx="0">
+            <a:schemeClr val="accent1"/>
+          </a:fillRef>
+          <a:effectRef idx="0">
+            <a:schemeClr val="accent1"/>
+          </a:effectRef>
+          <a:fontRef idx="minor">
+            <a:schemeClr val="tx1"/>
+          </a:fontRef>
+        </p:style>
+      </p:cxnSp>
+      <p:sp>
+        <p:nvSpPr>
+          <p:cNvPr id="36" name="圓角矩形 6">
+            <a:extLst>
+              <a:ext uri="{FF2B5EF4-FFF2-40B4-BE49-F238E27FC236}">
+                <a16:creationId xmlns:a16="http://schemas.microsoft.com/office/drawing/2014/main" xmlns="" id="{9292555D-6383-47AB-94C4-8C24D05C629F}"/>
+              </a:ext>
+            </a:extLst>
+          </p:cNvPr>
+          <p:cNvSpPr/>
+          <p:nvPr/>
+        </p:nvSpPr>
+        <p:spPr>
+          <a:xfrm>
+            <a:off x="1221774" y="985165"/>
+            <a:ext cx="6485842" cy="973190"/>
+          </a:xfrm>
+          <a:prstGeom prst="roundRect">
+            <a:avLst/>
+          </a:prstGeom>
+          <a:ln w="25400">
+            <a:solidFill>
+              <a:schemeClr val="accent1"/>
+            </a:solidFill>
+            <a:prstDash val="sysDash"/>
+          </a:ln>
+        </p:spPr>
+        <p:style>
+          <a:lnRef idx="2">
+            <a:schemeClr val="accent1"/>
+          </a:lnRef>
+          <a:fillRef idx="1">
+            <a:schemeClr val="lt1"/>
+          </a:fillRef>
+          <a:effectRef idx="0">
+            <a:schemeClr val="accent1"/>
+          </a:effectRef>
+          <a:fontRef idx="minor">
+            <a:schemeClr val="dk1"/>
+          </a:fontRef>
+        </p:style>
+        <p:txBody>
+          <a:bodyPr rtlCol="0" anchor="ctr"/>
+          <a:lstStyle/>
+          <a:p>
+            <a:pPr algn="ctr"/>
+            <a:endParaRPr lang="zh-TW" altLang="en-US">
+              <a:latin typeface="Consolas" panose="020B0609020204030204" pitchFamily="49" charset="0"/>
+              <a:cs typeface="Consolas" panose="020B0609020204030204" pitchFamily="49" charset="0"/>
+            </a:endParaRPr>
+          </a:p>
+        </p:txBody>
+      </p:sp>
+      <p:grpSp>
+        <p:nvGrpSpPr>
+          <p:cNvPr id="7" name="群組 6"/>
+          <p:cNvGrpSpPr/>
+          <p:nvPr/>
+        </p:nvGrpSpPr>
+        <p:grpSpPr>
+          <a:xfrm>
+            <a:off x="3029901" y="1159103"/>
+            <a:ext cx="2724587" cy="613245"/>
+            <a:chOff x="3029901" y="1159103"/>
+            <a:chExt cx="2724587" cy="613245"/>
+          </a:xfrm>
+        </p:grpSpPr>
+        <p:grpSp>
+          <p:nvGrpSpPr>
+            <p:cNvPr id="40" name="群組 39"/>
+            <p:cNvGrpSpPr/>
+            <p:nvPr/>
+          </p:nvGrpSpPr>
+          <p:grpSpPr>
+            <a:xfrm>
+              <a:off x="3029901" y="1159103"/>
+              <a:ext cx="2724587" cy="613245"/>
+              <a:chOff x="8194302" y="2551167"/>
+              <a:chExt cx="2724587" cy="613245"/>
+            </a:xfrm>
+          </p:grpSpPr>
+          <p:sp>
+            <p:nvSpPr>
+              <p:cNvPr id="42" name="文字方塊 41">
+                <a:extLst>
+                  <a:ext uri="{FF2B5EF4-FFF2-40B4-BE49-F238E27FC236}">
+                    <a16:creationId xmlns:a16="http://schemas.microsoft.com/office/drawing/2014/main" xmlns="" id="{CA8B39F2-1093-4652-9183-59D4A1FA31AE}"/>
+                  </a:ext>
+                </a:extLst>
+              </p:cNvPr>
+              <p:cNvSpPr txBox="1"/>
+              <p:nvPr/>
+            </p:nvSpPr>
+            <p:spPr>
+              <a:xfrm>
+                <a:off x="9073337" y="2688512"/>
+                <a:ext cx="745717" cy="338554"/>
+              </a:xfrm>
+              <a:prstGeom prst="rect">
+                <a:avLst/>
+              </a:prstGeom>
+              <a:noFill/>
+            </p:spPr>
+            <p:txBody>
+              <a:bodyPr wrap="none" rtlCol="0">
+                <a:spAutoFit/>
+              </a:bodyPr>
+              <a:lstStyle/>
+              <a:p>
+                <a:r>
+                  <a:rPr lang="en-US" altLang="zh-TW" sz="1600" b="1" dirty="0" err="1" smtClean="0">
+                    <a:solidFill>
+                      <a:schemeClr val="tx2">
+                        <a:lumMod val="75000"/>
+                      </a:schemeClr>
+                    </a:solidFill>
+                    <a:latin typeface="Consolas" panose="020B0609020204030204" pitchFamily="49" charset="0"/>
+                    <a:ea typeface="微軟正黑體" panose="020B0604030504040204" pitchFamily="34" charset="-120"/>
+                    <a:cs typeface="Consolas" panose="020B0609020204030204" pitchFamily="49" charset="0"/>
+                  </a:rPr>
+                  <a:t>Nginx</a:t>
+                </a:r>
+                <a:endParaRPr lang="zh-TW" altLang="en-US" sz="1600" b="1" dirty="0">
+                  <a:solidFill>
+                    <a:schemeClr val="tx2">
+                      <a:lumMod val="75000"/>
+                    </a:schemeClr>
+                  </a:solidFill>
+                  <a:latin typeface="Consolas" panose="020B0609020204030204" pitchFamily="49" charset="0"/>
+                  <a:ea typeface="微軟正黑體" panose="020B0604030504040204" pitchFamily="34" charset="-120"/>
+                  <a:cs typeface="Consolas" panose="020B0609020204030204" pitchFamily="49" charset="0"/>
+                </a:endParaRPr>
+              </a:p>
+            </p:txBody>
+          </p:sp>
+          <p:sp>
+            <p:nvSpPr>
+              <p:cNvPr id="43" name="矩形 42">
+                <a:extLst>
+                  <a:ext uri="{FF2B5EF4-FFF2-40B4-BE49-F238E27FC236}">
+                    <a16:creationId xmlns:a16="http://schemas.microsoft.com/office/drawing/2014/main" xmlns="" id="{3B93D6B4-AAC0-4BDA-8620-5B2577AB6EAB}"/>
+                  </a:ext>
+                </a:extLst>
+              </p:cNvPr>
+              <p:cNvSpPr/>
+              <p:nvPr/>
+            </p:nvSpPr>
+            <p:spPr>
+              <a:xfrm>
+                <a:off x="8194302" y="2551167"/>
+                <a:ext cx="2724587" cy="613245"/>
+              </a:xfrm>
+              <a:prstGeom prst="rect">
+                <a:avLst/>
+              </a:prstGeom>
+              <a:noFill/>
+              <a:ln>
+                <a:prstDash val="dash"/>
+              </a:ln>
+            </p:spPr>
+            <p:style>
+              <a:lnRef idx="2">
+                <a:schemeClr val="accent1">
+                  <a:shade val="50000"/>
+                </a:schemeClr>
+              </a:lnRef>
+              <a:fillRef idx="1">
+                <a:schemeClr val="accent1"/>
+              </a:fillRef>
+              <a:effectRef idx="0">
+                <a:schemeClr val="accent1"/>
+              </a:effectRef>
+              <a:fontRef idx="minor">
+                <a:schemeClr val="lt1"/>
+              </a:fontRef>
+            </p:style>
+            <p:txBody>
+              <a:bodyPr rtlCol="0" anchor="ctr"/>
+              <a:lstStyle/>
+              <a:p>
+                <a:pPr algn="ctr"/>
+                <a:endParaRPr lang="zh-TW" altLang="en-US">
+                  <a:latin typeface="Consolas" panose="020B0609020204030204" pitchFamily="49" charset="0"/>
+                  <a:cs typeface="Consolas" panose="020B0609020204030204" pitchFamily="49" charset="0"/>
+                </a:endParaRPr>
+              </a:p>
+            </p:txBody>
+          </p:sp>
+        </p:grpSp>
+        <p:pic>
+          <p:nvPicPr>
+            <p:cNvPr id="11" name="圖片 10"/>
+            <p:cNvPicPr>
+              <a:picLocks noChangeAspect="1"/>
+            </p:cNvPicPr>
+            <p:nvPr/>
+          </p:nvPicPr>
+          <p:blipFill>
+            <a:blip r:embed="rId6" cstate="print">
+              <a:extLst>
+                <a:ext uri="{28A0092B-C50C-407E-A947-70E740481C1C}">
+                  <a14:useLocalDpi xmlns:a14="http://schemas.microsoft.com/office/drawing/2010/main" val="0"/>
+                </a:ext>
+              </a:extLst>
+            </a:blip>
+            <a:stretch>
+              <a:fillRect/>
+            </a:stretch>
+          </p:blipFill>
+          <p:spPr>
+            <a:xfrm>
+              <a:off x="3141206" y="1256595"/>
+              <a:ext cx="670287" cy="418259"/>
+            </a:xfrm>
+            <a:prstGeom prst="rect">
+              <a:avLst/>
+            </a:prstGeom>
+          </p:spPr>
+        </p:pic>
+      </p:grpSp>
+      <p:sp>
+        <p:nvSpPr>
+          <p:cNvPr id="21" name="向右箭號 20"/>
+          <p:cNvSpPr/>
+          <p:nvPr/>
+        </p:nvSpPr>
+        <p:spPr>
+          <a:xfrm>
+            <a:off x="74951" y="1091009"/>
+            <a:ext cx="1146823" cy="749429"/>
+          </a:xfrm>
+          <a:prstGeom prst="rightArrow">
+            <a:avLst/>
+          </a:prstGeom>
+        </p:spPr>
+        <p:style>
+          <a:lnRef idx="2">
+            <a:schemeClr val="accent6">
+              <a:shade val="50000"/>
+            </a:schemeClr>
+          </a:lnRef>
+          <a:fillRef idx="1">
+            <a:schemeClr val="accent6"/>
+          </a:fillRef>
+          <a:effectRef idx="0">
+            <a:schemeClr val="accent6"/>
+          </a:effectRef>
+          <a:fontRef idx="minor">
+            <a:schemeClr val="lt1"/>
+          </a:fontRef>
+        </p:style>
+        <p:txBody>
+          <a:bodyPr rtlCol="0" anchor="ctr"/>
+          <a:lstStyle/>
+          <a:p>
+            <a:pPr algn="ctr"/>
+            <a:r>
+              <a:rPr lang="en-US" altLang="zh-TW" dirty="0" smtClean="0"/>
+              <a:t>Client</a:t>
+            </a:r>
+            <a:endParaRPr lang="zh-TW" altLang="en-US" dirty="0"/>
+          </a:p>
+        </p:txBody>
+      </p:sp>
+      <p:cxnSp>
+        <p:nvCxnSpPr>
+          <p:cNvPr id="39" name="直線單箭頭接點 38">
+            <a:extLst>
+              <a:ext uri="{FF2B5EF4-FFF2-40B4-BE49-F238E27FC236}">
+                <a16:creationId xmlns:a16="http://schemas.microsoft.com/office/drawing/2014/main" xmlns="" id="{A8AC5B70-F649-4DB5-AE32-A6F5581DFE4C}"/>
+              </a:ext>
+            </a:extLst>
+          </p:cNvPr>
+          <p:cNvCxnSpPr>
+            <a:cxnSpLocks/>
+            <a:stCxn id="36" idx="2"/>
+          </p:cNvCxnSpPr>
+          <p:nvPr/>
+        </p:nvCxnSpPr>
+        <p:spPr>
+          <a:xfrm flipH="1">
+            <a:off x="2896883" y="1958355"/>
+            <a:ext cx="1567812" cy="444382"/>
+          </a:xfrm>
+          <a:prstGeom prst="straightConnector1">
+            <a:avLst/>
+          </a:prstGeom>
+          <a:ln w="25400">
+            <a:tailEnd type="arrow"/>
+          </a:ln>
+        </p:spPr>
+        <p:style>
+          <a:lnRef idx="1">
+            <a:schemeClr val="accent1"/>
+          </a:lnRef>
+          <a:fillRef idx="0">
+            <a:schemeClr val="accent1"/>
+          </a:fillRef>
+          <a:effectRef idx="0">
+            <a:schemeClr val="accent1"/>
+          </a:effectRef>
+          <a:fontRef idx="minor">
+            <a:schemeClr val="tx1"/>
+          </a:fontRef>
+        </p:style>
+      </p:cxnSp>
+      <p:sp>
+        <p:nvSpPr>
+          <p:cNvPr id="16" name="文字方塊 15"/>
+          <p:cNvSpPr txBox="1"/>
+          <p:nvPr/>
+        </p:nvSpPr>
+        <p:spPr>
+          <a:xfrm>
+            <a:off x="2936882" y="1998929"/>
+            <a:ext cx="667062" cy="307777"/>
+          </a:xfrm>
+          <a:prstGeom prst="rect">
+            <a:avLst/>
+          </a:prstGeom>
+          <a:noFill/>
+        </p:spPr>
+        <p:txBody>
+          <a:bodyPr wrap="square" rtlCol="0">
+            <a:spAutoFit/>
+          </a:bodyPr>
+          <a:lstStyle/>
+          <a:p>
+            <a:r>
+              <a:rPr lang="en-US" altLang="zh-TW" sz="1400" dirty="0" smtClean="0"/>
+              <a:t>Proxy</a:t>
+            </a:r>
+            <a:endParaRPr lang="zh-TW" altLang="en-US" sz="1400" dirty="0"/>
+          </a:p>
+        </p:txBody>
+      </p:sp>
+    </p:spTree>
+    <p:extLst>
+      <p:ext uri="{BB962C8B-B14F-4D97-AF65-F5344CB8AC3E}">
+        <p14:creationId xmlns:p14="http://schemas.microsoft.com/office/powerpoint/2010/main" val="743290654"/>
       </p:ext>
     </p:extLst>
   </p:cSld>

</xml_diff>

<commit_message>
Update README n AppSettings
</commit_message>
<xml_diff>
--- a/doc/Architecture.pptx
+++ b/doc/Architecture.pptx
@@ -6,11 +6,12 @@
   </p:sldMasterIdLst>
   <p:sldIdLst>
     <p:sldId id="258" r:id="rId2"/>
-    <p:sldId id="262" r:id="rId3"/>
-    <p:sldId id="257" r:id="rId4"/>
-    <p:sldId id="259" r:id="rId5"/>
-    <p:sldId id="260" r:id="rId6"/>
-    <p:sldId id="261" r:id="rId7"/>
+    <p:sldId id="263" r:id="rId3"/>
+    <p:sldId id="262" r:id="rId4"/>
+    <p:sldId id="257" r:id="rId5"/>
+    <p:sldId id="259" r:id="rId6"/>
+    <p:sldId id="260" r:id="rId7"/>
+    <p:sldId id="261" r:id="rId8"/>
   </p:sldIdLst>
   <p:sldSz cx="12192000" cy="6858000"/>
   <p:notesSz cx="6858000" cy="9144000"/>
@@ -139,7 +140,7 @@
           <p:cNvPr id="2" name="標題 1">
             <a:extLst>
               <a:ext uri="{FF2B5EF4-FFF2-40B4-BE49-F238E27FC236}">
-                <a16:creationId xmlns:a16="http://schemas.microsoft.com/office/drawing/2014/main" xmlns="" id="{82AC7534-00B5-40A1-A1DF-A06A703F322F}"/>
+                <a16:creationId xmlns:a16="http://schemas.microsoft.com/office/drawing/2014/main" id="{82AC7534-00B5-40A1-A1DF-A06A703F322F}"/>
               </a:ext>
             </a:extLst>
           </p:cNvPr>
@@ -177,7 +178,7 @@
           <p:cNvPr id="3" name="副標題 2">
             <a:extLst>
               <a:ext uri="{FF2B5EF4-FFF2-40B4-BE49-F238E27FC236}">
-                <a16:creationId xmlns:a16="http://schemas.microsoft.com/office/drawing/2014/main" xmlns="" id="{7B2DE1E1-AA93-4FB8-9EB7-9C50C48BD235}"/>
+                <a16:creationId xmlns:a16="http://schemas.microsoft.com/office/drawing/2014/main" id="{7B2DE1E1-AA93-4FB8-9EB7-9C50C48BD235}"/>
               </a:ext>
             </a:extLst>
           </p:cNvPr>
@@ -248,7 +249,7 @@
           <p:cNvPr id="4" name="日期版面配置區 3">
             <a:extLst>
               <a:ext uri="{FF2B5EF4-FFF2-40B4-BE49-F238E27FC236}">
-                <a16:creationId xmlns:a16="http://schemas.microsoft.com/office/drawing/2014/main" xmlns="" id="{6E3EBCEF-2893-450A-A8F0-0758F2240CCE}"/>
+                <a16:creationId xmlns:a16="http://schemas.microsoft.com/office/drawing/2014/main" id="{6E3EBCEF-2893-450A-A8F0-0758F2240CCE}"/>
               </a:ext>
             </a:extLst>
           </p:cNvPr>
@@ -266,7 +267,7 @@
           <a:p>
             <a:fld id="{308EF277-7957-4950-8844-43C656DF05A1}" type="datetimeFigureOut">
               <a:rPr lang="en-US" smtClean="0"/>
-              <a:t>4/11/2020</a:t>
+              <a:t>5/9/2020</a:t>
             </a:fld>
             <a:endParaRPr lang="en-US"/>
           </a:p>
@@ -277,7 +278,7 @@
           <p:cNvPr id="5" name="頁尾版面配置區 4">
             <a:extLst>
               <a:ext uri="{FF2B5EF4-FFF2-40B4-BE49-F238E27FC236}">
-                <a16:creationId xmlns:a16="http://schemas.microsoft.com/office/drawing/2014/main" xmlns="" id="{1BEE8A35-0BD6-4511-8A1D-D5688795A83E}"/>
+                <a16:creationId xmlns:a16="http://schemas.microsoft.com/office/drawing/2014/main" id="{1BEE8A35-0BD6-4511-8A1D-D5688795A83E}"/>
               </a:ext>
             </a:extLst>
           </p:cNvPr>
@@ -302,7 +303,7 @@
           <p:cNvPr id="6" name="投影片編號版面配置區 5">
             <a:extLst>
               <a:ext uri="{FF2B5EF4-FFF2-40B4-BE49-F238E27FC236}">
-                <a16:creationId xmlns:a16="http://schemas.microsoft.com/office/drawing/2014/main" xmlns="" id="{7B50FBC5-2F25-4A1E-8DBC-66A1E17D25A5}"/>
+                <a16:creationId xmlns:a16="http://schemas.microsoft.com/office/drawing/2014/main" id="{7B50FBC5-2F25-4A1E-8DBC-66A1E17D25A5}"/>
               </a:ext>
             </a:extLst>
           </p:cNvPr>
@@ -361,7 +362,7 @@
           <p:cNvPr id="2" name="標題 1">
             <a:extLst>
               <a:ext uri="{FF2B5EF4-FFF2-40B4-BE49-F238E27FC236}">
-                <a16:creationId xmlns:a16="http://schemas.microsoft.com/office/drawing/2014/main" xmlns="" id="{56E79B4A-E398-4D95-8AC7-01FA447EAB4C}"/>
+                <a16:creationId xmlns:a16="http://schemas.microsoft.com/office/drawing/2014/main" id="{56E79B4A-E398-4D95-8AC7-01FA447EAB4C}"/>
               </a:ext>
             </a:extLst>
           </p:cNvPr>
@@ -390,7 +391,7 @@
           <p:cNvPr id="3" name="直排文字版面配置區 2">
             <a:extLst>
               <a:ext uri="{FF2B5EF4-FFF2-40B4-BE49-F238E27FC236}">
-                <a16:creationId xmlns:a16="http://schemas.microsoft.com/office/drawing/2014/main" xmlns="" id="{F442B8C2-DCC3-49A1-BB85-2700C809526B}"/>
+                <a16:creationId xmlns:a16="http://schemas.microsoft.com/office/drawing/2014/main" id="{F442B8C2-DCC3-49A1-BB85-2700C809526B}"/>
               </a:ext>
             </a:extLst>
           </p:cNvPr>
@@ -448,7 +449,7 @@
           <p:cNvPr id="4" name="日期版面配置區 3">
             <a:extLst>
               <a:ext uri="{FF2B5EF4-FFF2-40B4-BE49-F238E27FC236}">
-                <a16:creationId xmlns:a16="http://schemas.microsoft.com/office/drawing/2014/main" xmlns="" id="{A3FBCBAA-AA9C-439D-B591-F7F033DB55E2}"/>
+                <a16:creationId xmlns:a16="http://schemas.microsoft.com/office/drawing/2014/main" id="{A3FBCBAA-AA9C-439D-B591-F7F033DB55E2}"/>
               </a:ext>
             </a:extLst>
           </p:cNvPr>
@@ -466,7 +467,7 @@
           <a:p>
             <a:fld id="{308EF277-7957-4950-8844-43C656DF05A1}" type="datetimeFigureOut">
               <a:rPr lang="en-US" smtClean="0"/>
-              <a:t>4/11/2020</a:t>
+              <a:t>5/9/2020</a:t>
             </a:fld>
             <a:endParaRPr lang="en-US"/>
           </a:p>
@@ -477,7 +478,7 @@
           <p:cNvPr id="5" name="頁尾版面配置區 4">
             <a:extLst>
               <a:ext uri="{FF2B5EF4-FFF2-40B4-BE49-F238E27FC236}">
-                <a16:creationId xmlns:a16="http://schemas.microsoft.com/office/drawing/2014/main" xmlns="" id="{E54B8732-984F-4DF1-BBE6-E627F0265A1C}"/>
+                <a16:creationId xmlns:a16="http://schemas.microsoft.com/office/drawing/2014/main" id="{E54B8732-984F-4DF1-BBE6-E627F0265A1C}"/>
               </a:ext>
             </a:extLst>
           </p:cNvPr>
@@ -502,7 +503,7 @@
           <p:cNvPr id="6" name="投影片編號版面配置區 5">
             <a:extLst>
               <a:ext uri="{FF2B5EF4-FFF2-40B4-BE49-F238E27FC236}">
-                <a16:creationId xmlns:a16="http://schemas.microsoft.com/office/drawing/2014/main" xmlns="" id="{262135CB-1B65-4F63-B7D6-54B5D36F4186}"/>
+                <a16:creationId xmlns:a16="http://schemas.microsoft.com/office/drawing/2014/main" id="{262135CB-1B65-4F63-B7D6-54B5D36F4186}"/>
               </a:ext>
             </a:extLst>
           </p:cNvPr>
@@ -561,7 +562,7 @@
           <p:cNvPr id="2" name="直排標題 1">
             <a:extLst>
               <a:ext uri="{FF2B5EF4-FFF2-40B4-BE49-F238E27FC236}">
-                <a16:creationId xmlns:a16="http://schemas.microsoft.com/office/drawing/2014/main" xmlns="" id="{6C1F94A8-6CD9-4D71-91ED-FEB1B92CB028}"/>
+                <a16:creationId xmlns:a16="http://schemas.microsoft.com/office/drawing/2014/main" id="{6C1F94A8-6CD9-4D71-91ED-FEB1B92CB028}"/>
               </a:ext>
             </a:extLst>
           </p:cNvPr>
@@ -595,7 +596,7 @@
           <p:cNvPr id="3" name="直排文字版面配置區 2">
             <a:extLst>
               <a:ext uri="{FF2B5EF4-FFF2-40B4-BE49-F238E27FC236}">
-                <a16:creationId xmlns:a16="http://schemas.microsoft.com/office/drawing/2014/main" xmlns="" id="{593FDB2A-BBAF-4BC2-A6AF-692DB1FCBB1B}"/>
+                <a16:creationId xmlns:a16="http://schemas.microsoft.com/office/drawing/2014/main" id="{593FDB2A-BBAF-4BC2-A6AF-692DB1FCBB1B}"/>
               </a:ext>
             </a:extLst>
           </p:cNvPr>
@@ -658,7 +659,7 @@
           <p:cNvPr id="4" name="日期版面配置區 3">
             <a:extLst>
               <a:ext uri="{FF2B5EF4-FFF2-40B4-BE49-F238E27FC236}">
-                <a16:creationId xmlns:a16="http://schemas.microsoft.com/office/drawing/2014/main" xmlns="" id="{557BE055-0E9F-4E67-9256-A7747084021C}"/>
+                <a16:creationId xmlns:a16="http://schemas.microsoft.com/office/drawing/2014/main" id="{557BE055-0E9F-4E67-9256-A7747084021C}"/>
               </a:ext>
             </a:extLst>
           </p:cNvPr>
@@ -676,7 +677,7 @@
           <a:p>
             <a:fld id="{308EF277-7957-4950-8844-43C656DF05A1}" type="datetimeFigureOut">
               <a:rPr lang="en-US" smtClean="0"/>
-              <a:t>4/11/2020</a:t>
+              <a:t>5/9/2020</a:t>
             </a:fld>
             <a:endParaRPr lang="en-US"/>
           </a:p>
@@ -687,7 +688,7 @@
           <p:cNvPr id="5" name="頁尾版面配置區 4">
             <a:extLst>
               <a:ext uri="{FF2B5EF4-FFF2-40B4-BE49-F238E27FC236}">
-                <a16:creationId xmlns:a16="http://schemas.microsoft.com/office/drawing/2014/main" xmlns="" id="{7E0BC5E4-04C2-4917-BD3E-1457C2E3378C}"/>
+                <a16:creationId xmlns:a16="http://schemas.microsoft.com/office/drawing/2014/main" id="{7E0BC5E4-04C2-4917-BD3E-1457C2E3378C}"/>
               </a:ext>
             </a:extLst>
           </p:cNvPr>
@@ -712,7 +713,7 @@
           <p:cNvPr id="6" name="投影片編號版面配置區 5">
             <a:extLst>
               <a:ext uri="{FF2B5EF4-FFF2-40B4-BE49-F238E27FC236}">
-                <a16:creationId xmlns:a16="http://schemas.microsoft.com/office/drawing/2014/main" xmlns="" id="{10380EEE-3F30-4C57-8BE3-6B7604BC1AA8}"/>
+                <a16:creationId xmlns:a16="http://schemas.microsoft.com/office/drawing/2014/main" id="{10380EEE-3F30-4C57-8BE3-6B7604BC1AA8}"/>
               </a:ext>
             </a:extLst>
           </p:cNvPr>
@@ -771,7 +772,7 @@
           <p:cNvPr id="2" name="標題 1">
             <a:extLst>
               <a:ext uri="{FF2B5EF4-FFF2-40B4-BE49-F238E27FC236}">
-                <a16:creationId xmlns:a16="http://schemas.microsoft.com/office/drawing/2014/main" xmlns="" id="{A6D2C37C-2357-4EDB-B035-899E0D748729}"/>
+                <a16:creationId xmlns:a16="http://schemas.microsoft.com/office/drawing/2014/main" id="{A6D2C37C-2357-4EDB-B035-899E0D748729}"/>
               </a:ext>
             </a:extLst>
           </p:cNvPr>
@@ -800,7 +801,7 @@
           <p:cNvPr id="3" name="內容版面配置區 2">
             <a:extLst>
               <a:ext uri="{FF2B5EF4-FFF2-40B4-BE49-F238E27FC236}">
-                <a16:creationId xmlns:a16="http://schemas.microsoft.com/office/drawing/2014/main" xmlns="" id="{2B0AE9A2-7646-45A6-96B2-3CEAE4360EDE}"/>
+                <a16:creationId xmlns:a16="http://schemas.microsoft.com/office/drawing/2014/main" id="{2B0AE9A2-7646-45A6-96B2-3CEAE4360EDE}"/>
               </a:ext>
             </a:extLst>
           </p:cNvPr>
@@ -858,7 +859,7 @@
           <p:cNvPr id="4" name="日期版面配置區 3">
             <a:extLst>
               <a:ext uri="{FF2B5EF4-FFF2-40B4-BE49-F238E27FC236}">
-                <a16:creationId xmlns:a16="http://schemas.microsoft.com/office/drawing/2014/main" xmlns="" id="{94C55BDD-0F39-4086-A775-A7E8303FE22F}"/>
+                <a16:creationId xmlns:a16="http://schemas.microsoft.com/office/drawing/2014/main" id="{94C55BDD-0F39-4086-A775-A7E8303FE22F}"/>
               </a:ext>
             </a:extLst>
           </p:cNvPr>
@@ -876,7 +877,7 @@
           <a:p>
             <a:fld id="{308EF277-7957-4950-8844-43C656DF05A1}" type="datetimeFigureOut">
               <a:rPr lang="en-US" smtClean="0"/>
-              <a:t>4/11/2020</a:t>
+              <a:t>5/9/2020</a:t>
             </a:fld>
             <a:endParaRPr lang="en-US"/>
           </a:p>
@@ -887,7 +888,7 @@
           <p:cNvPr id="5" name="頁尾版面配置區 4">
             <a:extLst>
               <a:ext uri="{FF2B5EF4-FFF2-40B4-BE49-F238E27FC236}">
-                <a16:creationId xmlns:a16="http://schemas.microsoft.com/office/drawing/2014/main" xmlns="" id="{C7E3F2EA-7AD8-4B6B-9F0A-D4AD30185FC2}"/>
+                <a16:creationId xmlns:a16="http://schemas.microsoft.com/office/drawing/2014/main" id="{C7E3F2EA-7AD8-4B6B-9F0A-D4AD30185FC2}"/>
               </a:ext>
             </a:extLst>
           </p:cNvPr>
@@ -912,7 +913,7 @@
           <p:cNvPr id="6" name="投影片編號版面配置區 5">
             <a:extLst>
               <a:ext uri="{FF2B5EF4-FFF2-40B4-BE49-F238E27FC236}">
-                <a16:creationId xmlns:a16="http://schemas.microsoft.com/office/drawing/2014/main" xmlns="" id="{E24C4BD1-94DF-4ADD-99E8-6D51018907E5}"/>
+                <a16:creationId xmlns:a16="http://schemas.microsoft.com/office/drawing/2014/main" id="{E24C4BD1-94DF-4ADD-99E8-6D51018907E5}"/>
               </a:ext>
             </a:extLst>
           </p:cNvPr>
@@ -971,7 +972,7 @@
           <p:cNvPr id="2" name="標題 1">
             <a:extLst>
               <a:ext uri="{FF2B5EF4-FFF2-40B4-BE49-F238E27FC236}">
-                <a16:creationId xmlns:a16="http://schemas.microsoft.com/office/drawing/2014/main" xmlns="" id="{B9490E7D-F4E0-4BA6-A441-B4E2EB19EB0E}"/>
+                <a16:creationId xmlns:a16="http://schemas.microsoft.com/office/drawing/2014/main" id="{B9490E7D-F4E0-4BA6-A441-B4E2EB19EB0E}"/>
               </a:ext>
             </a:extLst>
           </p:cNvPr>
@@ -1009,7 +1010,7 @@
           <p:cNvPr id="3" name="文字版面配置區 2">
             <a:extLst>
               <a:ext uri="{FF2B5EF4-FFF2-40B4-BE49-F238E27FC236}">
-                <a16:creationId xmlns:a16="http://schemas.microsoft.com/office/drawing/2014/main" xmlns="" id="{8E3BB02F-8F6E-41AE-8AB4-4211A0AECB85}"/>
+                <a16:creationId xmlns:a16="http://schemas.microsoft.com/office/drawing/2014/main" id="{8E3BB02F-8F6E-41AE-8AB4-4211A0AECB85}"/>
               </a:ext>
             </a:extLst>
           </p:cNvPr>
@@ -1134,7 +1135,7 @@
           <p:cNvPr id="4" name="日期版面配置區 3">
             <a:extLst>
               <a:ext uri="{FF2B5EF4-FFF2-40B4-BE49-F238E27FC236}">
-                <a16:creationId xmlns:a16="http://schemas.microsoft.com/office/drawing/2014/main" xmlns="" id="{8E00F28D-E3A0-45EE-AEBD-2437D4D7956F}"/>
+                <a16:creationId xmlns:a16="http://schemas.microsoft.com/office/drawing/2014/main" id="{8E00F28D-E3A0-45EE-AEBD-2437D4D7956F}"/>
               </a:ext>
             </a:extLst>
           </p:cNvPr>
@@ -1152,7 +1153,7 @@
           <a:p>
             <a:fld id="{308EF277-7957-4950-8844-43C656DF05A1}" type="datetimeFigureOut">
               <a:rPr lang="en-US" smtClean="0"/>
-              <a:t>4/11/2020</a:t>
+              <a:t>5/9/2020</a:t>
             </a:fld>
             <a:endParaRPr lang="en-US"/>
           </a:p>
@@ -1163,7 +1164,7 @@
           <p:cNvPr id="5" name="頁尾版面配置區 4">
             <a:extLst>
               <a:ext uri="{FF2B5EF4-FFF2-40B4-BE49-F238E27FC236}">
-                <a16:creationId xmlns:a16="http://schemas.microsoft.com/office/drawing/2014/main" xmlns="" id="{A567CB2F-F9F2-4626-8E82-5192C6784E7C}"/>
+                <a16:creationId xmlns:a16="http://schemas.microsoft.com/office/drawing/2014/main" id="{A567CB2F-F9F2-4626-8E82-5192C6784E7C}"/>
               </a:ext>
             </a:extLst>
           </p:cNvPr>
@@ -1188,7 +1189,7 @@
           <p:cNvPr id="6" name="投影片編號版面配置區 5">
             <a:extLst>
               <a:ext uri="{FF2B5EF4-FFF2-40B4-BE49-F238E27FC236}">
-                <a16:creationId xmlns:a16="http://schemas.microsoft.com/office/drawing/2014/main" xmlns="" id="{B30863E3-51AC-493D-8EE2-0B3FE0964350}"/>
+                <a16:creationId xmlns:a16="http://schemas.microsoft.com/office/drawing/2014/main" id="{B30863E3-51AC-493D-8EE2-0B3FE0964350}"/>
               </a:ext>
             </a:extLst>
           </p:cNvPr>
@@ -1247,7 +1248,7 @@
           <p:cNvPr id="2" name="標題 1">
             <a:extLst>
               <a:ext uri="{FF2B5EF4-FFF2-40B4-BE49-F238E27FC236}">
-                <a16:creationId xmlns:a16="http://schemas.microsoft.com/office/drawing/2014/main" xmlns="" id="{4936CFF5-AF5B-44FF-885B-0E5DD36575CF}"/>
+                <a16:creationId xmlns:a16="http://schemas.microsoft.com/office/drawing/2014/main" id="{4936CFF5-AF5B-44FF-885B-0E5DD36575CF}"/>
               </a:ext>
             </a:extLst>
           </p:cNvPr>
@@ -1276,7 +1277,7 @@
           <p:cNvPr id="3" name="內容版面配置區 2">
             <a:extLst>
               <a:ext uri="{FF2B5EF4-FFF2-40B4-BE49-F238E27FC236}">
-                <a16:creationId xmlns:a16="http://schemas.microsoft.com/office/drawing/2014/main" xmlns="" id="{86455A0E-4D97-45F2-8E56-10A8B565FD26}"/>
+                <a16:creationId xmlns:a16="http://schemas.microsoft.com/office/drawing/2014/main" id="{86455A0E-4D97-45F2-8E56-10A8B565FD26}"/>
               </a:ext>
             </a:extLst>
           </p:cNvPr>
@@ -1339,7 +1340,7 @@
           <p:cNvPr id="4" name="內容版面配置區 3">
             <a:extLst>
               <a:ext uri="{FF2B5EF4-FFF2-40B4-BE49-F238E27FC236}">
-                <a16:creationId xmlns:a16="http://schemas.microsoft.com/office/drawing/2014/main" xmlns="" id="{3ADFE31E-F546-4395-828F-2A116437067C}"/>
+                <a16:creationId xmlns:a16="http://schemas.microsoft.com/office/drawing/2014/main" id="{3ADFE31E-F546-4395-828F-2A116437067C}"/>
               </a:ext>
             </a:extLst>
           </p:cNvPr>
@@ -1402,7 +1403,7 @@
           <p:cNvPr id="5" name="日期版面配置區 4">
             <a:extLst>
               <a:ext uri="{FF2B5EF4-FFF2-40B4-BE49-F238E27FC236}">
-                <a16:creationId xmlns:a16="http://schemas.microsoft.com/office/drawing/2014/main" xmlns="" id="{A2B574BE-C27D-43D5-8097-A10F9FBA13F5}"/>
+                <a16:creationId xmlns:a16="http://schemas.microsoft.com/office/drawing/2014/main" id="{A2B574BE-C27D-43D5-8097-A10F9FBA13F5}"/>
               </a:ext>
             </a:extLst>
           </p:cNvPr>
@@ -1420,7 +1421,7 @@
           <a:p>
             <a:fld id="{308EF277-7957-4950-8844-43C656DF05A1}" type="datetimeFigureOut">
               <a:rPr lang="en-US" smtClean="0"/>
-              <a:t>4/11/2020</a:t>
+              <a:t>5/9/2020</a:t>
             </a:fld>
             <a:endParaRPr lang="en-US"/>
           </a:p>
@@ -1431,7 +1432,7 @@
           <p:cNvPr id="6" name="頁尾版面配置區 5">
             <a:extLst>
               <a:ext uri="{FF2B5EF4-FFF2-40B4-BE49-F238E27FC236}">
-                <a16:creationId xmlns:a16="http://schemas.microsoft.com/office/drawing/2014/main" xmlns="" id="{798AFB51-75E8-41E5-982F-47775C475673}"/>
+                <a16:creationId xmlns:a16="http://schemas.microsoft.com/office/drawing/2014/main" id="{798AFB51-75E8-41E5-982F-47775C475673}"/>
               </a:ext>
             </a:extLst>
           </p:cNvPr>
@@ -1456,7 +1457,7 @@
           <p:cNvPr id="7" name="投影片編號版面配置區 6">
             <a:extLst>
               <a:ext uri="{FF2B5EF4-FFF2-40B4-BE49-F238E27FC236}">
-                <a16:creationId xmlns:a16="http://schemas.microsoft.com/office/drawing/2014/main" xmlns="" id="{30171867-7710-4B87-8FCE-7E7DB52F969B}"/>
+                <a16:creationId xmlns:a16="http://schemas.microsoft.com/office/drawing/2014/main" id="{30171867-7710-4B87-8FCE-7E7DB52F969B}"/>
               </a:ext>
             </a:extLst>
           </p:cNvPr>
@@ -1515,7 +1516,7 @@
           <p:cNvPr id="2" name="標題 1">
             <a:extLst>
               <a:ext uri="{FF2B5EF4-FFF2-40B4-BE49-F238E27FC236}">
-                <a16:creationId xmlns:a16="http://schemas.microsoft.com/office/drawing/2014/main" xmlns="" id="{E2BF2966-8253-4F79-8EED-67C4A19E058D}"/>
+                <a16:creationId xmlns:a16="http://schemas.microsoft.com/office/drawing/2014/main" id="{E2BF2966-8253-4F79-8EED-67C4A19E058D}"/>
               </a:ext>
             </a:extLst>
           </p:cNvPr>
@@ -1549,7 +1550,7 @@
           <p:cNvPr id="3" name="文字版面配置區 2">
             <a:extLst>
               <a:ext uri="{FF2B5EF4-FFF2-40B4-BE49-F238E27FC236}">
-                <a16:creationId xmlns:a16="http://schemas.microsoft.com/office/drawing/2014/main" xmlns="" id="{82BEBD01-2B0D-4AAD-B471-B6E232DE669C}"/>
+                <a16:creationId xmlns:a16="http://schemas.microsoft.com/office/drawing/2014/main" id="{82BEBD01-2B0D-4AAD-B471-B6E232DE669C}"/>
               </a:ext>
             </a:extLst>
           </p:cNvPr>
@@ -1620,7 +1621,7 @@
           <p:cNvPr id="4" name="內容版面配置區 3">
             <a:extLst>
               <a:ext uri="{FF2B5EF4-FFF2-40B4-BE49-F238E27FC236}">
-                <a16:creationId xmlns:a16="http://schemas.microsoft.com/office/drawing/2014/main" xmlns="" id="{DB2E7D45-DA8D-4833-A154-D050CA28FD64}"/>
+                <a16:creationId xmlns:a16="http://schemas.microsoft.com/office/drawing/2014/main" id="{DB2E7D45-DA8D-4833-A154-D050CA28FD64}"/>
               </a:ext>
             </a:extLst>
           </p:cNvPr>
@@ -1683,7 +1684,7 @@
           <p:cNvPr id="5" name="文字版面配置區 4">
             <a:extLst>
               <a:ext uri="{FF2B5EF4-FFF2-40B4-BE49-F238E27FC236}">
-                <a16:creationId xmlns:a16="http://schemas.microsoft.com/office/drawing/2014/main" xmlns="" id="{22CBCF01-2639-44EA-9E8B-89013494D2E3}"/>
+                <a16:creationId xmlns:a16="http://schemas.microsoft.com/office/drawing/2014/main" id="{22CBCF01-2639-44EA-9E8B-89013494D2E3}"/>
               </a:ext>
             </a:extLst>
           </p:cNvPr>
@@ -1754,7 +1755,7 @@
           <p:cNvPr id="6" name="內容版面配置區 5">
             <a:extLst>
               <a:ext uri="{FF2B5EF4-FFF2-40B4-BE49-F238E27FC236}">
-                <a16:creationId xmlns:a16="http://schemas.microsoft.com/office/drawing/2014/main" xmlns="" id="{6B98DDC0-BADE-4764-A519-89897B39BCFE}"/>
+                <a16:creationId xmlns:a16="http://schemas.microsoft.com/office/drawing/2014/main" id="{6B98DDC0-BADE-4764-A519-89897B39BCFE}"/>
               </a:ext>
             </a:extLst>
           </p:cNvPr>
@@ -1817,7 +1818,7 @@
           <p:cNvPr id="7" name="日期版面配置區 6">
             <a:extLst>
               <a:ext uri="{FF2B5EF4-FFF2-40B4-BE49-F238E27FC236}">
-                <a16:creationId xmlns:a16="http://schemas.microsoft.com/office/drawing/2014/main" xmlns="" id="{881DD612-3847-4A0B-B7AE-EC5F1CA587C0}"/>
+                <a16:creationId xmlns:a16="http://schemas.microsoft.com/office/drawing/2014/main" id="{881DD612-3847-4A0B-B7AE-EC5F1CA587C0}"/>
               </a:ext>
             </a:extLst>
           </p:cNvPr>
@@ -1835,7 +1836,7 @@
           <a:p>
             <a:fld id="{308EF277-7957-4950-8844-43C656DF05A1}" type="datetimeFigureOut">
               <a:rPr lang="en-US" smtClean="0"/>
-              <a:t>4/11/2020</a:t>
+              <a:t>5/9/2020</a:t>
             </a:fld>
             <a:endParaRPr lang="en-US"/>
           </a:p>
@@ -1846,7 +1847,7 @@
           <p:cNvPr id="8" name="頁尾版面配置區 7">
             <a:extLst>
               <a:ext uri="{FF2B5EF4-FFF2-40B4-BE49-F238E27FC236}">
-                <a16:creationId xmlns:a16="http://schemas.microsoft.com/office/drawing/2014/main" xmlns="" id="{2EEEAD35-4196-44E7-88C9-593C8EE1DC57}"/>
+                <a16:creationId xmlns:a16="http://schemas.microsoft.com/office/drawing/2014/main" id="{2EEEAD35-4196-44E7-88C9-593C8EE1DC57}"/>
               </a:ext>
             </a:extLst>
           </p:cNvPr>
@@ -1871,7 +1872,7 @@
           <p:cNvPr id="9" name="投影片編號版面配置區 8">
             <a:extLst>
               <a:ext uri="{FF2B5EF4-FFF2-40B4-BE49-F238E27FC236}">
-                <a16:creationId xmlns:a16="http://schemas.microsoft.com/office/drawing/2014/main" xmlns="" id="{77719CE7-426B-4C82-A331-2DCA0DA2D3F1}"/>
+                <a16:creationId xmlns:a16="http://schemas.microsoft.com/office/drawing/2014/main" id="{77719CE7-426B-4C82-A331-2DCA0DA2D3F1}"/>
               </a:ext>
             </a:extLst>
           </p:cNvPr>
@@ -1930,7 +1931,7 @@
           <p:cNvPr id="2" name="標題 1">
             <a:extLst>
               <a:ext uri="{FF2B5EF4-FFF2-40B4-BE49-F238E27FC236}">
-                <a16:creationId xmlns:a16="http://schemas.microsoft.com/office/drawing/2014/main" xmlns="" id="{1FE12DCA-69A8-4E5D-8F53-3BA4C163D2B0}"/>
+                <a16:creationId xmlns:a16="http://schemas.microsoft.com/office/drawing/2014/main" id="{1FE12DCA-69A8-4E5D-8F53-3BA4C163D2B0}"/>
               </a:ext>
             </a:extLst>
           </p:cNvPr>
@@ -1959,7 +1960,7 @@
           <p:cNvPr id="3" name="日期版面配置區 2">
             <a:extLst>
               <a:ext uri="{FF2B5EF4-FFF2-40B4-BE49-F238E27FC236}">
-                <a16:creationId xmlns:a16="http://schemas.microsoft.com/office/drawing/2014/main" xmlns="" id="{6F212DE5-7CF3-447B-9B0A-5D6FA859F4A4}"/>
+                <a16:creationId xmlns:a16="http://schemas.microsoft.com/office/drawing/2014/main" id="{6F212DE5-7CF3-447B-9B0A-5D6FA859F4A4}"/>
               </a:ext>
             </a:extLst>
           </p:cNvPr>
@@ -1977,7 +1978,7 @@
           <a:p>
             <a:fld id="{308EF277-7957-4950-8844-43C656DF05A1}" type="datetimeFigureOut">
               <a:rPr lang="en-US" smtClean="0"/>
-              <a:t>4/11/2020</a:t>
+              <a:t>5/9/2020</a:t>
             </a:fld>
             <a:endParaRPr lang="en-US"/>
           </a:p>
@@ -1988,7 +1989,7 @@
           <p:cNvPr id="4" name="頁尾版面配置區 3">
             <a:extLst>
               <a:ext uri="{FF2B5EF4-FFF2-40B4-BE49-F238E27FC236}">
-                <a16:creationId xmlns:a16="http://schemas.microsoft.com/office/drawing/2014/main" xmlns="" id="{CB774918-57DB-462C-8AD5-B80AE2BE82E9}"/>
+                <a16:creationId xmlns:a16="http://schemas.microsoft.com/office/drawing/2014/main" id="{CB774918-57DB-462C-8AD5-B80AE2BE82E9}"/>
               </a:ext>
             </a:extLst>
           </p:cNvPr>
@@ -2013,7 +2014,7 @@
           <p:cNvPr id="5" name="投影片編號版面配置區 4">
             <a:extLst>
               <a:ext uri="{FF2B5EF4-FFF2-40B4-BE49-F238E27FC236}">
-                <a16:creationId xmlns:a16="http://schemas.microsoft.com/office/drawing/2014/main" xmlns="" id="{D02979A6-49E6-46D6-A408-7E9EEB24B2C8}"/>
+                <a16:creationId xmlns:a16="http://schemas.microsoft.com/office/drawing/2014/main" id="{D02979A6-49E6-46D6-A408-7E9EEB24B2C8}"/>
               </a:ext>
             </a:extLst>
           </p:cNvPr>
@@ -2072,7 +2073,7 @@
           <p:cNvPr id="2" name="日期版面配置區 1">
             <a:extLst>
               <a:ext uri="{FF2B5EF4-FFF2-40B4-BE49-F238E27FC236}">
-                <a16:creationId xmlns:a16="http://schemas.microsoft.com/office/drawing/2014/main" xmlns="" id="{E25B78D0-8299-4777-9521-7DAC1D52C7BC}"/>
+                <a16:creationId xmlns:a16="http://schemas.microsoft.com/office/drawing/2014/main" id="{E25B78D0-8299-4777-9521-7DAC1D52C7BC}"/>
               </a:ext>
             </a:extLst>
           </p:cNvPr>
@@ -2090,7 +2091,7 @@
           <a:p>
             <a:fld id="{308EF277-7957-4950-8844-43C656DF05A1}" type="datetimeFigureOut">
               <a:rPr lang="en-US" smtClean="0"/>
-              <a:t>4/11/2020</a:t>
+              <a:t>5/9/2020</a:t>
             </a:fld>
             <a:endParaRPr lang="en-US"/>
           </a:p>
@@ -2101,7 +2102,7 @@
           <p:cNvPr id="3" name="頁尾版面配置區 2">
             <a:extLst>
               <a:ext uri="{FF2B5EF4-FFF2-40B4-BE49-F238E27FC236}">
-                <a16:creationId xmlns:a16="http://schemas.microsoft.com/office/drawing/2014/main" xmlns="" id="{21C2EFF7-28C0-4A00-941E-CAB2EEB7B396}"/>
+                <a16:creationId xmlns:a16="http://schemas.microsoft.com/office/drawing/2014/main" id="{21C2EFF7-28C0-4A00-941E-CAB2EEB7B396}"/>
               </a:ext>
             </a:extLst>
           </p:cNvPr>
@@ -2126,7 +2127,7 @@
           <p:cNvPr id="4" name="投影片編號版面配置區 3">
             <a:extLst>
               <a:ext uri="{FF2B5EF4-FFF2-40B4-BE49-F238E27FC236}">
-                <a16:creationId xmlns:a16="http://schemas.microsoft.com/office/drawing/2014/main" xmlns="" id="{1A702276-6BBB-404C-9B2C-BD6371B75F93}"/>
+                <a16:creationId xmlns:a16="http://schemas.microsoft.com/office/drawing/2014/main" id="{1A702276-6BBB-404C-9B2C-BD6371B75F93}"/>
               </a:ext>
             </a:extLst>
           </p:cNvPr>
@@ -2185,7 +2186,7 @@
           <p:cNvPr id="2" name="標題 1">
             <a:extLst>
               <a:ext uri="{FF2B5EF4-FFF2-40B4-BE49-F238E27FC236}">
-                <a16:creationId xmlns:a16="http://schemas.microsoft.com/office/drawing/2014/main" xmlns="" id="{5D10841A-423A-4339-95EF-2BCB941D6E14}"/>
+                <a16:creationId xmlns:a16="http://schemas.microsoft.com/office/drawing/2014/main" id="{5D10841A-423A-4339-95EF-2BCB941D6E14}"/>
               </a:ext>
             </a:extLst>
           </p:cNvPr>
@@ -2223,7 +2224,7 @@
           <p:cNvPr id="3" name="內容版面配置區 2">
             <a:extLst>
               <a:ext uri="{FF2B5EF4-FFF2-40B4-BE49-F238E27FC236}">
-                <a16:creationId xmlns:a16="http://schemas.microsoft.com/office/drawing/2014/main" xmlns="" id="{55FA11F7-421A-4A43-8AD5-971D8E1DED8B}"/>
+                <a16:creationId xmlns:a16="http://schemas.microsoft.com/office/drawing/2014/main" id="{55FA11F7-421A-4A43-8AD5-971D8E1DED8B}"/>
               </a:ext>
             </a:extLst>
           </p:cNvPr>
@@ -2314,7 +2315,7 @@
           <p:cNvPr id="4" name="文字版面配置區 3">
             <a:extLst>
               <a:ext uri="{FF2B5EF4-FFF2-40B4-BE49-F238E27FC236}">
-                <a16:creationId xmlns:a16="http://schemas.microsoft.com/office/drawing/2014/main" xmlns="" id="{65018E35-020D-4A65-907D-3F3B32A4EF78}"/>
+                <a16:creationId xmlns:a16="http://schemas.microsoft.com/office/drawing/2014/main" id="{65018E35-020D-4A65-907D-3F3B32A4EF78}"/>
               </a:ext>
             </a:extLst>
           </p:cNvPr>
@@ -2385,7 +2386,7 @@
           <p:cNvPr id="5" name="日期版面配置區 4">
             <a:extLst>
               <a:ext uri="{FF2B5EF4-FFF2-40B4-BE49-F238E27FC236}">
-                <a16:creationId xmlns:a16="http://schemas.microsoft.com/office/drawing/2014/main" xmlns="" id="{D392C35B-8B4B-414E-B686-32E61F515A31}"/>
+                <a16:creationId xmlns:a16="http://schemas.microsoft.com/office/drawing/2014/main" id="{D392C35B-8B4B-414E-B686-32E61F515A31}"/>
               </a:ext>
             </a:extLst>
           </p:cNvPr>
@@ -2403,7 +2404,7 @@
           <a:p>
             <a:fld id="{308EF277-7957-4950-8844-43C656DF05A1}" type="datetimeFigureOut">
               <a:rPr lang="en-US" smtClean="0"/>
-              <a:t>4/11/2020</a:t>
+              <a:t>5/9/2020</a:t>
             </a:fld>
             <a:endParaRPr lang="en-US"/>
           </a:p>
@@ -2414,7 +2415,7 @@
           <p:cNvPr id="6" name="頁尾版面配置區 5">
             <a:extLst>
               <a:ext uri="{FF2B5EF4-FFF2-40B4-BE49-F238E27FC236}">
-                <a16:creationId xmlns:a16="http://schemas.microsoft.com/office/drawing/2014/main" xmlns="" id="{0B42AE15-ED07-445B-AFA3-CC17AACC47A5}"/>
+                <a16:creationId xmlns:a16="http://schemas.microsoft.com/office/drawing/2014/main" id="{0B42AE15-ED07-445B-AFA3-CC17AACC47A5}"/>
               </a:ext>
             </a:extLst>
           </p:cNvPr>
@@ -2439,7 +2440,7 @@
           <p:cNvPr id="7" name="投影片編號版面配置區 6">
             <a:extLst>
               <a:ext uri="{FF2B5EF4-FFF2-40B4-BE49-F238E27FC236}">
-                <a16:creationId xmlns:a16="http://schemas.microsoft.com/office/drawing/2014/main" xmlns="" id="{C5D38D6B-D6E9-4C6F-91D5-113E36CAB582}"/>
+                <a16:creationId xmlns:a16="http://schemas.microsoft.com/office/drawing/2014/main" id="{C5D38D6B-D6E9-4C6F-91D5-113E36CAB582}"/>
               </a:ext>
             </a:extLst>
           </p:cNvPr>
@@ -2498,7 +2499,7 @@
           <p:cNvPr id="2" name="標題 1">
             <a:extLst>
               <a:ext uri="{FF2B5EF4-FFF2-40B4-BE49-F238E27FC236}">
-                <a16:creationId xmlns:a16="http://schemas.microsoft.com/office/drawing/2014/main" xmlns="" id="{FED623AC-B2EC-4A0B-927C-11F71BB2CBAF}"/>
+                <a16:creationId xmlns:a16="http://schemas.microsoft.com/office/drawing/2014/main" id="{FED623AC-B2EC-4A0B-927C-11F71BB2CBAF}"/>
               </a:ext>
             </a:extLst>
           </p:cNvPr>
@@ -2536,7 +2537,7 @@
           <p:cNvPr id="3" name="圖片版面配置區 2">
             <a:extLst>
               <a:ext uri="{FF2B5EF4-FFF2-40B4-BE49-F238E27FC236}">
-                <a16:creationId xmlns:a16="http://schemas.microsoft.com/office/drawing/2014/main" xmlns="" id="{5EED2DAC-D0A8-4440-84BB-E2D3BC7EA389}"/>
+                <a16:creationId xmlns:a16="http://schemas.microsoft.com/office/drawing/2014/main" id="{5EED2DAC-D0A8-4440-84BB-E2D3BC7EA389}"/>
               </a:ext>
             </a:extLst>
           </p:cNvPr>
@@ -2603,7 +2604,7 @@
           <p:cNvPr id="4" name="文字版面配置區 3">
             <a:extLst>
               <a:ext uri="{FF2B5EF4-FFF2-40B4-BE49-F238E27FC236}">
-                <a16:creationId xmlns:a16="http://schemas.microsoft.com/office/drawing/2014/main" xmlns="" id="{7E5292D8-4251-448F-BABA-92BAE1AA73E6}"/>
+                <a16:creationId xmlns:a16="http://schemas.microsoft.com/office/drawing/2014/main" id="{7E5292D8-4251-448F-BABA-92BAE1AA73E6}"/>
               </a:ext>
             </a:extLst>
           </p:cNvPr>
@@ -2674,7 +2675,7 @@
           <p:cNvPr id="5" name="日期版面配置區 4">
             <a:extLst>
               <a:ext uri="{FF2B5EF4-FFF2-40B4-BE49-F238E27FC236}">
-                <a16:creationId xmlns:a16="http://schemas.microsoft.com/office/drawing/2014/main" xmlns="" id="{54357AF7-CA25-4F54-A815-87613EEFAAB5}"/>
+                <a16:creationId xmlns:a16="http://schemas.microsoft.com/office/drawing/2014/main" id="{54357AF7-CA25-4F54-A815-87613EEFAAB5}"/>
               </a:ext>
             </a:extLst>
           </p:cNvPr>
@@ -2692,7 +2693,7 @@
           <a:p>
             <a:fld id="{308EF277-7957-4950-8844-43C656DF05A1}" type="datetimeFigureOut">
               <a:rPr lang="en-US" smtClean="0"/>
-              <a:t>4/11/2020</a:t>
+              <a:t>5/9/2020</a:t>
             </a:fld>
             <a:endParaRPr lang="en-US"/>
           </a:p>
@@ -2703,7 +2704,7 @@
           <p:cNvPr id="6" name="頁尾版面配置區 5">
             <a:extLst>
               <a:ext uri="{FF2B5EF4-FFF2-40B4-BE49-F238E27FC236}">
-                <a16:creationId xmlns:a16="http://schemas.microsoft.com/office/drawing/2014/main" xmlns="" id="{BBA7B2D3-DE97-4E4A-8F05-7720C8F458A0}"/>
+                <a16:creationId xmlns:a16="http://schemas.microsoft.com/office/drawing/2014/main" id="{BBA7B2D3-DE97-4E4A-8F05-7720C8F458A0}"/>
               </a:ext>
             </a:extLst>
           </p:cNvPr>
@@ -2728,7 +2729,7 @@
           <p:cNvPr id="7" name="投影片編號版面配置區 6">
             <a:extLst>
               <a:ext uri="{FF2B5EF4-FFF2-40B4-BE49-F238E27FC236}">
-                <a16:creationId xmlns:a16="http://schemas.microsoft.com/office/drawing/2014/main" xmlns="" id="{C13ED175-CE68-4572-BF99-01C321D46AF3}"/>
+                <a16:creationId xmlns:a16="http://schemas.microsoft.com/office/drawing/2014/main" id="{C13ED175-CE68-4572-BF99-01C321D46AF3}"/>
               </a:ext>
             </a:extLst>
           </p:cNvPr>
@@ -2792,7 +2793,7 @@
           <p:cNvPr id="2" name="標題版面配置區 1">
             <a:extLst>
               <a:ext uri="{FF2B5EF4-FFF2-40B4-BE49-F238E27FC236}">
-                <a16:creationId xmlns:a16="http://schemas.microsoft.com/office/drawing/2014/main" xmlns="" id="{70952118-C09C-4914-9C11-21A076CF3E64}"/>
+                <a16:creationId xmlns:a16="http://schemas.microsoft.com/office/drawing/2014/main" id="{70952118-C09C-4914-9C11-21A076CF3E64}"/>
               </a:ext>
             </a:extLst>
           </p:cNvPr>
@@ -2831,7 +2832,7 @@
           <p:cNvPr id="3" name="文字版面配置區 2">
             <a:extLst>
               <a:ext uri="{FF2B5EF4-FFF2-40B4-BE49-F238E27FC236}">
-                <a16:creationId xmlns:a16="http://schemas.microsoft.com/office/drawing/2014/main" xmlns="" id="{3AE4C985-C2B3-4AE4-BED9-8808C6A16CEC}"/>
+                <a16:creationId xmlns:a16="http://schemas.microsoft.com/office/drawing/2014/main" id="{3AE4C985-C2B3-4AE4-BED9-8808C6A16CEC}"/>
               </a:ext>
             </a:extLst>
           </p:cNvPr>
@@ -2899,7 +2900,7 @@
           <p:cNvPr id="4" name="日期版面配置區 3">
             <a:extLst>
               <a:ext uri="{FF2B5EF4-FFF2-40B4-BE49-F238E27FC236}">
-                <a16:creationId xmlns:a16="http://schemas.microsoft.com/office/drawing/2014/main" xmlns="" id="{3739DD90-0545-43F3-A164-6D6FBE60CD63}"/>
+                <a16:creationId xmlns:a16="http://schemas.microsoft.com/office/drawing/2014/main" id="{3739DD90-0545-43F3-A164-6D6FBE60CD63}"/>
               </a:ext>
             </a:extLst>
           </p:cNvPr>
@@ -2935,7 +2936,7 @@
           <a:p>
             <a:fld id="{308EF277-7957-4950-8844-43C656DF05A1}" type="datetimeFigureOut">
               <a:rPr lang="en-US" smtClean="0"/>
-              <a:t>4/11/2020</a:t>
+              <a:t>5/9/2020</a:t>
             </a:fld>
             <a:endParaRPr lang="en-US"/>
           </a:p>
@@ -2946,7 +2947,7 @@
           <p:cNvPr id="5" name="頁尾版面配置區 4">
             <a:extLst>
               <a:ext uri="{FF2B5EF4-FFF2-40B4-BE49-F238E27FC236}">
-                <a16:creationId xmlns:a16="http://schemas.microsoft.com/office/drawing/2014/main" xmlns="" id="{0F0AF2CD-9E2E-46E3-94AC-087AB961FC07}"/>
+                <a16:creationId xmlns:a16="http://schemas.microsoft.com/office/drawing/2014/main" id="{0F0AF2CD-9E2E-46E3-94AC-087AB961FC07}"/>
               </a:ext>
             </a:extLst>
           </p:cNvPr>
@@ -2989,7 +2990,7 @@
           <p:cNvPr id="6" name="投影片編號版面配置區 5">
             <a:extLst>
               <a:ext uri="{FF2B5EF4-FFF2-40B4-BE49-F238E27FC236}">
-                <a16:creationId xmlns:a16="http://schemas.microsoft.com/office/drawing/2014/main" xmlns="" id="{5F1F57D4-AA98-40C3-BF1A-297BCFCA8558}"/>
+                <a16:creationId xmlns:a16="http://schemas.microsoft.com/office/drawing/2014/main" id="{5F1F57D4-AA98-40C3-BF1A-297BCFCA8558}"/>
               </a:ext>
             </a:extLst>
           </p:cNvPr>
@@ -3357,7 +3358,7 @@
           <p:cNvPr id="4" name="圓角矩形 6">
             <a:extLst>
               <a:ext uri="{FF2B5EF4-FFF2-40B4-BE49-F238E27FC236}">
-                <a16:creationId xmlns:a16="http://schemas.microsoft.com/office/drawing/2014/main" xmlns="" id="{9292555D-6383-47AB-94C4-8C24D05C629F}"/>
+                <a16:creationId xmlns:a16="http://schemas.microsoft.com/office/drawing/2014/main" id="{9292555D-6383-47AB-94C4-8C24D05C629F}"/>
               </a:ext>
             </a:extLst>
           </p:cNvPr>
@@ -3410,7 +3411,7 @@
           <p:cNvPr id="8" name="AutoShape 2" descr="data:image/jpeg;base64,/9j/4AAQSkZJRgABAQAAAQABAAD/2wCEAAkGBhASEBAQDxAODxQSEg8PEBAUEBAPEBAQFBAVFBQQFRQXHCYeFxkjGRQUHy8gIycpLCwsFR4xNTMqNSYrLCkBCQoKDgwOFw8PGiwcHBwpLCksKSkpKSwpKSktNSopLCkpLCwsNSkpKSksKSkpKSwpKiopKTUpKSkvKSwpKSkpKf/AABEIAMwAzAMBIgACEQEDEQH/xAAbAAABBQEBAAAAAAAAAAAAAAAAAgMEBQYBB//EAEUQAAEDAgIGBgYGCAUFAAAAAAEAAgMEERIhBQYxQVFxE2GBkaHBIjJCUpKxFCMzcqKyJFNiY4LR4fAHFkOTsxVEg8LD/8QAGQEBAAMBAQAAAAAAAAAAAAAAAAEDBAIF/8QAJxEBAAIBAwMDBAMAAAAAAAAAAAECEQMSIQQxQRMyYQUiQlGRocH/2gAMAwEAAhEDEQA/APcUIQgFFrtIsiDS+/pEgWF9m9Slm9bpheJu+z3HkbAfIoLSPT0B9u3MFSWV0Z2PZ8QC8j0hrUYp5IRCJAzAMQkwuJcwOIsRbK6k0+tzMsUNQ37vRyfIhd7LYzhxvrHGXrDXg7CD2pS8zbrVTb5JW/ehly7QCFLptbICbMrIr8OlwHudZc4mO7qJiez0FCydPpuY+rIH8ix/yU9mmpd7W/CQoSvUKobpx29g7yE83TTd7XDuKCxQobdKxneRzBTgr4/fHigkISGzNOxzT2hLQCEIQCEIQCEIQCEIQCEIQCEIQCx+tUmKcN91rG95J81sFh9Nz/pEznWsw+DGXQebl/SVVQ7beaQDk12EflV/R0TTuWX1ediAefau883Eu81sKIr161xSIePrzm0p8OiGFEurrCLEA9RzCn0pyUrEqpiGfdMM27VCPcxretowHvbZJGgpWZRzVEfU2aQDxK1LXJQKiaRKY17x2lmfote0+jVT8nYJB+JqdbpOvZ63QSc4iwnta7yW4hha5rTYZgLkmjmHcFmmK/p6EX1MZiWNZrPMPXpmn7krh+ZqdGt7B60E45GN/mFpH6EjO5RZdW2HcFG2ruNW6sj1upT6xlZ96Jx8W3U6DWOmPq1UV+BfgPcVHn1SadwUGXU7qUenH7TGvbzDURaQJ9WUO5Oa5SGVknHwC8/qdTyPVFuQwnwUZmhall8EszeT3jzUen8u/XjzD1Btc7eAnm1V9y8mdpTSUR9GeQgbnBr/ABIulx6+6QZ67IJOcZae8HyT0bJ9ej1oShclna1pc4hoaCSTsAG9YXVTXmeqqGwvp4mAhxc9rnXADSdhHEDvWj1lntRz9bQz4iAuLVms4lbW0WjMLljwQCCCCLgjMEcUpZ3UeoLqdzSb4Hlo5YQbeK0S5dBCEIBCEIBeZ6x1BENdIdoiqXeBA8l6RUSYWOdwa49wXkuts9qCoO0vMMXPHKCfAFTWMzEE8QzOgWWaBwAHcLLU0RWY0R6oWloSvamOHi37r+mdkpGJQ6ZykFyoZ7H2OS8SjtelY1OFMyvtGSXZbgSPPzUvEqrREnrDkVYl6yXjFperoXzSDl1wlN41wvXGF244SuBNF66HqcOdwfZNCJpOwLjpElkmanCM8o1Vo+M7goE2gYyNitJnpp0isiZwiYhD0FodsM5e232bx2lzbeak62yfopHGSMeN0/SH0nnqY3tu4n5hVut0v1UTeMjj8Lf6rNqTmzbpRisLXUqK1Lf3nvPl5K+Vdq7FhpYR+wHfFn5qxVawIQhAIQhBX6elw00p/Zt3kBeWa02dHTxHZJOXHlHC7zeO5ej63y2p7e89g7rnyXmOsp+upBwjqJO1z42D8rl3pxm0Obe2VXSxFhLTtBt/VXtE5VOloiCyRuVwGu5jYe75J+hrCOB8F7Uc1y8i8Ylp6Z6fdIqqmrRbenzVDiqtvLNdYtkS8agxzJ0SqcM1lzouT0+YIVoXrP0E1nX4Zq4MizaleWzp7/bhIxpBkTBkTZlXG1o3pBkSnSZKGJEqSVNqNxb5E2yX0gmJJUyJsxzXUVTFk6d+ajmRdqXqGZFMRw7meVlo/ZI7i8D4WD+ap9a5bvibwY93e7+ittHfZA+8+V34y3/1VJpwY6oN6omfEf6rDf3S9GnthvqJto4xwYwfhCeXGiwA4ZLq5dhCEIBCEIMtr1UWbA3i9zjyDbea831gl/TGt/V08DSOtxfKfCRvctvr7NeeNg9mMntc63kvOdKVGKuqjwl6Mco2NYPyq/QjN1erOKrOVoews4jLqI2Kvpn280/DOmaoWfcbHZ9u/wDvrXraf6edqRnlPimThqFWMmXTUK2KsdoWsVQpLao8SqSOoUls672sl6tHQ1Rzz3K5irLtB6gspQz5O5K0o6r0eRI81n1NNOlaYnC4dVJp1YoD6hR3VCq9Nqi0riKruUmSszKr4J8iUy6oUbE7k6St6kwa3MKHJMmDKuoo7iWgqan0RyUA1RvuXZJbsHJVlTNZryNzXW54TZcRV3lsdHfYQdcTHHm8Yz4uKq8OPSLR+8jB/haD8wrmNgAY0ZANY0DgA0BVOrvp1xd+1M/5gfNeVM5nL2Y4btCEKEhCEIBCEIPPNYX9JpHDwfBH2XBPzK8sgqMUkr9uKSV3fI4hei1lZ+l1M5/0vpU3+zE8jxaF5ZQus0ch8ls6SMzMqNeeIheRTqTM/EzrGYVMyZTIalejHdjkCdBnUOd9nHvCb6ZaYZ7VWcc6ksnVMyZSWTK2IZr1aKhn9F3Yp9DU7RyKz9HP6J5qbTVFj4Li1c5ZsYsuZKhR3VChyVKZE9yFVtaKroz2ZzTXTqHUVGwcAmunXE1TCa+ZIEqiGVHSZLnDvK8ZNeMKEPSc1vvPjbzvI247roppfq0rRAxVNOOErX9jLuPgCqbcRMrNPm8R8tzLLYudwxO7rlV2pMd53HhGe8uCk1Tvq5DwY/5W80vUaL7Z/wBxvzP8l473WrQhCAQhCASZH2BJ3AnuCUq/T82GlqHcIpB2lpA+aDyHS1Xho66QnN0BZfrmla0+BcsHC/Ja3Wx+HR792Oopo+qzWvkI8Asaw5L1ugpmsz8sfU25iEkSJ+OdQcSW163bGbclVD7i/BRukXS9RypxhHdKbKpDJVXhyeY9XVlVaq4pZsu1Sm1FrKpp35J8yKzDJavKyfUrtPNdyrDMnqaW1yqph3jhYyVN3FdEyrGzJ0SqmU4TxKuulUISpXSKuRdUcvoHtU/VoXqmH3WTP7DGY/nIFS0MmR/vcr3VCO88r/chDP8AclaR/wAJWXXnFJW9NzrVhpdJPtDJ1hre9w/krbUyO0Dne9I7wACo9Lu+qA4vH4Wn+a02q7bUsXXiP4yvJe6tUIQgEIQgFRa6y2opR72Fne4X8Ar1RNJaLinZglBIviFnFtja18uaDyaOdzQWgjCcy1zWPaTxLXAi6Z+g0z8WOhpX5Xc5ofA+3HFG4fJbyq/w9jP2Ur29TgHKnqdSKply3o35HMGxtwzTNq+2cSWjMMfPqpQSep9LpnHYA6OojHxAO8VDd/h87Po6unPASNlgPabOC08uhalhziflyK76TfWY9vWWuA71pr1etX8v55Vzo0nwxVXqNXsBLYOmaPaheycdgacXgqGpp3xkiVj4iNoexzLd4XqrJRtBHMbU59OkGx7+V8Q7itFfqF/yiJ/pVPS18S8jaU40r0qshgkuZqSklJ2u6LoJT/5Ii0qnn1Yo3G7W1MHUyVsrRyDxfxWin1Cn5RMKrdLbxLMwHIJxzlfP1QZ/o1beps8L4vxxl48FBqtWqppyjZMNxikZLfk0HF3gLZXrNG3a3+Mdun1InsrcSeDrN5puppZYj9dFLF99jmjvIsh8oNrEbF3uieYlVNZjiS2uTocmWlOtVcoOtcnGlNNTjVVLlNon7exavUxotUP3l8UZ/hY93/0WPgNitnqi0dA8+9NJf+FrGrH1M/ZLR0dc6ufhY6Xd9mPvH5BbPQkWGnhH7DXfEMXmsXpPN0bf2fFzit/EzC1rRuAHcLLzHtFoQhAIQhAIQhALhC6hAxJCDtAPYocmjY/caN+XonvCsrJJYgztVq5C65tn15gfI+KrKnVNvsEjk7aeRBC2LokxKwAEkgAbScggwU2rUw3X7Ae8g+Sr5dDTN9jF1tIPhkVtKvTcLdl38sm958rqrn1jJ2NYObcZHacvBE5ZSSNzfXa5n3gW/NIsOpXFdWPfm15jcPaAbY9Tm2sQqt2lXg4Z4KeT9oNMTiOIcz+SGSoauRuTJJGjgHOw/DsXJaeGU3mp6aQna7omxPPN8WEntSPp9OTnHPF91zZR3OsfFS6c0zvUq4gfdla6E9+Y8UiZjtwicT3RXaqUL/YqIDxjmEjR/BIL/iUKp1F3wVbXcGzRPiPa9uJq08VE8+rhk643sk+RSjER6wLeYIV1dfUjyqtoac+GLfqjXtuWxxzAfqpopCeTb4vBV9RHNESJoJorbccbmgdpFl6I7ZfrGdrkC+ZUptR7LZHPFr2OwZ7LG4VsdXfyot0dJ7PMYa1p3r0DVgD6JCR7XSvPbK+3gAn59GU8l+kp6Z99pMQa/wCNliFJpoGtDWMaGMFmtYLkNbsAF8+9caut6kYTodP6VpnJWDFVRt4OhZ3WK3ixGi246trv3hd2DJbdZ2sIQhAIQhAIQhAIQhAIQkveACTsAJPIII+kNIMibieeQ3krG6Q0lLMc3YRuaMgEmurXTPL3b9g90bgmmtQRjR39pc/6ceI8VPaxOMiQVJ0a7q70zPotxFiCfJaNtMummQYybRHAkcwq+o0RJuDXdtvmt5LBxAPYoktE07rckHnj6Z8Zvhcw8RceIVpo7WeqZ6PTvcNwfaVvL0rrRy6P4WPUqup0Mw7WAHiPRKCVBrG8/aQwv62h0R8MlaU2kad/syxHf6sg8M1no6fDtu7rKkxyINPBQ4wXRPa8DI3BaU7Ho6XE30CcxmPStnvtsVTofSBjeDnbeOpbgYXDMAg57kETQmjQwl/Ox457VdXUdhTrSgcQuArqAQhCAQhCAQhCAUbSQvDKP3b/AMpUlcI3IPPWtTrWqZpDR5jkwbSQXR7frGjhxeBtHIqOwIFRsUqONIjYpEYQOsjXXRpTV0oIczEzHBe6lSrlIM3DqBQV0kQDi12zceCjVEBGThy4FW2k4Mg7hkeRUSGUEdHJmD6p4FBTy0oUKSnI2K7q6UsPEbj5KG9qCPSDMf3sW7oHWYwH3R8lnNC6IL3E2u1pGI7hvw9Z48LrUsgsgfY5SGJmNifa1AsJS4AuoBCEIBCEIBCEIBCEIGaukZKwskGIHsIO4gjMHrVBXaKljscLqloyxtwipaN2Jps2Xnkea0qEGSiwl2Fj2ud+rP1cw5xuse5SOjI9YFvMEK6r9FQzjDNEyQbrjNvW121p5KH/AJfwi0FRUwjc0vE7AOGGUO+aCK1DkP0ZXNvhlop+AfBJAe10bj8kjoK32qWjd9yqlb+aNA29cpzZ3YU4aeqP/Zxc/ppt/wAaR9BrPZpaRvW6pldb4WoHJSCCDvyVMYXG4AJtfYL+KuY9A1bj6c1NGOEcBkPxPd5KX/leNw+uknn4gydGw/wR4QgzjZS4dH9o73GDpZO4ZDmSFY6M1Xe4YpvqWn2AcUrhwc7Y3kL81pKOhjibgiYyNvBrQ0c+tPoGoaZrGhrGhoGwAWCUYwloQJDF2y6hAIQhAIQhAIQhAIQhAIQhAIQhAIQhAIQhAIQhAIQhAIQhAIQhAIQhAIQhAIQhB//Z">
             <a:extLst>
               <a:ext uri="{FF2B5EF4-FFF2-40B4-BE49-F238E27FC236}">
-                <a16:creationId xmlns:a16="http://schemas.microsoft.com/office/drawing/2014/main" xmlns="" id="{15B92B98-B7C8-4A75-A841-F25CD0136DE7}"/>
+                <a16:creationId xmlns:a16="http://schemas.microsoft.com/office/drawing/2014/main" id="{15B92B98-B7C8-4A75-A841-F25CD0136DE7}"/>
               </a:ext>
             </a:extLst>
           </p:cNvPr>
@@ -3449,7 +3450,7 @@
           <p:cNvPr id="17" name="群組 16">
             <a:extLst>
               <a:ext uri="{FF2B5EF4-FFF2-40B4-BE49-F238E27FC236}">
-                <a16:creationId xmlns:a16="http://schemas.microsoft.com/office/drawing/2014/main" xmlns="" id="{3E62AE25-4106-44ED-8F4E-D5D956A394D2}"/>
+                <a16:creationId xmlns:a16="http://schemas.microsoft.com/office/drawing/2014/main" id="{3E62AE25-4106-44ED-8F4E-D5D956A394D2}"/>
               </a:ext>
             </a:extLst>
           </p:cNvPr>
@@ -3469,7 +3470,7 @@
             <p:cNvPr id="18" name="圖片 17">
               <a:extLst>
                 <a:ext uri="{FF2B5EF4-FFF2-40B4-BE49-F238E27FC236}">
-                  <a16:creationId xmlns:a16="http://schemas.microsoft.com/office/drawing/2014/main" xmlns="" id="{DF00FD23-F9E0-40CA-BFAD-2BC20441329D}"/>
+                  <a16:creationId xmlns:a16="http://schemas.microsoft.com/office/drawing/2014/main" id="{DF00FD23-F9E0-40CA-BFAD-2BC20441329D}"/>
                 </a:ext>
               </a:extLst>
             </p:cNvPr>
@@ -3505,7 +3506,7 @@
             <p:cNvPr id="19" name="文字方塊 18">
               <a:extLst>
                 <a:ext uri="{FF2B5EF4-FFF2-40B4-BE49-F238E27FC236}">
-                  <a16:creationId xmlns:a16="http://schemas.microsoft.com/office/drawing/2014/main" xmlns="" id="{14F08A50-B905-4E9F-B65E-EEFCE05DA4E3}"/>
+                  <a16:creationId xmlns:a16="http://schemas.microsoft.com/office/drawing/2014/main" id="{14F08A50-B905-4E9F-B65E-EEFCE05DA4E3}"/>
                 </a:ext>
               </a:extLst>
             </p:cNvPr>
@@ -3560,7 +3561,7 @@
           <p:cNvPr id="35" name="矩形 34">
             <a:extLst>
               <a:ext uri="{FF2B5EF4-FFF2-40B4-BE49-F238E27FC236}">
-                <a16:creationId xmlns:a16="http://schemas.microsoft.com/office/drawing/2014/main" xmlns="" id="{A3837EC7-3FF7-497F-B8B9-5A0B2AE1FAD0}"/>
+                <a16:creationId xmlns:a16="http://schemas.microsoft.com/office/drawing/2014/main" id="{A3837EC7-3FF7-497F-B8B9-5A0B2AE1FAD0}"/>
               </a:ext>
             </a:extLst>
           </p:cNvPr>
@@ -3599,7 +3600,7 @@
           <p:cNvPr id="37" name="矩形 36">
             <a:extLst>
               <a:ext uri="{FF2B5EF4-FFF2-40B4-BE49-F238E27FC236}">
-                <a16:creationId xmlns:a16="http://schemas.microsoft.com/office/drawing/2014/main" xmlns="" id="{79B0EFC5-385A-4CBF-8F26-44920131D317}"/>
+                <a16:creationId xmlns:a16="http://schemas.microsoft.com/office/drawing/2014/main" id="{79B0EFC5-385A-4CBF-8F26-44920131D317}"/>
               </a:ext>
             </a:extLst>
           </p:cNvPr>
@@ -3652,7 +3653,7 @@
           <p:cNvPr id="38" name="圓角矩形 6">
             <a:extLst>
               <a:ext uri="{FF2B5EF4-FFF2-40B4-BE49-F238E27FC236}">
-                <a16:creationId xmlns:a16="http://schemas.microsoft.com/office/drawing/2014/main" xmlns="" id="{AA3F0518-490B-4DDF-BB4F-AE947406C799}"/>
+                <a16:creationId xmlns:a16="http://schemas.microsoft.com/office/drawing/2014/main" id="{AA3F0518-490B-4DDF-BB4F-AE947406C799}"/>
               </a:ext>
             </a:extLst>
           </p:cNvPr>
@@ -3667,10 +3668,10 @@
           <a:prstGeom prst="roundRect">
             <a:avLst/>
           </a:prstGeom>
-          <a:ln w="12700">
+          <a:ln w="25400">
             <a:solidFill>
-              <a:schemeClr val="accent5">
-                <a:lumMod val="50000"/>
+              <a:schemeClr val="accent1">
+                <a:lumMod val="75000"/>
               </a:schemeClr>
             </a:solidFill>
             <a:prstDash val="sysDash"/>
@@ -3707,7 +3708,7 @@
           <p:cNvPr id="48" name="文字方塊 47">
             <a:extLst>
               <a:ext uri="{FF2B5EF4-FFF2-40B4-BE49-F238E27FC236}">
-                <a16:creationId xmlns:a16="http://schemas.microsoft.com/office/drawing/2014/main" xmlns="" id="{0DF6CDA6-2149-48ED-A2DB-F56C93DC8F7D}"/>
+                <a16:creationId xmlns:a16="http://schemas.microsoft.com/office/drawing/2014/main" id="{0DF6CDA6-2149-48ED-A2DB-F56C93DC8F7D}"/>
               </a:ext>
             </a:extLst>
           </p:cNvPr>
@@ -3761,7 +3762,7 @@
           <p:cNvPr id="49" name="矩形 48">
             <a:extLst>
               <a:ext uri="{FF2B5EF4-FFF2-40B4-BE49-F238E27FC236}">
-                <a16:creationId xmlns:a16="http://schemas.microsoft.com/office/drawing/2014/main" xmlns="" id="{7C6A78A2-117B-4511-A337-A22A0D832DD5}"/>
+                <a16:creationId xmlns:a16="http://schemas.microsoft.com/office/drawing/2014/main" id="{7C6A78A2-117B-4511-A337-A22A0D832DD5}"/>
               </a:ext>
             </a:extLst>
           </p:cNvPr>
@@ -3814,7 +3815,7 @@
           <p:cNvPr id="51" name="圖片 50">
             <a:extLst>
               <a:ext uri="{FF2B5EF4-FFF2-40B4-BE49-F238E27FC236}">
-                <a16:creationId xmlns:a16="http://schemas.microsoft.com/office/drawing/2014/main" xmlns="" id="{360008C4-4A7C-4F98-BDE4-D845F6D06F74}"/>
+                <a16:creationId xmlns:a16="http://schemas.microsoft.com/office/drawing/2014/main" id="{360008C4-4A7C-4F98-BDE4-D845F6D06F74}"/>
               </a:ext>
             </a:extLst>
           </p:cNvPr>
@@ -3850,7 +3851,7 @@
           <p:cNvPr id="52" name="矩形 51">
             <a:extLst>
               <a:ext uri="{FF2B5EF4-FFF2-40B4-BE49-F238E27FC236}">
-                <a16:creationId xmlns:a16="http://schemas.microsoft.com/office/drawing/2014/main" xmlns="" id="{849940C1-270B-4DDA-82FD-843CAA8ED7ED}"/>
+                <a16:creationId xmlns:a16="http://schemas.microsoft.com/office/drawing/2014/main" id="{849940C1-270B-4DDA-82FD-843CAA8ED7ED}"/>
               </a:ext>
             </a:extLst>
           </p:cNvPr>
@@ -3896,7 +3897,7 @@
           <p:cNvPr id="55" name="直線單箭頭接點 54">
             <a:extLst>
               <a:ext uri="{FF2B5EF4-FFF2-40B4-BE49-F238E27FC236}">
-                <a16:creationId xmlns:a16="http://schemas.microsoft.com/office/drawing/2014/main" xmlns="" id="{A8AC5B70-F649-4DB5-AE32-A6F5581DFE4C}"/>
+                <a16:creationId xmlns:a16="http://schemas.microsoft.com/office/drawing/2014/main" id="{A8AC5B70-F649-4DB5-AE32-A6F5581DFE4C}"/>
               </a:ext>
             </a:extLst>
           </p:cNvPr>
@@ -3938,7 +3939,7 @@
           <p:cNvPr id="58" name="圓角矩形 6">
             <a:extLst>
               <a:ext uri="{FF2B5EF4-FFF2-40B4-BE49-F238E27FC236}">
-                <a16:creationId xmlns:a16="http://schemas.microsoft.com/office/drawing/2014/main" xmlns="" id="{E0994BA9-38F8-40E8-8EAA-1E120C08B215}"/>
+                <a16:creationId xmlns:a16="http://schemas.microsoft.com/office/drawing/2014/main" id="{E0994BA9-38F8-40E8-8EAA-1E120C08B215}"/>
               </a:ext>
             </a:extLst>
           </p:cNvPr>
@@ -3953,7 +3954,12 @@
           <a:prstGeom prst="roundRect">
             <a:avLst/>
           </a:prstGeom>
-          <a:ln>
+          <a:ln w="25400">
+            <a:solidFill>
+              <a:schemeClr val="accent1">
+                <a:lumMod val="75000"/>
+              </a:schemeClr>
+            </a:solidFill>
             <a:prstDash val="sysDash"/>
           </a:ln>
         </p:spPr>
@@ -3988,7 +3994,7 @@
           <p:cNvPr id="59" name="文字方塊 58">
             <a:extLst>
               <a:ext uri="{FF2B5EF4-FFF2-40B4-BE49-F238E27FC236}">
-                <a16:creationId xmlns:a16="http://schemas.microsoft.com/office/drawing/2014/main" xmlns="" id="{CA8B39F2-1093-4652-9183-59D4A1FA31AE}"/>
+                <a16:creationId xmlns:a16="http://schemas.microsoft.com/office/drawing/2014/main" id="{CA8B39F2-1093-4652-9183-59D4A1FA31AE}"/>
               </a:ext>
             </a:extLst>
           </p:cNvPr>
@@ -4042,7 +4048,7 @@
           <p:cNvPr id="60" name="矩形 59">
             <a:extLst>
               <a:ext uri="{FF2B5EF4-FFF2-40B4-BE49-F238E27FC236}">
-                <a16:creationId xmlns:a16="http://schemas.microsoft.com/office/drawing/2014/main" xmlns="" id="{3B93D6B4-AAC0-4BDA-8620-5B2577AB6EAB}"/>
+                <a16:creationId xmlns:a16="http://schemas.microsoft.com/office/drawing/2014/main" id="{3B93D6B4-AAC0-4BDA-8620-5B2577AB6EAB}"/>
               </a:ext>
             </a:extLst>
           </p:cNvPr>
@@ -4095,7 +4101,7 @@
           <p:cNvPr id="61" name="圖片 60">
             <a:extLst>
               <a:ext uri="{FF2B5EF4-FFF2-40B4-BE49-F238E27FC236}">
-                <a16:creationId xmlns:a16="http://schemas.microsoft.com/office/drawing/2014/main" xmlns="" id="{BE73BB19-43C0-469E-8622-D3B22AE9CFCC}"/>
+                <a16:creationId xmlns:a16="http://schemas.microsoft.com/office/drawing/2014/main" id="{BE73BB19-43C0-469E-8622-D3B22AE9CFCC}"/>
               </a:ext>
             </a:extLst>
           </p:cNvPr>
@@ -4131,7 +4137,7 @@
           <p:cNvPr id="2" name="圖片 1">
             <a:extLst>
               <a:ext uri="{FF2B5EF4-FFF2-40B4-BE49-F238E27FC236}">
-                <a16:creationId xmlns:a16="http://schemas.microsoft.com/office/drawing/2014/main" xmlns="" id="{9719C86B-CFC1-4A17-B6CA-1F6C48A30850}"/>
+                <a16:creationId xmlns:a16="http://schemas.microsoft.com/office/drawing/2014/main" id="{9719C86B-CFC1-4A17-B6CA-1F6C48A30850}"/>
               </a:ext>
             </a:extLst>
           </p:cNvPr>
@@ -4161,7 +4167,7 @@
           <p:cNvPr id="54" name="直線單箭頭接點 53">
             <a:extLst>
               <a:ext uri="{FF2B5EF4-FFF2-40B4-BE49-F238E27FC236}">
-                <a16:creationId xmlns:a16="http://schemas.microsoft.com/office/drawing/2014/main" xmlns="" id="{9CD041CD-9441-4679-8E66-FF8013D04890}"/>
+                <a16:creationId xmlns:a16="http://schemas.microsoft.com/office/drawing/2014/main" id="{9CD041CD-9441-4679-8E66-FF8013D04890}"/>
               </a:ext>
             </a:extLst>
           </p:cNvPr>
@@ -4231,10 +4237,10 @@
       </p:grpSpPr>
       <p:sp>
         <p:nvSpPr>
-          <p:cNvPr id="23" name="矩形 22">
-            <a:extLst>
-              <a:ext uri="{FF2B5EF4-FFF2-40B4-BE49-F238E27FC236}">
-                <a16:creationId xmlns:a16="http://schemas.microsoft.com/office/drawing/2014/main" xmlns="" id="{9939ADAE-D42F-4139-B2EF-679A7A89092A}"/>
+          <p:cNvPr id="4" name="圓角矩形 6">
+            <a:extLst>
+              <a:ext uri="{FF2B5EF4-FFF2-40B4-BE49-F238E27FC236}">
+                <a16:creationId xmlns:a16="http://schemas.microsoft.com/office/drawing/2014/main" id="{9292555D-6383-47AB-94C4-8C24D05C629F}"/>
               </a:ext>
             </a:extLst>
           </p:cNvPr>
@@ -4243,12 +4249,18 @@
         </p:nvSpPr>
         <p:spPr>
           <a:xfrm>
-            <a:off x="1003300" y="832262"/>
-            <a:ext cx="10477500" cy="3701638"/>
-          </a:xfrm>
-          <a:prstGeom prst="rect">
-            <a:avLst/>
-          </a:prstGeom>
+            <a:off x="1191794" y="1795636"/>
+            <a:ext cx="3392205" cy="2142064"/>
+          </a:xfrm>
+          <a:prstGeom prst="roundRect">
+            <a:avLst/>
+          </a:prstGeom>
+          <a:ln w="25400">
+            <a:solidFill>
+              <a:schemeClr val="tx2"/>
+            </a:solidFill>
+            <a:prstDash val="sysDash"/>
+          </a:ln>
         </p:spPr>
         <p:style>
           <a:lnRef idx="2">
@@ -4269,58 +4281,6 @@
           <a:lstStyle/>
           <a:p>
             <a:pPr algn="ctr"/>
-            <a:endParaRPr lang="zh-TW" altLang="en-US" dirty="0"/>
-          </a:p>
-        </p:txBody>
-      </p:sp>
-      <p:sp>
-        <p:nvSpPr>
-          <p:cNvPr id="4" name="圓角矩形 6">
-            <a:extLst>
-              <a:ext uri="{FF2B5EF4-FFF2-40B4-BE49-F238E27FC236}">
-                <a16:creationId xmlns:a16="http://schemas.microsoft.com/office/drawing/2014/main" xmlns="" id="{11088A7B-099A-477A-ABDE-983AB26D6566}"/>
-              </a:ext>
-            </a:extLst>
-          </p:cNvPr>
-          <p:cNvSpPr/>
-          <p:nvPr/>
-        </p:nvSpPr>
-        <p:spPr>
-          <a:xfrm>
-            <a:off x="1191794" y="1795636"/>
-            <a:ext cx="3392205" cy="2142064"/>
-          </a:xfrm>
-          <a:prstGeom prst="roundRect">
-            <a:avLst/>
-          </a:prstGeom>
-          <a:ln w="19050">
-            <a:solidFill>
-              <a:schemeClr val="accent1">
-                <a:lumMod val="50000"/>
-              </a:schemeClr>
-            </a:solidFill>
-            <a:prstDash val="sysDash"/>
-          </a:ln>
-        </p:spPr>
-        <p:style>
-          <a:lnRef idx="2">
-            <a:schemeClr val="accent1"/>
-          </a:lnRef>
-          <a:fillRef idx="1">
-            <a:schemeClr val="lt1"/>
-          </a:fillRef>
-          <a:effectRef idx="0">
-            <a:schemeClr val="accent1"/>
-          </a:effectRef>
-          <a:fontRef idx="minor">
-            <a:schemeClr val="dk1"/>
-          </a:fontRef>
-        </p:style>
-        <p:txBody>
-          <a:bodyPr rtlCol="0" anchor="ctr"/>
-          <a:lstStyle/>
-          <a:p>
-            <a:pPr algn="ctr"/>
             <a:endParaRPr lang="zh-TW" altLang="en-US">
               <a:latin typeface="Consolas" panose="020B0609020204030204" pitchFamily="49" charset="0"/>
               <a:cs typeface="Consolas" panose="020B0609020204030204" pitchFamily="49" charset="0"/>
@@ -4330,10 +4290,10 @@
       </p:sp>
       <p:sp>
         <p:nvSpPr>
-          <p:cNvPr id="5" name="AutoShape 2" descr="data:image/jpeg;base64,/9j/4AAQSkZJRgABAQAAAQABAAD/2wCEAAkGBhASEBAQDxAODxQSEg8PEBAUEBAPEBAQFBAVFBQQFRQXHCYeFxkjGRQUHy8gIycpLCwsFR4xNTMqNSYrLCkBCQoKDgwOFw8PGiwcHBwpLCksKSkpKSwpKSktNSopLCkpLCwsNSkpKSksKSkpKSwpKiopKTUpKSkvKSwpKSkpKf/AABEIAMwAzAMBIgACEQEDEQH/xAAbAAABBQEBAAAAAAAAAAAAAAAAAgMEBQYBB//EAEUQAAEDAgIGBgYGCAUFAAAAAAEAAgMEERIhBQYxQVFxE2GBkaHBIjJCUpKxFCMzcqKyJFNiY4LR4fAHFkOTsxVEg8LD/8QAGQEBAAMBAQAAAAAAAAAAAAAAAAEDBAIF/8QAJxEBAAIBAwMDBAMAAAAAAAAAAAECEQMSIQQxQRMyYQUiQlGRocH/2gAMAwEAAhEDEQA/APcUIQgFFrtIsiDS+/pEgWF9m9Slm9bpheJu+z3HkbAfIoLSPT0B9u3MFSWV0Z2PZ8QC8j0hrUYp5IRCJAzAMQkwuJcwOIsRbK6k0+tzMsUNQ37vRyfIhd7LYzhxvrHGXrDXg7CD2pS8zbrVTb5JW/ehly7QCFLptbICbMrIr8OlwHudZc4mO7qJiez0FCydPpuY+rIH8ix/yU9mmpd7W/CQoSvUKobpx29g7yE83TTd7XDuKCxQobdKxneRzBTgr4/fHigkISGzNOxzT2hLQCEIQCEIQCEIQCEIQCEIQCEIQCx+tUmKcN91rG95J81sFh9Nz/pEznWsw+DGXQebl/SVVQ7beaQDk12EflV/R0TTuWX1ediAefau883Eu81sKIr161xSIePrzm0p8OiGFEurrCLEA9RzCn0pyUrEqpiGfdMM27VCPcxretowHvbZJGgpWZRzVEfU2aQDxK1LXJQKiaRKY17x2lmfote0+jVT8nYJB+JqdbpOvZ63QSc4iwnta7yW4hha5rTYZgLkmjmHcFmmK/p6EX1MZiWNZrPMPXpmn7krh+ZqdGt7B60E45GN/mFpH6EjO5RZdW2HcFG2ruNW6sj1upT6xlZ96Jx8W3U6DWOmPq1UV+BfgPcVHn1SadwUGXU7qUenH7TGvbzDURaQJ9WUO5Oa5SGVknHwC8/qdTyPVFuQwnwUZmhall8EszeT3jzUen8u/XjzD1Btc7eAnm1V9y8mdpTSUR9GeQgbnBr/ABIulx6+6QZ67IJOcZae8HyT0bJ9ej1oShclna1pc4hoaCSTsAG9YXVTXmeqqGwvp4mAhxc9rnXADSdhHEDvWj1lntRz9bQz4iAuLVms4lbW0WjMLljwQCCCCLgjMEcUpZ3UeoLqdzSb4Hlo5YQbeK0S5dBCEIBCEIBeZ6x1BENdIdoiqXeBA8l6RUSYWOdwa49wXkuts9qCoO0vMMXPHKCfAFTWMzEE8QzOgWWaBwAHcLLU0RWY0R6oWloSvamOHi37r+mdkpGJQ6ZykFyoZ7H2OS8SjtelY1OFMyvtGSXZbgSPPzUvEqrREnrDkVYl6yXjFperoXzSDl1wlN41wvXGF244SuBNF66HqcOdwfZNCJpOwLjpElkmanCM8o1Vo+M7goE2gYyNitJnpp0isiZwiYhD0FodsM5e232bx2lzbeak62yfopHGSMeN0/SH0nnqY3tu4n5hVut0v1UTeMjj8Lf6rNqTmzbpRisLXUqK1Lf3nvPl5K+Vdq7FhpYR+wHfFn5qxVawIQhAIQhBX6elw00p/Zt3kBeWa02dHTxHZJOXHlHC7zeO5ej63y2p7e89g7rnyXmOsp+upBwjqJO1z42D8rl3pxm0Obe2VXSxFhLTtBt/VXtE5VOloiCyRuVwGu5jYe75J+hrCOB8F7Uc1y8i8Ylp6Z6fdIqqmrRbenzVDiqtvLNdYtkS8agxzJ0SqcM1lzouT0+YIVoXrP0E1nX4Zq4MizaleWzp7/bhIxpBkTBkTZlXG1o3pBkSnSZKGJEqSVNqNxb5E2yX0gmJJUyJsxzXUVTFk6d+ajmRdqXqGZFMRw7meVlo/ZI7i8D4WD+ap9a5bvibwY93e7+ittHfZA+8+V34y3/1VJpwY6oN6omfEf6rDf3S9GnthvqJto4xwYwfhCeXGiwA4ZLq5dhCEIBCEIMtr1UWbA3i9zjyDbea831gl/TGt/V08DSOtxfKfCRvctvr7NeeNg9mMntc63kvOdKVGKuqjwl6Mco2NYPyq/QjN1erOKrOVoews4jLqI2Kvpn280/DOmaoWfcbHZ9u/wDvrXraf6edqRnlPimThqFWMmXTUK2KsdoWsVQpLao8SqSOoUls672sl6tHQ1Rzz3K5irLtB6gspQz5O5K0o6r0eRI81n1NNOlaYnC4dVJp1YoD6hR3VCq9Nqi0riKruUmSszKr4J8iUy6oUbE7k6St6kwa3MKHJMmDKuoo7iWgqan0RyUA1RvuXZJbsHJVlTNZryNzXW54TZcRV3lsdHfYQdcTHHm8Yz4uKq8OPSLR+8jB/haD8wrmNgAY0ZANY0DgA0BVOrvp1xd+1M/5gfNeVM5nL2Y4btCEKEhCEIBCEIPPNYX9JpHDwfBH2XBPzK8sgqMUkr9uKSV3fI4hei1lZ+l1M5/0vpU3+zE8jxaF5ZQus0ch8ls6SMzMqNeeIheRTqTM/EzrGYVMyZTIalejHdjkCdBnUOd9nHvCb6ZaYZ7VWcc6ksnVMyZSWTK2IZr1aKhn9F3Yp9DU7RyKz9HP6J5qbTVFj4Li1c5ZsYsuZKhR3VChyVKZE9yFVtaKroz2ZzTXTqHUVGwcAmunXE1TCa+ZIEqiGVHSZLnDvK8ZNeMKEPSc1vvPjbzvI247roppfq0rRAxVNOOErX9jLuPgCqbcRMrNPm8R8tzLLYudwxO7rlV2pMd53HhGe8uCk1Tvq5DwY/5W80vUaL7Z/wBxvzP8l473WrQhCAQhCASZH2BJ3AnuCUq/T82GlqHcIpB2lpA+aDyHS1Xho66QnN0BZfrmla0+BcsHC/Ja3Wx+HR792Oopo+qzWvkI8Asaw5L1ugpmsz8sfU25iEkSJ+OdQcSW163bGbclVD7i/BRukXS9RypxhHdKbKpDJVXhyeY9XVlVaq4pZsu1Sm1FrKpp35J8yKzDJavKyfUrtPNdyrDMnqaW1yqph3jhYyVN3FdEyrGzJ0SqmU4TxKuulUISpXSKuRdUcvoHtU/VoXqmH3WTP7DGY/nIFS0MmR/vcr3VCO88r/chDP8AclaR/wAJWXXnFJW9NzrVhpdJPtDJ1hre9w/krbUyO0Dne9I7wACo9Lu+qA4vH4Wn+a02q7bUsXXiP4yvJe6tUIQgEIQgFRa6y2opR72Fne4X8Ar1RNJaLinZglBIviFnFtja18uaDyaOdzQWgjCcy1zWPaTxLXAi6Z+g0z8WOhpX5Xc5ofA+3HFG4fJbyq/w9jP2Ur29TgHKnqdSKply3o35HMGxtwzTNq+2cSWjMMfPqpQSep9LpnHYA6OojHxAO8VDd/h87Po6unPASNlgPabOC08uhalhziflyK76TfWY9vWWuA71pr1etX8v55Vzo0nwxVXqNXsBLYOmaPaheycdgacXgqGpp3xkiVj4iNoexzLd4XqrJRtBHMbU59OkGx7+V8Q7itFfqF/yiJ/pVPS18S8jaU40r0qshgkuZqSklJ2u6LoJT/5Ii0qnn1Yo3G7W1MHUyVsrRyDxfxWin1Cn5RMKrdLbxLMwHIJxzlfP1QZ/o1beps8L4vxxl48FBqtWqppyjZMNxikZLfk0HF3gLZXrNG3a3+Mdun1InsrcSeDrN5puppZYj9dFLF99jmjvIsh8oNrEbF3uieYlVNZjiS2uTocmWlOtVcoOtcnGlNNTjVVLlNon7exavUxotUP3l8UZ/hY93/0WPgNitnqi0dA8+9NJf+FrGrH1M/ZLR0dc6ufhY6Xd9mPvH5BbPQkWGnhH7DXfEMXmsXpPN0bf2fFzit/EzC1rRuAHcLLzHtFoQhAIQhAIQhALhC6hAxJCDtAPYocmjY/caN+XonvCsrJJYgztVq5C65tn15gfI+KrKnVNvsEjk7aeRBC2LokxKwAEkgAbScggwU2rUw3X7Ae8g+Sr5dDTN9jF1tIPhkVtKvTcLdl38sm958rqrn1jJ2NYObcZHacvBE5ZSSNzfXa5n3gW/NIsOpXFdWPfm15jcPaAbY9Tm2sQqt2lXg4Z4KeT9oNMTiOIcz+SGSoauRuTJJGjgHOw/DsXJaeGU3mp6aQna7omxPPN8WEntSPp9OTnHPF91zZR3OsfFS6c0zvUq4gfdla6E9+Y8UiZjtwicT3RXaqUL/YqIDxjmEjR/BIL/iUKp1F3wVbXcGzRPiPa9uJq08VE8+rhk643sk+RSjER6wLeYIV1dfUjyqtoac+GLfqjXtuWxxzAfqpopCeTb4vBV9RHNESJoJorbccbmgdpFl6I7ZfrGdrkC+ZUptR7LZHPFr2OwZ7LG4VsdXfyot0dJ7PMYa1p3r0DVgD6JCR7XSvPbK+3gAn59GU8l+kp6Z99pMQa/wCNliFJpoGtDWMaGMFmtYLkNbsAF8+9caut6kYTodP6VpnJWDFVRt4OhZ3WK3ixGi246trv3hd2DJbdZ2sIQhAIQhAIQhAIQhAIQkveACTsAJPIII+kNIMibieeQ3krG6Q0lLMc3YRuaMgEmurXTPL3b9g90bgmmtQRjR39pc/6ceI8VPaxOMiQVJ0a7q70zPotxFiCfJaNtMummQYybRHAkcwq+o0RJuDXdtvmt5LBxAPYoktE07rckHnj6Z8Zvhcw8RceIVpo7WeqZ6PTvcNwfaVvL0rrRy6P4WPUqup0Mw7WAHiPRKCVBrG8/aQwv62h0R8MlaU2kad/syxHf6sg8M1no6fDtu7rKkxyINPBQ4wXRPa8DI3BaU7Ho6XE30CcxmPStnvtsVTofSBjeDnbeOpbgYXDMAg57kETQmjQwl/Ox457VdXUdhTrSgcQuArqAQhCAQhCAQhCAUbSQvDKP3b/AMpUlcI3IPPWtTrWqZpDR5jkwbSQXR7frGjhxeBtHIqOwIFRsUqONIjYpEYQOsjXXRpTV0oIczEzHBe6lSrlIM3DqBQV0kQDi12zceCjVEBGThy4FW2k4Mg7hkeRUSGUEdHJmD6p4FBTy0oUKSnI2K7q6UsPEbj5KG9qCPSDMf3sW7oHWYwH3R8lnNC6IL3E2u1pGI7hvw9Z48LrUsgsgfY5SGJmNifa1AsJS4AuoBCEIBCEIBCEIBCEIGaukZKwskGIHsIO4gjMHrVBXaKljscLqloyxtwipaN2Jps2Xnkea0qEGSiwl2Fj2ud+rP1cw5xuse5SOjI9YFvMEK6r9FQzjDNEyQbrjNvW121p5KH/AJfwi0FRUwjc0vE7AOGGUO+aCK1DkP0ZXNvhlop+AfBJAe10bj8kjoK32qWjd9yqlb+aNA29cpzZ3YU4aeqP/Zxc/ppt/wAaR9BrPZpaRvW6pldb4WoHJSCCDvyVMYXG4AJtfYL+KuY9A1bj6c1NGOEcBkPxPd5KX/leNw+uknn4gydGw/wR4QgzjZS4dH9o73GDpZO4ZDmSFY6M1Xe4YpvqWn2AcUrhwc7Y3kL81pKOhjibgiYyNvBrQ0c+tPoGoaZrGhrGhoGwAWCUYwloQJDF2y6hAIQhAIQhAIQhAIQhAIQhAIQhAIQhAIQhAIQhAIQhAIQhAIQhAIQhAIQhAIQhB//Z">
-            <a:extLst>
-              <a:ext uri="{FF2B5EF4-FFF2-40B4-BE49-F238E27FC236}">
-                <a16:creationId xmlns:a16="http://schemas.microsoft.com/office/drawing/2014/main" xmlns="" id="{69D67559-2F0E-4887-BF37-41EA453B89FD}"/>
+          <p:cNvPr id="8" name="AutoShape 2" descr="data:image/jpeg;base64,/9j/4AAQSkZJRgABAQAAAQABAAD/2wCEAAkGBhASEBAQDxAODxQSEg8PEBAUEBAPEBAQFBAVFBQQFRQXHCYeFxkjGRQUHy8gIycpLCwsFR4xNTMqNSYrLCkBCQoKDgwOFw8PGiwcHBwpLCksKSkpKSwpKSktNSopLCkpLCwsNSkpKSksKSkpKSwpKiopKTUpKSkvKSwpKSkpKf/AABEIAMwAzAMBIgACEQEDEQH/xAAbAAABBQEBAAAAAAAAAAAAAAAAAgMEBQYBB//EAEUQAAEDAgIGBgYGCAUFAAAAAAEAAgMEERIhBQYxQVFxE2GBkaHBIjJCUpKxFCMzcqKyJFNiY4LR4fAHFkOTsxVEg8LD/8QAGQEBAAMBAQAAAAAAAAAAAAAAAAEDBAIF/8QAJxEBAAIBAwMDBAMAAAAAAAAAAAECEQMSIQQxQRMyYQUiQlGRocH/2gAMAwEAAhEDEQA/APcUIQgFFrtIsiDS+/pEgWF9m9Slm9bpheJu+z3HkbAfIoLSPT0B9u3MFSWV0Z2PZ8QC8j0hrUYp5IRCJAzAMQkwuJcwOIsRbK6k0+tzMsUNQ37vRyfIhd7LYzhxvrHGXrDXg7CD2pS8zbrVTb5JW/ehly7QCFLptbICbMrIr8OlwHudZc4mO7qJiez0FCydPpuY+rIH8ix/yU9mmpd7W/CQoSvUKobpx29g7yE83TTd7XDuKCxQobdKxneRzBTgr4/fHigkISGzNOxzT2hLQCEIQCEIQCEIQCEIQCEIQCEIQCx+tUmKcN91rG95J81sFh9Nz/pEznWsw+DGXQebl/SVVQ7beaQDk12EflV/R0TTuWX1ediAefau883Eu81sKIr161xSIePrzm0p8OiGFEurrCLEA9RzCn0pyUrEqpiGfdMM27VCPcxretowHvbZJGgpWZRzVEfU2aQDxK1LXJQKiaRKY17x2lmfote0+jVT8nYJB+JqdbpOvZ63QSc4iwnta7yW4hha5rTYZgLkmjmHcFmmK/p6EX1MZiWNZrPMPXpmn7krh+ZqdGt7B60E45GN/mFpH6EjO5RZdW2HcFG2ruNW6sj1upT6xlZ96Jx8W3U6DWOmPq1UV+BfgPcVHn1SadwUGXU7qUenH7TGvbzDURaQJ9WUO5Oa5SGVknHwC8/qdTyPVFuQwnwUZmhall8EszeT3jzUen8u/XjzD1Btc7eAnm1V9y8mdpTSUR9GeQgbnBr/ABIulx6+6QZ67IJOcZae8HyT0bJ9ej1oShclna1pc4hoaCSTsAG9YXVTXmeqqGwvp4mAhxc9rnXADSdhHEDvWj1lntRz9bQz4iAuLVms4lbW0WjMLljwQCCCCLgjMEcUpZ3UeoLqdzSb4Hlo5YQbeK0S5dBCEIBCEIBeZ6x1BENdIdoiqXeBA8l6RUSYWOdwa49wXkuts9qCoO0vMMXPHKCfAFTWMzEE8QzOgWWaBwAHcLLU0RWY0R6oWloSvamOHi37r+mdkpGJQ6ZykFyoZ7H2OS8SjtelY1OFMyvtGSXZbgSPPzUvEqrREnrDkVYl6yXjFperoXzSDl1wlN41wvXGF244SuBNF66HqcOdwfZNCJpOwLjpElkmanCM8o1Vo+M7goE2gYyNitJnpp0isiZwiYhD0FodsM5e232bx2lzbeak62yfopHGSMeN0/SH0nnqY3tu4n5hVut0v1UTeMjj8Lf6rNqTmzbpRisLXUqK1Lf3nvPl5K+Vdq7FhpYR+wHfFn5qxVawIQhAIQhBX6elw00p/Zt3kBeWa02dHTxHZJOXHlHC7zeO5ej63y2p7e89g7rnyXmOsp+upBwjqJO1z42D8rl3pxm0Obe2VXSxFhLTtBt/VXtE5VOloiCyRuVwGu5jYe75J+hrCOB8F7Uc1y8i8Ylp6Z6fdIqqmrRbenzVDiqtvLNdYtkS8agxzJ0SqcM1lzouT0+YIVoXrP0E1nX4Zq4MizaleWzp7/bhIxpBkTBkTZlXG1o3pBkSnSZKGJEqSVNqNxb5E2yX0gmJJUyJsxzXUVTFk6d+ajmRdqXqGZFMRw7meVlo/ZI7i8D4WD+ap9a5bvibwY93e7+ittHfZA+8+V34y3/1VJpwY6oN6omfEf6rDf3S9GnthvqJto4xwYwfhCeXGiwA4ZLq5dhCEIBCEIMtr1UWbA3i9zjyDbea831gl/TGt/V08DSOtxfKfCRvctvr7NeeNg9mMntc63kvOdKVGKuqjwl6Mco2NYPyq/QjN1erOKrOVoews4jLqI2Kvpn280/DOmaoWfcbHZ9u/wDvrXraf6edqRnlPimThqFWMmXTUK2KsdoWsVQpLao8SqSOoUls672sl6tHQ1Rzz3K5irLtB6gspQz5O5K0o6r0eRI81n1NNOlaYnC4dVJp1YoD6hR3VCq9Nqi0riKruUmSszKr4J8iUy6oUbE7k6St6kwa3MKHJMmDKuoo7iWgqan0RyUA1RvuXZJbsHJVlTNZryNzXW54TZcRV3lsdHfYQdcTHHm8Yz4uKq8OPSLR+8jB/haD8wrmNgAY0ZANY0DgA0BVOrvp1xd+1M/5gfNeVM5nL2Y4btCEKEhCEIBCEIPPNYX9JpHDwfBH2XBPzK8sgqMUkr9uKSV3fI4hei1lZ+l1M5/0vpU3+zE8jxaF5ZQus0ch8ls6SMzMqNeeIheRTqTM/EzrGYVMyZTIalejHdjkCdBnUOd9nHvCb6ZaYZ7VWcc6ksnVMyZSWTK2IZr1aKhn9F3Yp9DU7RyKz9HP6J5qbTVFj4Li1c5ZsYsuZKhR3VChyVKZE9yFVtaKroz2ZzTXTqHUVGwcAmunXE1TCa+ZIEqiGVHSZLnDvK8ZNeMKEPSc1vvPjbzvI247roppfq0rRAxVNOOErX9jLuPgCqbcRMrNPm8R8tzLLYudwxO7rlV2pMd53HhGe8uCk1Tvq5DwY/5W80vUaL7Z/wBxvzP8l473WrQhCAQhCASZH2BJ3AnuCUq/T82GlqHcIpB2lpA+aDyHS1Xho66QnN0BZfrmla0+BcsHC/Ja3Wx+HR792Oopo+qzWvkI8Asaw5L1ugpmsz8sfU25iEkSJ+OdQcSW163bGbclVD7i/BRukXS9RypxhHdKbKpDJVXhyeY9XVlVaq4pZsu1Sm1FrKpp35J8yKzDJavKyfUrtPNdyrDMnqaW1yqph3jhYyVN3FdEyrGzJ0SqmU4TxKuulUISpXSKuRdUcvoHtU/VoXqmH3WTP7DGY/nIFS0MmR/vcr3VCO88r/chDP8AclaR/wAJWXXnFJW9NzrVhpdJPtDJ1hre9w/krbUyO0Dne9I7wACo9Lu+qA4vH4Wn+a02q7bUsXXiP4yvJe6tUIQgEIQgFRa6y2opR72Fne4X8Ar1RNJaLinZglBIviFnFtja18uaDyaOdzQWgjCcy1zWPaTxLXAi6Z+g0z8WOhpX5Xc5ofA+3HFG4fJbyq/w9jP2Ur29TgHKnqdSKply3o35HMGxtwzTNq+2cSWjMMfPqpQSep9LpnHYA6OojHxAO8VDd/h87Po6unPASNlgPabOC08uhalhziflyK76TfWY9vWWuA71pr1etX8v55Vzo0nwxVXqNXsBLYOmaPaheycdgacXgqGpp3xkiVj4iNoexzLd4XqrJRtBHMbU59OkGx7+V8Q7itFfqF/yiJ/pVPS18S8jaU40r0qshgkuZqSklJ2u6LoJT/5Ii0qnn1Yo3G7W1MHUyVsrRyDxfxWin1Cn5RMKrdLbxLMwHIJxzlfP1QZ/o1beps8L4vxxl48FBqtWqppyjZMNxikZLfk0HF3gLZXrNG3a3+Mdun1InsrcSeDrN5puppZYj9dFLF99jmjvIsh8oNrEbF3uieYlVNZjiS2uTocmWlOtVcoOtcnGlNNTjVVLlNon7exavUxotUP3l8UZ/hY93/0WPgNitnqi0dA8+9NJf+FrGrH1M/ZLR0dc6ufhY6Xd9mPvH5BbPQkWGnhH7DXfEMXmsXpPN0bf2fFzit/EzC1rRuAHcLLzHtFoQhAIQhAIQhALhC6hAxJCDtAPYocmjY/caN+XonvCsrJJYgztVq5C65tn15gfI+KrKnVNvsEjk7aeRBC2LokxKwAEkgAbScggwU2rUw3X7Ae8g+Sr5dDTN9jF1tIPhkVtKvTcLdl38sm958rqrn1jJ2NYObcZHacvBE5ZSSNzfXa5n3gW/NIsOpXFdWPfm15jcPaAbY9Tm2sQqt2lXg4Z4KeT9oNMTiOIcz+SGSoauRuTJJGjgHOw/DsXJaeGU3mp6aQna7omxPPN8WEntSPp9OTnHPF91zZR3OsfFS6c0zvUq4gfdla6E9+Y8UiZjtwicT3RXaqUL/YqIDxjmEjR/BIL/iUKp1F3wVbXcGzRPiPa9uJq08VE8+rhk643sk+RSjER6wLeYIV1dfUjyqtoac+GLfqjXtuWxxzAfqpopCeTb4vBV9RHNESJoJorbccbmgdpFl6I7ZfrGdrkC+ZUptR7LZHPFr2OwZ7LG4VsdXfyot0dJ7PMYa1p3r0DVgD6JCR7XSvPbK+3gAn59GU8l+kp6Z99pMQa/wCNliFJpoGtDWMaGMFmtYLkNbsAF8+9caut6kYTodP6VpnJWDFVRt4OhZ3WK3ixGi246trv3hd2DJbdZ2sIQhAIQhAIQhAIQhAIQkveACTsAJPIII+kNIMibieeQ3krG6Q0lLMc3YRuaMgEmurXTPL3b9g90bgmmtQRjR39pc/6ceI8VPaxOMiQVJ0a7q70zPotxFiCfJaNtMummQYybRHAkcwq+o0RJuDXdtvmt5LBxAPYoktE07rckHnj6Z8Zvhcw8RceIVpo7WeqZ6PTvcNwfaVvL0rrRy6P4WPUqup0Mw7WAHiPRKCVBrG8/aQwv62h0R8MlaU2kad/syxHf6sg8M1no6fDtu7rKkxyINPBQ4wXRPa8DI3BaU7Ho6XE30CcxmPStnvtsVTofSBjeDnbeOpbgYXDMAg57kETQmjQwl/Ox457VdXUdhTrSgcQuArqAQhCAQhCAQhCAUbSQvDKP3b/AMpUlcI3IPPWtTrWqZpDR5jkwbSQXR7frGjhxeBtHIqOwIFRsUqONIjYpEYQOsjXXRpTV0oIczEzHBe6lSrlIM3DqBQV0kQDi12zceCjVEBGThy4FW2k4Mg7hkeRUSGUEdHJmD6p4FBTy0oUKSnI2K7q6UsPEbj5KG9qCPSDMf3sW7oHWYwH3R8lnNC6IL3E2u1pGI7hvw9Z48LrUsgsgfY5SGJmNifa1AsJS4AuoBCEIBCEIBCEIBCEIGaukZKwskGIHsIO4gjMHrVBXaKljscLqloyxtwipaN2Jps2Xnkea0qEGSiwl2Fj2ud+rP1cw5xuse5SOjI9YFvMEK6r9FQzjDNEyQbrjNvW121p5KH/AJfwi0FRUwjc0vE7AOGGUO+aCK1DkP0ZXNvhlop+AfBJAe10bj8kjoK32qWjd9yqlb+aNA29cpzZ3YU4aeqP/Zxc/ppt/wAaR9BrPZpaRvW6pldb4WoHJSCCDvyVMYXG4AJtfYL+KuY9A1bj6c1NGOEcBkPxPd5KX/leNw+uknn4gydGw/wR4QgzjZS4dH9o73GDpZO4ZDmSFY6M1Xe4YpvqWn2AcUrhwc7Y3kL81pKOhjibgiYyNvBrQ0c+tPoGoaZrGhrGhoGwAWCUYwloQJDF2y6hAIQhAIQhAIQhAIQhAIQhAIQhAIQhAIQhAIQhAIQhAIQhAIQhAIQhAIQhAIQhB//Z">
+            <a:extLst>
+              <a:ext uri="{FF2B5EF4-FFF2-40B4-BE49-F238E27FC236}">
+                <a16:creationId xmlns:a16="http://schemas.microsoft.com/office/drawing/2014/main" id="{15B92B98-B7C8-4A75-A841-F25CD0136DE7}"/>
               </a:ext>
             </a:extLst>
           </p:cNvPr>
@@ -4369,10 +4329,10 @@
       </p:sp>
       <p:grpSp>
         <p:nvGrpSpPr>
-          <p:cNvPr id="6" name="群組 5">
-            <a:extLst>
-              <a:ext uri="{FF2B5EF4-FFF2-40B4-BE49-F238E27FC236}">
-                <a16:creationId xmlns:a16="http://schemas.microsoft.com/office/drawing/2014/main" xmlns="" id="{74DF11E3-9C59-4162-9CA2-A939607651A2}"/>
+          <p:cNvPr id="17" name="群組 16">
+            <a:extLst>
+              <a:ext uri="{FF2B5EF4-FFF2-40B4-BE49-F238E27FC236}">
+                <a16:creationId xmlns:a16="http://schemas.microsoft.com/office/drawing/2014/main" id="{3E62AE25-4106-44ED-8F4E-D5D956A394D2}"/>
               </a:ext>
             </a:extLst>
           </p:cNvPr>
@@ -4389,10 +4349,10 @@
         </p:grpSpPr>
         <p:pic>
           <p:nvPicPr>
-            <p:cNvPr id="7" name="圖片 6">
+            <p:cNvPr id="18" name="圖片 17">
               <a:extLst>
                 <a:ext uri="{FF2B5EF4-FFF2-40B4-BE49-F238E27FC236}">
-                  <a16:creationId xmlns:a16="http://schemas.microsoft.com/office/drawing/2014/main" xmlns="" id="{4AD4BCEB-4B11-4913-8D7C-58CC9858D4CF}"/>
+                  <a16:creationId xmlns:a16="http://schemas.microsoft.com/office/drawing/2014/main" id="{DF00FD23-F9E0-40CA-BFAD-2BC20441329D}"/>
                 </a:ext>
               </a:extLst>
             </p:cNvPr>
@@ -4425,10 +4385,10 @@
         </p:pic>
         <p:sp>
           <p:nvSpPr>
-            <p:cNvPr id="8" name="文字方塊 7">
+            <p:cNvPr id="19" name="文字方塊 18">
               <a:extLst>
                 <a:ext uri="{FF2B5EF4-FFF2-40B4-BE49-F238E27FC236}">
-                  <a16:creationId xmlns:a16="http://schemas.microsoft.com/office/drawing/2014/main" xmlns="" id="{2932AF25-1F93-4171-8FA4-AF04D9B1A7A5}"/>
+                  <a16:creationId xmlns:a16="http://schemas.microsoft.com/office/drawing/2014/main" id="{14F08A50-B905-4E9F-B65E-EEFCE05DA4E3}"/>
                 </a:ext>
               </a:extLst>
             </p:cNvPr>
@@ -4480,10 +4440,10 @@
       </p:grpSp>
       <p:sp>
         <p:nvSpPr>
-          <p:cNvPr id="9" name="矩形 8">
-            <a:extLst>
-              <a:ext uri="{FF2B5EF4-FFF2-40B4-BE49-F238E27FC236}">
-                <a16:creationId xmlns:a16="http://schemas.microsoft.com/office/drawing/2014/main" xmlns="" id="{61D13771-887B-4EDB-B31B-0D7C427BA003}"/>
+          <p:cNvPr id="35" name="矩形 34">
+            <a:extLst>
+              <a:ext uri="{FF2B5EF4-FFF2-40B4-BE49-F238E27FC236}">
+                <a16:creationId xmlns:a16="http://schemas.microsoft.com/office/drawing/2014/main" id="{A3837EC7-3FF7-497F-B8B9-5A0B2AE1FAD0}"/>
               </a:ext>
             </a:extLst>
           </p:cNvPr>
@@ -4519,10 +4479,10 @@
       </p:sp>
       <p:sp>
         <p:nvSpPr>
-          <p:cNvPr id="10" name="矩形 9">
-            <a:extLst>
-              <a:ext uri="{FF2B5EF4-FFF2-40B4-BE49-F238E27FC236}">
-                <a16:creationId xmlns:a16="http://schemas.microsoft.com/office/drawing/2014/main" xmlns="" id="{0C90415A-7A0C-4B24-81D4-0EF230952877}"/>
+          <p:cNvPr id="37" name="矩形 36">
+            <a:extLst>
+              <a:ext uri="{FF2B5EF4-FFF2-40B4-BE49-F238E27FC236}">
+                <a16:creationId xmlns:a16="http://schemas.microsoft.com/office/drawing/2014/main" id="{79B0EFC5-385A-4CBF-8F26-44920131D317}"/>
               </a:ext>
             </a:extLst>
           </p:cNvPr>
@@ -4572,10 +4532,10 @@
       </p:sp>
       <p:sp>
         <p:nvSpPr>
-          <p:cNvPr id="11" name="圓角矩形 6">
-            <a:extLst>
-              <a:ext uri="{FF2B5EF4-FFF2-40B4-BE49-F238E27FC236}">
-                <a16:creationId xmlns:a16="http://schemas.microsoft.com/office/drawing/2014/main" xmlns="" id="{F8757F56-02DD-40A4-8A94-26C291615795}"/>
+          <p:cNvPr id="38" name="圓角矩形 6">
+            <a:extLst>
+              <a:ext uri="{FF2B5EF4-FFF2-40B4-BE49-F238E27FC236}">
+                <a16:creationId xmlns:a16="http://schemas.microsoft.com/office/drawing/2014/main" id="{AA3F0518-490B-4DDF-BB4F-AE947406C799}"/>
               </a:ext>
             </a:extLst>
           </p:cNvPr>
@@ -4590,10 +4550,10 @@
           <a:prstGeom prst="roundRect">
             <a:avLst/>
           </a:prstGeom>
-          <a:ln w="19050">
+          <a:ln w="25400">
             <a:solidFill>
-              <a:schemeClr val="accent5">
-                <a:lumMod val="50000"/>
+              <a:schemeClr val="accent1">
+                <a:lumMod val="75000"/>
               </a:schemeClr>
             </a:solidFill>
             <a:prstDash val="sysDash"/>
@@ -4627,10 +4587,10 @@
       </p:sp>
       <p:sp>
         <p:nvSpPr>
-          <p:cNvPr id="12" name="文字方塊 11">
-            <a:extLst>
-              <a:ext uri="{FF2B5EF4-FFF2-40B4-BE49-F238E27FC236}">
-                <a16:creationId xmlns:a16="http://schemas.microsoft.com/office/drawing/2014/main" xmlns="" id="{762D0A24-AF69-4B6E-8CB4-4D8CCEE93CCE}"/>
+          <p:cNvPr id="48" name="文字方塊 47">
+            <a:extLst>
+              <a:ext uri="{FF2B5EF4-FFF2-40B4-BE49-F238E27FC236}">
+                <a16:creationId xmlns:a16="http://schemas.microsoft.com/office/drawing/2014/main" id="{0DF6CDA6-2149-48ED-A2DB-F56C93DC8F7D}"/>
               </a:ext>
             </a:extLst>
           </p:cNvPr>
@@ -4681,10 +4641,10 @@
       </p:sp>
       <p:sp>
         <p:nvSpPr>
-          <p:cNvPr id="13" name="矩形 12">
-            <a:extLst>
-              <a:ext uri="{FF2B5EF4-FFF2-40B4-BE49-F238E27FC236}">
-                <a16:creationId xmlns:a16="http://schemas.microsoft.com/office/drawing/2014/main" xmlns="" id="{17ED7585-5FF1-4090-B626-A090BB0B116B}"/>
+          <p:cNvPr id="49" name="矩形 48">
+            <a:extLst>
+              <a:ext uri="{FF2B5EF4-FFF2-40B4-BE49-F238E27FC236}">
+                <a16:creationId xmlns:a16="http://schemas.microsoft.com/office/drawing/2014/main" id="{7C6A78A2-117B-4511-A337-A22A0D832DD5}"/>
               </a:ext>
             </a:extLst>
           </p:cNvPr>
@@ -4734,10 +4694,10 @@
       </p:sp>
       <p:pic>
         <p:nvPicPr>
-          <p:cNvPr id="14" name="圖片 13">
-            <a:extLst>
-              <a:ext uri="{FF2B5EF4-FFF2-40B4-BE49-F238E27FC236}">
-                <a16:creationId xmlns:a16="http://schemas.microsoft.com/office/drawing/2014/main" xmlns="" id="{9BC22A68-D7A8-40D2-A973-36183B470786}"/>
+          <p:cNvPr id="51" name="圖片 50">
+            <a:extLst>
+              <a:ext uri="{FF2B5EF4-FFF2-40B4-BE49-F238E27FC236}">
+                <a16:creationId xmlns:a16="http://schemas.microsoft.com/office/drawing/2014/main" id="{360008C4-4A7C-4F98-BDE4-D845F6D06F74}"/>
               </a:ext>
             </a:extLst>
           </p:cNvPr>
@@ -4770,10 +4730,10 @@
       </p:pic>
       <p:sp>
         <p:nvSpPr>
-          <p:cNvPr id="15" name="矩形 14">
-            <a:extLst>
-              <a:ext uri="{FF2B5EF4-FFF2-40B4-BE49-F238E27FC236}">
-                <a16:creationId xmlns:a16="http://schemas.microsoft.com/office/drawing/2014/main" xmlns="" id="{22FF2DC1-64FC-43FC-B98D-6C5A88F63F47}"/>
+          <p:cNvPr id="52" name="矩形 51">
+            <a:extLst>
+              <a:ext uri="{FF2B5EF4-FFF2-40B4-BE49-F238E27FC236}">
+                <a16:creationId xmlns:a16="http://schemas.microsoft.com/office/drawing/2014/main" id="{849940C1-270B-4DDA-82FD-843CAA8ED7ED}"/>
               </a:ext>
             </a:extLst>
           </p:cNvPr>
@@ -4816,16 +4776,16 @@
       </p:sp>
       <p:cxnSp>
         <p:nvCxnSpPr>
-          <p:cNvPr id="16" name="直線單箭頭接點 15">
-            <a:extLst>
-              <a:ext uri="{FF2B5EF4-FFF2-40B4-BE49-F238E27FC236}">
-                <a16:creationId xmlns:a16="http://schemas.microsoft.com/office/drawing/2014/main" xmlns="" id="{C93A3381-6625-4A16-AA19-13522514D565}"/>
+          <p:cNvPr id="55" name="直線單箭頭接點 54">
+            <a:extLst>
+              <a:ext uri="{FF2B5EF4-FFF2-40B4-BE49-F238E27FC236}">
+                <a16:creationId xmlns:a16="http://schemas.microsoft.com/office/drawing/2014/main" id="{A8AC5B70-F649-4DB5-AE32-A6F5581DFE4C}"/>
               </a:ext>
             </a:extLst>
           </p:cNvPr>
           <p:cNvCxnSpPr>
             <a:cxnSpLocks/>
-            <a:stCxn id="10" idx="3"/>
+            <a:stCxn id="37" idx="3"/>
           </p:cNvCxnSpPr>
           <p:nvPr/>
         </p:nvCxnSpPr>
@@ -4858,10 +4818,10 @@
       </p:cxnSp>
       <p:sp>
         <p:nvSpPr>
-          <p:cNvPr id="17" name="圓角矩形 6">
-            <a:extLst>
-              <a:ext uri="{FF2B5EF4-FFF2-40B4-BE49-F238E27FC236}">
-                <a16:creationId xmlns:a16="http://schemas.microsoft.com/office/drawing/2014/main" xmlns="" id="{6ABEE6DB-9402-4004-B1E7-1D70DAE89DA0}"/>
+          <p:cNvPr id="58" name="圓角矩形 6">
+            <a:extLst>
+              <a:ext uri="{FF2B5EF4-FFF2-40B4-BE49-F238E27FC236}">
+                <a16:creationId xmlns:a16="http://schemas.microsoft.com/office/drawing/2014/main" id="{E0994BA9-38F8-40E8-8EAA-1E120C08B215}"/>
               </a:ext>
             </a:extLst>
           </p:cNvPr>
@@ -4871,12 +4831,17 @@
         <p:spPr>
           <a:xfrm>
             <a:off x="8028782" y="1795636"/>
-            <a:ext cx="3055627" cy="2142064"/>
+            <a:ext cx="3430715" cy="2142064"/>
           </a:xfrm>
           <a:prstGeom prst="roundRect">
             <a:avLst/>
           </a:prstGeom>
-          <a:ln w="19050">
+          <a:ln w="25400">
+            <a:solidFill>
+              <a:schemeClr val="accent1">
+                <a:lumMod val="75000"/>
+              </a:schemeClr>
+            </a:solidFill>
             <a:prstDash val="sysDash"/>
           </a:ln>
         </p:spPr>
@@ -4906,36 +4871,81 @@
           </a:p>
         </p:txBody>
       </p:sp>
-      <p:sp>
-        <p:nvSpPr>
-          <p:cNvPr id="18" name="文字方塊 17">
-            <a:extLst>
-              <a:ext uri="{FF2B5EF4-FFF2-40B4-BE49-F238E27FC236}">
-                <a16:creationId xmlns:a16="http://schemas.microsoft.com/office/drawing/2014/main" xmlns="" id="{948582BB-7035-4A11-BD5F-EC60FC0F15C1}"/>
-              </a:ext>
-            </a:extLst>
-          </p:cNvPr>
-          <p:cNvSpPr txBox="1"/>
-          <p:nvPr/>
-        </p:nvSpPr>
-        <p:spPr>
-          <a:xfrm>
-            <a:off x="8795755" y="2672827"/>
-            <a:ext cx="2204450" cy="338554"/>
-          </a:xfrm>
-          <a:prstGeom prst="rect">
-            <a:avLst/>
-          </a:prstGeom>
-          <a:noFill/>
-        </p:spPr>
-        <p:txBody>
-          <a:bodyPr wrap="none" rtlCol="0">
-            <a:spAutoFit/>
-          </a:bodyPr>
-          <a:lstStyle/>
-          <a:p>
-            <a:r>
-              <a:rPr lang="en-US" altLang="zh-TW" sz="1600" b="1" dirty="0">
+      <p:grpSp>
+        <p:nvGrpSpPr>
+          <p:cNvPr id="9" name="群組 8">
+            <a:extLst>
+              <a:ext uri="{FF2B5EF4-FFF2-40B4-BE49-F238E27FC236}">
+                <a16:creationId xmlns:a16="http://schemas.microsoft.com/office/drawing/2014/main" id="{81309725-28E4-4A43-96F0-D93A7749F154}"/>
+              </a:ext>
+            </a:extLst>
+          </p:cNvPr>
+          <p:cNvGrpSpPr/>
+          <p:nvPr/>
+        </p:nvGrpSpPr>
+        <p:grpSpPr>
+          <a:xfrm>
+            <a:off x="8195956" y="2173043"/>
+            <a:ext cx="3054377" cy="613245"/>
+            <a:chOff x="8194302" y="2551167"/>
+            <a:chExt cx="2724587" cy="613245"/>
+          </a:xfrm>
+        </p:grpSpPr>
+        <p:sp>
+          <p:nvSpPr>
+            <p:cNvPr id="59" name="文字方塊 58">
+              <a:extLst>
+                <a:ext uri="{FF2B5EF4-FFF2-40B4-BE49-F238E27FC236}">
+                  <a16:creationId xmlns:a16="http://schemas.microsoft.com/office/drawing/2014/main" id="{CA8B39F2-1093-4652-9183-59D4A1FA31AE}"/>
+                </a:ext>
+              </a:extLst>
+            </p:cNvPr>
+            <p:cNvSpPr txBox="1"/>
+            <p:nvPr/>
+          </p:nvSpPr>
+          <p:spPr>
+            <a:xfrm>
+              <a:off x="8729341" y="2687864"/>
+              <a:ext cx="2150731" cy="338554"/>
+            </a:xfrm>
+            <a:prstGeom prst="rect">
+              <a:avLst/>
+            </a:prstGeom>
+            <a:noFill/>
+          </p:spPr>
+          <p:txBody>
+            <a:bodyPr wrap="square" rtlCol="0">
+              <a:spAutoFit/>
+            </a:bodyPr>
+            <a:lstStyle/>
+            <a:p>
+              <a:r>
+                <a:rPr lang="en-US" altLang="zh-TW" sz="1600" b="1" dirty="0" err="1">
+                  <a:solidFill>
+                    <a:schemeClr val="tx2">
+                      <a:lumMod val="75000"/>
+                    </a:schemeClr>
+                  </a:solidFill>
+                  <a:latin typeface="Consolas" panose="020B0609020204030204" pitchFamily="49" charset="0"/>
+                  <a:ea typeface="微軟正黑體" panose="020B0604030504040204" pitchFamily="34" charset="-120"/>
+                  <a:cs typeface="Consolas" panose="020B0609020204030204" pitchFamily="49" charset="0"/>
+                </a:rPr>
+                <a:t>OpenLDAP</a:t>
+              </a:r>
+              <a:r>
+                <a:rPr lang="en-US" altLang="zh-TW" sz="1600" b="1" dirty="0">
+                  <a:solidFill>
+                    <a:schemeClr val="tx2">
+                      <a:lumMod val="75000"/>
+                    </a:schemeClr>
+                  </a:solidFill>
+                  <a:latin typeface="Consolas" panose="020B0609020204030204" pitchFamily="49" charset="0"/>
+                  <a:ea typeface="微軟正黑體" panose="020B0604030504040204" pitchFamily="34" charset="-120"/>
+                  <a:cs typeface="Consolas" panose="020B0609020204030204" pitchFamily="49" charset="0"/>
+                </a:rPr>
+                <a:t> container A</a:t>
+              </a:r>
+              <a:endParaRPr lang="zh-TW" altLang="en-US" sz="1600" b="1" dirty="0">
                 <a:solidFill>
                   <a:schemeClr val="tx2">
                     <a:lumMod val="75000"/>
@@ -4944,117 +4954,106 @@
                 <a:latin typeface="Consolas" panose="020B0609020204030204" pitchFamily="49" charset="0"/>
                 <a:ea typeface="微軟正黑體" panose="020B0604030504040204" pitchFamily="34" charset="-120"/>
                 <a:cs typeface="Consolas" panose="020B0609020204030204" pitchFamily="49" charset="0"/>
-              </a:rPr>
-              <a:t>OpenLDAP container</a:t>
-            </a:r>
-            <a:endParaRPr lang="zh-TW" altLang="en-US" sz="1600" b="1" dirty="0">
-              <a:solidFill>
-                <a:schemeClr val="tx2">
-                  <a:lumMod val="75000"/>
-                </a:schemeClr>
-              </a:solidFill>
-              <a:latin typeface="Consolas" panose="020B0609020204030204" pitchFamily="49" charset="0"/>
-              <a:ea typeface="微軟正黑體" panose="020B0604030504040204" pitchFamily="34" charset="-120"/>
-              <a:cs typeface="Consolas" panose="020B0609020204030204" pitchFamily="49" charset="0"/>
-            </a:endParaRPr>
-          </a:p>
-        </p:txBody>
-      </p:sp>
-      <p:sp>
-        <p:nvSpPr>
-          <p:cNvPr id="19" name="矩形 18">
-            <a:extLst>
-              <a:ext uri="{FF2B5EF4-FFF2-40B4-BE49-F238E27FC236}">
-                <a16:creationId xmlns:a16="http://schemas.microsoft.com/office/drawing/2014/main" xmlns="" id="{D7B8F306-445F-44F9-B928-FA9479D63B7F}"/>
-              </a:ext>
-            </a:extLst>
-          </p:cNvPr>
-          <p:cNvSpPr/>
-          <p:nvPr/>
-        </p:nvSpPr>
-        <p:spPr>
-          <a:xfrm>
-            <a:off x="8194302" y="2551167"/>
-            <a:ext cx="2724587" cy="613245"/>
-          </a:xfrm>
-          <a:prstGeom prst="rect">
-            <a:avLst/>
-          </a:prstGeom>
-          <a:noFill/>
-          <a:ln>
-            <a:prstDash val="dash"/>
-          </a:ln>
-        </p:spPr>
-        <p:style>
-          <a:lnRef idx="2">
-            <a:schemeClr val="accent1">
-              <a:shade val="50000"/>
-            </a:schemeClr>
-          </a:lnRef>
-          <a:fillRef idx="1">
-            <a:schemeClr val="accent1"/>
-          </a:fillRef>
-          <a:effectRef idx="0">
-            <a:schemeClr val="accent1"/>
-          </a:effectRef>
-          <a:fontRef idx="minor">
-            <a:schemeClr val="lt1"/>
-          </a:fontRef>
-        </p:style>
-        <p:txBody>
-          <a:bodyPr rtlCol="0" anchor="ctr"/>
-          <a:lstStyle/>
-          <a:p>
-            <a:pPr algn="ctr"/>
-            <a:endParaRPr lang="zh-TW" altLang="en-US">
-              <a:latin typeface="Consolas" panose="020B0609020204030204" pitchFamily="49" charset="0"/>
-              <a:cs typeface="Consolas" panose="020B0609020204030204" pitchFamily="49" charset="0"/>
-            </a:endParaRPr>
-          </a:p>
-        </p:txBody>
-      </p:sp>
+              </a:endParaRPr>
+            </a:p>
+          </p:txBody>
+        </p:sp>
+        <p:sp>
+          <p:nvSpPr>
+            <p:cNvPr id="60" name="矩形 59">
+              <a:extLst>
+                <a:ext uri="{FF2B5EF4-FFF2-40B4-BE49-F238E27FC236}">
+                  <a16:creationId xmlns:a16="http://schemas.microsoft.com/office/drawing/2014/main" id="{3B93D6B4-AAC0-4BDA-8620-5B2577AB6EAB}"/>
+                </a:ext>
+              </a:extLst>
+            </p:cNvPr>
+            <p:cNvSpPr/>
+            <p:nvPr/>
+          </p:nvSpPr>
+          <p:spPr>
+            <a:xfrm>
+              <a:off x="8194302" y="2551167"/>
+              <a:ext cx="2724587" cy="613245"/>
+            </a:xfrm>
+            <a:prstGeom prst="rect">
+              <a:avLst/>
+            </a:prstGeom>
+            <a:noFill/>
+            <a:ln>
+              <a:prstDash val="dash"/>
+            </a:ln>
+          </p:spPr>
+          <p:style>
+            <a:lnRef idx="2">
+              <a:schemeClr val="accent1">
+                <a:shade val="50000"/>
+              </a:schemeClr>
+            </a:lnRef>
+            <a:fillRef idx="1">
+              <a:schemeClr val="accent1"/>
+            </a:fillRef>
+            <a:effectRef idx="0">
+              <a:schemeClr val="accent1"/>
+            </a:effectRef>
+            <a:fontRef idx="minor">
+              <a:schemeClr val="lt1"/>
+            </a:fontRef>
+          </p:style>
+          <p:txBody>
+            <a:bodyPr rtlCol="0" anchor="ctr"/>
+            <a:lstStyle/>
+            <a:p>
+              <a:pPr algn="ctr"/>
+              <a:endParaRPr lang="zh-TW" altLang="en-US">
+                <a:latin typeface="Consolas" panose="020B0609020204030204" pitchFamily="49" charset="0"/>
+                <a:cs typeface="Consolas" panose="020B0609020204030204" pitchFamily="49" charset="0"/>
+              </a:endParaRPr>
+            </a:p>
+          </p:txBody>
+        </p:sp>
+        <p:pic>
+          <p:nvPicPr>
+            <p:cNvPr id="61" name="圖片 60">
+              <a:extLst>
+                <a:ext uri="{FF2B5EF4-FFF2-40B4-BE49-F238E27FC236}">
+                  <a16:creationId xmlns:a16="http://schemas.microsoft.com/office/drawing/2014/main" id="{BE73BB19-43C0-469E-8622-D3B22AE9CFCC}"/>
+                </a:ext>
+              </a:extLst>
+            </p:cNvPr>
+            <p:cNvPicPr>
+              <a:picLocks noChangeAspect="1"/>
+            </p:cNvPicPr>
+            <p:nvPr/>
+          </p:nvPicPr>
+          <p:blipFill>
+            <a:blip r:embed="rId2" cstate="print">
+              <a:extLst>
+                <a:ext uri="{28A0092B-C50C-407E-A947-70E740481C1C}">
+                  <a14:useLocalDpi xmlns:a14="http://schemas.microsoft.com/office/drawing/2010/main" val="0"/>
+                </a:ext>
+              </a:extLst>
+            </a:blip>
+            <a:stretch>
+              <a:fillRect/>
+            </a:stretch>
+          </p:blipFill>
+          <p:spPr>
+            <a:xfrm>
+              <a:off x="8299046" y="2612725"/>
+              <a:ext cx="422295" cy="501739"/>
+            </a:xfrm>
+            <a:prstGeom prst="rect">
+              <a:avLst/>
+            </a:prstGeom>
+          </p:spPr>
+        </p:pic>
+      </p:grpSp>
       <p:pic>
         <p:nvPicPr>
-          <p:cNvPr id="20" name="圖片 19">
-            <a:extLst>
-              <a:ext uri="{FF2B5EF4-FFF2-40B4-BE49-F238E27FC236}">
-                <a16:creationId xmlns:a16="http://schemas.microsoft.com/office/drawing/2014/main" xmlns="" id="{C3450A85-5EC7-4447-864C-F9D3800716A4}"/>
-              </a:ext>
-            </a:extLst>
-          </p:cNvPr>
-          <p:cNvPicPr>
-            <a:picLocks noChangeAspect="1"/>
-          </p:cNvPicPr>
-          <p:nvPr/>
-        </p:nvPicPr>
-        <p:blipFill>
-          <a:blip r:embed="rId2" cstate="print">
-            <a:extLst>
-              <a:ext uri="{28A0092B-C50C-407E-A947-70E740481C1C}">
-                <a14:useLocalDpi xmlns:a14="http://schemas.microsoft.com/office/drawing/2010/main" val="0"/>
-              </a:ext>
-            </a:extLst>
-          </a:blip>
-          <a:stretch>
-            <a:fillRect/>
-          </a:stretch>
-        </p:blipFill>
-        <p:spPr>
-          <a:xfrm>
-            <a:off x="8283881" y="2612725"/>
-            <a:ext cx="422295" cy="501739"/>
-          </a:xfrm>
-          <a:prstGeom prst="rect">
-            <a:avLst/>
-          </a:prstGeom>
-        </p:spPr>
-      </p:pic>
-      <p:pic>
-        <p:nvPicPr>
-          <p:cNvPr id="21" name="圖片 20">
-            <a:extLst>
-              <a:ext uri="{FF2B5EF4-FFF2-40B4-BE49-F238E27FC236}">
-                <a16:creationId xmlns:a16="http://schemas.microsoft.com/office/drawing/2014/main" xmlns="" id="{09BE25E7-CFBD-4993-94A7-113CD2B2B51B}"/>
+          <p:cNvPr id="2" name="圖片 1">
+            <a:extLst>
+              <a:ext uri="{FF2B5EF4-FFF2-40B4-BE49-F238E27FC236}">
+                <a16:creationId xmlns:a16="http://schemas.microsoft.com/office/drawing/2014/main" id="{9719C86B-CFC1-4A17-B6CA-1F6C48A30850}"/>
               </a:ext>
             </a:extLst>
           </p:cNvPr>
@@ -5071,7 +5070,7 @@
         </p:blipFill>
         <p:spPr>
           <a:xfrm>
-            <a:off x="5515469" y="648984"/>
+            <a:off x="8795755" y="1612357"/>
             <a:ext cx="1407316" cy="366557"/>
           </a:xfrm>
           <a:prstGeom prst="rect">
@@ -5081,24 +5080,24 @@
       </p:pic>
       <p:cxnSp>
         <p:nvCxnSpPr>
-          <p:cNvPr id="22" name="直線單箭頭接點 21">
-            <a:extLst>
-              <a:ext uri="{FF2B5EF4-FFF2-40B4-BE49-F238E27FC236}">
-                <a16:creationId xmlns:a16="http://schemas.microsoft.com/office/drawing/2014/main" xmlns="" id="{2327516C-8D19-4517-81B1-A28B5CF78603}"/>
+          <p:cNvPr id="54" name="直線單箭頭接點 53">
+            <a:extLst>
+              <a:ext uri="{FF2B5EF4-FFF2-40B4-BE49-F238E27FC236}">
+                <a16:creationId xmlns:a16="http://schemas.microsoft.com/office/drawing/2014/main" id="{9CD041CD-9441-4679-8E66-FF8013D04890}"/>
               </a:ext>
             </a:extLst>
           </p:cNvPr>
           <p:cNvCxnSpPr>
             <a:cxnSpLocks/>
-            <a:stCxn id="13" idx="3"/>
-            <a:endCxn id="19" idx="1"/>
+            <a:stCxn id="49" idx="3"/>
+            <a:endCxn id="60" idx="1"/>
           </p:cNvCxnSpPr>
           <p:nvPr/>
         </p:nvCxnSpPr>
         <p:spPr>
-          <a:xfrm>
-            <a:off x="7638419" y="2850983"/>
-            <a:ext cx="555883" cy="6807"/>
+          <a:xfrm flipV="1">
+            <a:off x="7638419" y="2479666"/>
+            <a:ext cx="557536" cy="371317"/>
           </a:xfrm>
           <a:prstGeom prst="straightConnector1">
             <a:avLst/>
@@ -5122,154 +5121,229 @@
           </a:fontRef>
         </p:style>
       </p:cxnSp>
-      <p:sp>
-        <p:nvSpPr>
-          <p:cNvPr id="24" name="橢圓 23">
-            <a:extLst>
-              <a:ext uri="{FF2B5EF4-FFF2-40B4-BE49-F238E27FC236}">
-                <a16:creationId xmlns:a16="http://schemas.microsoft.com/office/drawing/2014/main" xmlns="" id="{F1BF4D60-9F72-41E0-9967-9E63C2F532F7}"/>
-              </a:ext>
-            </a:extLst>
-          </p:cNvPr>
-          <p:cNvSpPr/>
-          <p:nvPr/>
-        </p:nvSpPr>
-        <p:spPr>
-          <a:xfrm>
-            <a:off x="1096151" y="3287843"/>
-            <a:ext cx="1094412" cy="1094412"/>
-          </a:xfrm>
-          <a:prstGeom prst="ellipse">
-            <a:avLst/>
-          </a:prstGeom>
+      <p:grpSp>
+        <p:nvGrpSpPr>
+          <p:cNvPr id="30" name="群組 29">
+            <a:extLst>
+              <a:ext uri="{FF2B5EF4-FFF2-40B4-BE49-F238E27FC236}">
+                <a16:creationId xmlns:a16="http://schemas.microsoft.com/office/drawing/2014/main" id="{BC02D5A9-14BD-457C-9AED-EDAAA42952AF}"/>
+              </a:ext>
+            </a:extLst>
+          </p:cNvPr>
+          <p:cNvGrpSpPr/>
+          <p:nvPr/>
+        </p:nvGrpSpPr>
+        <p:grpSpPr>
+          <a:xfrm>
+            <a:off x="8195956" y="2960212"/>
+            <a:ext cx="3054377" cy="613245"/>
+            <a:chOff x="8194302" y="2551167"/>
+            <a:chExt cx="2724587" cy="613245"/>
+          </a:xfrm>
+        </p:grpSpPr>
+        <p:sp>
+          <p:nvSpPr>
+            <p:cNvPr id="31" name="文字方塊 30">
+              <a:extLst>
+                <a:ext uri="{FF2B5EF4-FFF2-40B4-BE49-F238E27FC236}">
+                  <a16:creationId xmlns:a16="http://schemas.microsoft.com/office/drawing/2014/main" id="{69C67FF2-A880-4980-BB33-A8AE893C9671}"/>
+                </a:ext>
+              </a:extLst>
+            </p:cNvPr>
+            <p:cNvSpPr txBox="1"/>
+            <p:nvPr/>
+          </p:nvSpPr>
+          <p:spPr>
+            <a:xfrm>
+              <a:off x="8729341" y="2687864"/>
+              <a:ext cx="2150731" cy="338554"/>
+            </a:xfrm>
+            <a:prstGeom prst="rect">
+              <a:avLst/>
+            </a:prstGeom>
+            <a:noFill/>
+          </p:spPr>
+          <p:txBody>
+            <a:bodyPr wrap="square" rtlCol="0">
+              <a:spAutoFit/>
+            </a:bodyPr>
+            <a:lstStyle/>
+            <a:p>
+              <a:r>
+                <a:rPr lang="en-US" altLang="zh-TW" sz="1600" b="1" dirty="0" err="1">
+                  <a:solidFill>
+                    <a:schemeClr val="tx2">
+                      <a:lumMod val="75000"/>
+                    </a:schemeClr>
+                  </a:solidFill>
+                  <a:latin typeface="Consolas" panose="020B0609020204030204" pitchFamily="49" charset="0"/>
+                  <a:ea typeface="微軟正黑體" panose="020B0604030504040204" pitchFamily="34" charset="-120"/>
+                  <a:cs typeface="Consolas" panose="020B0609020204030204" pitchFamily="49" charset="0"/>
+                </a:rPr>
+                <a:t>OpenLDAP</a:t>
+              </a:r>
+              <a:r>
+                <a:rPr lang="en-US" altLang="zh-TW" sz="1600" b="1" dirty="0">
+                  <a:solidFill>
+                    <a:schemeClr val="tx2">
+                      <a:lumMod val="75000"/>
+                    </a:schemeClr>
+                  </a:solidFill>
+                  <a:latin typeface="Consolas" panose="020B0609020204030204" pitchFamily="49" charset="0"/>
+                  <a:ea typeface="微軟正黑體" panose="020B0604030504040204" pitchFamily="34" charset="-120"/>
+                  <a:cs typeface="Consolas" panose="020B0609020204030204" pitchFamily="49" charset="0"/>
+                </a:rPr>
+                <a:t> container B</a:t>
+              </a:r>
+              <a:endParaRPr lang="zh-TW" altLang="en-US" sz="1600" b="1" dirty="0">
+                <a:solidFill>
+                  <a:schemeClr val="tx2">
+                    <a:lumMod val="75000"/>
+                  </a:schemeClr>
+                </a:solidFill>
+                <a:latin typeface="Consolas" panose="020B0609020204030204" pitchFamily="49" charset="0"/>
+                <a:ea typeface="微軟正黑體" panose="020B0604030504040204" pitchFamily="34" charset="-120"/>
+                <a:cs typeface="Consolas" panose="020B0609020204030204" pitchFamily="49" charset="0"/>
+              </a:endParaRPr>
+            </a:p>
+          </p:txBody>
+        </p:sp>
+        <p:sp>
+          <p:nvSpPr>
+            <p:cNvPr id="32" name="矩形 31">
+              <a:extLst>
+                <a:ext uri="{FF2B5EF4-FFF2-40B4-BE49-F238E27FC236}">
+                  <a16:creationId xmlns:a16="http://schemas.microsoft.com/office/drawing/2014/main" id="{AD8B558B-E1E1-41CB-BDB4-A5FA9BC25A6F}"/>
+                </a:ext>
+              </a:extLst>
+            </p:cNvPr>
+            <p:cNvSpPr/>
+            <p:nvPr/>
+          </p:nvSpPr>
+          <p:spPr>
+            <a:xfrm>
+              <a:off x="8194302" y="2551167"/>
+              <a:ext cx="2724587" cy="613245"/>
+            </a:xfrm>
+            <a:prstGeom prst="rect">
+              <a:avLst/>
+            </a:prstGeom>
+            <a:noFill/>
+            <a:ln>
+              <a:prstDash val="dash"/>
+            </a:ln>
+          </p:spPr>
+          <p:style>
+            <a:lnRef idx="2">
+              <a:schemeClr val="accent1">
+                <a:shade val="50000"/>
+              </a:schemeClr>
+            </a:lnRef>
+            <a:fillRef idx="1">
+              <a:schemeClr val="accent1"/>
+            </a:fillRef>
+            <a:effectRef idx="0">
+              <a:schemeClr val="accent1"/>
+            </a:effectRef>
+            <a:fontRef idx="minor">
+              <a:schemeClr val="lt1"/>
+            </a:fontRef>
+          </p:style>
+          <p:txBody>
+            <a:bodyPr rtlCol="0" anchor="ctr"/>
+            <a:lstStyle/>
+            <a:p>
+              <a:pPr algn="ctr"/>
+              <a:endParaRPr lang="zh-TW" altLang="en-US">
+                <a:latin typeface="Consolas" panose="020B0609020204030204" pitchFamily="49" charset="0"/>
+                <a:cs typeface="Consolas" panose="020B0609020204030204" pitchFamily="49" charset="0"/>
+              </a:endParaRPr>
+            </a:p>
+          </p:txBody>
+        </p:sp>
+        <p:pic>
+          <p:nvPicPr>
+            <p:cNvPr id="33" name="圖片 32">
+              <a:extLst>
+                <a:ext uri="{FF2B5EF4-FFF2-40B4-BE49-F238E27FC236}">
+                  <a16:creationId xmlns:a16="http://schemas.microsoft.com/office/drawing/2014/main" id="{66A1C891-CC35-4BAD-9866-C4DCEBC92B6D}"/>
+                </a:ext>
+              </a:extLst>
+            </p:cNvPr>
+            <p:cNvPicPr>
+              <a:picLocks noChangeAspect="1"/>
+            </p:cNvPicPr>
+            <p:nvPr/>
+          </p:nvPicPr>
+          <p:blipFill>
+            <a:blip r:embed="rId2" cstate="print">
+              <a:extLst>
+                <a:ext uri="{28A0092B-C50C-407E-A947-70E740481C1C}">
+                  <a14:useLocalDpi xmlns:a14="http://schemas.microsoft.com/office/drawing/2010/main" val="0"/>
+                </a:ext>
+              </a:extLst>
+            </a:blip>
+            <a:stretch>
+              <a:fillRect/>
+            </a:stretch>
+          </p:blipFill>
+          <p:spPr>
+            <a:xfrm>
+              <a:off x="8299046" y="2612725"/>
+              <a:ext cx="422295" cy="501739"/>
+            </a:xfrm>
+            <a:prstGeom prst="rect">
+              <a:avLst/>
+            </a:prstGeom>
+          </p:spPr>
+        </p:pic>
+      </p:grpSp>
+      <p:cxnSp>
+        <p:nvCxnSpPr>
+          <p:cNvPr id="34" name="直線單箭頭接點 33">
+            <a:extLst>
+              <a:ext uri="{FF2B5EF4-FFF2-40B4-BE49-F238E27FC236}">
+                <a16:creationId xmlns:a16="http://schemas.microsoft.com/office/drawing/2014/main" id="{B7C10416-5301-483F-8A03-04290F9AE32D}"/>
+              </a:ext>
+            </a:extLst>
+          </p:cNvPr>
+          <p:cNvCxnSpPr>
+            <a:cxnSpLocks/>
+            <a:stCxn id="49" idx="3"/>
+          </p:cNvCxnSpPr>
+          <p:nvPr/>
+        </p:nvCxnSpPr>
+        <p:spPr>
+          <a:xfrm>
+            <a:off x="7638419" y="2850983"/>
+            <a:ext cx="557536" cy="415203"/>
+          </a:xfrm>
+          <a:prstGeom prst="straightConnector1">
+            <a:avLst/>
+          </a:prstGeom>
+          <a:ln>
+            <a:tailEnd type="arrow"/>
+          </a:ln>
         </p:spPr>
         <p:style>
-          <a:lnRef idx="2">
-            <a:schemeClr val="accent2"/>
+          <a:lnRef idx="1">
+            <a:schemeClr val="accent1"/>
           </a:lnRef>
-          <a:fillRef idx="1">
-            <a:schemeClr val="lt1"/>
+          <a:fillRef idx="0">
+            <a:schemeClr val="accent1"/>
           </a:fillRef>
           <a:effectRef idx="0">
-            <a:schemeClr val="accent2"/>
+            <a:schemeClr val="accent1"/>
           </a:effectRef>
           <a:fontRef idx="minor">
-            <a:schemeClr val="dk1"/>
+            <a:schemeClr val="tx1"/>
           </a:fontRef>
         </p:style>
-        <p:txBody>
-          <a:bodyPr rtlCol="0" anchor="ctr"/>
-          <a:lstStyle/>
-          <a:p>
-            <a:pPr algn="ctr"/>
-            <a:r>
-              <a:rPr lang="en-US" altLang="zh-TW" sz="1600" dirty="0"/>
-              <a:t>Role based</a:t>
-            </a:r>
-            <a:endParaRPr lang="zh-TW" altLang="en-US" sz="1600" dirty="0"/>
-          </a:p>
-        </p:txBody>
-      </p:sp>
-      <p:sp>
-        <p:nvSpPr>
-          <p:cNvPr id="25" name="橢圓 24">
-            <a:extLst>
-              <a:ext uri="{FF2B5EF4-FFF2-40B4-BE49-F238E27FC236}">
-                <a16:creationId xmlns:a16="http://schemas.microsoft.com/office/drawing/2014/main" xmlns="" id="{9FB09A2C-94DC-4488-A120-439B2CEE2E5F}"/>
-              </a:ext>
-            </a:extLst>
-          </p:cNvPr>
-          <p:cNvSpPr/>
-          <p:nvPr/>
-        </p:nvSpPr>
-        <p:spPr>
-          <a:xfrm>
-            <a:off x="2316397" y="3287843"/>
-            <a:ext cx="1078941" cy="1078941"/>
-          </a:xfrm>
-          <a:prstGeom prst="ellipse">
-            <a:avLst/>
-          </a:prstGeom>
-        </p:spPr>
-        <p:style>
-          <a:lnRef idx="2">
-            <a:schemeClr val="accent2"/>
-          </a:lnRef>
-          <a:fillRef idx="1">
-            <a:schemeClr val="lt1"/>
-          </a:fillRef>
-          <a:effectRef idx="0">
-            <a:schemeClr val="accent2"/>
-          </a:effectRef>
-          <a:fontRef idx="minor">
-            <a:schemeClr val="dk1"/>
-          </a:fontRef>
-        </p:style>
-        <p:txBody>
-          <a:bodyPr rtlCol="0" anchor="ctr"/>
-          <a:lstStyle/>
-          <a:p>
-            <a:pPr algn="ctr"/>
-            <a:r>
-              <a:rPr lang="en-US" altLang="zh-TW" sz="1600" dirty="0"/>
-              <a:t>Policy based</a:t>
-            </a:r>
-            <a:endParaRPr lang="zh-TW" altLang="en-US" sz="1600" dirty="0"/>
-          </a:p>
-        </p:txBody>
-      </p:sp>
-      <p:sp>
-        <p:nvSpPr>
-          <p:cNvPr id="26" name="橢圓 25">
-            <a:extLst>
-              <a:ext uri="{FF2B5EF4-FFF2-40B4-BE49-F238E27FC236}">
-                <a16:creationId xmlns:a16="http://schemas.microsoft.com/office/drawing/2014/main" xmlns="" id="{3A1A50AC-8675-4D46-B754-64287F98280C}"/>
-              </a:ext>
-            </a:extLst>
-          </p:cNvPr>
-          <p:cNvSpPr/>
-          <p:nvPr/>
-        </p:nvSpPr>
-        <p:spPr>
-          <a:xfrm>
-            <a:off x="3530660" y="3281542"/>
-            <a:ext cx="1094413" cy="1094413"/>
-          </a:xfrm>
-          <a:prstGeom prst="ellipse">
-            <a:avLst/>
-          </a:prstGeom>
-        </p:spPr>
-        <p:style>
-          <a:lnRef idx="2">
-            <a:schemeClr val="accent2"/>
-          </a:lnRef>
-          <a:fillRef idx="1">
-            <a:schemeClr val="lt1"/>
-          </a:fillRef>
-          <a:effectRef idx="0">
-            <a:schemeClr val="accent2"/>
-          </a:effectRef>
-          <a:fontRef idx="minor">
-            <a:schemeClr val="dk1"/>
-          </a:fontRef>
-        </p:style>
-        <p:txBody>
-          <a:bodyPr rtlCol="0" anchor="ctr"/>
-          <a:lstStyle/>
-          <a:p>
-            <a:pPr algn="ctr"/>
-            <a:r>
-              <a:rPr lang="en-US" altLang="zh-TW" sz="1500" dirty="0"/>
-              <a:t>Refresh Token</a:t>
-            </a:r>
-            <a:endParaRPr lang="zh-TW" altLang="en-US" sz="1500" dirty="0"/>
-          </a:p>
-        </p:txBody>
-      </p:sp>
+      </p:cxnSp>
     </p:spTree>
     <p:extLst>
       <p:ext uri="{BB962C8B-B14F-4D97-AF65-F5344CB8AC3E}">
-        <p14:creationId xmlns:p14="http://schemas.microsoft.com/office/powerpoint/2010/main" val="2695080214"/>
+        <p14:creationId xmlns:p14="http://schemas.microsoft.com/office/powerpoint/2010/main" val="1693475023"/>
       </p:ext>
     </p:extLst>
   </p:cSld>
@@ -5298,10 +5372,10 @@
       </p:grpSpPr>
       <p:sp>
         <p:nvSpPr>
-          <p:cNvPr id="2" name="圓角矩形 6">
-            <a:extLst>
-              <a:ext uri="{FF2B5EF4-FFF2-40B4-BE49-F238E27FC236}">
-                <a16:creationId xmlns:a16="http://schemas.microsoft.com/office/drawing/2014/main" xmlns="" id="{706DE702-26E5-46A9-8661-165882CFAF5B}"/>
+          <p:cNvPr id="23" name="矩形 22">
+            <a:extLst>
+              <a:ext uri="{FF2B5EF4-FFF2-40B4-BE49-F238E27FC236}">
+                <a16:creationId xmlns:a16="http://schemas.microsoft.com/office/drawing/2014/main" id="{9939ADAE-D42F-4139-B2EF-679A7A89092A}"/>
               </a:ext>
             </a:extLst>
           </p:cNvPr>
@@ -5310,18 +5384,12 @@
         </p:nvSpPr>
         <p:spPr>
           <a:xfrm>
-            <a:off x="1191794" y="1795636"/>
-            <a:ext cx="3392205" cy="2142064"/>
-          </a:xfrm>
-          <a:prstGeom prst="roundRect">
-            <a:avLst/>
-          </a:prstGeom>
-          <a:ln w="25400">
-            <a:solidFill>
-              <a:srgbClr val="FF0000"/>
-            </a:solidFill>
-            <a:prstDash val="sysDash"/>
-          </a:ln>
+            <a:off x="1003300" y="832262"/>
+            <a:ext cx="10477500" cy="3701638"/>
+          </a:xfrm>
+          <a:prstGeom prst="rect">
+            <a:avLst/>
+          </a:prstGeom>
         </p:spPr>
         <p:style>
           <a:lnRef idx="2">
@@ -5342,6 +5410,58 @@
           <a:lstStyle/>
           <a:p>
             <a:pPr algn="ctr"/>
+            <a:endParaRPr lang="zh-TW" altLang="en-US" dirty="0"/>
+          </a:p>
+        </p:txBody>
+      </p:sp>
+      <p:sp>
+        <p:nvSpPr>
+          <p:cNvPr id="4" name="圓角矩形 6">
+            <a:extLst>
+              <a:ext uri="{FF2B5EF4-FFF2-40B4-BE49-F238E27FC236}">
+                <a16:creationId xmlns:a16="http://schemas.microsoft.com/office/drawing/2014/main" id="{11088A7B-099A-477A-ABDE-983AB26D6566}"/>
+              </a:ext>
+            </a:extLst>
+          </p:cNvPr>
+          <p:cNvSpPr/>
+          <p:nvPr/>
+        </p:nvSpPr>
+        <p:spPr>
+          <a:xfrm>
+            <a:off x="1191794" y="1795636"/>
+            <a:ext cx="3392205" cy="2142064"/>
+          </a:xfrm>
+          <a:prstGeom prst="roundRect">
+            <a:avLst/>
+          </a:prstGeom>
+          <a:ln w="19050">
+            <a:solidFill>
+              <a:schemeClr val="accent1">
+                <a:lumMod val="50000"/>
+              </a:schemeClr>
+            </a:solidFill>
+            <a:prstDash val="sysDash"/>
+          </a:ln>
+        </p:spPr>
+        <p:style>
+          <a:lnRef idx="2">
+            <a:schemeClr val="accent1"/>
+          </a:lnRef>
+          <a:fillRef idx="1">
+            <a:schemeClr val="lt1"/>
+          </a:fillRef>
+          <a:effectRef idx="0">
+            <a:schemeClr val="accent1"/>
+          </a:effectRef>
+          <a:fontRef idx="minor">
+            <a:schemeClr val="dk1"/>
+          </a:fontRef>
+        </p:style>
+        <p:txBody>
+          <a:bodyPr rtlCol="0" anchor="ctr"/>
+          <a:lstStyle/>
+          <a:p>
+            <a:pPr algn="ctr"/>
             <a:endParaRPr lang="zh-TW" altLang="en-US">
               <a:latin typeface="Consolas" panose="020B0609020204030204" pitchFamily="49" charset="0"/>
               <a:cs typeface="Consolas" panose="020B0609020204030204" pitchFamily="49" charset="0"/>
@@ -5349,12 +5469,51 @@
           </a:p>
         </p:txBody>
       </p:sp>
+      <p:sp>
+        <p:nvSpPr>
+          <p:cNvPr id="5" name="AutoShape 2" descr="data:image/jpeg;base64,/9j/4AAQSkZJRgABAQAAAQABAAD/2wCEAAkGBhASEBAQDxAODxQSEg8PEBAUEBAPEBAQFBAVFBQQFRQXHCYeFxkjGRQUHy8gIycpLCwsFR4xNTMqNSYrLCkBCQoKDgwOFw8PGiwcHBwpLCksKSkpKSwpKSktNSopLCkpLCwsNSkpKSksKSkpKSwpKiopKTUpKSkvKSwpKSkpKf/AABEIAMwAzAMBIgACEQEDEQH/xAAbAAABBQEBAAAAAAAAAAAAAAAAAgMEBQYBB//EAEUQAAEDAgIGBgYGCAUFAAAAAAEAAgMEERIhBQYxQVFxE2GBkaHBIjJCUpKxFCMzcqKyJFNiY4LR4fAHFkOTsxVEg8LD/8QAGQEBAAMBAQAAAAAAAAAAAAAAAAEDBAIF/8QAJxEBAAIBAwMDBAMAAAAAAAAAAAECEQMSIQQxQRMyYQUiQlGRocH/2gAMAwEAAhEDEQA/APcUIQgFFrtIsiDS+/pEgWF9m9Slm9bpheJu+z3HkbAfIoLSPT0B9u3MFSWV0Z2PZ8QC8j0hrUYp5IRCJAzAMQkwuJcwOIsRbK6k0+tzMsUNQ37vRyfIhd7LYzhxvrHGXrDXg7CD2pS8zbrVTb5JW/ehly7QCFLptbICbMrIr8OlwHudZc4mO7qJiez0FCydPpuY+rIH8ix/yU9mmpd7W/CQoSvUKobpx29g7yE83TTd7XDuKCxQobdKxneRzBTgr4/fHigkISGzNOxzT2hLQCEIQCEIQCEIQCEIQCEIQCEIQCx+tUmKcN91rG95J81sFh9Nz/pEznWsw+DGXQebl/SVVQ7beaQDk12EflV/R0TTuWX1ediAefau883Eu81sKIr161xSIePrzm0p8OiGFEurrCLEA9RzCn0pyUrEqpiGfdMM27VCPcxretowHvbZJGgpWZRzVEfU2aQDxK1LXJQKiaRKY17x2lmfote0+jVT8nYJB+JqdbpOvZ63QSc4iwnta7yW4hha5rTYZgLkmjmHcFmmK/p6EX1MZiWNZrPMPXpmn7krh+ZqdGt7B60E45GN/mFpH6EjO5RZdW2HcFG2ruNW6sj1upT6xlZ96Jx8W3U6DWOmPq1UV+BfgPcVHn1SadwUGXU7qUenH7TGvbzDURaQJ9WUO5Oa5SGVknHwC8/qdTyPVFuQwnwUZmhall8EszeT3jzUen8u/XjzD1Btc7eAnm1V9y8mdpTSUR9GeQgbnBr/ABIulx6+6QZ67IJOcZae8HyT0bJ9ej1oShclna1pc4hoaCSTsAG9YXVTXmeqqGwvp4mAhxc9rnXADSdhHEDvWj1lntRz9bQz4iAuLVms4lbW0WjMLljwQCCCCLgjMEcUpZ3UeoLqdzSb4Hlo5YQbeK0S5dBCEIBCEIBeZ6x1BENdIdoiqXeBA8l6RUSYWOdwa49wXkuts9qCoO0vMMXPHKCfAFTWMzEE8QzOgWWaBwAHcLLU0RWY0R6oWloSvamOHi37r+mdkpGJQ6ZykFyoZ7H2OS8SjtelY1OFMyvtGSXZbgSPPzUvEqrREnrDkVYl6yXjFperoXzSDl1wlN41wvXGF244SuBNF66HqcOdwfZNCJpOwLjpElkmanCM8o1Vo+M7goE2gYyNitJnpp0isiZwiYhD0FodsM5e232bx2lzbeak62yfopHGSMeN0/SH0nnqY3tu4n5hVut0v1UTeMjj8Lf6rNqTmzbpRisLXUqK1Lf3nvPl5K+Vdq7FhpYR+wHfFn5qxVawIQhAIQhBX6elw00p/Zt3kBeWa02dHTxHZJOXHlHC7zeO5ej63y2p7e89g7rnyXmOsp+upBwjqJO1z42D8rl3pxm0Obe2VXSxFhLTtBt/VXtE5VOloiCyRuVwGu5jYe75J+hrCOB8F7Uc1y8i8Ylp6Z6fdIqqmrRbenzVDiqtvLNdYtkS8agxzJ0SqcM1lzouT0+YIVoXrP0E1nX4Zq4MizaleWzp7/bhIxpBkTBkTZlXG1o3pBkSnSZKGJEqSVNqNxb5E2yX0gmJJUyJsxzXUVTFk6d+ajmRdqXqGZFMRw7meVlo/ZI7i8D4WD+ap9a5bvibwY93e7+ittHfZA+8+V34y3/1VJpwY6oN6omfEf6rDf3S9GnthvqJto4xwYwfhCeXGiwA4ZLq5dhCEIBCEIMtr1UWbA3i9zjyDbea831gl/TGt/V08DSOtxfKfCRvctvr7NeeNg9mMntc63kvOdKVGKuqjwl6Mco2NYPyq/QjN1erOKrOVoews4jLqI2Kvpn280/DOmaoWfcbHZ9u/wDvrXraf6edqRnlPimThqFWMmXTUK2KsdoWsVQpLao8SqSOoUls672sl6tHQ1Rzz3K5irLtB6gspQz5O5K0o6r0eRI81n1NNOlaYnC4dVJp1YoD6hR3VCq9Nqi0riKruUmSszKr4J8iUy6oUbE7k6St6kwa3MKHJMmDKuoo7iWgqan0RyUA1RvuXZJbsHJVlTNZryNzXW54TZcRV3lsdHfYQdcTHHm8Yz4uKq8OPSLR+8jB/haD8wrmNgAY0ZANY0DgA0BVOrvp1xd+1M/5gfNeVM5nL2Y4btCEKEhCEIBCEIPPNYX9JpHDwfBH2XBPzK8sgqMUkr9uKSV3fI4hei1lZ+l1M5/0vpU3+zE8jxaF5ZQus0ch8ls6SMzMqNeeIheRTqTM/EzrGYVMyZTIalejHdjkCdBnUOd9nHvCb6ZaYZ7VWcc6ksnVMyZSWTK2IZr1aKhn9F3Yp9DU7RyKz9HP6J5qbTVFj4Li1c5ZsYsuZKhR3VChyVKZE9yFVtaKroz2ZzTXTqHUVGwcAmunXE1TCa+ZIEqiGVHSZLnDvK8ZNeMKEPSc1vvPjbzvI247roppfq0rRAxVNOOErX9jLuPgCqbcRMrNPm8R8tzLLYudwxO7rlV2pMd53HhGe8uCk1Tvq5DwY/5W80vUaL7Z/wBxvzP8l473WrQhCAQhCASZH2BJ3AnuCUq/T82GlqHcIpB2lpA+aDyHS1Xho66QnN0BZfrmla0+BcsHC/Ja3Wx+HR792Oopo+qzWvkI8Asaw5L1ugpmsz8sfU25iEkSJ+OdQcSW163bGbclVD7i/BRukXS9RypxhHdKbKpDJVXhyeY9XVlVaq4pZsu1Sm1FrKpp35J8yKzDJavKyfUrtPNdyrDMnqaW1yqph3jhYyVN3FdEyrGzJ0SqmU4TxKuulUISpXSKuRdUcvoHtU/VoXqmH3WTP7DGY/nIFS0MmR/vcr3VCO88r/chDP8AclaR/wAJWXXnFJW9NzrVhpdJPtDJ1hre9w/krbUyO0Dne9I7wACo9Lu+qA4vH4Wn+a02q7bUsXXiP4yvJe6tUIQgEIQgFRa6y2opR72Fne4X8Ar1RNJaLinZglBIviFnFtja18uaDyaOdzQWgjCcy1zWPaTxLXAi6Z+g0z8WOhpX5Xc5ofA+3HFG4fJbyq/w9jP2Ur29TgHKnqdSKply3o35HMGxtwzTNq+2cSWjMMfPqpQSep9LpnHYA6OojHxAO8VDd/h87Po6unPASNlgPabOC08uhalhziflyK76TfWY9vWWuA71pr1etX8v55Vzo0nwxVXqNXsBLYOmaPaheycdgacXgqGpp3xkiVj4iNoexzLd4XqrJRtBHMbU59OkGx7+V8Q7itFfqF/yiJ/pVPS18S8jaU40r0qshgkuZqSklJ2u6LoJT/5Ii0qnn1Yo3G7W1MHUyVsrRyDxfxWin1Cn5RMKrdLbxLMwHIJxzlfP1QZ/o1beps8L4vxxl48FBqtWqppyjZMNxikZLfk0HF3gLZXrNG3a3+Mdun1InsrcSeDrN5puppZYj9dFLF99jmjvIsh8oNrEbF3uieYlVNZjiS2uTocmWlOtVcoOtcnGlNNTjVVLlNon7exavUxotUP3l8UZ/hY93/0WPgNitnqi0dA8+9NJf+FrGrH1M/ZLR0dc6ufhY6Xd9mPvH5BbPQkWGnhH7DXfEMXmsXpPN0bf2fFzit/EzC1rRuAHcLLzHtFoQhAIQhAIQhALhC6hAxJCDtAPYocmjY/caN+XonvCsrJJYgztVq5C65tn15gfI+KrKnVNvsEjk7aeRBC2LokxKwAEkgAbScggwU2rUw3X7Ae8g+Sr5dDTN9jF1tIPhkVtKvTcLdl38sm958rqrn1jJ2NYObcZHacvBE5ZSSNzfXa5n3gW/NIsOpXFdWPfm15jcPaAbY9Tm2sQqt2lXg4Z4KeT9oNMTiOIcz+SGSoauRuTJJGjgHOw/DsXJaeGU3mp6aQna7omxPPN8WEntSPp9OTnHPF91zZR3OsfFS6c0zvUq4gfdla6E9+Y8UiZjtwicT3RXaqUL/YqIDxjmEjR/BIL/iUKp1F3wVbXcGzRPiPa9uJq08VE8+rhk643sk+RSjER6wLeYIV1dfUjyqtoac+GLfqjXtuWxxzAfqpopCeTb4vBV9RHNESJoJorbccbmgdpFl6I7ZfrGdrkC+ZUptR7LZHPFr2OwZ7LG4VsdXfyot0dJ7PMYa1p3r0DVgD6JCR7XSvPbK+3gAn59GU8l+kp6Z99pMQa/wCNliFJpoGtDWMaGMFmtYLkNbsAF8+9caut6kYTodP6VpnJWDFVRt4OhZ3WK3ixGi246trv3hd2DJbdZ2sIQhAIQhAIQhAIQhAIQkveACTsAJPIII+kNIMibieeQ3krG6Q0lLMc3YRuaMgEmurXTPL3b9g90bgmmtQRjR39pc/6ceI8VPaxOMiQVJ0a7q70zPotxFiCfJaNtMummQYybRHAkcwq+o0RJuDXdtvmt5LBxAPYoktE07rckHnj6Z8Zvhcw8RceIVpo7WeqZ6PTvcNwfaVvL0rrRy6P4WPUqup0Mw7WAHiPRKCVBrG8/aQwv62h0R8MlaU2kad/syxHf6sg8M1no6fDtu7rKkxyINPBQ4wXRPa8DI3BaU7Ho6XE30CcxmPStnvtsVTofSBjeDnbeOpbgYXDMAg57kETQmjQwl/Ox457VdXUdhTrSgcQuArqAQhCAQhCAQhCAUbSQvDKP3b/AMpUlcI3IPPWtTrWqZpDR5jkwbSQXR7frGjhxeBtHIqOwIFRsUqONIjYpEYQOsjXXRpTV0oIczEzHBe6lSrlIM3DqBQV0kQDi12zceCjVEBGThy4FW2k4Mg7hkeRUSGUEdHJmD6p4FBTy0oUKSnI2K7q6UsPEbj5KG9qCPSDMf3sW7oHWYwH3R8lnNC6IL3E2u1pGI7hvw9Z48LrUsgsgfY5SGJmNifa1AsJS4AuoBCEIBCEIBCEIBCEIGaukZKwskGIHsIO4gjMHrVBXaKljscLqloyxtwipaN2Jps2Xnkea0qEGSiwl2Fj2ud+rP1cw5xuse5SOjI9YFvMEK6r9FQzjDNEyQbrjNvW121p5KH/AJfwi0FRUwjc0vE7AOGGUO+aCK1DkP0ZXNvhlop+AfBJAe10bj8kjoK32qWjd9yqlb+aNA29cpzZ3YU4aeqP/Zxc/ppt/wAaR9BrPZpaRvW6pldb4WoHJSCCDvyVMYXG4AJtfYL+KuY9A1bj6c1NGOEcBkPxPd5KX/leNw+uknn4gydGw/wR4QgzjZS4dH9o73GDpZO4ZDmSFY6M1Xe4YpvqWn2AcUrhwc7Y3kL81pKOhjibgiYyNvBrQ0c+tPoGoaZrGhrGhoGwAWCUYwloQJDF2y6hAIQhAIQhAIQhAIQhAIQhAIQhAIQhAIQhAIQhAIQhAIQhAIQhAIQhAIQhAIQhB//Z">
+            <a:extLst>
+              <a:ext uri="{FF2B5EF4-FFF2-40B4-BE49-F238E27FC236}">
+                <a16:creationId xmlns:a16="http://schemas.microsoft.com/office/drawing/2014/main" id="{69D67559-2F0E-4887-BF37-41EA453B89FD}"/>
+              </a:ext>
+            </a:extLst>
+          </p:cNvPr>
+          <p:cNvSpPr>
+            <a:spLocks noChangeAspect="1" noChangeArrowheads="1"/>
+          </p:cNvSpPr>
+          <p:nvPr/>
+        </p:nvSpPr>
+        <p:spPr bwMode="auto">
+          <a:xfrm>
+            <a:off x="155575" y="-144463"/>
+            <a:ext cx="304800" cy="304801"/>
+          </a:xfrm>
+          <a:prstGeom prst="rect">
+            <a:avLst/>
+          </a:prstGeom>
+          <a:noFill/>
+        </p:spPr>
+        <p:txBody>
+          <a:bodyPr vert="horz" wrap="square" lIns="91440" tIns="45720" rIns="91440" bIns="45720" numCol="1" anchor="t" anchorCtr="0" compatLnSpc="1">
+            <a:prstTxWarp prst="textNoShape">
+              <a:avLst/>
+            </a:prstTxWarp>
+          </a:bodyPr>
+          <a:lstStyle/>
+          <a:p>
+            <a:endParaRPr lang="zh-TW" altLang="en-US">
+              <a:latin typeface="Consolas" panose="020B0609020204030204" pitchFamily="49" charset="0"/>
+              <a:cs typeface="Consolas" panose="020B0609020204030204" pitchFamily="49" charset="0"/>
+            </a:endParaRPr>
+          </a:p>
+        </p:txBody>
+      </p:sp>
       <p:grpSp>
         <p:nvGrpSpPr>
-          <p:cNvPr id="3" name="群組 2">
-            <a:extLst>
-              <a:ext uri="{FF2B5EF4-FFF2-40B4-BE49-F238E27FC236}">
-                <a16:creationId xmlns:a16="http://schemas.microsoft.com/office/drawing/2014/main" xmlns="" id="{A91D7176-EE55-4C33-B06B-C483824D2263}"/>
+          <p:cNvPr id="6" name="群組 5">
+            <a:extLst>
+              <a:ext uri="{FF2B5EF4-FFF2-40B4-BE49-F238E27FC236}">
+                <a16:creationId xmlns:a16="http://schemas.microsoft.com/office/drawing/2014/main" id="{74DF11E3-9C59-4162-9CA2-A939607651A2}"/>
               </a:ext>
             </a:extLst>
           </p:cNvPr>
@@ -5371,10 +5530,10 @@
         </p:grpSpPr>
         <p:pic>
           <p:nvPicPr>
-            <p:cNvPr id="4" name="圖片 3">
+            <p:cNvPr id="7" name="圖片 6">
               <a:extLst>
                 <a:ext uri="{FF2B5EF4-FFF2-40B4-BE49-F238E27FC236}">
-                  <a16:creationId xmlns:a16="http://schemas.microsoft.com/office/drawing/2014/main" xmlns="" id="{A5DC711C-CC7B-4BCD-AA24-424BE899958A}"/>
+                  <a16:creationId xmlns:a16="http://schemas.microsoft.com/office/drawing/2014/main" id="{4AD4BCEB-4B11-4913-8D7C-58CC9858D4CF}"/>
                 </a:ext>
               </a:extLst>
             </p:cNvPr>
@@ -5407,10 +5566,10 @@
         </p:pic>
         <p:sp>
           <p:nvSpPr>
-            <p:cNvPr id="5" name="文字方塊 4">
+            <p:cNvPr id="8" name="文字方塊 7">
               <a:extLst>
                 <a:ext uri="{FF2B5EF4-FFF2-40B4-BE49-F238E27FC236}">
-                  <a16:creationId xmlns:a16="http://schemas.microsoft.com/office/drawing/2014/main" xmlns="" id="{CC7ABC9E-01EF-425D-8E74-48A43D9C65CD}"/>
+                  <a16:creationId xmlns:a16="http://schemas.microsoft.com/office/drawing/2014/main" id="{2932AF25-1F93-4171-8FA4-AF04D9B1A7A5}"/>
                 </a:ext>
               </a:extLst>
             </p:cNvPr>
@@ -5462,10 +5621,10 @@
       </p:grpSp>
       <p:sp>
         <p:nvSpPr>
-          <p:cNvPr id="6" name="矩形 5">
-            <a:extLst>
-              <a:ext uri="{FF2B5EF4-FFF2-40B4-BE49-F238E27FC236}">
-                <a16:creationId xmlns:a16="http://schemas.microsoft.com/office/drawing/2014/main" xmlns="" id="{251C348E-2D22-4DE8-B44D-1701DC2482B8}"/>
+          <p:cNvPr id="9" name="矩形 8">
+            <a:extLst>
+              <a:ext uri="{FF2B5EF4-FFF2-40B4-BE49-F238E27FC236}">
+                <a16:creationId xmlns:a16="http://schemas.microsoft.com/office/drawing/2014/main" id="{61D13771-887B-4EDB-B31B-0D7C427BA003}"/>
               </a:ext>
             </a:extLst>
           </p:cNvPr>
@@ -5501,10 +5660,10 @@
       </p:sp>
       <p:sp>
         <p:nvSpPr>
-          <p:cNvPr id="7" name="矩形 6">
-            <a:extLst>
-              <a:ext uri="{FF2B5EF4-FFF2-40B4-BE49-F238E27FC236}">
-                <a16:creationId xmlns:a16="http://schemas.microsoft.com/office/drawing/2014/main" xmlns="" id="{449972E5-9A5F-437C-9B35-45C93A8AFF8D}"/>
+          <p:cNvPr id="10" name="矩形 9">
+            <a:extLst>
+              <a:ext uri="{FF2B5EF4-FFF2-40B4-BE49-F238E27FC236}">
+                <a16:creationId xmlns:a16="http://schemas.microsoft.com/office/drawing/2014/main" id="{0C90415A-7A0C-4B24-81D4-0EF230952877}"/>
               </a:ext>
             </a:extLst>
           </p:cNvPr>
@@ -5554,10 +5713,10 @@
       </p:sp>
       <p:sp>
         <p:nvSpPr>
-          <p:cNvPr id="8" name="圓角矩形 6">
-            <a:extLst>
-              <a:ext uri="{FF2B5EF4-FFF2-40B4-BE49-F238E27FC236}">
-                <a16:creationId xmlns:a16="http://schemas.microsoft.com/office/drawing/2014/main" xmlns="" id="{A8DE8DDB-CE73-4804-AB78-B70EFB29D495}"/>
+          <p:cNvPr id="11" name="圓角矩形 6">
+            <a:extLst>
+              <a:ext uri="{FF2B5EF4-FFF2-40B4-BE49-F238E27FC236}">
+                <a16:creationId xmlns:a16="http://schemas.microsoft.com/office/drawing/2014/main" id="{F8757F56-02DD-40A4-8A94-26C291615795}"/>
               </a:ext>
             </a:extLst>
           </p:cNvPr>
@@ -5572,9 +5731,11 @@
           <a:prstGeom prst="roundRect">
             <a:avLst/>
           </a:prstGeom>
-          <a:ln w="25400">
+          <a:ln w="19050">
             <a:solidFill>
-              <a:srgbClr val="FF0000"/>
+              <a:schemeClr val="accent5">
+                <a:lumMod val="50000"/>
+              </a:schemeClr>
             </a:solidFill>
             <a:prstDash val="sysDash"/>
           </a:ln>
@@ -5607,10 +5768,10 @@
       </p:sp>
       <p:sp>
         <p:nvSpPr>
-          <p:cNvPr id="9" name="文字方塊 8">
-            <a:extLst>
-              <a:ext uri="{FF2B5EF4-FFF2-40B4-BE49-F238E27FC236}">
-                <a16:creationId xmlns:a16="http://schemas.microsoft.com/office/drawing/2014/main" xmlns="" id="{EEFEA2BF-382A-4752-B466-E1D2FE26365D}"/>
+          <p:cNvPr id="12" name="文字方塊 11">
+            <a:extLst>
+              <a:ext uri="{FF2B5EF4-FFF2-40B4-BE49-F238E27FC236}">
+                <a16:creationId xmlns:a16="http://schemas.microsoft.com/office/drawing/2014/main" id="{762D0A24-AF69-4B6E-8CB4-4D8CCEE93CCE}"/>
               </a:ext>
             </a:extLst>
           </p:cNvPr>
@@ -5661,10 +5822,10 @@
       </p:sp>
       <p:sp>
         <p:nvSpPr>
-          <p:cNvPr id="10" name="矩形 9">
-            <a:extLst>
-              <a:ext uri="{FF2B5EF4-FFF2-40B4-BE49-F238E27FC236}">
-                <a16:creationId xmlns:a16="http://schemas.microsoft.com/office/drawing/2014/main" xmlns="" id="{7FDAF179-9B2E-411A-B0C7-CD050D262008}"/>
+          <p:cNvPr id="13" name="矩形 12">
+            <a:extLst>
+              <a:ext uri="{FF2B5EF4-FFF2-40B4-BE49-F238E27FC236}">
+                <a16:creationId xmlns:a16="http://schemas.microsoft.com/office/drawing/2014/main" id="{17ED7585-5FF1-4090-B626-A090BB0B116B}"/>
               </a:ext>
             </a:extLst>
           </p:cNvPr>
@@ -5714,10 +5875,10 @@
       </p:sp>
       <p:pic>
         <p:nvPicPr>
-          <p:cNvPr id="11" name="圖片 10">
-            <a:extLst>
-              <a:ext uri="{FF2B5EF4-FFF2-40B4-BE49-F238E27FC236}">
-                <a16:creationId xmlns:a16="http://schemas.microsoft.com/office/drawing/2014/main" xmlns="" id="{5BE1084A-E4FD-4463-932D-30523A0449CF}"/>
+          <p:cNvPr id="14" name="圖片 13">
+            <a:extLst>
+              <a:ext uri="{FF2B5EF4-FFF2-40B4-BE49-F238E27FC236}">
+                <a16:creationId xmlns:a16="http://schemas.microsoft.com/office/drawing/2014/main" id="{9BC22A68-D7A8-40D2-A973-36183B470786}"/>
               </a:ext>
             </a:extLst>
           </p:cNvPr>
@@ -5750,10 +5911,10 @@
       </p:pic>
       <p:sp>
         <p:nvSpPr>
-          <p:cNvPr id="12" name="矩形 11">
-            <a:extLst>
-              <a:ext uri="{FF2B5EF4-FFF2-40B4-BE49-F238E27FC236}">
-                <a16:creationId xmlns:a16="http://schemas.microsoft.com/office/drawing/2014/main" xmlns="" id="{C50DCA4B-3556-4099-9C32-9297DAF2DB06}"/>
+          <p:cNvPr id="15" name="矩形 14">
+            <a:extLst>
+              <a:ext uri="{FF2B5EF4-FFF2-40B4-BE49-F238E27FC236}">
+                <a16:creationId xmlns:a16="http://schemas.microsoft.com/office/drawing/2014/main" id="{22FF2DC1-64FC-43FC-B98D-6C5A88F63F47}"/>
               </a:ext>
             </a:extLst>
           </p:cNvPr>
@@ -5796,16 +5957,16 @@
       </p:sp>
       <p:cxnSp>
         <p:nvCxnSpPr>
-          <p:cNvPr id="13" name="直線單箭頭接點 12">
-            <a:extLst>
-              <a:ext uri="{FF2B5EF4-FFF2-40B4-BE49-F238E27FC236}">
-                <a16:creationId xmlns:a16="http://schemas.microsoft.com/office/drawing/2014/main" xmlns="" id="{F960792B-F82F-44F4-AC09-EEFA605794A2}"/>
+          <p:cNvPr id="16" name="直線單箭頭接點 15">
+            <a:extLst>
+              <a:ext uri="{FF2B5EF4-FFF2-40B4-BE49-F238E27FC236}">
+                <a16:creationId xmlns:a16="http://schemas.microsoft.com/office/drawing/2014/main" id="{C93A3381-6625-4A16-AA19-13522514D565}"/>
               </a:ext>
             </a:extLst>
           </p:cNvPr>
           <p:cNvCxnSpPr>
             <a:cxnSpLocks/>
-            <a:stCxn id="7" idx="3"/>
+            <a:stCxn id="10" idx="3"/>
           </p:cNvCxnSpPr>
           <p:nvPr/>
         </p:nvCxnSpPr>
@@ -5838,10 +5999,10 @@
       </p:cxnSp>
       <p:sp>
         <p:nvSpPr>
-          <p:cNvPr id="14" name="圓角矩形 6">
-            <a:extLst>
-              <a:ext uri="{FF2B5EF4-FFF2-40B4-BE49-F238E27FC236}">
-                <a16:creationId xmlns:a16="http://schemas.microsoft.com/office/drawing/2014/main" xmlns="" id="{7CD9D1F1-45AB-4A83-BAF4-DB58F90FD930}"/>
+          <p:cNvPr id="17" name="圓角矩形 6">
+            <a:extLst>
+              <a:ext uri="{FF2B5EF4-FFF2-40B4-BE49-F238E27FC236}">
+                <a16:creationId xmlns:a16="http://schemas.microsoft.com/office/drawing/2014/main" id="{6ABEE6DB-9402-4004-B1E7-1D70DAE89DA0}"/>
               </a:ext>
             </a:extLst>
           </p:cNvPr>
@@ -5856,7 +6017,7 @@
           <a:prstGeom prst="roundRect">
             <a:avLst/>
           </a:prstGeom>
-          <a:ln>
+          <a:ln w="19050">
             <a:prstDash val="sysDash"/>
           </a:ln>
         </p:spPr>
@@ -5888,10 +6049,10 @@
       </p:sp>
       <p:sp>
         <p:nvSpPr>
-          <p:cNvPr id="15" name="文字方塊 14">
-            <a:extLst>
-              <a:ext uri="{FF2B5EF4-FFF2-40B4-BE49-F238E27FC236}">
-                <a16:creationId xmlns:a16="http://schemas.microsoft.com/office/drawing/2014/main" xmlns="" id="{2A38FED3-41D3-4F5C-994A-88677072ED11}"/>
+          <p:cNvPr id="18" name="文字方塊 17">
+            <a:extLst>
+              <a:ext uri="{FF2B5EF4-FFF2-40B4-BE49-F238E27FC236}">
+                <a16:creationId xmlns:a16="http://schemas.microsoft.com/office/drawing/2014/main" id="{948582BB-7035-4A11-BD5F-EC60FC0F15C1}"/>
               </a:ext>
             </a:extLst>
           </p:cNvPr>
@@ -5942,10 +6103,10 @@
       </p:sp>
       <p:sp>
         <p:nvSpPr>
-          <p:cNvPr id="16" name="矩形 15">
-            <a:extLst>
-              <a:ext uri="{FF2B5EF4-FFF2-40B4-BE49-F238E27FC236}">
-                <a16:creationId xmlns:a16="http://schemas.microsoft.com/office/drawing/2014/main" xmlns="" id="{9D918EDB-4CFC-4B66-9EB0-A862160D0A27}"/>
+          <p:cNvPr id="19" name="矩形 18">
+            <a:extLst>
+              <a:ext uri="{FF2B5EF4-FFF2-40B4-BE49-F238E27FC236}">
+                <a16:creationId xmlns:a16="http://schemas.microsoft.com/office/drawing/2014/main" id="{D7B8F306-445F-44F9-B928-FA9479D63B7F}"/>
               </a:ext>
             </a:extLst>
           </p:cNvPr>
@@ -5995,10 +6156,10 @@
       </p:sp>
       <p:pic>
         <p:nvPicPr>
-          <p:cNvPr id="17" name="圖片 16">
-            <a:extLst>
-              <a:ext uri="{FF2B5EF4-FFF2-40B4-BE49-F238E27FC236}">
-                <a16:creationId xmlns:a16="http://schemas.microsoft.com/office/drawing/2014/main" xmlns="" id="{0EFF49B5-497B-4921-8CF6-BD4E4B674ADF}"/>
+          <p:cNvPr id="20" name="圖片 19">
+            <a:extLst>
+              <a:ext uri="{FF2B5EF4-FFF2-40B4-BE49-F238E27FC236}">
+                <a16:creationId xmlns:a16="http://schemas.microsoft.com/office/drawing/2014/main" id="{C3450A85-5EC7-4447-864C-F9D3800716A4}"/>
               </a:ext>
             </a:extLst>
           </p:cNvPr>
@@ -6031,10 +6192,10 @@
       </p:pic>
       <p:pic>
         <p:nvPicPr>
-          <p:cNvPr id="18" name="圖片 17">
-            <a:extLst>
-              <a:ext uri="{FF2B5EF4-FFF2-40B4-BE49-F238E27FC236}">
-                <a16:creationId xmlns:a16="http://schemas.microsoft.com/office/drawing/2014/main" xmlns="" id="{65E53252-C355-4873-ABD1-69208ED76225}"/>
+          <p:cNvPr id="21" name="圖片 20">
+            <a:extLst>
+              <a:ext uri="{FF2B5EF4-FFF2-40B4-BE49-F238E27FC236}">
+                <a16:creationId xmlns:a16="http://schemas.microsoft.com/office/drawing/2014/main" id="{09BE25E7-CFBD-4993-94A7-113CD2B2B51B}"/>
               </a:ext>
             </a:extLst>
           </p:cNvPr>
@@ -6051,7 +6212,7 @@
         </p:blipFill>
         <p:spPr>
           <a:xfrm>
-            <a:off x="8795755" y="1612357"/>
+            <a:off x="5515469" y="648984"/>
             <a:ext cx="1407316" cy="366557"/>
           </a:xfrm>
           <a:prstGeom prst="rect">
@@ -6061,17 +6222,17 @@
       </p:pic>
       <p:cxnSp>
         <p:nvCxnSpPr>
-          <p:cNvPr id="19" name="直線單箭頭接點 18">
-            <a:extLst>
-              <a:ext uri="{FF2B5EF4-FFF2-40B4-BE49-F238E27FC236}">
-                <a16:creationId xmlns:a16="http://schemas.microsoft.com/office/drawing/2014/main" xmlns="" id="{4FD714C3-D43C-4AE3-A614-B9AE37447913}"/>
+          <p:cNvPr id="22" name="直線單箭頭接點 21">
+            <a:extLst>
+              <a:ext uri="{FF2B5EF4-FFF2-40B4-BE49-F238E27FC236}">
+                <a16:creationId xmlns:a16="http://schemas.microsoft.com/office/drawing/2014/main" id="{2327516C-8D19-4517-81B1-A28B5CF78603}"/>
               </a:ext>
             </a:extLst>
           </p:cNvPr>
           <p:cNvCxnSpPr>
             <a:cxnSpLocks/>
-            <a:stCxn id="10" idx="3"/>
-            <a:endCxn id="16" idx="1"/>
+            <a:stCxn id="13" idx="3"/>
+            <a:endCxn id="19" idx="1"/>
           </p:cNvCxnSpPr>
           <p:nvPr/>
         </p:nvCxnSpPr>
@@ -6104,10 +6265,10 @@
       </p:cxnSp>
       <p:sp>
         <p:nvSpPr>
-          <p:cNvPr id="20" name="語音泡泡: 矩形 19">
-            <a:extLst>
-              <a:ext uri="{FF2B5EF4-FFF2-40B4-BE49-F238E27FC236}">
-                <a16:creationId xmlns:a16="http://schemas.microsoft.com/office/drawing/2014/main" xmlns="" id="{B0052EBC-8056-4CFC-9B7E-870F38D20FD1}"/>
+          <p:cNvPr id="24" name="橢圓 23">
+            <a:extLst>
+              <a:ext uri="{FF2B5EF4-FFF2-40B4-BE49-F238E27FC236}">
+                <a16:creationId xmlns:a16="http://schemas.microsoft.com/office/drawing/2014/main" id="{F1BF4D60-9F72-41E0-9967-9E63C2F532F7}"/>
               </a:ext>
             </a:extLst>
           </p:cNvPr>
@@ -6116,30 +6277,25 @@
         </p:nvSpPr>
         <p:spPr>
           <a:xfrm>
-            <a:off x="1617356" y="4318963"/>
-            <a:ext cx="2541080" cy="735291"/>
-          </a:xfrm>
-          <a:prstGeom prst="wedgeRectCallout">
-            <a:avLst>
-              <a:gd name="adj1" fmla="val 43717"/>
-              <a:gd name="adj2" fmla="val -137500"/>
-            </a:avLst>
+            <a:off x="1096151" y="3287843"/>
+            <a:ext cx="1094412" cy="1094412"/>
+          </a:xfrm>
+          <a:prstGeom prst="ellipse">
+            <a:avLst/>
           </a:prstGeom>
         </p:spPr>
         <p:style>
           <a:lnRef idx="2">
-            <a:schemeClr val="accent2">
-              <a:shade val="50000"/>
-            </a:schemeClr>
+            <a:schemeClr val="accent2"/>
           </a:lnRef>
           <a:fillRef idx="1">
-            <a:schemeClr val="accent2"/>
+            <a:schemeClr val="lt1"/>
           </a:fillRef>
           <a:effectRef idx="0">
             <a:schemeClr val="accent2"/>
           </a:effectRef>
           <a:fontRef idx="minor">
-            <a:schemeClr val="lt1"/>
+            <a:schemeClr val="dk1"/>
           </a:fontRef>
         </p:style>
         <p:txBody>
@@ -6148,18 +6304,19 @@
           <a:p>
             <a:pPr algn="ctr"/>
             <a:r>
-              <a:rPr lang="en-US" dirty="0"/>
-              <a:t>Secure API with role(s)</a:t>
+              <a:rPr lang="en-US" altLang="zh-TW" sz="1600" dirty="0"/>
+              <a:t>Role based</a:t>
             </a:r>
-          </a:p>
-        </p:txBody>
-      </p:sp>
-      <p:sp>
-        <p:nvSpPr>
-          <p:cNvPr id="21" name="語音泡泡: 矩形 20">
-            <a:extLst>
-              <a:ext uri="{FF2B5EF4-FFF2-40B4-BE49-F238E27FC236}">
-                <a16:creationId xmlns:a16="http://schemas.microsoft.com/office/drawing/2014/main" xmlns="" id="{53CD2CE1-4D7B-4C00-BFBA-40FA2850023D}"/>
+            <a:endParaRPr lang="zh-TW" altLang="en-US" sz="1600" dirty="0"/>
+          </a:p>
+        </p:txBody>
+      </p:sp>
+      <p:sp>
+        <p:nvSpPr>
+          <p:cNvPr id="25" name="橢圓 24">
+            <a:extLst>
+              <a:ext uri="{FF2B5EF4-FFF2-40B4-BE49-F238E27FC236}">
+                <a16:creationId xmlns:a16="http://schemas.microsoft.com/office/drawing/2014/main" id="{9FB09A2C-94DC-4488-A120-439B2CEE2E5F}"/>
               </a:ext>
             </a:extLst>
           </p:cNvPr>
@@ -6168,30 +6325,25 @@
         </p:nvSpPr>
         <p:spPr>
           <a:xfrm>
-            <a:off x="4941778" y="4318963"/>
-            <a:ext cx="2541080" cy="735291"/>
-          </a:xfrm>
-          <a:prstGeom prst="wedgeRectCallout">
-            <a:avLst>
-              <a:gd name="adj1" fmla="val -28252"/>
-              <a:gd name="adj2" fmla="val -150872"/>
-            </a:avLst>
+            <a:off x="2316397" y="3287843"/>
+            <a:ext cx="1078941" cy="1078941"/>
+          </a:xfrm>
+          <a:prstGeom prst="ellipse">
+            <a:avLst/>
           </a:prstGeom>
         </p:spPr>
         <p:style>
           <a:lnRef idx="2">
-            <a:schemeClr val="accent2">
-              <a:shade val="50000"/>
-            </a:schemeClr>
+            <a:schemeClr val="accent2"/>
           </a:lnRef>
           <a:fillRef idx="1">
-            <a:schemeClr val="accent2"/>
+            <a:schemeClr val="lt1"/>
           </a:fillRef>
           <a:effectRef idx="0">
             <a:schemeClr val="accent2"/>
           </a:effectRef>
           <a:fontRef idx="minor">
-            <a:schemeClr val="lt1"/>
+            <a:schemeClr val="dk1"/>
           </a:fontRef>
         </p:style>
         <p:txBody>
@@ -6200,16 +6352,65 @@
           <a:p>
             <a:pPr algn="ctr"/>
             <a:r>
-              <a:rPr lang="en-US" dirty="0"/>
-              <a:t>Add role claims when issue an JWT token</a:t>
+              <a:rPr lang="en-US" altLang="zh-TW" sz="1600" dirty="0"/>
+              <a:t>Policy based</a:t>
             </a:r>
+            <a:endParaRPr lang="zh-TW" altLang="en-US" sz="1600" dirty="0"/>
+          </a:p>
+        </p:txBody>
+      </p:sp>
+      <p:sp>
+        <p:nvSpPr>
+          <p:cNvPr id="26" name="橢圓 25">
+            <a:extLst>
+              <a:ext uri="{FF2B5EF4-FFF2-40B4-BE49-F238E27FC236}">
+                <a16:creationId xmlns:a16="http://schemas.microsoft.com/office/drawing/2014/main" id="{3A1A50AC-8675-4D46-B754-64287F98280C}"/>
+              </a:ext>
+            </a:extLst>
+          </p:cNvPr>
+          <p:cNvSpPr/>
+          <p:nvPr/>
+        </p:nvSpPr>
+        <p:spPr>
+          <a:xfrm>
+            <a:off x="3530660" y="3281542"/>
+            <a:ext cx="1094413" cy="1094413"/>
+          </a:xfrm>
+          <a:prstGeom prst="ellipse">
+            <a:avLst/>
+          </a:prstGeom>
+        </p:spPr>
+        <p:style>
+          <a:lnRef idx="2">
+            <a:schemeClr val="accent2"/>
+          </a:lnRef>
+          <a:fillRef idx="1">
+            <a:schemeClr val="lt1"/>
+          </a:fillRef>
+          <a:effectRef idx="0">
+            <a:schemeClr val="accent2"/>
+          </a:effectRef>
+          <a:fontRef idx="minor">
+            <a:schemeClr val="dk1"/>
+          </a:fontRef>
+        </p:style>
+        <p:txBody>
+          <a:bodyPr rtlCol="0" anchor="ctr"/>
+          <a:lstStyle/>
+          <a:p>
+            <a:pPr algn="ctr"/>
+            <a:r>
+              <a:rPr lang="en-US" altLang="zh-TW" sz="1500" dirty="0"/>
+              <a:t>Refresh Token</a:t>
+            </a:r>
+            <a:endParaRPr lang="zh-TW" altLang="en-US" sz="1500" dirty="0"/>
           </a:p>
         </p:txBody>
       </p:sp>
     </p:spTree>
     <p:extLst>
       <p:ext uri="{BB962C8B-B14F-4D97-AF65-F5344CB8AC3E}">
-        <p14:creationId xmlns:p14="http://schemas.microsoft.com/office/powerpoint/2010/main" val="291861415"/>
+        <p14:creationId xmlns:p14="http://schemas.microsoft.com/office/powerpoint/2010/main" val="2695080214"/>
       </p:ext>
     </p:extLst>
   </p:cSld>
@@ -6241,7 +6442,7 @@
           <p:cNvPr id="2" name="圓角矩形 6">
             <a:extLst>
               <a:ext uri="{FF2B5EF4-FFF2-40B4-BE49-F238E27FC236}">
-                <a16:creationId xmlns:a16="http://schemas.microsoft.com/office/drawing/2014/main" xmlns="" id="{706DE702-26E5-46A9-8661-165882CFAF5B}"/>
+                <a16:creationId xmlns:a16="http://schemas.microsoft.com/office/drawing/2014/main" id="{706DE702-26E5-46A9-8661-165882CFAF5B}"/>
               </a:ext>
             </a:extLst>
           </p:cNvPr>
@@ -6294,7 +6495,7 @@
           <p:cNvPr id="3" name="群組 2">
             <a:extLst>
               <a:ext uri="{FF2B5EF4-FFF2-40B4-BE49-F238E27FC236}">
-                <a16:creationId xmlns:a16="http://schemas.microsoft.com/office/drawing/2014/main" xmlns="" id="{A91D7176-EE55-4C33-B06B-C483824D2263}"/>
+                <a16:creationId xmlns:a16="http://schemas.microsoft.com/office/drawing/2014/main" id="{A91D7176-EE55-4C33-B06B-C483824D2263}"/>
               </a:ext>
             </a:extLst>
           </p:cNvPr>
@@ -6314,7 +6515,7 @@
             <p:cNvPr id="4" name="圖片 3">
               <a:extLst>
                 <a:ext uri="{FF2B5EF4-FFF2-40B4-BE49-F238E27FC236}">
-                  <a16:creationId xmlns:a16="http://schemas.microsoft.com/office/drawing/2014/main" xmlns="" id="{A5DC711C-CC7B-4BCD-AA24-424BE899958A}"/>
+                  <a16:creationId xmlns:a16="http://schemas.microsoft.com/office/drawing/2014/main" id="{A5DC711C-CC7B-4BCD-AA24-424BE899958A}"/>
                 </a:ext>
               </a:extLst>
             </p:cNvPr>
@@ -6350,7 +6551,7 @@
             <p:cNvPr id="5" name="文字方塊 4">
               <a:extLst>
                 <a:ext uri="{FF2B5EF4-FFF2-40B4-BE49-F238E27FC236}">
-                  <a16:creationId xmlns:a16="http://schemas.microsoft.com/office/drawing/2014/main" xmlns="" id="{CC7ABC9E-01EF-425D-8E74-48A43D9C65CD}"/>
+                  <a16:creationId xmlns:a16="http://schemas.microsoft.com/office/drawing/2014/main" id="{CC7ABC9E-01EF-425D-8E74-48A43D9C65CD}"/>
                 </a:ext>
               </a:extLst>
             </p:cNvPr>
@@ -6405,7 +6606,7 @@
           <p:cNvPr id="6" name="矩形 5">
             <a:extLst>
               <a:ext uri="{FF2B5EF4-FFF2-40B4-BE49-F238E27FC236}">
-                <a16:creationId xmlns:a16="http://schemas.microsoft.com/office/drawing/2014/main" xmlns="" id="{251C348E-2D22-4DE8-B44D-1701DC2482B8}"/>
+                <a16:creationId xmlns:a16="http://schemas.microsoft.com/office/drawing/2014/main" id="{251C348E-2D22-4DE8-B44D-1701DC2482B8}"/>
               </a:ext>
             </a:extLst>
           </p:cNvPr>
@@ -6444,7 +6645,7 @@
           <p:cNvPr id="7" name="矩形 6">
             <a:extLst>
               <a:ext uri="{FF2B5EF4-FFF2-40B4-BE49-F238E27FC236}">
-                <a16:creationId xmlns:a16="http://schemas.microsoft.com/office/drawing/2014/main" xmlns="" id="{449972E5-9A5F-437C-9B35-45C93A8AFF8D}"/>
+                <a16:creationId xmlns:a16="http://schemas.microsoft.com/office/drawing/2014/main" id="{449972E5-9A5F-437C-9B35-45C93A8AFF8D}"/>
               </a:ext>
             </a:extLst>
           </p:cNvPr>
@@ -6497,7 +6698,7 @@
           <p:cNvPr id="8" name="圓角矩形 6">
             <a:extLst>
               <a:ext uri="{FF2B5EF4-FFF2-40B4-BE49-F238E27FC236}">
-                <a16:creationId xmlns:a16="http://schemas.microsoft.com/office/drawing/2014/main" xmlns="" id="{A8DE8DDB-CE73-4804-AB78-B70EFB29D495}"/>
+                <a16:creationId xmlns:a16="http://schemas.microsoft.com/office/drawing/2014/main" id="{A8DE8DDB-CE73-4804-AB78-B70EFB29D495}"/>
               </a:ext>
             </a:extLst>
           </p:cNvPr>
@@ -6550,7 +6751,7 @@
           <p:cNvPr id="9" name="文字方塊 8">
             <a:extLst>
               <a:ext uri="{FF2B5EF4-FFF2-40B4-BE49-F238E27FC236}">
-                <a16:creationId xmlns:a16="http://schemas.microsoft.com/office/drawing/2014/main" xmlns="" id="{EEFEA2BF-382A-4752-B466-E1D2FE26365D}"/>
+                <a16:creationId xmlns:a16="http://schemas.microsoft.com/office/drawing/2014/main" id="{EEFEA2BF-382A-4752-B466-E1D2FE26365D}"/>
               </a:ext>
             </a:extLst>
           </p:cNvPr>
@@ -6604,7 +6805,7 @@
           <p:cNvPr id="10" name="矩形 9">
             <a:extLst>
               <a:ext uri="{FF2B5EF4-FFF2-40B4-BE49-F238E27FC236}">
-                <a16:creationId xmlns:a16="http://schemas.microsoft.com/office/drawing/2014/main" xmlns="" id="{7FDAF179-9B2E-411A-B0C7-CD050D262008}"/>
+                <a16:creationId xmlns:a16="http://schemas.microsoft.com/office/drawing/2014/main" id="{7FDAF179-9B2E-411A-B0C7-CD050D262008}"/>
               </a:ext>
             </a:extLst>
           </p:cNvPr>
@@ -6657,7 +6858,7 @@
           <p:cNvPr id="11" name="圖片 10">
             <a:extLst>
               <a:ext uri="{FF2B5EF4-FFF2-40B4-BE49-F238E27FC236}">
-                <a16:creationId xmlns:a16="http://schemas.microsoft.com/office/drawing/2014/main" xmlns="" id="{5BE1084A-E4FD-4463-932D-30523A0449CF}"/>
+                <a16:creationId xmlns:a16="http://schemas.microsoft.com/office/drawing/2014/main" id="{5BE1084A-E4FD-4463-932D-30523A0449CF}"/>
               </a:ext>
             </a:extLst>
           </p:cNvPr>
@@ -6693,7 +6894,7 @@
           <p:cNvPr id="12" name="矩形 11">
             <a:extLst>
               <a:ext uri="{FF2B5EF4-FFF2-40B4-BE49-F238E27FC236}">
-                <a16:creationId xmlns:a16="http://schemas.microsoft.com/office/drawing/2014/main" xmlns="" id="{C50DCA4B-3556-4099-9C32-9297DAF2DB06}"/>
+                <a16:creationId xmlns:a16="http://schemas.microsoft.com/office/drawing/2014/main" id="{C50DCA4B-3556-4099-9C32-9297DAF2DB06}"/>
               </a:ext>
             </a:extLst>
           </p:cNvPr>
@@ -6739,7 +6940,7 @@
           <p:cNvPr id="13" name="直線單箭頭接點 12">
             <a:extLst>
               <a:ext uri="{FF2B5EF4-FFF2-40B4-BE49-F238E27FC236}">
-                <a16:creationId xmlns:a16="http://schemas.microsoft.com/office/drawing/2014/main" xmlns="" id="{F960792B-F82F-44F4-AC09-EEFA605794A2}"/>
+                <a16:creationId xmlns:a16="http://schemas.microsoft.com/office/drawing/2014/main" id="{F960792B-F82F-44F4-AC09-EEFA605794A2}"/>
               </a:ext>
             </a:extLst>
           </p:cNvPr>
@@ -6781,7 +6982,7 @@
           <p:cNvPr id="14" name="圓角矩形 6">
             <a:extLst>
               <a:ext uri="{FF2B5EF4-FFF2-40B4-BE49-F238E27FC236}">
-                <a16:creationId xmlns:a16="http://schemas.microsoft.com/office/drawing/2014/main" xmlns="" id="{7CD9D1F1-45AB-4A83-BAF4-DB58F90FD930}"/>
+                <a16:creationId xmlns:a16="http://schemas.microsoft.com/office/drawing/2014/main" id="{7CD9D1F1-45AB-4A83-BAF4-DB58F90FD930}"/>
               </a:ext>
             </a:extLst>
           </p:cNvPr>
@@ -6831,7 +7032,7 @@
           <p:cNvPr id="15" name="文字方塊 14">
             <a:extLst>
               <a:ext uri="{FF2B5EF4-FFF2-40B4-BE49-F238E27FC236}">
-                <a16:creationId xmlns:a16="http://schemas.microsoft.com/office/drawing/2014/main" xmlns="" id="{2A38FED3-41D3-4F5C-994A-88677072ED11}"/>
+                <a16:creationId xmlns:a16="http://schemas.microsoft.com/office/drawing/2014/main" id="{2A38FED3-41D3-4F5C-994A-88677072ED11}"/>
               </a:ext>
             </a:extLst>
           </p:cNvPr>
@@ -6885,7 +7086,7 @@
           <p:cNvPr id="16" name="矩形 15">
             <a:extLst>
               <a:ext uri="{FF2B5EF4-FFF2-40B4-BE49-F238E27FC236}">
-                <a16:creationId xmlns:a16="http://schemas.microsoft.com/office/drawing/2014/main" xmlns="" id="{9D918EDB-4CFC-4B66-9EB0-A862160D0A27}"/>
+                <a16:creationId xmlns:a16="http://schemas.microsoft.com/office/drawing/2014/main" id="{9D918EDB-4CFC-4B66-9EB0-A862160D0A27}"/>
               </a:ext>
             </a:extLst>
           </p:cNvPr>
@@ -6938,7 +7139,7 @@
           <p:cNvPr id="17" name="圖片 16">
             <a:extLst>
               <a:ext uri="{FF2B5EF4-FFF2-40B4-BE49-F238E27FC236}">
-                <a16:creationId xmlns:a16="http://schemas.microsoft.com/office/drawing/2014/main" xmlns="" id="{0EFF49B5-497B-4921-8CF6-BD4E4B674ADF}"/>
+                <a16:creationId xmlns:a16="http://schemas.microsoft.com/office/drawing/2014/main" id="{0EFF49B5-497B-4921-8CF6-BD4E4B674ADF}"/>
               </a:ext>
             </a:extLst>
           </p:cNvPr>
@@ -6974,7 +7175,7 @@
           <p:cNvPr id="18" name="圖片 17">
             <a:extLst>
               <a:ext uri="{FF2B5EF4-FFF2-40B4-BE49-F238E27FC236}">
-                <a16:creationId xmlns:a16="http://schemas.microsoft.com/office/drawing/2014/main" xmlns="" id="{65E53252-C355-4873-ABD1-69208ED76225}"/>
+                <a16:creationId xmlns:a16="http://schemas.microsoft.com/office/drawing/2014/main" id="{65E53252-C355-4873-ABD1-69208ED76225}"/>
               </a:ext>
             </a:extLst>
           </p:cNvPr>
@@ -7004,7 +7205,7 @@
           <p:cNvPr id="19" name="直線單箭頭接點 18">
             <a:extLst>
               <a:ext uri="{FF2B5EF4-FFF2-40B4-BE49-F238E27FC236}">
-                <a16:creationId xmlns:a16="http://schemas.microsoft.com/office/drawing/2014/main" xmlns="" id="{4FD714C3-D43C-4AE3-A614-B9AE37447913}"/>
+                <a16:creationId xmlns:a16="http://schemas.microsoft.com/office/drawing/2014/main" id="{4FD714C3-D43C-4AE3-A614-B9AE37447913}"/>
               </a:ext>
             </a:extLst>
           </p:cNvPr>
@@ -7047,7 +7248,7 @@
           <p:cNvPr id="20" name="語音泡泡: 矩形 19">
             <a:extLst>
               <a:ext uri="{FF2B5EF4-FFF2-40B4-BE49-F238E27FC236}">
-                <a16:creationId xmlns:a16="http://schemas.microsoft.com/office/drawing/2014/main" xmlns="" id="{B0052EBC-8056-4CFC-9B7E-870F38D20FD1}"/>
+                <a16:creationId xmlns:a16="http://schemas.microsoft.com/office/drawing/2014/main" id="{B0052EBC-8056-4CFC-9B7E-870F38D20FD1}"/>
               </a:ext>
             </a:extLst>
           </p:cNvPr>
@@ -7089,7 +7290,7 @@
             <a:pPr algn="ctr"/>
             <a:r>
               <a:rPr lang="en-US" dirty="0"/>
-              <a:t>Secure API with Policies</a:t>
+              <a:t>Secure API with role(s)</a:t>
             </a:r>
           </a:p>
         </p:txBody>
@@ -7099,7 +7300,7 @@
           <p:cNvPr id="21" name="語音泡泡: 矩形 20">
             <a:extLst>
               <a:ext uri="{FF2B5EF4-FFF2-40B4-BE49-F238E27FC236}">
-                <a16:creationId xmlns:a16="http://schemas.microsoft.com/office/drawing/2014/main" xmlns="" id="{53CD2CE1-4D7B-4C00-BFBA-40FA2850023D}"/>
+                <a16:creationId xmlns:a16="http://schemas.microsoft.com/office/drawing/2014/main" id="{53CD2CE1-4D7B-4C00-BFBA-40FA2850023D}"/>
               </a:ext>
             </a:extLst>
           </p:cNvPr>
@@ -7108,8 +7309,8 @@
         </p:nvSpPr>
         <p:spPr>
           <a:xfrm>
-            <a:off x="4978759" y="4572804"/>
-            <a:ext cx="2541080" cy="962900"/>
+            <a:off x="4941778" y="4318963"/>
+            <a:ext cx="2541080" cy="735291"/>
           </a:xfrm>
           <a:prstGeom prst="wedgeRectCallout">
             <a:avLst>
@@ -7141,7 +7342,7 @@
             <a:pPr algn="ctr"/>
             <a:r>
               <a:rPr lang="en-US" dirty="0"/>
-              <a:t>Add required claims for Policy when issue an JWT token</a:t>
+              <a:t>Add role claims when issue an JWT token</a:t>
             </a:r>
           </a:p>
         </p:txBody>
@@ -7149,7 +7350,7 @@
     </p:spTree>
     <p:extLst>
       <p:ext uri="{BB962C8B-B14F-4D97-AF65-F5344CB8AC3E}">
-        <p14:creationId xmlns:p14="http://schemas.microsoft.com/office/powerpoint/2010/main" val="1521631976"/>
+        <p14:creationId xmlns:p14="http://schemas.microsoft.com/office/powerpoint/2010/main" val="291861415"/>
       </p:ext>
     </p:extLst>
   </p:cSld>
@@ -7178,67 +7379,19 @@
       </p:grpSpPr>
       <p:sp>
         <p:nvSpPr>
-          <p:cNvPr id="3" name="矩形 2"/>
+          <p:cNvPr id="2" name="圓角矩形 6">
+            <a:extLst>
+              <a:ext uri="{FF2B5EF4-FFF2-40B4-BE49-F238E27FC236}">
+                <a16:creationId xmlns:a16="http://schemas.microsoft.com/office/drawing/2014/main" id="{706DE702-26E5-46A9-8661-165882CFAF5B}"/>
+              </a:ext>
+            </a:extLst>
+          </p:cNvPr>
           <p:cNvSpPr/>
           <p:nvPr/>
         </p:nvSpPr>
         <p:spPr>
           <a:xfrm>
-            <a:off x="940125" y="1431559"/>
-            <a:ext cx="11044511" cy="4512039"/>
-          </a:xfrm>
-          <a:prstGeom prst="rect">
-            <a:avLst/>
-          </a:prstGeom>
-          <a:solidFill>
-            <a:schemeClr val="bg1">
-              <a:lumMod val="85000"/>
-            </a:schemeClr>
-          </a:solidFill>
-          <a:ln w="19050">
-            <a:prstDash val="sysDash"/>
-          </a:ln>
-        </p:spPr>
-        <p:style>
-          <a:lnRef idx="2">
-            <a:schemeClr val="accent1">
-              <a:shade val="50000"/>
-            </a:schemeClr>
-          </a:lnRef>
-          <a:fillRef idx="1">
-            <a:schemeClr val="accent1"/>
-          </a:fillRef>
-          <a:effectRef idx="0">
-            <a:schemeClr val="accent1"/>
-          </a:effectRef>
-          <a:fontRef idx="minor">
-            <a:schemeClr val="lt1"/>
-          </a:fontRef>
-        </p:style>
-        <p:txBody>
-          <a:bodyPr rtlCol="0" anchor="ctr"/>
-          <a:lstStyle/>
-          <a:p>
-            <a:pPr algn="ctr"/>
-            <a:endParaRPr lang="zh-TW" altLang="en-US"/>
-          </a:p>
-        </p:txBody>
-      </p:sp>
-      <p:sp>
-        <p:nvSpPr>
-          <p:cNvPr id="4" name="圓角矩形 6">
-            <a:extLst>
-              <a:ext uri="{FF2B5EF4-FFF2-40B4-BE49-F238E27FC236}">
-                <a16:creationId xmlns:a16="http://schemas.microsoft.com/office/drawing/2014/main" xmlns="" id="{9292555D-6383-47AB-94C4-8C24D05C629F}"/>
-              </a:ext>
-            </a:extLst>
-          </p:cNvPr>
-          <p:cNvSpPr/>
-          <p:nvPr/>
-        </p:nvSpPr>
-        <p:spPr>
-          <a:xfrm>
-            <a:off x="1221774" y="1825615"/>
+            <a:off x="1191794" y="1795636"/>
             <a:ext cx="3392205" cy="2142064"/>
           </a:xfrm>
           <a:prstGeom prst="roundRect">
@@ -7246,7 +7399,7 @@
           </a:prstGeom>
           <a:ln w="25400">
             <a:solidFill>
-              <a:schemeClr val="accent1"/>
+              <a:srgbClr val="FF0000"/>
             </a:solidFill>
             <a:prstDash val="sysDash"/>
           </a:ln>
@@ -7277,51 +7430,12 @@
           </a:p>
         </p:txBody>
       </p:sp>
-      <p:sp>
-        <p:nvSpPr>
-          <p:cNvPr id="8" name="AutoShape 2" descr="data:image/jpeg;base64,/9j/4AAQSkZJRgABAQAAAQABAAD/2wCEAAkGBhASEBAQDxAODxQSEg8PEBAUEBAPEBAQFBAVFBQQFRQXHCYeFxkjGRQUHy8gIycpLCwsFR4xNTMqNSYrLCkBCQoKDgwOFw8PGiwcHBwpLCksKSkpKSwpKSktNSopLCkpLCwsNSkpKSksKSkpKSwpKiopKTUpKSkvKSwpKSkpKf/AABEIAMwAzAMBIgACEQEDEQH/xAAbAAABBQEBAAAAAAAAAAAAAAAAAgMEBQYBB//EAEUQAAEDAgIGBgYGCAUFAAAAAAEAAgMEERIhBQYxQVFxE2GBkaHBIjJCUpKxFCMzcqKyJFNiY4LR4fAHFkOTsxVEg8LD/8QAGQEBAAMBAQAAAAAAAAAAAAAAAAEDBAIF/8QAJxEBAAIBAwMDBAMAAAAAAAAAAAECEQMSIQQxQRMyYQUiQlGRocH/2gAMAwEAAhEDEQA/APcUIQgFFrtIsiDS+/pEgWF9m9Slm9bpheJu+z3HkbAfIoLSPT0B9u3MFSWV0Z2PZ8QC8j0hrUYp5IRCJAzAMQkwuJcwOIsRbK6k0+tzMsUNQ37vRyfIhd7LYzhxvrHGXrDXg7CD2pS8zbrVTb5JW/ehly7QCFLptbICbMrIr8OlwHudZc4mO7qJiez0FCydPpuY+rIH8ix/yU9mmpd7W/CQoSvUKobpx29g7yE83TTd7XDuKCxQobdKxneRzBTgr4/fHigkISGzNOxzT2hLQCEIQCEIQCEIQCEIQCEIQCEIQCx+tUmKcN91rG95J81sFh9Nz/pEznWsw+DGXQebl/SVVQ7beaQDk12EflV/R0TTuWX1ediAefau883Eu81sKIr161xSIePrzm0p8OiGFEurrCLEA9RzCn0pyUrEqpiGfdMM27VCPcxretowHvbZJGgpWZRzVEfU2aQDxK1LXJQKiaRKY17x2lmfote0+jVT8nYJB+JqdbpOvZ63QSc4iwnta7yW4hha5rTYZgLkmjmHcFmmK/p6EX1MZiWNZrPMPXpmn7krh+ZqdGt7B60E45GN/mFpH6EjO5RZdW2HcFG2ruNW6sj1upT6xlZ96Jx8W3U6DWOmPq1UV+BfgPcVHn1SadwUGXU7qUenH7TGvbzDURaQJ9WUO5Oa5SGVknHwC8/qdTyPVFuQwnwUZmhall8EszeT3jzUen8u/XjzD1Btc7eAnm1V9y8mdpTSUR9GeQgbnBr/ABIulx6+6QZ67IJOcZae8HyT0bJ9ej1oShclna1pc4hoaCSTsAG9YXVTXmeqqGwvp4mAhxc9rnXADSdhHEDvWj1lntRz9bQz4iAuLVms4lbW0WjMLljwQCCCCLgjMEcUpZ3UeoLqdzSb4Hlo5YQbeK0S5dBCEIBCEIBeZ6x1BENdIdoiqXeBA8l6RUSYWOdwa49wXkuts9qCoO0vMMXPHKCfAFTWMzEE8QzOgWWaBwAHcLLU0RWY0R6oWloSvamOHi37r+mdkpGJQ6ZykFyoZ7H2OS8SjtelY1OFMyvtGSXZbgSPPzUvEqrREnrDkVYl6yXjFperoXzSDl1wlN41wvXGF244SuBNF66HqcOdwfZNCJpOwLjpElkmanCM8o1Vo+M7goE2gYyNitJnpp0isiZwiYhD0FodsM5e232bx2lzbeak62yfopHGSMeN0/SH0nnqY3tu4n5hVut0v1UTeMjj8Lf6rNqTmzbpRisLXUqK1Lf3nvPl5K+Vdq7FhpYR+wHfFn5qxVawIQhAIQhBX6elw00p/Zt3kBeWa02dHTxHZJOXHlHC7zeO5ej63y2p7e89g7rnyXmOsp+upBwjqJO1z42D8rl3pxm0Obe2VXSxFhLTtBt/VXtE5VOloiCyRuVwGu5jYe75J+hrCOB8F7Uc1y8i8Ylp6Z6fdIqqmrRbenzVDiqtvLNdYtkS8agxzJ0SqcM1lzouT0+YIVoXrP0E1nX4Zq4MizaleWzp7/bhIxpBkTBkTZlXG1o3pBkSnSZKGJEqSVNqNxb5E2yX0gmJJUyJsxzXUVTFk6d+ajmRdqXqGZFMRw7meVlo/ZI7i8D4WD+ap9a5bvibwY93e7+ittHfZA+8+V34y3/1VJpwY6oN6omfEf6rDf3S9GnthvqJto4xwYwfhCeXGiwA4ZLq5dhCEIBCEIMtr1UWbA3i9zjyDbea831gl/TGt/V08DSOtxfKfCRvctvr7NeeNg9mMntc63kvOdKVGKuqjwl6Mco2NYPyq/QjN1erOKrOVoews4jLqI2Kvpn280/DOmaoWfcbHZ9u/wDvrXraf6edqRnlPimThqFWMmXTUK2KsdoWsVQpLao8SqSOoUls672sl6tHQ1Rzz3K5irLtB6gspQz5O5K0o6r0eRI81n1NNOlaYnC4dVJp1YoD6hR3VCq9Nqi0riKruUmSszKr4J8iUy6oUbE7k6St6kwa3MKHJMmDKuoo7iWgqan0RyUA1RvuXZJbsHJVlTNZryNzXW54TZcRV3lsdHfYQdcTHHm8Yz4uKq8OPSLR+8jB/haD8wrmNgAY0ZANY0DgA0BVOrvp1xd+1M/5gfNeVM5nL2Y4btCEKEhCEIBCEIPPNYX9JpHDwfBH2XBPzK8sgqMUkr9uKSV3fI4hei1lZ+l1M5/0vpU3+zE8jxaF5ZQus0ch8ls6SMzMqNeeIheRTqTM/EzrGYVMyZTIalejHdjkCdBnUOd9nHvCb6ZaYZ7VWcc6ksnVMyZSWTK2IZr1aKhn9F3Yp9DU7RyKz9HP6J5qbTVFj4Li1c5ZsYsuZKhR3VChyVKZE9yFVtaKroz2ZzTXTqHUVGwcAmunXE1TCa+ZIEqiGVHSZLnDvK8ZNeMKEPSc1vvPjbzvI247roppfq0rRAxVNOOErX9jLuPgCqbcRMrNPm8R8tzLLYudwxO7rlV2pMd53HhGe8uCk1Tvq5DwY/5W80vUaL7Z/wBxvzP8l473WrQhCAQhCASZH2BJ3AnuCUq/T82GlqHcIpB2lpA+aDyHS1Xho66QnN0BZfrmla0+BcsHC/Ja3Wx+HR792Oopo+qzWvkI8Asaw5L1ugpmsz8sfU25iEkSJ+OdQcSW163bGbclVD7i/BRukXS9RypxhHdKbKpDJVXhyeY9XVlVaq4pZsu1Sm1FrKpp35J8yKzDJavKyfUrtPNdyrDMnqaW1yqph3jhYyVN3FdEyrGzJ0SqmU4TxKuulUISpXSKuRdUcvoHtU/VoXqmH3WTP7DGY/nIFS0MmR/vcr3VCO88r/chDP8AclaR/wAJWXXnFJW9NzrVhpdJPtDJ1hre9w/krbUyO0Dne9I7wACo9Lu+qA4vH4Wn+a02q7bUsXXiP4yvJe6tUIQgEIQgFRa6y2opR72Fne4X8Ar1RNJaLinZglBIviFnFtja18uaDyaOdzQWgjCcy1zWPaTxLXAi6Z+g0z8WOhpX5Xc5ofA+3HFG4fJbyq/w9jP2Ur29TgHKnqdSKply3o35HMGxtwzTNq+2cSWjMMfPqpQSep9LpnHYA6OojHxAO8VDd/h87Po6unPASNlgPabOC08uhalhziflyK76TfWY9vWWuA71pr1etX8v55Vzo0nwxVXqNXsBLYOmaPaheycdgacXgqGpp3xkiVj4iNoexzLd4XqrJRtBHMbU59OkGx7+V8Q7itFfqF/yiJ/pVPS18S8jaU40r0qshgkuZqSklJ2u6LoJT/5Ii0qnn1Yo3G7W1MHUyVsrRyDxfxWin1Cn5RMKrdLbxLMwHIJxzlfP1QZ/o1beps8L4vxxl48FBqtWqppyjZMNxikZLfk0HF3gLZXrNG3a3+Mdun1InsrcSeDrN5puppZYj9dFLF99jmjvIsh8oNrEbF3uieYlVNZjiS2uTocmWlOtVcoOtcnGlNNTjVVLlNon7exavUxotUP3l8UZ/hY93/0WPgNitnqi0dA8+9NJf+FrGrH1M/ZLR0dc6ufhY6Xd9mPvH5BbPQkWGnhH7DXfEMXmsXpPN0bf2fFzit/EzC1rRuAHcLLzHtFoQhAIQhAIQhALhC6hAxJCDtAPYocmjY/caN+XonvCsrJJYgztVq5C65tn15gfI+KrKnVNvsEjk7aeRBC2LokxKwAEkgAbScggwU2rUw3X7Ae8g+Sr5dDTN9jF1tIPhkVtKvTcLdl38sm958rqrn1jJ2NYObcZHacvBE5ZSSNzfXa5n3gW/NIsOpXFdWPfm15jcPaAbY9Tm2sQqt2lXg4Z4KeT9oNMTiOIcz+SGSoauRuTJJGjgHOw/DsXJaeGU3mp6aQna7omxPPN8WEntSPp9OTnHPF91zZR3OsfFS6c0zvUq4gfdla6E9+Y8UiZjtwicT3RXaqUL/YqIDxjmEjR/BIL/iUKp1F3wVbXcGzRPiPa9uJq08VE8+rhk643sk+RSjER6wLeYIV1dfUjyqtoac+GLfqjXtuWxxzAfqpopCeTb4vBV9RHNESJoJorbccbmgdpFl6I7ZfrGdrkC+ZUptR7LZHPFr2OwZ7LG4VsdXfyot0dJ7PMYa1p3r0DVgD6JCR7XSvPbK+3gAn59GU8l+kp6Z99pMQa/wCNliFJpoGtDWMaGMFmtYLkNbsAF8+9caut6kYTodP6VpnJWDFVRt4OhZ3WK3ixGi246trv3hd2DJbdZ2sIQhAIQhAIQhAIQhAIQkveACTsAJPIII+kNIMibieeQ3krG6Q0lLMc3YRuaMgEmurXTPL3b9g90bgmmtQRjR39pc/6ceI8VPaxOMiQVJ0a7q70zPotxFiCfJaNtMummQYybRHAkcwq+o0RJuDXdtvmt5LBxAPYoktE07rckHnj6Z8Zvhcw8RceIVpo7WeqZ6PTvcNwfaVvL0rrRy6P4WPUqup0Mw7WAHiPRKCVBrG8/aQwv62h0R8MlaU2kad/syxHf6sg8M1no6fDtu7rKkxyINPBQ4wXRPa8DI3BaU7Ho6XE30CcxmPStnvtsVTofSBjeDnbeOpbgYXDMAg57kETQmjQwl/Ox457VdXUdhTrSgcQuArqAQhCAQhCAQhCAUbSQvDKP3b/AMpUlcI3IPPWtTrWqZpDR5jkwbSQXR7frGjhxeBtHIqOwIFRsUqONIjYpEYQOsjXXRpTV0oIczEzHBe6lSrlIM3DqBQV0kQDi12zceCjVEBGThy4FW2k4Mg7hkeRUSGUEdHJmD6p4FBTy0oUKSnI2K7q6UsPEbj5KG9qCPSDMf3sW7oHWYwH3R8lnNC6IL3E2u1pGI7hvw9Z48LrUsgsgfY5SGJmNifa1AsJS4AuoBCEIBCEIBCEIBCEIGaukZKwskGIHsIO4gjMHrVBXaKljscLqloyxtwipaN2Jps2Xnkea0qEGSiwl2Fj2ud+rP1cw5xuse5SOjI9YFvMEK6r9FQzjDNEyQbrjNvW121p5KH/AJfwi0FRUwjc0vE7AOGGUO+aCK1DkP0ZXNvhlop+AfBJAe10bj8kjoK32qWjd9yqlb+aNA29cpzZ3YU4aeqP/Zxc/ppt/wAaR9BrPZpaRvW6pldb4WoHJSCCDvyVMYXG4AJtfYL+KuY9A1bj6c1NGOEcBkPxPd5KX/leNw+uknn4gydGw/wR4QgzjZS4dH9o73GDpZO4ZDmSFY6M1Xe4YpvqWn2AcUrhwc7Y3kL81pKOhjibgiYyNvBrQ0c+tPoGoaZrGhrGhoGwAWCUYwloQJDF2y6hAIQhAIQhAIQhAIQhAIQhAIQhAIQhAIQhAIQhAIQhAIQhAIQhAIQhAIQhAIQhB//Z">
-            <a:extLst>
-              <a:ext uri="{FF2B5EF4-FFF2-40B4-BE49-F238E27FC236}">
-                <a16:creationId xmlns:a16="http://schemas.microsoft.com/office/drawing/2014/main" xmlns="" id="{15B92B98-B7C8-4A75-A841-F25CD0136DE7}"/>
-              </a:ext>
-            </a:extLst>
-          </p:cNvPr>
-          <p:cNvSpPr>
-            <a:spLocks noChangeAspect="1" noChangeArrowheads="1"/>
-          </p:cNvSpPr>
-          <p:nvPr/>
-        </p:nvSpPr>
-        <p:spPr bwMode="auto">
-          <a:xfrm>
-            <a:off x="155575" y="-721585"/>
-            <a:ext cx="304800" cy="304801"/>
-          </a:xfrm>
-          <a:prstGeom prst="rect">
-            <a:avLst/>
-          </a:prstGeom>
-          <a:noFill/>
-        </p:spPr>
-        <p:txBody>
-          <a:bodyPr vert="horz" wrap="square" lIns="91440" tIns="45720" rIns="91440" bIns="45720" numCol="1" anchor="t" anchorCtr="0" compatLnSpc="1">
-            <a:prstTxWarp prst="textNoShape">
-              <a:avLst/>
-            </a:prstTxWarp>
-          </a:bodyPr>
-          <a:lstStyle/>
-          <a:p>
-            <a:endParaRPr lang="zh-TW" altLang="en-US">
-              <a:latin typeface="Consolas" panose="020B0609020204030204" pitchFamily="49" charset="0"/>
-              <a:cs typeface="Consolas" panose="020B0609020204030204" pitchFamily="49" charset="0"/>
-            </a:endParaRPr>
-          </a:p>
-        </p:txBody>
-      </p:sp>
       <p:grpSp>
         <p:nvGrpSpPr>
-          <p:cNvPr id="17" name="群組 16">
-            <a:extLst>
-              <a:ext uri="{FF2B5EF4-FFF2-40B4-BE49-F238E27FC236}">
-                <a16:creationId xmlns:a16="http://schemas.microsoft.com/office/drawing/2014/main" xmlns="" id="{3E62AE25-4106-44ED-8F4E-D5D956A394D2}"/>
+          <p:cNvPr id="3" name="群組 2">
+            <a:extLst>
+              <a:ext uri="{FF2B5EF4-FFF2-40B4-BE49-F238E27FC236}">
+                <a16:creationId xmlns:a16="http://schemas.microsoft.com/office/drawing/2014/main" id="{A91D7176-EE55-4C33-B06B-C483824D2263}"/>
               </a:ext>
             </a:extLst>
           </p:cNvPr>
@@ -7330,7 +7444,7 @@
         </p:nvGrpSpPr>
         <p:grpSpPr>
           <a:xfrm>
-            <a:off x="1483395" y="2590023"/>
+            <a:off x="1453415" y="2560044"/>
             <a:ext cx="2936123" cy="613246"/>
             <a:chOff x="1027702" y="2502131"/>
             <a:chExt cx="2309308" cy="492060"/>
@@ -7338,10 +7452,10 @@
         </p:grpSpPr>
         <p:pic>
           <p:nvPicPr>
-            <p:cNvPr id="18" name="圖片 17">
+            <p:cNvPr id="4" name="圖片 3">
               <a:extLst>
                 <a:ext uri="{FF2B5EF4-FFF2-40B4-BE49-F238E27FC236}">
-                  <a16:creationId xmlns:a16="http://schemas.microsoft.com/office/drawing/2014/main" xmlns="" id="{DF00FD23-F9E0-40CA-BFAD-2BC20441329D}"/>
+                  <a16:creationId xmlns:a16="http://schemas.microsoft.com/office/drawing/2014/main" id="{A5DC711C-CC7B-4BCD-AA24-424BE899958A}"/>
                 </a:ext>
               </a:extLst>
             </p:cNvPr>
@@ -7374,10 +7488,10 @@
         </p:pic>
         <p:sp>
           <p:nvSpPr>
-            <p:cNvPr id="19" name="文字方塊 18">
+            <p:cNvPr id="5" name="文字方塊 4">
               <a:extLst>
                 <a:ext uri="{FF2B5EF4-FFF2-40B4-BE49-F238E27FC236}">
-                  <a16:creationId xmlns:a16="http://schemas.microsoft.com/office/drawing/2014/main" xmlns="" id="{14F08A50-B905-4E9F-B65E-EEFCE05DA4E3}"/>
+                  <a16:creationId xmlns:a16="http://schemas.microsoft.com/office/drawing/2014/main" id="{CC7ABC9E-01EF-425D-8E74-48A43D9C65CD}"/>
                 </a:ext>
               </a:extLst>
             </p:cNvPr>
@@ -7429,10 +7543,10 @@
       </p:grpSp>
       <p:sp>
         <p:nvSpPr>
-          <p:cNvPr id="35" name="矩形 34">
-            <a:extLst>
-              <a:ext uri="{FF2B5EF4-FFF2-40B4-BE49-F238E27FC236}">
-                <a16:creationId xmlns:a16="http://schemas.microsoft.com/office/drawing/2014/main" xmlns="" id="{A3837EC7-3FF7-497F-B8B9-5A0B2AE1FAD0}"/>
+          <p:cNvPr id="6" name="矩形 5">
+            <a:extLst>
+              <a:ext uri="{FF2B5EF4-FFF2-40B4-BE49-F238E27FC236}">
+                <a16:creationId xmlns:a16="http://schemas.microsoft.com/office/drawing/2014/main" id="{251C348E-2D22-4DE8-B44D-1701DC2482B8}"/>
               </a:ext>
             </a:extLst>
           </p:cNvPr>
@@ -7441,7 +7555,7 @@
         </p:nvSpPr>
         <p:spPr>
           <a:xfrm>
-            <a:off x="1939082" y="2025682"/>
+            <a:off x="1913538" y="1427691"/>
             <a:ext cx="1957587" cy="369332"/>
           </a:xfrm>
           <a:prstGeom prst="rect">
@@ -7468,10 +7582,10 @@
       </p:sp>
       <p:sp>
         <p:nvSpPr>
-          <p:cNvPr id="38" name="圓角矩形 6">
-            <a:extLst>
-              <a:ext uri="{FF2B5EF4-FFF2-40B4-BE49-F238E27FC236}">
-                <a16:creationId xmlns:a16="http://schemas.microsoft.com/office/drawing/2014/main" xmlns="" id="{AA3F0518-490B-4DDF-BB4F-AE947406C799}"/>
+          <p:cNvPr id="7" name="矩形 6">
+            <a:extLst>
+              <a:ext uri="{FF2B5EF4-FFF2-40B4-BE49-F238E27FC236}">
+                <a16:creationId xmlns:a16="http://schemas.microsoft.com/office/drawing/2014/main" id="{449972E5-9A5F-437C-9B35-45C93A8AFF8D}"/>
               </a:ext>
             </a:extLst>
           </p:cNvPr>
@@ -7480,62 +7594,7 @@
         </p:nvSpPr>
         <p:spPr>
           <a:xfrm>
-            <a:off x="5058761" y="1825615"/>
-            <a:ext cx="3055627" cy="2142064"/>
-          </a:xfrm>
-          <a:prstGeom prst="roundRect">
-            <a:avLst/>
-          </a:prstGeom>
-          <a:ln w="12700">
-            <a:solidFill>
-              <a:schemeClr val="accent5">
-                <a:lumMod val="50000"/>
-              </a:schemeClr>
-            </a:solidFill>
-            <a:prstDash val="sysDash"/>
-          </a:ln>
-        </p:spPr>
-        <p:style>
-          <a:lnRef idx="2">
-            <a:schemeClr val="accent1"/>
-          </a:lnRef>
-          <a:fillRef idx="1">
-            <a:schemeClr val="lt1"/>
-          </a:fillRef>
-          <a:effectRef idx="0">
-            <a:schemeClr val="accent1"/>
-          </a:effectRef>
-          <a:fontRef idx="minor">
-            <a:schemeClr val="dk1"/>
-          </a:fontRef>
-        </p:style>
-        <p:txBody>
-          <a:bodyPr rtlCol="0" anchor="ctr"/>
-          <a:lstStyle/>
-          <a:p>
-            <a:pPr algn="ctr"/>
-            <a:endParaRPr lang="zh-TW" altLang="en-US">
-              <a:latin typeface="Consolas" panose="020B0609020204030204" pitchFamily="49" charset="0"/>
-              <a:cs typeface="Consolas" panose="020B0609020204030204" pitchFamily="49" charset="0"/>
-            </a:endParaRPr>
-          </a:p>
-        </p:txBody>
-      </p:sp>
-      <p:sp>
-        <p:nvSpPr>
-          <p:cNvPr id="37" name="矩形 36">
-            <a:extLst>
-              <a:ext uri="{FF2B5EF4-FFF2-40B4-BE49-F238E27FC236}">
-                <a16:creationId xmlns:a16="http://schemas.microsoft.com/office/drawing/2014/main" xmlns="" id="{79B0EFC5-385A-4CBF-8F26-44920131D317}"/>
-              </a:ext>
-            </a:extLst>
-          </p:cNvPr>
-          <p:cNvSpPr/>
-          <p:nvPr/>
-        </p:nvSpPr>
-        <p:spPr>
-          <a:xfrm>
-            <a:off x="1447760" y="2575911"/>
+            <a:off x="1417780" y="2545932"/>
             <a:ext cx="2944435" cy="613245"/>
           </a:xfrm>
           <a:prstGeom prst="rect">
@@ -7576,10 +7635,63 @@
       </p:sp>
       <p:sp>
         <p:nvSpPr>
-          <p:cNvPr id="48" name="文字方塊 47">
-            <a:extLst>
-              <a:ext uri="{FF2B5EF4-FFF2-40B4-BE49-F238E27FC236}">
-                <a16:creationId xmlns:a16="http://schemas.microsoft.com/office/drawing/2014/main" xmlns="" id="{0DF6CDA6-2149-48ED-A2DB-F56C93DC8F7D}"/>
+          <p:cNvPr id="8" name="圓角矩形 6">
+            <a:extLst>
+              <a:ext uri="{FF2B5EF4-FFF2-40B4-BE49-F238E27FC236}">
+                <a16:creationId xmlns:a16="http://schemas.microsoft.com/office/drawing/2014/main" id="{A8DE8DDB-CE73-4804-AB78-B70EFB29D495}"/>
+              </a:ext>
+            </a:extLst>
+          </p:cNvPr>
+          <p:cNvSpPr/>
+          <p:nvPr/>
+        </p:nvSpPr>
+        <p:spPr>
+          <a:xfrm>
+            <a:off x="4721486" y="1795636"/>
+            <a:ext cx="3055627" cy="2142064"/>
+          </a:xfrm>
+          <a:prstGeom prst="roundRect">
+            <a:avLst/>
+          </a:prstGeom>
+          <a:ln w="25400">
+            <a:solidFill>
+              <a:srgbClr val="FF0000"/>
+            </a:solidFill>
+            <a:prstDash val="sysDash"/>
+          </a:ln>
+        </p:spPr>
+        <p:style>
+          <a:lnRef idx="2">
+            <a:schemeClr val="accent1"/>
+          </a:lnRef>
+          <a:fillRef idx="1">
+            <a:schemeClr val="lt1"/>
+          </a:fillRef>
+          <a:effectRef idx="0">
+            <a:schemeClr val="accent1"/>
+          </a:effectRef>
+          <a:fontRef idx="minor">
+            <a:schemeClr val="dk1"/>
+          </a:fontRef>
+        </p:style>
+        <p:txBody>
+          <a:bodyPr rtlCol="0" anchor="ctr"/>
+          <a:lstStyle/>
+          <a:p>
+            <a:pPr algn="ctr"/>
+            <a:endParaRPr lang="zh-TW" altLang="en-US">
+              <a:latin typeface="Consolas" panose="020B0609020204030204" pitchFamily="49" charset="0"/>
+              <a:cs typeface="Consolas" panose="020B0609020204030204" pitchFamily="49" charset="0"/>
+            </a:endParaRPr>
+          </a:p>
+        </p:txBody>
+      </p:sp>
+      <p:sp>
+        <p:nvSpPr>
+          <p:cNvPr id="9" name="文字方塊 8">
+            <a:extLst>
+              <a:ext uri="{FF2B5EF4-FFF2-40B4-BE49-F238E27FC236}">
+                <a16:creationId xmlns:a16="http://schemas.microsoft.com/office/drawing/2014/main" id="{EEFEA2BF-382A-4752-B466-E1D2FE26365D}"/>
               </a:ext>
             </a:extLst>
           </p:cNvPr>
@@ -7588,7 +7700,7 @@
         </p:nvSpPr>
         <p:spPr>
           <a:xfrm>
-            <a:off x="5771244" y="2711684"/>
+            <a:off x="5433969" y="2681705"/>
             <a:ext cx="2204450" cy="338554"/>
           </a:xfrm>
           <a:prstGeom prst="rect">
@@ -7630,10 +7742,10 @@
       </p:sp>
       <p:sp>
         <p:nvSpPr>
-          <p:cNvPr id="49" name="矩形 48">
-            <a:extLst>
-              <a:ext uri="{FF2B5EF4-FFF2-40B4-BE49-F238E27FC236}">
-                <a16:creationId xmlns:a16="http://schemas.microsoft.com/office/drawing/2014/main" xmlns="" id="{7C6A78A2-117B-4511-A337-A22A0D832DD5}"/>
+          <p:cNvPr id="10" name="矩形 9">
+            <a:extLst>
+              <a:ext uri="{FF2B5EF4-FFF2-40B4-BE49-F238E27FC236}">
+                <a16:creationId xmlns:a16="http://schemas.microsoft.com/office/drawing/2014/main" id="{7FDAF179-9B2E-411A-B0C7-CD050D262008}"/>
               </a:ext>
             </a:extLst>
           </p:cNvPr>
@@ -7642,7 +7754,7 @@
         </p:nvSpPr>
         <p:spPr>
           <a:xfrm>
-            <a:off x="5251107" y="2574339"/>
+            <a:off x="4913832" y="2544360"/>
             <a:ext cx="2724587" cy="613245"/>
           </a:xfrm>
           <a:prstGeom prst="rect">
@@ -7683,10 +7795,10 @@
       </p:sp>
       <p:pic>
         <p:nvPicPr>
-          <p:cNvPr id="51" name="圖片 50">
-            <a:extLst>
-              <a:ext uri="{FF2B5EF4-FFF2-40B4-BE49-F238E27FC236}">
-                <a16:creationId xmlns:a16="http://schemas.microsoft.com/office/drawing/2014/main" xmlns="" id="{360008C4-4A7C-4F98-BDE4-D845F6D06F74}"/>
+          <p:cNvPr id="11" name="圖片 10">
+            <a:extLst>
+              <a:ext uri="{FF2B5EF4-FFF2-40B4-BE49-F238E27FC236}">
+                <a16:creationId xmlns:a16="http://schemas.microsoft.com/office/drawing/2014/main" id="{5BE1084A-E4FD-4463-932D-30523A0449CF}"/>
               </a:ext>
             </a:extLst>
           </p:cNvPr>
@@ -7709,7 +7821,7 @@
         </p:blipFill>
         <p:spPr>
           <a:xfrm>
-            <a:off x="5444573" y="2658508"/>
+            <a:off x="5107298" y="2628529"/>
             <a:ext cx="408171" cy="444906"/>
           </a:xfrm>
           <a:prstGeom prst="rect">
@@ -7719,10 +7831,10 @@
       </p:pic>
       <p:sp>
         <p:nvSpPr>
-          <p:cNvPr id="52" name="矩形 51">
-            <a:extLst>
-              <a:ext uri="{FF2B5EF4-FFF2-40B4-BE49-F238E27FC236}">
-                <a16:creationId xmlns:a16="http://schemas.microsoft.com/office/drawing/2014/main" xmlns="" id="{849940C1-270B-4DDA-82FD-843CAA8ED7ED}"/>
+          <p:cNvPr id="12" name="矩形 11">
+            <a:extLst>
+              <a:ext uri="{FF2B5EF4-FFF2-40B4-BE49-F238E27FC236}">
+                <a16:creationId xmlns:a16="http://schemas.microsoft.com/office/drawing/2014/main" id="{C50DCA4B-3556-4099-9C32-9297DAF2DB06}"/>
               </a:ext>
             </a:extLst>
           </p:cNvPr>
@@ -7731,7 +7843,7 @@
         </p:nvSpPr>
         <p:spPr>
           <a:xfrm>
-            <a:off x="5806127" y="2025682"/>
+            <a:off x="5468852" y="1440977"/>
             <a:ext cx="1577676" cy="369332"/>
           </a:xfrm>
           <a:prstGeom prst="rect">
@@ -7765,29 +7877,28 @@
       </p:sp>
       <p:cxnSp>
         <p:nvCxnSpPr>
-          <p:cNvPr id="55" name="直線單箭頭接點 54">
-            <a:extLst>
-              <a:ext uri="{FF2B5EF4-FFF2-40B4-BE49-F238E27FC236}">
-                <a16:creationId xmlns:a16="http://schemas.microsoft.com/office/drawing/2014/main" xmlns="" id="{A8AC5B70-F649-4DB5-AE32-A6F5581DFE4C}"/>
+          <p:cNvPr id="13" name="直線單箭頭接點 12">
+            <a:extLst>
+              <a:ext uri="{FF2B5EF4-FFF2-40B4-BE49-F238E27FC236}">
+                <a16:creationId xmlns:a16="http://schemas.microsoft.com/office/drawing/2014/main" id="{F960792B-F82F-44F4-AC09-EEFA605794A2}"/>
               </a:ext>
             </a:extLst>
           </p:cNvPr>
           <p:cNvCxnSpPr>
             <a:cxnSpLocks/>
-            <a:stCxn id="4" idx="3"/>
-            <a:endCxn id="38" idx="1"/>
+            <a:stCxn id="7" idx="3"/>
           </p:cNvCxnSpPr>
           <p:nvPr/>
         </p:nvCxnSpPr>
         <p:spPr>
           <a:xfrm>
-            <a:off x="4613979" y="2896647"/>
-            <a:ext cx="444782" cy="0"/>
+            <a:off x="4362215" y="2852555"/>
+            <a:ext cx="579563" cy="0"/>
           </a:xfrm>
           <a:prstGeom prst="straightConnector1">
             <a:avLst/>
           </a:prstGeom>
-          <a:ln w="25400">
+          <a:ln>
             <a:tailEnd type="arrow"/>
           </a:ln>
         </p:spPr>
@@ -7808,10 +7919,1040 @@
       </p:cxnSp>
       <p:sp>
         <p:nvSpPr>
+          <p:cNvPr id="14" name="圓角矩形 6">
+            <a:extLst>
+              <a:ext uri="{FF2B5EF4-FFF2-40B4-BE49-F238E27FC236}">
+                <a16:creationId xmlns:a16="http://schemas.microsoft.com/office/drawing/2014/main" id="{7CD9D1F1-45AB-4A83-BAF4-DB58F90FD930}"/>
+              </a:ext>
+            </a:extLst>
+          </p:cNvPr>
+          <p:cNvSpPr/>
+          <p:nvPr/>
+        </p:nvSpPr>
+        <p:spPr>
+          <a:xfrm>
+            <a:off x="8028782" y="1795636"/>
+            <a:ext cx="3055627" cy="2142064"/>
+          </a:xfrm>
+          <a:prstGeom prst="roundRect">
+            <a:avLst/>
+          </a:prstGeom>
+          <a:ln>
+            <a:prstDash val="sysDash"/>
+          </a:ln>
+        </p:spPr>
+        <p:style>
+          <a:lnRef idx="2">
+            <a:schemeClr val="accent1"/>
+          </a:lnRef>
+          <a:fillRef idx="1">
+            <a:schemeClr val="lt1"/>
+          </a:fillRef>
+          <a:effectRef idx="0">
+            <a:schemeClr val="accent1"/>
+          </a:effectRef>
+          <a:fontRef idx="minor">
+            <a:schemeClr val="dk1"/>
+          </a:fontRef>
+        </p:style>
+        <p:txBody>
+          <a:bodyPr rtlCol="0" anchor="ctr"/>
+          <a:lstStyle/>
+          <a:p>
+            <a:pPr algn="ctr"/>
+            <a:endParaRPr lang="zh-TW" altLang="en-US" dirty="0">
+              <a:latin typeface="Consolas" panose="020B0609020204030204" pitchFamily="49" charset="0"/>
+              <a:cs typeface="Consolas" panose="020B0609020204030204" pitchFamily="49" charset="0"/>
+            </a:endParaRPr>
+          </a:p>
+        </p:txBody>
+      </p:sp>
+      <p:sp>
+        <p:nvSpPr>
+          <p:cNvPr id="15" name="文字方塊 14">
+            <a:extLst>
+              <a:ext uri="{FF2B5EF4-FFF2-40B4-BE49-F238E27FC236}">
+                <a16:creationId xmlns:a16="http://schemas.microsoft.com/office/drawing/2014/main" id="{2A38FED3-41D3-4F5C-994A-88677072ED11}"/>
+              </a:ext>
+            </a:extLst>
+          </p:cNvPr>
+          <p:cNvSpPr txBox="1"/>
+          <p:nvPr/>
+        </p:nvSpPr>
+        <p:spPr>
+          <a:xfrm>
+            <a:off x="8795755" y="2672827"/>
+            <a:ext cx="2204450" cy="338554"/>
+          </a:xfrm>
+          <a:prstGeom prst="rect">
+            <a:avLst/>
+          </a:prstGeom>
+          <a:noFill/>
+        </p:spPr>
+        <p:txBody>
+          <a:bodyPr wrap="none" rtlCol="0">
+            <a:spAutoFit/>
+          </a:bodyPr>
+          <a:lstStyle/>
+          <a:p>
+            <a:r>
+              <a:rPr lang="en-US" altLang="zh-TW" sz="1600" b="1" dirty="0">
+                <a:solidFill>
+                  <a:schemeClr val="tx2">
+                    <a:lumMod val="75000"/>
+                  </a:schemeClr>
+                </a:solidFill>
+                <a:latin typeface="Consolas" panose="020B0609020204030204" pitchFamily="49" charset="0"/>
+                <a:ea typeface="微軟正黑體" panose="020B0604030504040204" pitchFamily="34" charset="-120"/>
+                <a:cs typeface="Consolas" panose="020B0609020204030204" pitchFamily="49" charset="0"/>
+              </a:rPr>
+              <a:t>OpenLDAP container</a:t>
+            </a:r>
+            <a:endParaRPr lang="zh-TW" altLang="en-US" sz="1600" b="1" dirty="0">
+              <a:solidFill>
+                <a:schemeClr val="tx2">
+                  <a:lumMod val="75000"/>
+                </a:schemeClr>
+              </a:solidFill>
+              <a:latin typeface="Consolas" panose="020B0609020204030204" pitchFamily="49" charset="0"/>
+              <a:ea typeface="微軟正黑體" panose="020B0604030504040204" pitchFamily="34" charset="-120"/>
+              <a:cs typeface="Consolas" panose="020B0609020204030204" pitchFamily="49" charset="0"/>
+            </a:endParaRPr>
+          </a:p>
+        </p:txBody>
+      </p:sp>
+      <p:sp>
+        <p:nvSpPr>
+          <p:cNvPr id="16" name="矩形 15">
+            <a:extLst>
+              <a:ext uri="{FF2B5EF4-FFF2-40B4-BE49-F238E27FC236}">
+                <a16:creationId xmlns:a16="http://schemas.microsoft.com/office/drawing/2014/main" id="{9D918EDB-4CFC-4B66-9EB0-A862160D0A27}"/>
+              </a:ext>
+            </a:extLst>
+          </p:cNvPr>
+          <p:cNvSpPr/>
+          <p:nvPr/>
+        </p:nvSpPr>
+        <p:spPr>
+          <a:xfrm>
+            <a:off x="8194302" y="2551167"/>
+            <a:ext cx="2724587" cy="613245"/>
+          </a:xfrm>
+          <a:prstGeom prst="rect">
+            <a:avLst/>
+          </a:prstGeom>
+          <a:noFill/>
+          <a:ln>
+            <a:prstDash val="dash"/>
+          </a:ln>
+        </p:spPr>
+        <p:style>
+          <a:lnRef idx="2">
+            <a:schemeClr val="accent1">
+              <a:shade val="50000"/>
+            </a:schemeClr>
+          </a:lnRef>
+          <a:fillRef idx="1">
+            <a:schemeClr val="accent1"/>
+          </a:fillRef>
+          <a:effectRef idx="0">
+            <a:schemeClr val="accent1"/>
+          </a:effectRef>
+          <a:fontRef idx="minor">
+            <a:schemeClr val="lt1"/>
+          </a:fontRef>
+        </p:style>
+        <p:txBody>
+          <a:bodyPr rtlCol="0" anchor="ctr"/>
+          <a:lstStyle/>
+          <a:p>
+            <a:pPr algn="ctr"/>
+            <a:endParaRPr lang="zh-TW" altLang="en-US">
+              <a:latin typeface="Consolas" panose="020B0609020204030204" pitchFamily="49" charset="0"/>
+              <a:cs typeface="Consolas" panose="020B0609020204030204" pitchFamily="49" charset="0"/>
+            </a:endParaRPr>
+          </a:p>
+        </p:txBody>
+      </p:sp>
+      <p:pic>
+        <p:nvPicPr>
+          <p:cNvPr id="17" name="圖片 16">
+            <a:extLst>
+              <a:ext uri="{FF2B5EF4-FFF2-40B4-BE49-F238E27FC236}">
+                <a16:creationId xmlns:a16="http://schemas.microsoft.com/office/drawing/2014/main" id="{0EFF49B5-497B-4921-8CF6-BD4E4B674ADF}"/>
+              </a:ext>
+            </a:extLst>
+          </p:cNvPr>
+          <p:cNvPicPr>
+            <a:picLocks noChangeAspect="1"/>
+          </p:cNvPicPr>
+          <p:nvPr/>
+        </p:nvPicPr>
+        <p:blipFill>
+          <a:blip r:embed="rId2" cstate="print">
+            <a:extLst>
+              <a:ext uri="{28A0092B-C50C-407E-A947-70E740481C1C}">
+                <a14:useLocalDpi xmlns:a14="http://schemas.microsoft.com/office/drawing/2010/main" val="0"/>
+              </a:ext>
+            </a:extLst>
+          </a:blip>
+          <a:stretch>
+            <a:fillRect/>
+          </a:stretch>
+        </p:blipFill>
+        <p:spPr>
+          <a:xfrm>
+            <a:off x="8283881" y="2612725"/>
+            <a:ext cx="422295" cy="501739"/>
+          </a:xfrm>
+          <a:prstGeom prst="rect">
+            <a:avLst/>
+          </a:prstGeom>
+        </p:spPr>
+      </p:pic>
+      <p:pic>
+        <p:nvPicPr>
+          <p:cNvPr id="18" name="圖片 17">
+            <a:extLst>
+              <a:ext uri="{FF2B5EF4-FFF2-40B4-BE49-F238E27FC236}">
+                <a16:creationId xmlns:a16="http://schemas.microsoft.com/office/drawing/2014/main" id="{65E53252-C355-4873-ABD1-69208ED76225}"/>
+              </a:ext>
+            </a:extLst>
+          </p:cNvPr>
+          <p:cNvPicPr>
+            <a:picLocks noChangeAspect="1"/>
+          </p:cNvPicPr>
+          <p:nvPr/>
+        </p:nvPicPr>
+        <p:blipFill>
+          <a:blip r:embed="rId4"/>
+          <a:stretch>
+            <a:fillRect/>
+          </a:stretch>
+        </p:blipFill>
+        <p:spPr>
+          <a:xfrm>
+            <a:off x="8795755" y="1612357"/>
+            <a:ext cx="1407316" cy="366557"/>
+          </a:xfrm>
+          <a:prstGeom prst="rect">
+            <a:avLst/>
+          </a:prstGeom>
+        </p:spPr>
+      </p:pic>
+      <p:cxnSp>
+        <p:nvCxnSpPr>
+          <p:cNvPr id="19" name="直線單箭頭接點 18">
+            <a:extLst>
+              <a:ext uri="{FF2B5EF4-FFF2-40B4-BE49-F238E27FC236}">
+                <a16:creationId xmlns:a16="http://schemas.microsoft.com/office/drawing/2014/main" id="{4FD714C3-D43C-4AE3-A614-B9AE37447913}"/>
+              </a:ext>
+            </a:extLst>
+          </p:cNvPr>
+          <p:cNvCxnSpPr>
+            <a:cxnSpLocks/>
+            <a:stCxn id="10" idx="3"/>
+            <a:endCxn id="16" idx="1"/>
+          </p:cNvCxnSpPr>
+          <p:nvPr/>
+        </p:nvCxnSpPr>
+        <p:spPr>
+          <a:xfrm>
+            <a:off x="7638419" y="2850983"/>
+            <a:ext cx="555883" cy="6807"/>
+          </a:xfrm>
+          <a:prstGeom prst="straightConnector1">
+            <a:avLst/>
+          </a:prstGeom>
+          <a:ln>
+            <a:tailEnd type="arrow"/>
+          </a:ln>
+        </p:spPr>
+        <p:style>
+          <a:lnRef idx="1">
+            <a:schemeClr val="accent1"/>
+          </a:lnRef>
+          <a:fillRef idx="0">
+            <a:schemeClr val="accent1"/>
+          </a:fillRef>
+          <a:effectRef idx="0">
+            <a:schemeClr val="accent1"/>
+          </a:effectRef>
+          <a:fontRef idx="minor">
+            <a:schemeClr val="tx1"/>
+          </a:fontRef>
+        </p:style>
+      </p:cxnSp>
+      <p:sp>
+        <p:nvSpPr>
+          <p:cNvPr id="20" name="語音泡泡: 矩形 19">
+            <a:extLst>
+              <a:ext uri="{FF2B5EF4-FFF2-40B4-BE49-F238E27FC236}">
+                <a16:creationId xmlns:a16="http://schemas.microsoft.com/office/drawing/2014/main" id="{B0052EBC-8056-4CFC-9B7E-870F38D20FD1}"/>
+              </a:ext>
+            </a:extLst>
+          </p:cNvPr>
+          <p:cNvSpPr/>
+          <p:nvPr/>
+        </p:nvSpPr>
+        <p:spPr>
+          <a:xfrm>
+            <a:off x="1617356" y="4318963"/>
+            <a:ext cx="2541080" cy="735291"/>
+          </a:xfrm>
+          <a:prstGeom prst="wedgeRectCallout">
+            <a:avLst>
+              <a:gd name="adj1" fmla="val 43717"/>
+              <a:gd name="adj2" fmla="val -137500"/>
+            </a:avLst>
+          </a:prstGeom>
+        </p:spPr>
+        <p:style>
+          <a:lnRef idx="2">
+            <a:schemeClr val="accent2">
+              <a:shade val="50000"/>
+            </a:schemeClr>
+          </a:lnRef>
+          <a:fillRef idx="1">
+            <a:schemeClr val="accent2"/>
+          </a:fillRef>
+          <a:effectRef idx="0">
+            <a:schemeClr val="accent2"/>
+          </a:effectRef>
+          <a:fontRef idx="minor">
+            <a:schemeClr val="lt1"/>
+          </a:fontRef>
+        </p:style>
+        <p:txBody>
+          <a:bodyPr rtlCol="0" anchor="ctr"/>
+          <a:lstStyle/>
+          <a:p>
+            <a:pPr algn="ctr"/>
+            <a:r>
+              <a:rPr lang="en-US" dirty="0"/>
+              <a:t>Secure API with Policies</a:t>
+            </a:r>
+          </a:p>
+        </p:txBody>
+      </p:sp>
+      <p:sp>
+        <p:nvSpPr>
+          <p:cNvPr id="21" name="語音泡泡: 矩形 20">
+            <a:extLst>
+              <a:ext uri="{FF2B5EF4-FFF2-40B4-BE49-F238E27FC236}">
+                <a16:creationId xmlns:a16="http://schemas.microsoft.com/office/drawing/2014/main" id="{53CD2CE1-4D7B-4C00-BFBA-40FA2850023D}"/>
+              </a:ext>
+            </a:extLst>
+          </p:cNvPr>
+          <p:cNvSpPr/>
+          <p:nvPr/>
+        </p:nvSpPr>
+        <p:spPr>
+          <a:xfrm>
+            <a:off x="4978759" y="4572804"/>
+            <a:ext cx="2541080" cy="962900"/>
+          </a:xfrm>
+          <a:prstGeom prst="wedgeRectCallout">
+            <a:avLst>
+              <a:gd name="adj1" fmla="val -28252"/>
+              <a:gd name="adj2" fmla="val -150872"/>
+            </a:avLst>
+          </a:prstGeom>
+        </p:spPr>
+        <p:style>
+          <a:lnRef idx="2">
+            <a:schemeClr val="accent2">
+              <a:shade val="50000"/>
+            </a:schemeClr>
+          </a:lnRef>
+          <a:fillRef idx="1">
+            <a:schemeClr val="accent2"/>
+          </a:fillRef>
+          <a:effectRef idx="0">
+            <a:schemeClr val="accent2"/>
+          </a:effectRef>
+          <a:fontRef idx="minor">
+            <a:schemeClr val="lt1"/>
+          </a:fontRef>
+        </p:style>
+        <p:txBody>
+          <a:bodyPr rtlCol="0" anchor="ctr"/>
+          <a:lstStyle/>
+          <a:p>
+            <a:pPr algn="ctr"/>
+            <a:r>
+              <a:rPr lang="en-US" dirty="0"/>
+              <a:t>Add required claims for Policy when issue an JWT token</a:t>
+            </a:r>
+          </a:p>
+        </p:txBody>
+      </p:sp>
+    </p:spTree>
+    <p:extLst>
+      <p:ext uri="{BB962C8B-B14F-4D97-AF65-F5344CB8AC3E}">
+        <p14:creationId xmlns:p14="http://schemas.microsoft.com/office/powerpoint/2010/main" val="1521631976"/>
+      </p:ext>
+    </p:extLst>
+  </p:cSld>
+  <p:clrMapOvr>
+    <a:masterClrMapping/>
+  </p:clrMapOvr>
+</p:sld>
+</file>
+
+<file path=ppt/slides/slide6.xml><?xml version="1.0" encoding="utf-8"?>
+<p:sld xmlns:a="http://schemas.openxmlformats.org/drawingml/2006/main" xmlns:r="http://schemas.openxmlformats.org/officeDocument/2006/relationships" xmlns:p="http://schemas.openxmlformats.org/presentationml/2006/main">
+  <p:cSld>
+    <p:spTree>
+      <p:nvGrpSpPr>
+        <p:cNvPr id="1" name=""/>
+        <p:cNvGrpSpPr/>
+        <p:nvPr/>
+      </p:nvGrpSpPr>
+      <p:grpSpPr>
+        <a:xfrm>
+          <a:off x="0" y="0"/>
+          <a:ext cx="0" cy="0"/>
+          <a:chOff x="0" y="0"/>
+          <a:chExt cx="0" cy="0"/>
+        </a:xfrm>
+      </p:grpSpPr>
+      <p:sp>
+        <p:nvSpPr>
+          <p:cNvPr id="3" name="矩形 2"/>
+          <p:cNvSpPr/>
+          <p:nvPr/>
+        </p:nvSpPr>
+        <p:spPr>
+          <a:xfrm>
+            <a:off x="940125" y="1431559"/>
+            <a:ext cx="11044511" cy="4512039"/>
+          </a:xfrm>
+          <a:prstGeom prst="rect">
+            <a:avLst/>
+          </a:prstGeom>
+          <a:solidFill>
+            <a:schemeClr val="bg1">
+              <a:lumMod val="85000"/>
+            </a:schemeClr>
+          </a:solidFill>
+          <a:ln w="19050">
+            <a:prstDash val="sysDash"/>
+          </a:ln>
+        </p:spPr>
+        <p:style>
+          <a:lnRef idx="2">
+            <a:schemeClr val="accent1">
+              <a:shade val="50000"/>
+            </a:schemeClr>
+          </a:lnRef>
+          <a:fillRef idx="1">
+            <a:schemeClr val="accent1"/>
+          </a:fillRef>
+          <a:effectRef idx="0">
+            <a:schemeClr val="accent1"/>
+          </a:effectRef>
+          <a:fontRef idx="minor">
+            <a:schemeClr val="lt1"/>
+          </a:fontRef>
+        </p:style>
+        <p:txBody>
+          <a:bodyPr rtlCol="0" anchor="ctr"/>
+          <a:lstStyle/>
+          <a:p>
+            <a:pPr algn="ctr"/>
+            <a:endParaRPr lang="zh-TW" altLang="en-US"/>
+          </a:p>
+        </p:txBody>
+      </p:sp>
+      <p:sp>
+        <p:nvSpPr>
+          <p:cNvPr id="4" name="圓角矩形 6">
+            <a:extLst>
+              <a:ext uri="{FF2B5EF4-FFF2-40B4-BE49-F238E27FC236}">
+                <a16:creationId xmlns:a16="http://schemas.microsoft.com/office/drawing/2014/main" id="{9292555D-6383-47AB-94C4-8C24D05C629F}"/>
+              </a:ext>
+            </a:extLst>
+          </p:cNvPr>
+          <p:cNvSpPr/>
+          <p:nvPr/>
+        </p:nvSpPr>
+        <p:spPr>
+          <a:xfrm>
+            <a:off x="1221774" y="1825615"/>
+            <a:ext cx="3392205" cy="2142064"/>
+          </a:xfrm>
+          <a:prstGeom prst="roundRect">
+            <a:avLst/>
+          </a:prstGeom>
+          <a:ln w="25400">
+            <a:solidFill>
+              <a:schemeClr val="accent1"/>
+            </a:solidFill>
+            <a:prstDash val="sysDash"/>
+          </a:ln>
+        </p:spPr>
+        <p:style>
+          <a:lnRef idx="2">
+            <a:schemeClr val="accent1"/>
+          </a:lnRef>
+          <a:fillRef idx="1">
+            <a:schemeClr val="lt1"/>
+          </a:fillRef>
+          <a:effectRef idx="0">
+            <a:schemeClr val="accent1"/>
+          </a:effectRef>
+          <a:fontRef idx="minor">
+            <a:schemeClr val="dk1"/>
+          </a:fontRef>
+        </p:style>
+        <p:txBody>
+          <a:bodyPr rtlCol="0" anchor="ctr"/>
+          <a:lstStyle/>
+          <a:p>
+            <a:pPr algn="ctr"/>
+            <a:endParaRPr lang="zh-TW" altLang="en-US">
+              <a:latin typeface="Consolas" panose="020B0609020204030204" pitchFamily="49" charset="0"/>
+              <a:cs typeface="Consolas" panose="020B0609020204030204" pitchFamily="49" charset="0"/>
+            </a:endParaRPr>
+          </a:p>
+        </p:txBody>
+      </p:sp>
+      <p:sp>
+        <p:nvSpPr>
+          <p:cNvPr id="8" name="AutoShape 2" descr="data:image/jpeg;base64,/9j/4AAQSkZJRgABAQAAAQABAAD/2wCEAAkGBhASEBAQDxAODxQSEg8PEBAUEBAPEBAQFBAVFBQQFRQXHCYeFxkjGRQUHy8gIycpLCwsFR4xNTMqNSYrLCkBCQoKDgwOFw8PGiwcHBwpLCksKSkpKSwpKSktNSopLCkpLCwsNSkpKSksKSkpKSwpKiopKTUpKSkvKSwpKSkpKf/AABEIAMwAzAMBIgACEQEDEQH/xAAbAAABBQEBAAAAAAAAAAAAAAAAAgMEBQYBB//EAEUQAAEDAgIGBgYGCAUFAAAAAAEAAgMEERIhBQYxQVFxE2GBkaHBIjJCUpKxFCMzcqKyJFNiY4LR4fAHFkOTsxVEg8LD/8QAGQEBAAMBAQAAAAAAAAAAAAAAAAEDBAIF/8QAJxEBAAIBAwMDBAMAAAAAAAAAAAECEQMSIQQxQRMyYQUiQlGRocH/2gAMAwEAAhEDEQA/APcUIQgFFrtIsiDS+/pEgWF9m9Slm9bpheJu+z3HkbAfIoLSPT0B9u3MFSWV0Z2PZ8QC8j0hrUYp5IRCJAzAMQkwuJcwOIsRbK6k0+tzMsUNQ37vRyfIhd7LYzhxvrHGXrDXg7CD2pS8zbrVTb5JW/ehly7QCFLptbICbMrIr8OlwHudZc4mO7qJiez0FCydPpuY+rIH8ix/yU9mmpd7W/CQoSvUKobpx29g7yE83TTd7XDuKCxQobdKxneRzBTgr4/fHigkISGzNOxzT2hLQCEIQCEIQCEIQCEIQCEIQCEIQCx+tUmKcN91rG95J81sFh9Nz/pEznWsw+DGXQebl/SVVQ7beaQDk12EflV/R0TTuWX1ediAefau883Eu81sKIr161xSIePrzm0p8OiGFEurrCLEA9RzCn0pyUrEqpiGfdMM27VCPcxretowHvbZJGgpWZRzVEfU2aQDxK1LXJQKiaRKY17x2lmfote0+jVT8nYJB+JqdbpOvZ63QSc4iwnta7yW4hha5rTYZgLkmjmHcFmmK/p6EX1MZiWNZrPMPXpmn7krh+ZqdGt7B60E45GN/mFpH6EjO5RZdW2HcFG2ruNW6sj1upT6xlZ96Jx8W3U6DWOmPq1UV+BfgPcVHn1SadwUGXU7qUenH7TGvbzDURaQJ9WUO5Oa5SGVknHwC8/qdTyPVFuQwnwUZmhall8EszeT3jzUen8u/XjzD1Btc7eAnm1V9y8mdpTSUR9GeQgbnBr/ABIulx6+6QZ67IJOcZae8HyT0bJ9ej1oShclna1pc4hoaCSTsAG9YXVTXmeqqGwvp4mAhxc9rnXADSdhHEDvWj1lntRz9bQz4iAuLVms4lbW0WjMLljwQCCCCLgjMEcUpZ3UeoLqdzSb4Hlo5YQbeK0S5dBCEIBCEIBeZ6x1BENdIdoiqXeBA8l6RUSYWOdwa49wXkuts9qCoO0vMMXPHKCfAFTWMzEE8QzOgWWaBwAHcLLU0RWY0R6oWloSvamOHi37r+mdkpGJQ6ZykFyoZ7H2OS8SjtelY1OFMyvtGSXZbgSPPzUvEqrREnrDkVYl6yXjFperoXzSDl1wlN41wvXGF244SuBNF66HqcOdwfZNCJpOwLjpElkmanCM8o1Vo+M7goE2gYyNitJnpp0isiZwiYhD0FodsM5e232bx2lzbeak62yfopHGSMeN0/SH0nnqY3tu4n5hVut0v1UTeMjj8Lf6rNqTmzbpRisLXUqK1Lf3nvPl5K+Vdq7FhpYR+wHfFn5qxVawIQhAIQhBX6elw00p/Zt3kBeWa02dHTxHZJOXHlHC7zeO5ej63y2p7e89g7rnyXmOsp+upBwjqJO1z42D8rl3pxm0Obe2VXSxFhLTtBt/VXtE5VOloiCyRuVwGu5jYe75J+hrCOB8F7Uc1y8i8Ylp6Z6fdIqqmrRbenzVDiqtvLNdYtkS8agxzJ0SqcM1lzouT0+YIVoXrP0E1nX4Zq4MizaleWzp7/bhIxpBkTBkTZlXG1o3pBkSnSZKGJEqSVNqNxb5E2yX0gmJJUyJsxzXUVTFk6d+ajmRdqXqGZFMRw7meVlo/ZI7i8D4WD+ap9a5bvibwY93e7+ittHfZA+8+V34y3/1VJpwY6oN6omfEf6rDf3S9GnthvqJto4xwYwfhCeXGiwA4ZLq5dhCEIBCEIMtr1UWbA3i9zjyDbea831gl/TGt/V08DSOtxfKfCRvctvr7NeeNg9mMntc63kvOdKVGKuqjwl6Mco2NYPyq/QjN1erOKrOVoews4jLqI2Kvpn280/DOmaoWfcbHZ9u/wDvrXraf6edqRnlPimThqFWMmXTUK2KsdoWsVQpLao8SqSOoUls672sl6tHQ1Rzz3K5irLtB6gspQz5O5K0o6r0eRI81n1NNOlaYnC4dVJp1YoD6hR3VCq9Nqi0riKruUmSszKr4J8iUy6oUbE7k6St6kwa3MKHJMmDKuoo7iWgqan0RyUA1RvuXZJbsHJVlTNZryNzXW54TZcRV3lsdHfYQdcTHHm8Yz4uKq8OPSLR+8jB/haD8wrmNgAY0ZANY0DgA0BVOrvp1xd+1M/5gfNeVM5nL2Y4btCEKEhCEIBCEIPPNYX9JpHDwfBH2XBPzK8sgqMUkr9uKSV3fI4hei1lZ+l1M5/0vpU3+zE8jxaF5ZQus0ch8ls6SMzMqNeeIheRTqTM/EzrGYVMyZTIalejHdjkCdBnUOd9nHvCb6ZaYZ7VWcc6ksnVMyZSWTK2IZr1aKhn9F3Yp9DU7RyKz9HP6J5qbTVFj4Li1c5ZsYsuZKhR3VChyVKZE9yFVtaKroz2ZzTXTqHUVGwcAmunXE1TCa+ZIEqiGVHSZLnDvK8ZNeMKEPSc1vvPjbzvI247roppfq0rRAxVNOOErX9jLuPgCqbcRMrNPm8R8tzLLYudwxO7rlV2pMd53HhGe8uCk1Tvq5DwY/5W80vUaL7Z/wBxvzP8l473WrQhCAQhCASZH2BJ3AnuCUq/T82GlqHcIpB2lpA+aDyHS1Xho66QnN0BZfrmla0+BcsHC/Ja3Wx+HR792Oopo+qzWvkI8Asaw5L1ugpmsz8sfU25iEkSJ+OdQcSW163bGbclVD7i/BRukXS9RypxhHdKbKpDJVXhyeY9XVlVaq4pZsu1Sm1FrKpp35J8yKzDJavKyfUrtPNdyrDMnqaW1yqph3jhYyVN3FdEyrGzJ0SqmU4TxKuulUISpXSKuRdUcvoHtU/VoXqmH3WTP7DGY/nIFS0MmR/vcr3VCO88r/chDP8AclaR/wAJWXXnFJW9NzrVhpdJPtDJ1hre9w/krbUyO0Dne9I7wACo9Lu+qA4vH4Wn+a02q7bUsXXiP4yvJe6tUIQgEIQgFRa6y2opR72Fne4X8Ar1RNJaLinZglBIviFnFtja18uaDyaOdzQWgjCcy1zWPaTxLXAi6Z+g0z8WOhpX5Xc5ofA+3HFG4fJbyq/w9jP2Ur29TgHKnqdSKply3o35HMGxtwzTNq+2cSWjMMfPqpQSep9LpnHYA6OojHxAO8VDd/h87Po6unPASNlgPabOC08uhalhziflyK76TfWY9vWWuA71pr1etX8v55Vzo0nwxVXqNXsBLYOmaPaheycdgacXgqGpp3xkiVj4iNoexzLd4XqrJRtBHMbU59OkGx7+V8Q7itFfqF/yiJ/pVPS18S8jaU40r0qshgkuZqSklJ2u6LoJT/5Ii0qnn1Yo3G7W1MHUyVsrRyDxfxWin1Cn5RMKrdLbxLMwHIJxzlfP1QZ/o1beps8L4vxxl48FBqtWqppyjZMNxikZLfk0HF3gLZXrNG3a3+Mdun1InsrcSeDrN5puppZYj9dFLF99jmjvIsh8oNrEbF3uieYlVNZjiS2uTocmWlOtVcoOtcnGlNNTjVVLlNon7exavUxotUP3l8UZ/hY93/0WPgNitnqi0dA8+9NJf+FrGrH1M/ZLR0dc6ufhY6Xd9mPvH5BbPQkWGnhH7DXfEMXmsXpPN0bf2fFzit/EzC1rRuAHcLLzHtFoQhAIQhAIQhALhC6hAxJCDtAPYocmjY/caN+XonvCsrJJYgztVq5C65tn15gfI+KrKnVNvsEjk7aeRBC2LokxKwAEkgAbScggwU2rUw3X7Ae8g+Sr5dDTN9jF1tIPhkVtKvTcLdl38sm958rqrn1jJ2NYObcZHacvBE5ZSSNzfXa5n3gW/NIsOpXFdWPfm15jcPaAbY9Tm2sQqt2lXg4Z4KeT9oNMTiOIcz+SGSoauRuTJJGjgHOw/DsXJaeGU3mp6aQna7omxPPN8WEntSPp9OTnHPF91zZR3OsfFS6c0zvUq4gfdla6E9+Y8UiZjtwicT3RXaqUL/YqIDxjmEjR/BIL/iUKp1F3wVbXcGzRPiPa9uJq08VE8+rhk643sk+RSjER6wLeYIV1dfUjyqtoac+GLfqjXtuWxxzAfqpopCeTb4vBV9RHNESJoJorbccbmgdpFl6I7ZfrGdrkC+ZUptR7LZHPFr2OwZ7LG4VsdXfyot0dJ7PMYa1p3r0DVgD6JCR7XSvPbK+3gAn59GU8l+kp6Z99pMQa/wCNliFJpoGtDWMaGMFmtYLkNbsAF8+9caut6kYTodP6VpnJWDFVRt4OhZ3WK3ixGi246trv3hd2DJbdZ2sIQhAIQhAIQhAIQhAIQkveACTsAJPIII+kNIMibieeQ3krG6Q0lLMc3YRuaMgEmurXTPL3b9g90bgmmtQRjR39pc/6ceI8VPaxOMiQVJ0a7q70zPotxFiCfJaNtMummQYybRHAkcwq+o0RJuDXdtvmt5LBxAPYoktE07rckHnj6Z8Zvhcw8RceIVpo7WeqZ6PTvcNwfaVvL0rrRy6P4WPUqup0Mw7WAHiPRKCVBrG8/aQwv62h0R8MlaU2kad/syxHf6sg8M1no6fDtu7rKkxyINPBQ4wXRPa8DI3BaU7Ho6XE30CcxmPStnvtsVTofSBjeDnbeOpbgYXDMAg57kETQmjQwl/Ox457VdXUdhTrSgcQuArqAQhCAQhCAQhCAUbSQvDKP3b/AMpUlcI3IPPWtTrWqZpDR5jkwbSQXR7frGjhxeBtHIqOwIFRsUqONIjYpEYQOsjXXRpTV0oIczEzHBe6lSrlIM3DqBQV0kQDi12zceCjVEBGThy4FW2k4Mg7hkeRUSGUEdHJmD6p4FBTy0oUKSnI2K7q6UsPEbj5KG9qCPSDMf3sW7oHWYwH3R8lnNC6IL3E2u1pGI7hvw9Z48LrUsgsgfY5SGJmNifa1AsJS4AuoBCEIBCEIBCEIBCEIGaukZKwskGIHsIO4gjMHrVBXaKljscLqloyxtwipaN2Jps2Xnkea0qEGSiwl2Fj2ud+rP1cw5xuse5SOjI9YFvMEK6r9FQzjDNEyQbrjNvW121p5KH/AJfwi0FRUwjc0vE7AOGGUO+aCK1DkP0ZXNvhlop+AfBJAe10bj8kjoK32qWjd9yqlb+aNA29cpzZ3YU4aeqP/Zxc/ppt/wAaR9BrPZpaRvW6pldb4WoHJSCCDvyVMYXG4AJtfYL+KuY9A1bj6c1NGOEcBkPxPd5KX/leNw+uknn4gydGw/wR4QgzjZS4dH9o73GDpZO4ZDmSFY6M1Xe4YpvqWn2AcUrhwc7Y3kL81pKOhjibgiYyNvBrQ0c+tPoGoaZrGhrGhoGwAWCUYwloQJDF2y6hAIQhAIQhAIQhAIQhAIQhAIQhAIQhAIQhAIQhAIQhAIQhAIQhAIQhAIQhAIQhB//Z">
+            <a:extLst>
+              <a:ext uri="{FF2B5EF4-FFF2-40B4-BE49-F238E27FC236}">
+                <a16:creationId xmlns:a16="http://schemas.microsoft.com/office/drawing/2014/main" id="{15B92B98-B7C8-4A75-A841-F25CD0136DE7}"/>
+              </a:ext>
+            </a:extLst>
+          </p:cNvPr>
+          <p:cNvSpPr>
+            <a:spLocks noChangeAspect="1" noChangeArrowheads="1"/>
+          </p:cNvSpPr>
+          <p:nvPr/>
+        </p:nvSpPr>
+        <p:spPr bwMode="auto">
+          <a:xfrm>
+            <a:off x="155575" y="-721585"/>
+            <a:ext cx="304800" cy="304801"/>
+          </a:xfrm>
+          <a:prstGeom prst="rect">
+            <a:avLst/>
+          </a:prstGeom>
+          <a:noFill/>
+        </p:spPr>
+        <p:txBody>
+          <a:bodyPr vert="horz" wrap="square" lIns="91440" tIns="45720" rIns="91440" bIns="45720" numCol="1" anchor="t" anchorCtr="0" compatLnSpc="1">
+            <a:prstTxWarp prst="textNoShape">
+              <a:avLst/>
+            </a:prstTxWarp>
+          </a:bodyPr>
+          <a:lstStyle/>
+          <a:p>
+            <a:endParaRPr lang="zh-TW" altLang="en-US">
+              <a:latin typeface="Consolas" panose="020B0609020204030204" pitchFamily="49" charset="0"/>
+              <a:cs typeface="Consolas" panose="020B0609020204030204" pitchFamily="49" charset="0"/>
+            </a:endParaRPr>
+          </a:p>
+        </p:txBody>
+      </p:sp>
+      <p:grpSp>
+        <p:nvGrpSpPr>
+          <p:cNvPr id="17" name="群組 16">
+            <a:extLst>
+              <a:ext uri="{FF2B5EF4-FFF2-40B4-BE49-F238E27FC236}">
+                <a16:creationId xmlns:a16="http://schemas.microsoft.com/office/drawing/2014/main" id="{3E62AE25-4106-44ED-8F4E-D5D956A394D2}"/>
+              </a:ext>
+            </a:extLst>
+          </p:cNvPr>
+          <p:cNvGrpSpPr/>
+          <p:nvPr/>
+        </p:nvGrpSpPr>
+        <p:grpSpPr>
+          <a:xfrm>
+            <a:off x="1483395" y="2590023"/>
+            <a:ext cx="2936123" cy="613246"/>
+            <a:chOff x="1027702" y="2502131"/>
+            <a:chExt cx="2309308" cy="492060"/>
+          </a:xfrm>
+        </p:grpSpPr>
+        <p:pic>
+          <p:nvPicPr>
+            <p:cNvPr id="18" name="圖片 17">
+              <a:extLst>
+                <a:ext uri="{FF2B5EF4-FFF2-40B4-BE49-F238E27FC236}">
+                  <a16:creationId xmlns:a16="http://schemas.microsoft.com/office/drawing/2014/main" id="{DF00FD23-F9E0-40CA-BFAD-2BC20441329D}"/>
+                </a:ext>
+              </a:extLst>
+            </p:cNvPr>
+            <p:cNvPicPr>
+              <a:picLocks noChangeAspect="1"/>
+            </p:cNvPicPr>
+            <p:nvPr/>
+          </p:nvPicPr>
+          <p:blipFill>
+            <a:blip r:embed="rId2" cstate="print">
+              <a:extLst>
+                <a:ext uri="{28A0092B-C50C-407E-A947-70E740481C1C}">
+                  <a14:useLocalDpi xmlns:a14="http://schemas.microsoft.com/office/drawing/2010/main" val="0"/>
+                </a:ext>
+              </a:extLst>
+            </a:blip>
+            <a:stretch>
+              <a:fillRect/>
+            </a:stretch>
+          </p:blipFill>
+          <p:spPr>
+            <a:xfrm>
+              <a:off x="1027702" y="2502131"/>
+              <a:ext cx="348313" cy="492060"/>
+            </a:xfrm>
+            <a:prstGeom prst="rect">
+              <a:avLst/>
+            </a:prstGeom>
+          </p:spPr>
+        </p:pic>
+        <p:sp>
+          <p:nvSpPr>
+            <p:cNvPr id="19" name="文字方塊 18">
+              <a:extLst>
+                <a:ext uri="{FF2B5EF4-FFF2-40B4-BE49-F238E27FC236}">
+                  <a16:creationId xmlns:a16="http://schemas.microsoft.com/office/drawing/2014/main" id="{14F08A50-B905-4E9F-B65E-EEFCE05DA4E3}"/>
+                </a:ext>
+              </a:extLst>
+            </p:cNvPr>
+            <p:cNvSpPr txBox="1"/>
+            <p:nvPr/>
+          </p:nvSpPr>
+          <p:spPr>
+            <a:xfrm>
+              <a:off x="1338410" y="2618369"/>
+              <a:ext cx="1998600" cy="271651"/>
+            </a:xfrm>
+            <a:prstGeom prst="rect">
+              <a:avLst/>
+            </a:prstGeom>
+            <a:noFill/>
+          </p:spPr>
+          <p:txBody>
+            <a:bodyPr wrap="none" rtlCol="0">
+              <a:spAutoFit/>
+            </a:bodyPr>
+            <a:lstStyle/>
+            <a:p>
+              <a:r>
+                <a:rPr lang="en-US" altLang="zh-TW" sz="1600" b="1" dirty="0">
+                  <a:solidFill>
+                    <a:schemeClr val="tx2">
+                      <a:lumMod val="75000"/>
+                    </a:schemeClr>
+                  </a:solidFill>
+                  <a:latin typeface="Consolas" panose="020B0609020204030204" pitchFamily="49" charset="0"/>
+                  <a:ea typeface="微軟正黑體" panose="020B0604030504040204" pitchFamily="34" charset="-120"/>
+                  <a:cs typeface="Consolas" panose="020B0609020204030204" pitchFamily="49" charset="0"/>
+                </a:rPr>
+                <a:t> ASP.NET Core Web API</a:t>
+              </a:r>
+              <a:endParaRPr lang="zh-TW" altLang="en-US" sz="1600" b="1" dirty="0">
+                <a:solidFill>
+                  <a:schemeClr val="tx2">
+                    <a:lumMod val="75000"/>
+                  </a:schemeClr>
+                </a:solidFill>
+                <a:latin typeface="Consolas" panose="020B0609020204030204" pitchFamily="49" charset="0"/>
+                <a:ea typeface="微軟正黑體" panose="020B0604030504040204" pitchFamily="34" charset="-120"/>
+                <a:cs typeface="Consolas" panose="020B0609020204030204" pitchFamily="49" charset="0"/>
+              </a:endParaRPr>
+            </a:p>
+          </p:txBody>
+        </p:sp>
+      </p:grpSp>
+      <p:sp>
+        <p:nvSpPr>
+          <p:cNvPr id="35" name="矩形 34">
+            <a:extLst>
+              <a:ext uri="{FF2B5EF4-FFF2-40B4-BE49-F238E27FC236}">
+                <a16:creationId xmlns:a16="http://schemas.microsoft.com/office/drawing/2014/main" id="{A3837EC7-3FF7-497F-B8B9-5A0B2AE1FAD0}"/>
+              </a:ext>
+            </a:extLst>
+          </p:cNvPr>
+          <p:cNvSpPr/>
+          <p:nvPr/>
+        </p:nvSpPr>
+        <p:spPr>
+          <a:xfrm>
+            <a:off x="1939082" y="2025682"/>
+            <a:ext cx="1957587" cy="369332"/>
+          </a:xfrm>
+          <a:prstGeom prst="rect">
+            <a:avLst/>
+          </a:prstGeom>
+          <a:noFill/>
+        </p:spPr>
+        <p:txBody>
+          <a:bodyPr wrap="none">
+            <a:spAutoFit/>
+          </a:bodyPr>
+          <a:lstStyle/>
+          <a:p>
+            <a:pPr algn="ctr"/>
+            <a:r>
+              <a:rPr lang="en-US" altLang="zh-TW" b="1" dirty="0">
+                <a:latin typeface="Consolas" panose="020B0609020204030204" pitchFamily="49" charset="0"/>
+                <a:cs typeface="Consolas" panose="020B0609020204030204" pitchFamily="49" charset="0"/>
+              </a:rPr>
+              <a:t>Backend Server</a:t>
+            </a:r>
+          </a:p>
+        </p:txBody>
+      </p:sp>
+      <p:sp>
+        <p:nvSpPr>
+          <p:cNvPr id="38" name="圓角矩形 6">
+            <a:extLst>
+              <a:ext uri="{FF2B5EF4-FFF2-40B4-BE49-F238E27FC236}">
+                <a16:creationId xmlns:a16="http://schemas.microsoft.com/office/drawing/2014/main" id="{AA3F0518-490B-4DDF-BB4F-AE947406C799}"/>
+              </a:ext>
+            </a:extLst>
+          </p:cNvPr>
+          <p:cNvSpPr/>
+          <p:nvPr/>
+        </p:nvSpPr>
+        <p:spPr>
+          <a:xfrm>
+            <a:off x="5058761" y="1825615"/>
+            <a:ext cx="3055627" cy="2142064"/>
+          </a:xfrm>
+          <a:prstGeom prst="roundRect">
+            <a:avLst/>
+          </a:prstGeom>
+          <a:ln w="12700">
+            <a:solidFill>
+              <a:schemeClr val="accent5">
+                <a:lumMod val="50000"/>
+              </a:schemeClr>
+            </a:solidFill>
+            <a:prstDash val="sysDash"/>
+          </a:ln>
+        </p:spPr>
+        <p:style>
+          <a:lnRef idx="2">
+            <a:schemeClr val="accent1"/>
+          </a:lnRef>
+          <a:fillRef idx="1">
+            <a:schemeClr val="lt1"/>
+          </a:fillRef>
+          <a:effectRef idx="0">
+            <a:schemeClr val="accent1"/>
+          </a:effectRef>
+          <a:fontRef idx="minor">
+            <a:schemeClr val="dk1"/>
+          </a:fontRef>
+        </p:style>
+        <p:txBody>
+          <a:bodyPr rtlCol="0" anchor="ctr"/>
+          <a:lstStyle/>
+          <a:p>
+            <a:pPr algn="ctr"/>
+            <a:endParaRPr lang="zh-TW" altLang="en-US">
+              <a:latin typeface="Consolas" panose="020B0609020204030204" pitchFamily="49" charset="0"/>
+              <a:cs typeface="Consolas" panose="020B0609020204030204" pitchFamily="49" charset="0"/>
+            </a:endParaRPr>
+          </a:p>
+        </p:txBody>
+      </p:sp>
+      <p:sp>
+        <p:nvSpPr>
+          <p:cNvPr id="37" name="矩形 36">
+            <a:extLst>
+              <a:ext uri="{FF2B5EF4-FFF2-40B4-BE49-F238E27FC236}">
+                <a16:creationId xmlns:a16="http://schemas.microsoft.com/office/drawing/2014/main" id="{79B0EFC5-385A-4CBF-8F26-44920131D317}"/>
+              </a:ext>
+            </a:extLst>
+          </p:cNvPr>
+          <p:cNvSpPr/>
+          <p:nvPr/>
+        </p:nvSpPr>
+        <p:spPr>
+          <a:xfrm>
+            <a:off x="1447760" y="2575911"/>
+            <a:ext cx="2944435" cy="613245"/>
+          </a:xfrm>
+          <a:prstGeom prst="rect">
+            <a:avLst/>
+          </a:prstGeom>
+          <a:noFill/>
+          <a:ln>
+            <a:prstDash val="dash"/>
+          </a:ln>
+        </p:spPr>
+        <p:style>
+          <a:lnRef idx="2">
+            <a:schemeClr val="accent1">
+              <a:shade val="50000"/>
+            </a:schemeClr>
+          </a:lnRef>
+          <a:fillRef idx="1">
+            <a:schemeClr val="accent1"/>
+          </a:fillRef>
+          <a:effectRef idx="0">
+            <a:schemeClr val="accent1"/>
+          </a:effectRef>
+          <a:fontRef idx="minor">
+            <a:schemeClr val="lt1"/>
+          </a:fontRef>
+        </p:style>
+        <p:txBody>
+          <a:bodyPr rtlCol="0" anchor="ctr"/>
+          <a:lstStyle/>
+          <a:p>
+            <a:pPr algn="ctr"/>
+            <a:endParaRPr lang="zh-TW" altLang="en-US">
+              <a:latin typeface="Consolas" panose="020B0609020204030204" pitchFamily="49" charset="0"/>
+              <a:cs typeface="Consolas" panose="020B0609020204030204" pitchFamily="49" charset="0"/>
+            </a:endParaRPr>
+          </a:p>
+        </p:txBody>
+      </p:sp>
+      <p:sp>
+        <p:nvSpPr>
+          <p:cNvPr id="48" name="文字方塊 47">
+            <a:extLst>
+              <a:ext uri="{FF2B5EF4-FFF2-40B4-BE49-F238E27FC236}">
+                <a16:creationId xmlns:a16="http://schemas.microsoft.com/office/drawing/2014/main" id="{0DF6CDA6-2149-48ED-A2DB-F56C93DC8F7D}"/>
+              </a:ext>
+            </a:extLst>
+          </p:cNvPr>
+          <p:cNvSpPr txBox="1"/>
+          <p:nvPr/>
+        </p:nvSpPr>
+        <p:spPr>
+          <a:xfrm>
+            <a:off x="5771244" y="2711684"/>
+            <a:ext cx="2204450" cy="338554"/>
+          </a:xfrm>
+          <a:prstGeom prst="rect">
+            <a:avLst/>
+          </a:prstGeom>
+          <a:noFill/>
+        </p:spPr>
+        <p:txBody>
+          <a:bodyPr wrap="none" rtlCol="0">
+            <a:spAutoFit/>
+          </a:bodyPr>
+          <a:lstStyle/>
+          <a:p>
+            <a:r>
+              <a:rPr lang="en-US" altLang="zh-TW" sz="1600" b="1" dirty="0">
+                <a:solidFill>
+                  <a:schemeClr val="tx2">
+                    <a:lumMod val="75000"/>
+                  </a:schemeClr>
+                </a:solidFill>
+                <a:latin typeface="Consolas" panose="020B0609020204030204" pitchFamily="49" charset="0"/>
+                <a:ea typeface="微軟正黑體" panose="020B0604030504040204" pitchFamily="34" charset="-120"/>
+                <a:cs typeface="Consolas" panose="020B0609020204030204" pitchFamily="49" charset="0"/>
+              </a:rPr>
+              <a:t> Identity Server 4</a:t>
+            </a:r>
+            <a:endParaRPr lang="zh-TW" altLang="en-US" sz="1600" b="1" dirty="0">
+              <a:solidFill>
+                <a:schemeClr val="tx2">
+                  <a:lumMod val="75000"/>
+                </a:schemeClr>
+              </a:solidFill>
+              <a:latin typeface="Consolas" panose="020B0609020204030204" pitchFamily="49" charset="0"/>
+              <a:ea typeface="微軟正黑體" panose="020B0604030504040204" pitchFamily="34" charset="-120"/>
+              <a:cs typeface="Consolas" panose="020B0609020204030204" pitchFamily="49" charset="0"/>
+            </a:endParaRPr>
+          </a:p>
+        </p:txBody>
+      </p:sp>
+      <p:sp>
+        <p:nvSpPr>
+          <p:cNvPr id="49" name="矩形 48">
+            <a:extLst>
+              <a:ext uri="{FF2B5EF4-FFF2-40B4-BE49-F238E27FC236}">
+                <a16:creationId xmlns:a16="http://schemas.microsoft.com/office/drawing/2014/main" id="{7C6A78A2-117B-4511-A337-A22A0D832DD5}"/>
+              </a:ext>
+            </a:extLst>
+          </p:cNvPr>
+          <p:cNvSpPr/>
+          <p:nvPr/>
+        </p:nvSpPr>
+        <p:spPr>
+          <a:xfrm>
+            <a:off x="5251107" y="2574339"/>
+            <a:ext cx="2724587" cy="613245"/>
+          </a:xfrm>
+          <a:prstGeom prst="rect">
+            <a:avLst/>
+          </a:prstGeom>
+          <a:noFill/>
+          <a:ln>
+            <a:prstDash val="dash"/>
+          </a:ln>
+        </p:spPr>
+        <p:style>
+          <a:lnRef idx="2">
+            <a:schemeClr val="accent1">
+              <a:shade val="50000"/>
+            </a:schemeClr>
+          </a:lnRef>
+          <a:fillRef idx="1">
+            <a:schemeClr val="accent1"/>
+          </a:fillRef>
+          <a:effectRef idx="0">
+            <a:schemeClr val="accent1"/>
+          </a:effectRef>
+          <a:fontRef idx="minor">
+            <a:schemeClr val="lt1"/>
+          </a:fontRef>
+        </p:style>
+        <p:txBody>
+          <a:bodyPr rtlCol="0" anchor="ctr"/>
+          <a:lstStyle/>
+          <a:p>
+            <a:pPr algn="ctr"/>
+            <a:endParaRPr lang="zh-TW" altLang="en-US">
+              <a:latin typeface="Consolas" panose="020B0609020204030204" pitchFamily="49" charset="0"/>
+              <a:cs typeface="Consolas" panose="020B0609020204030204" pitchFamily="49" charset="0"/>
+            </a:endParaRPr>
+          </a:p>
+        </p:txBody>
+      </p:sp>
+      <p:pic>
+        <p:nvPicPr>
+          <p:cNvPr id="51" name="圖片 50">
+            <a:extLst>
+              <a:ext uri="{FF2B5EF4-FFF2-40B4-BE49-F238E27FC236}">
+                <a16:creationId xmlns:a16="http://schemas.microsoft.com/office/drawing/2014/main" id="{360008C4-4A7C-4F98-BDE4-D845F6D06F74}"/>
+              </a:ext>
+            </a:extLst>
+          </p:cNvPr>
+          <p:cNvPicPr>
+            <a:picLocks noChangeAspect="1"/>
+          </p:cNvPicPr>
+          <p:nvPr/>
+        </p:nvPicPr>
+        <p:blipFill>
+          <a:blip r:embed="rId3" cstate="print">
+            <a:extLst>
+              <a:ext uri="{28A0092B-C50C-407E-A947-70E740481C1C}">
+                <a14:useLocalDpi xmlns:a14="http://schemas.microsoft.com/office/drawing/2010/main" val="0"/>
+              </a:ext>
+            </a:extLst>
+          </a:blip>
+          <a:stretch>
+            <a:fillRect/>
+          </a:stretch>
+        </p:blipFill>
+        <p:spPr>
+          <a:xfrm>
+            <a:off x="5444573" y="2658508"/>
+            <a:ext cx="408171" cy="444906"/>
+          </a:xfrm>
+          <a:prstGeom prst="rect">
+            <a:avLst/>
+          </a:prstGeom>
+        </p:spPr>
+      </p:pic>
+      <p:sp>
+        <p:nvSpPr>
+          <p:cNvPr id="52" name="矩形 51">
+            <a:extLst>
+              <a:ext uri="{FF2B5EF4-FFF2-40B4-BE49-F238E27FC236}">
+                <a16:creationId xmlns:a16="http://schemas.microsoft.com/office/drawing/2014/main" id="{849940C1-270B-4DDA-82FD-843CAA8ED7ED}"/>
+              </a:ext>
+            </a:extLst>
+          </p:cNvPr>
+          <p:cNvSpPr/>
+          <p:nvPr/>
+        </p:nvSpPr>
+        <p:spPr>
+          <a:xfrm>
+            <a:off x="5806127" y="2025682"/>
+            <a:ext cx="1577676" cy="369332"/>
+          </a:xfrm>
+          <a:prstGeom prst="rect">
+            <a:avLst/>
+          </a:prstGeom>
+          <a:noFill/>
+        </p:spPr>
+        <p:txBody>
+          <a:bodyPr wrap="none">
+            <a:spAutoFit/>
+          </a:bodyPr>
+          <a:lstStyle/>
+          <a:p>
+            <a:pPr algn="ctr"/>
+            <a:r>
+              <a:rPr lang="en-US" altLang="zh-TW" b="1" dirty="0" err="1">
+                <a:latin typeface="Consolas" panose="020B0609020204030204" pitchFamily="49" charset="0"/>
+                <a:cs typeface="Consolas" panose="020B0609020204030204" pitchFamily="49" charset="0"/>
+              </a:rPr>
+              <a:t>Auth</a:t>
+            </a:r>
+            <a:r>
+              <a:rPr lang="en-US" altLang="zh-TW" b="1" dirty="0">
+                <a:latin typeface="Consolas" panose="020B0609020204030204" pitchFamily="49" charset="0"/>
+                <a:cs typeface="Consolas" panose="020B0609020204030204" pitchFamily="49" charset="0"/>
+              </a:rPr>
+              <a:t> Server</a:t>
+            </a:r>
+          </a:p>
+        </p:txBody>
+      </p:sp>
+      <p:cxnSp>
+        <p:nvCxnSpPr>
+          <p:cNvPr id="55" name="直線單箭頭接點 54">
+            <a:extLst>
+              <a:ext uri="{FF2B5EF4-FFF2-40B4-BE49-F238E27FC236}">
+                <a16:creationId xmlns:a16="http://schemas.microsoft.com/office/drawing/2014/main" id="{A8AC5B70-F649-4DB5-AE32-A6F5581DFE4C}"/>
+              </a:ext>
+            </a:extLst>
+          </p:cNvPr>
+          <p:cNvCxnSpPr>
+            <a:cxnSpLocks/>
+            <a:stCxn id="4" idx="3"/>
+            <a:endCxn id="38" idx="1"/>
+          </p:cNvCxnSpPr>
+          <p:nvPr/>
+        </p:nvCxnSpPr>
+        <p:spPr>
+          <a:xfrm>
+            <a:off x="4613979" y="2896647"/>
+            <a:ext cx="444782" cy="0"/>
+          </a:xfrm>
+          <a:prstGeom prst="straightConnector1">
+            <a:avLst/>
+          </a:prstGeom>
+          <a:ln w="25400">
+            <a:tailEnd type="arrow"/>
+          </a:ln>
+        </p:spPr>
+        <p:style>
+          <a:lnRef idx="1">
+            <a:schemeClr val="accent1"/>
+          </a:lnRef>
+          <a:fillRef idx="0">
+            <a:schemeClr val="accent1"/>
+          </a:fillRef>
+          <a:effectRef idx="0">
+            <a:schemeClr val="accent1"/>
+          </a:effectRef>
+          <a:fontRef idx="minor">
+            <a:schemeClr val="tx1"/>
+          </a:fontRef>
+        </p:style>
+      </p:cxnSp>
+      <p:sp>
+        <p:nvSpPr>
           <p:cNvPr id="58" name="圓角矩形 6">
             <a:extLst>
               <a:ext uri="{FF2B5EF4-FFF2-40B4-BE49-F238E27FC236}">
-                <a16:creationId xmlns:a16="http://schemas.microsoft.com/office/drawing/2014/main" xmlns="" id="{E0994BA9-38F8-40E8-8EAA-1E120C08B215}"/>
+                <a16:creationId xmlns:a16="http://schemas.microsoft.com/office/drawing/2014/main" id="{E0994BA9-38F8-40E8-8EAA-1E120C08B215}"/>
               </a:ext>
             </a:extLst>
           </p:cNvPr>
@@ -7875,7 +9016,7 @@
             <p:cNvPr id="59" name="文字方塊 58">
               <a:extLst>
                 <a:ext uri="{FF2B5EF4-FFF2-40B4-BE49-F238E27FC236}">
-                  <a16:creationId xmlns:a16="http://schemas.microsoft.com/office/drawing/2014/main" xmlns="" id="{CA8B39F2-1093-4652-9183-59D4A1FA31AE}"/>
+                  <a16:creationId xmlns:a16="http://schemas.microsoft.com/office/drawing/2014/main" id="{CA8B39F2-1093-4652-9183-59D4A1FA31AE}"/>
                 </a:ext>
               </a:extLst>
             </p:cNvPr>
@@ -7929,7 +9070,7 @@
             <p:cNvPr id="60" name="矩形 59">
               <a:extLst>
                 <a:ext uri="{FF2B5EF4-FFF2-40B4-BE49-F238E27FC236}">
-                  <a16:creationId xmlns:a16="http://schemas.microsoft.com/office/drawing/2014/main" xmlns="" id="{3B93D6B4-AAC0-4BDA-8620-5B2577AB6EAB}"/>
+                  <a16:creationId xmlns:a16="http://schemas.microsoft.com/office/drawing/2014/main" id="{3B93D6B4-AAC0-4BDA-8620-5B2577AB6EAB}"/>
                 </a:ext>
               </a:extLst>
             </p:cNvPr>
@@ -7982,7 +9123,7 @@
             <p:cNvPr id="61" name="圖片 60">
               <a:extLst>
                 <a:ext uri="{FF2B5EF4-FFF2-40B4-BE49-F238E27FC236}">
-                  <a16:creationId xmlns:a16="http://schemas.microsoft.com/office/drawing/2014/main" xmlns="" id="{BE73BB19-43C0-469E-8622-D3B22AE9CFCC}"/>
+                  <a16:creationId xmlns:a16="http://schemas.microsoft.com/office/drawing/2014/main" id="{BE73BB19-43C0-469E-8622-D3B22AE9CFCC}"/>
                 </a:ext>
               </a:extLst>
             </p:cNvPr>
@@ -8019,7 +9160,7 @@
           <p:cNvPr id="2" name="圖片 1">
             <a:extLst>
               <a:ext uri="{FF2B5EF4-FFF2-40B4-BE49-F238E27FC236}">
-                <a16:creationId xmlns:a16="http://schemas.microsoft.com/office/drawing/2014/main" xmlns="" id="{9719C86B-CFC1-4A17-B6CA-1F6C48A30850}"/>
+                <a16:creationId xmlns:a16="http://schemas.microsoft.com/office/drawing/2014/main" id="{9719C86B-CFC1-4A17-B6CA-1F6C48A30850}"/>
               </a:ext>
             </a:extLst>
           </p:cNvPr>
@@ -8049,7 +9190,7 @@
           <p:cNvPr id="54" name="直線單箭頭接點 53">
             <a:extLst>
               <a:ext uri="{FF2B5EF4-FFF2-40B4-BE49-F238E27FC236}">
-                <a16:creationId xmlns:a16="http://schemas.microsoft.com/office/drawing/2014/main" xmlns="" id="{9CD041CD-9441-4679-8E66-FF8013D04890}"/>
+                <a16:creationId xmlns:a16="http://schemas.microsoft.com/office/drawing/2014/main" id="{9CD041CD-9441-4679-8E66-FF8013D04890}"/>
               </a:ext>
             </a:extLst>
           </p:cNvPr>
@@ -8092,7 +9233,7 @@
           <p:cNvPr id="22" name="圓角矩形 6">
             <a:extLst>
               <a:ext uri="{FF2B5EF4-FFF2-40B4-BE49-F238E27FC236}">
-                <a16:creationId xmlns:a16="http://schemas.microsoft.com/office/drawing/2014/main" xmlns="" id="{9292555D-6383-47AB-94C4-8C24D05C629F}"/>
+                <a16:creationId xmlns:a16="http://schemas.microsoft.com/office/drawing/2014/main" id="{9292555D-6383-47AB-94C4-8C24D05C629F}"/>
               </a:ext>
             </a:extLst>
           </p:cNvPr>
@@ -8145,7 +9286,7 @@
           <p:cNvPr id="23" name="矩形 22">
             <a:extLst>
               <a:ext uri="{FF2B5EF4-FFF2-40B4-BE49-F238E27FC236}">
-                <a16:creationId xmlns:a16="http://schemas.microsoft.com/office/drawing/2014/main" xmlns="" id="{849940C1-270B-4DDA-82FD-843CAA8ED7ED}"/>
+                <a16:creationId xmlns:a16="http://schemas.microsoft.com/office/drawing/2014/main" id="{849940C1-270B-4DDA-82FD-843CAA8ED7ED}"/>
               </a:ext>
             </a:extLst>
           </p:cNvPr>
@@ -8212,7 +9353,7 @@
               <p:cNvPr id="28" name="文字方塊 27">
                 <a:extLst>
                   <a:ext uri="{FF2B5EF4-FFF2-40B4-BE49-F238E27FC236}">
-                    <a16:creationId xmlns:a16="http://schemas.microsoft.com/office/drawing/2014/main" xmlns="" id="{CA8B39F2-1093-4652-9183-59D4A1FA31AE}"/>
+                    <a16:creationId xmlns:a16="http://schemas.microsoft.com/office/drawing/2014/main" id="{CA8B39F2-1093-4652-9183-59D4A1FA31AE}"/>
                   </a:ext>
                 </a:extLst>
               </p:cNvPr>
@@ -8266,7 +9407,7 @@
               <p:cNvPr id="29" name="矩形 28">
                 <a:extLst>
                   <a:ext uri="{FF2B5EF4-FFF2-40B4-BE49-F238E27FC236}">
-                    <a16:creationId xmlns:a16="http://schemas.microsoft.com/office/drawing/2014/main" xmlns="" id="{3B93D6B4-AAC0-4BDA-8620-5B2577AB6EAB}"/>
+                    <a16:creationId xmlns:a16="http://schemas.microsoft.com/office/drawing/2014/main" id="{3B93D6B4-AAC0-4BDA-8620-5B2577AB6EAB}"/>
                   </a:ext>
                 </a:extLst>
               </p:cNvPr>
@@ -8351,7 +9492,7 @@
           <p:cNvPr id="32" name="直線單箭頭接點 31">
             <a:extLst>
               <a:ext uri="{FF2B5EF4-FFF2-40B4-BE49-F238E27FC236}">
-                <a16:creationId xmlns:a16="http://schemas.microsoft.com/office/drawing/2014/main" xmlns="" id="{9CD041CD-9441-4679-8E66-FF8013D04890}"/>
+                <a16:creationId xmlns:a16="http://schemas.microsoft.com/office/drawing/2014/main" id="{9CD041CD-9441-4679-8E66-FF8013D04890}"/>
               </a:ext>
             </a:extLst>
           </p:cNvPr>
@@ -8444,7 +9585,7 @@
 </p:sld>
 </file>
 
-<file path=ppt/slides/slide6.xml><?xml version="1.0" encoding="utf-8"?>
+<file path=ppt/slides/slide7.xml><?xml version="1.0" encoding="utf-8"?>
 <p:sld xmlns:a="http://schemas.openxmlformats.org/drawingml/2006/main" xmlns:r="http://schemas.openxmlformats.org/officeDocument/2006/relationships" xmlns:p="http://schemas.openxmlformats.org/presentationml/2006/main">
   <p:cSld>
     <p:spTree>
@@ -8518,7 +9659,7 @@
           <p:cNvPr id="4" name="圓角矩形 6">
             <a:extLst>
               <a:ext uri="{FF2B5EF4-FFF2-40B4-BE49-F238E27FC236}">
-                <a16:creationId xmlns:a16="http://schemas.microsoft.com/office/drawing/2014/main" xmlns="" id="{9292555D-6383-47AB-94C4-8C24D05C629F}"/>
+                <a16:creationId xmlns:a16="http://schemas.microsoft.com/office/drawing/2014/main" id="{9292555D-6383-47AB-94C4-8C24D05C629F}"/>
               </a:ext>
             </a:extLst>
           </p:cNvPr>
@@ -8571,7 +9712,7 @@
           <p:cNvPr id="8" name="AutoShape 2" descr="data:image/jpeg;base64,/9j/4AAQSkZJRgABAQAAAQABAAD/2wCEAAkGBhASEBAQDxAODxQSEg8PEBAUEBAPEBAQFBAVFBQQFRQXHCYeFxkjGRQUHy8gIycpLCwsFR4xNTMqNSYrLCkBCQoKDgwOFw8PGiwcHBwpLCksKSkpKSwpKSktNSopLCkpLCwsNSkpKSksKSkpKSwpKiopKTUpKSkvKSwpKSkpKf/AABEIAMwAzAMBIgACEQEDEQH/xAAbAAABBQEBAAAAAAAAAAAAAAAAAgMEBQYBB//EAEUQAAEDAgIGBgYGCAUFAAAAAAEAAgMEERIhBQYxQVFxE2GBkaHBIjJCUpKxFCMzcqKyJFNiY4LR4fAHFkOTsxVEg8LD/8QAGQEBAAMBAQAAAAAAAAAAAAAAAAEDBAIF/8QAJxEBAAIBAwMDBAMAAAAAAAAAAAECEQMSIQQxQRMyYQUiQlGRocH/2gAMAwEAAhEDEQA/APcUIQgFFrtIsiDS+/pEgWF9m9Slm9bpheJu+z3HkbAfIoLSPT0B9u3MFSWV0Z2PZ8QC8j0hrUYp5IRCJAzAMQkwuJcwOIsRbK6k0+tzMsUNQ37vRyfIhd7LYzhxvrHGXrDXg7CD2pS8zbrVTb5JW/ehly7QCFLptbICbMrIr8OlwHudZc4mO7qJiez0FCydPpuY+rIH8ix/yU9mmpd7W/CQoSvUKobpx29g7yE83TTd7XDuKCxQobdKxneRzBTgr4/fHigkISGzNOxzT2hLQCEIQCEIQCEIQCEIQCEIQCEIQCx+tUmKcN91rG95J81sFh9Nz/pEznWsw+DGXQebl/SVVQ7beaQDk12EflV/R0TTuWX1ediAefau883Eu81sKIr161xSIePrzm0p8OiGFEurrCLEA9RzCn0pyUrEqpiGfdMM27VCPcxretowHvbZJGgpWZRzVEfU2aQDxK1LXJQKiaRKY17x2lmfote0+jVT8nYJB+JqdbpOvZ63QSc4iwnta7yW4hha5rTYZgLkmjmHcFmmK/p6EX1MZiWNZrPMPXpmn7krh+ZqdGt7B60E45GN/mFpH6EjO5RZdW2HcFG2ruNW6sj1upT6xlZ96Jx8W3U6DWOmPq1UV+BfgPcVHn1SadwUGXU7qUenH7TGvbzDURaQJ9WUO5Oa5SGVknHwC8/qdTyPVFuQwnwUZmhall8EszeT3jzUen8u/XjzD1Btc7eAnm1V9y8mdpTSUR9GeQgbnBr/ABIulx6+6QZ67IJOcZae8HyT0bJ9ej1oShclna1pc4hoaCSTsAG9YXVTXmeqqGwvp4mAhxc9rnXADSdhHEDvWj1lntRz9bQz4iAuLVms4lbW0WjMLljwQCCCCLgjMEcUpZ3UeoLqdzSb4Hlo5YQbeK0S5dBCEIBCEIBeZ6x1BENdIdoiqXeBA8l6RUSYWOdwa49wXkuts9qCoO0vMMXPHKCfAFTWMzEE8QzOgWWaBwAHcLLU0RWY0R6oWloSvamOHi37r+mdkpGJQ6ZykFyoZ7H2OS8SjtelY1OFMyvtGSXZbgSPPzUvEqrREnrDkVYl6yXjFperoXzSDl1wlN41wvXGF244SuBNF66HqcOdwfZNCJpOwLjpElkmanCM8o1Vo+M7goE2gYyNitJnpp0isiZwiYhD0FodsM5e232bx2lzbeak62yfopHGSMeN0/SH0nnqY3tu4n5hVut0v1UTeMjj8Lf6rNqTmzbpRisLXUqK1Lf3nvPl5K+Vdq7FhpYR+wHfFn5qxVawIQhAIQhBX6elw00p/Zt3kBeWa02dHTxHZJOXHlHC7zeO5ej63y2p7e89g7rnyXmOsp+upBwjqJO1z42D8rl3pxm0Obe2VXSxFhLTtBt/VXtE5VOloiCyRuVwGu5jYe75J+hrCOB8F7Uc1y8i8Ylp6Z6fdIqqmrRbenzVDiqtvLNdYtkS8agxzJ0SqcM1lzouT0+YIVoXrP0E1nX4Zq4MizaleWzp7/bhIxpBkTBkTZlXG1o3pBkSnSZKGJEqSVNqNxb5E2yX0gmJJUyJsxzXUVTFk6d+ajmRdqXqGZFMRw7meVlo/ZI7i8D4WD+ap9a5bvibwY93e7+ittHfZA+8+V34y3/1VJpwY6oN6omfEf6rDf3S9GnthvqJto4xwYwfhCeXGiwA4ZLq5dhCEIBCEIMtr1UWbA3i9zjyDbea831gl/TGt/V08DSOtxfKfCRvctvr7NeeNg9mMntc63kvOdKVGKuqjwl6Mco2NYPyq/QjN1erOKrOVoews4jLqI2Kvpn280/DOmaoWfcbHZ9u/wDvrXraf6edqRnlPimThqFWMmXTUK2KsdoWsVQpLao8SqSOoUls672sl6tHQ1Rzz3K5irLtB6gspQz5O5K0o6r0eRI81n1NNOlaYnC4dVJp1YoD6hR3VCq9Nqi0riKruUmSszKr4J8iUy6oUbE7k6St6kwa3MKHJMmDKuoo7iWgqan0RyUA1RvuXZJbsHJVlTNZryNzXW54TZcRV3lsdHfYQdcTHHm8Yz4uKq8OPSLR+8jB/haD8wrmNgAY0ZANY0DgA0BVOrvp1xd+1M/5gfNeVM5nL2Y4btCEKEhCEIBCEIPPNYX9JpHDwfBH2XBPzK8sgqMUkr9uKSV3fI4hei1lZ+l1M5/0vpU3+zE8jxaF5ZQus0ch8ls6SMzMqNeeIheRTqTM/EzrGYVMyZTIalejHdjkCdBnUOd9nHvCb6ZaYZ7VWcc6ksnVMyZSWTK2IZr1aKhn9F3Yp9DU7RyKz9HP6J5qbTVFj4Li1c5ZsYsuZKhR3VChyVKZE9yFVtaKroz2ZzTXTqHUVGwcAmunXE1TCa+ZIEqiGVHSZLnDvK8ZNeMKEPSc1vvPjbzvI247roppfq0rRAxVNOOErX9jLuPgCqbcRMrNPm8R8tzLLYudwxO7rlV2pMd53HhGe8uCk1Tvq5DwY/5W80vUaL7Z/wBxvzP8l473WrQhCAQhCASZH2BJ3AnuCUq/T82GlqHcIpB2lpA+aDyHS1Xho66QnN0BZfrmla0+BcsHC/Ja3Wx+HR792Oopo+qzWvkI8Asaw5L1ugpmsz8sfU25iEkSJ+OdQcSW163bGbclVD7i/BRukXS9RypxhHdKbKpDJVXhyeY9XVlVaq4pZsu1Sm1FrKpp35J8yKzDJavKyfUrtPNdyrDMnqaW1yqph3jhYyVN3FdEyrGzJ0SqmU4TxKuulUISpXSKuRdUcvoHtU/VoXqmH3WTP7DGY/nIFS0MmR/vcr3VCO88r/chDP8AclaR/wAJWXXnFJW9NzrVhpdJPtDJ1hre9w/krbUyO0Dne9I7wACo9Lu+qA4vH4Wn+a02q7bUsXXiP4yvJe6tUIQgEIQgFRa6y2opR72Fne4X8Ar1RNJaLinZglBIviFnFtja18uaDyaOdzQWgjCcy1zWPaTxLXAi6Z+g0z8WOhpX5Xc5ofA+3HFG4fJbyq/w9jP2Ur29TgHKnqdSKply3o35HMGxtwzTNq+2cSWjMMfPqpQSep9LpnHYA6OojHxAO8VDd/h87Po6unPASNlgPabOC08uhalhziflyK76TfWY9vWWuA71pr1etX8v55Vzo0nwxVXqNXsBLYOmaPaheycdgacXgqGpp3xkiVj4iNoexzLd4XqrJRtBHMbU59OkGx7+V8Q7itFfqF/yiJ/pVPS18S8jaU40r0qshgkuZqSklJ2u6LoJT/5Ii0qnn1Yo3G7W1MHUyVsrRyDxfxWin1Cn5RMKrdLbxLMwHIJxzlfP1QZ/o1beps8L4vxxl48FBqtWqppyjZMNxikZLfk0HF3gLZXrNG3a3+Mdun1InsrcSeDrN5puppZYj9dFLF99jmjvIsh8oNrEbF3uieYlVNZjiS2uTocmWlOtVcoOtcnGlNNTjVVLlNon7exavUxotUP3l8UZ/hY93/0WPgNitnqi0dA8+9NJf+FrGrH1M/ZLR0dc6ufhY6Xd9mPvH5BbPQkWGnhH7DXfEMXmsXpPN0bf2fFzit/EzC1rRuAHcLLzHtFoQhAIQhAIQhALhC6hAxJCDtAPYocmjY/caN+XonvCsrJJYgztVq5C65tn15gfI+KrKnVNvsEjk7aeRBC2LokxKwAEkgAbScggwU2rUw3X7Ae8g+Sr5dDTN9jF1tIPhkVtKvTcLdl38sm958rqrn1jJ2NYObcZHacvBE5ZSSNzfXa5n3gW/NIsOpXFdWPfm15jcPaAbY9Tm2sQqt2lXg4Z4KeT9oNMTiOIcz+SGSoauRuTJJGjgHOw/DsXJaeGU3mp6aQna7omxPPN8WEntSPp9OTnHPF91zZR3OsfFS6c0zvUq4gfdla6E9+Y8UiZjtwicT3RXaqUL/YqIDxjmEjR/BIL/iUKp1F3wVbXcGzRPiPa9uJq08VE8+rhk643sk+RSjER6wLeYIV1dfUjyqtoac+GLfqjXtuWxxzAfqpopCeTb4vBV9RHNESJoJorbccbmgdpFl6I7ZfrGdrkC+ZUptR7LZHPFr2OwZ7LG4VsdXfyot0dJ7PMYa1p3r0DVgD6JCR7XSvPbK+3gAn59GU8l+kp6Z99pMQa/wCNliFJpoGtDWMaGMFmtYLkNbsAF8+9caut6kYTodP6VpnJWDFVRt4OhZ3WK3ixGi246trv3hd2DJbdZ2sIQhAIQhAIQhAIQhAIQkveACTsAJPIII+kNIMibieeQ3krG6Q0lLMc3YRuaMgEmurXTPL3b9g90bgmmtQRjR39pc/6ceI8VPaxOMiQVJ0a7q70zPotxFiCfJaNtMummQYybRHAkcwq+o0RJuDXdtvmt5LBxAPYoktE07rckHnj6Z8Zvhcw8RceIVpo7WeqZ6PTvcNwfaVvL0rrRy6P4WPUqup0Mw7WAHiPRKCVBrG8/aQwv62h0R8MlaU2kad/syxHf6sg8M1no6fDtu7rKkxyINPBQ4wXRPa8DI3BaU7Ho6XE30CcxmPStnvtsVTofSBjeDnbeOpbgYXDMAg57kETQmjQwl/Ox457VdXUdhTrSgcQuArqAQhCAQhCAQhCAUbSQvDKP3b/AMpUlcI3IPPWtTrWqZpDR5jkwbSQXR7frGjhxeBtHIqOwIFRsUqONIjYpEYQOsjXXRpTV0oIczEzHBe6lSrlIM3DqBQV0kQDi12zceCjVEBGThy4FW2k4Mg7hkeRUSGUEdHJmD6p4FBTy0oUKSnI2K7q6UsPEbj5KG9qCPSDMf3sW7oHWYwH3R8lnNC6IL3E2u1pGI7hvw9Z48LrUsgsgfY5SGJmNifa1AsJS4AuoBCEIBCEIBCEIBCEIGaukZKwskGIHsIO4gjMHrVBXaKljscLqloyxtwipaN2Jps2Xnkea0qEGSiwl2Fj2ud+rP1cw5xuse5SOjI9YFvMEK6r9FQzjDNEyQbrjNvW121p5KH/AJfwi0FRUwjc0vE7AOGGUO+aCK1DkP0ZXNvhlop+AfBJAe10bj8kjoK32qWjd9yqlb+aNA29cpzZ3YU4aeqP/Zxc/ppt/wAaR9BrPZpaRvW6pldb4WoHJSCCDvyVMYXG4AJtfYL+KuY9A1bj6c1NGOEcBkPxPd5KX/leNw+uknn4gydGw/wR4QgzjZS4dH9o73GDpZO4ZDmSFY6M1Xe4YpvqWn2AcUrhwc7Y3kL81pKOhjibgiYyNvBrQ0c+tPoGoaZrGhrGhoGwAWCUYwloQJDF2y6hAIQhAIQhAIQhAIQhAIQhAIQhAIQhAIQhAIQhAIQhAIQhAIQhAIQhAIQhAIQhB//Z">
             <a:extLst>
               <a:ext uri="{FF2B5EF4-FFF2-40B4-BE49-F238E27FC236}">
-                <a16:creationId xmlns:a16="http://schemas.microsoft.com/office/drawing/2014/main" xmlns="" id="{15B92B98-B7C8-4A75-A841-F25CD0136DE7}"/>
+                <a16:creationId xmlns:a16="http://schemas.microsoft.com/office/drawing/2014/main" id="{15B92B98-B7C8-4A75-A841-F25CD0136DE7}"/>
               </a:ext>
             </a:extLst>
           </p:cNvPr>
@@ -8610,7 +9751,7 @@
           <p:cNvPr id="17" name="群組 16">
             <a:extLst>
               <a:ext uri="{FF2B5EF4-FFF2-40B4-BE49-F238E27FC236}">
-                <a16:creationId xmlns:a16="http://schemas.microsoft.com/office/drawing/2014/main" xmlns="" id="{3E62AE25-4106-44ED-8F4E-D5D956A394D2}"/>
+                <a16:creationId xmlns:a16="http://schemas.microsoft.com/office/drawing/2014/main" id="{3E62AE25-4106-44ED-8F4E-D5D956A394D2}"/>
               </a:ext>
             </a:extLst>
           </p:cNvPr>
@@ -8630,7 +9771,7 @@
             <p:cNvPr id="18" name="圖片 17">
               <a:extLst>
                 <a:ext uri="{FF2B5EF4-FFF2-40B4-BE49-F238E27FC236}">
-                  <a16:creationId xmlns:a16="http://schemas.microsoft.com/office/drawing/2014/main" xmlns="" id="{DF00FD23-F9E0-40CA-BFAD-2BC20441329D}"/>
+                  <a16:creationId xmlns:a16="http://schemas.microsoft.com/office/drawing/2014/main" id="{DF00FD23-F9E0-40CA-BFAD-2BC20441329D}"/>
                 </a:ext>
               </a:extLst>
             </p:cNvPr>
@@ -8666,7 +9807,7 @@
             <p:cNvPr id="19" name="文字方塊 18">
               <a:extLst>
                 <a:ext uri="{FF2B5EF4-FFF2-40B4-BE49-F238E27FC236}">
-                  <a16:creationId xmlns:a16="http://schemas.microsoft.com/office/drawing/2014/main" xmlns="" id="{14F08A50-B905-4E9F-B65E-EEFCE05DA4E3}"/>
+                  <a16:creationId xmlns:a16="http://schemas.microsoft.com/office/drawing/2014/main" id="{14F08A50-B905-4E9F-B65E-EEFCE05DA4E3}"/>
                 </a:ext>
               </a:extLst>
             </p:cNvPr>
@@ -8721,7 +9862,7 @@
           <p:cNvPr id="35" name="矩形 34">
             <a:extLst>
               <a:ext uri="{FF2B5EF4-FFF2-40B4-BE49-F238E27FC236}">
-                <a16:creationId xmlns:a16="http://schemas.microsoft.com/office/drawing/2014/main" xmlns="" id="{A3837EC7-3FF7-497F-B8B9-5A0B2AE1FAD0}"/>
+                <a16:creationId xmlns:a16="http://schemas.microsoft.com/office/drawing/2014/main" id="{A3837EC7-3FF7-497F-B8B9-5A0B2AE1FAD0}"/>
               </a:ext>
             </a:extLst>
           </p:cNvPr>
@@ -8760,7 +9901,7 @@
           <p:cNvPr id="38" name="圓角矩形 6">
             <a:extLst>
               <a:ext uri="{FF2B5EF4-FFF2-40B4-BE49-F238E27FC236}">
-                <a16:creationId xmlns:a16="http://schemas.microsoft.com/office/drawing/2014/main" xmlns="" id="{AA3F0518-490B-4DDF-BB4F-AE947406C799}"/>
+                <a16:creationId xmlns:a16="http://schemas.microsoft.com/office/drawing/2014/main" id="{AA3F0518-490B-4DDF-BB4F-AE947406C799}"/>
               </a:ext>
             </a:extLst>
           </p:cNvPr>
@@ -8815,7 +9956,7 @@
           <p:cNvPr id="37" name="矩形 36">
             <a:extLst>
               <a:ext uri="{FF2B5EF4-FFF2-40B4-BE49-F238E27FC236}">
-                <a16:creationId xmlns:a16="http://schemas.microsoft.com/office/drawing/2014/main" xmlns="" id="{79B0EFC5-385A-4CBF-8F26-44920131D317}"/>
+                <a16:creationId xmlns:a16="http://schemas.microsoft.com/office/drawing/2014/main" id="{79B0EFC5-385A-4CBF-8F26-44920131D317}"/>
               </a:ext>
             </a:extLst>
           </p:cNvPr>
@@ -8868,7 +10009,7 @@
           <p:cNvPr id="48" name="文字方塊 47">
             <a:extLst>
               <a:ext uri="{FF2B5EF4-FFF2-40B4-BE49-F238E27FC236}">
-                <a16:creationId xmlns:a16="http://schemas.microsoft.com/office/drawing/2014/main" xmlns="" id="{0DF6CDA6-2149-48ED-A2DB-F56C93DC8F7D}"/>
+                <a16:creationId xmlns:a16="http://schemas.microsoft.com/office/drawing/2014/main" id="{0DF6CDA6-2149-48ED-A2DB-F56C93DC8F7D}"/>
               </a:ext>
             </a:extLst>
           </p:cNvPr>
@@ -8922,7 +10063,7 @@
           <p:cNvPr id="49" name="矩形 48">
             <a:extLst>
               <a:ext uri="{FF2B5EF4-FFF2-40B4-BE49-F238E27FC236}">
-                <a16:creationId xmlns:a16="http://schemas.microsoft.com/office/drawing/2014/main" xmlns="" id="{7C6A78A2-117B-4511-A337-A22A0D832DD5}"/>
+                <a16:creationId xmlns:a16="http://schemas.microsoft.com/office/drawing/2014/main" id="{7C6A78A2-117B-4511-A337-A22A0D832DD5}"/>
               </a:ext>
             </a:extLst>
           </p:cNvPr>
@@ -8975,7 +10116,7 @@
           <p:cNvPr id="51" name="圖片 50">
             <a:extLst>
               <a:ext uri="{FF2B5EF4-FFF2-40B4-BE49-F238E27FC236}">
-                <a16:creationId xmlns:a16="http://schemas.microsoft.com/office/drawing/2014/main" xmlns="" id="{360008C4-4A7C-4F98-BDE4-D845F6D06F74}"/>
+                <a16:creationId xmlns:a16="http://schemas.microsoft.com/office/drawing/2014/main" id="{360008C4-4A7C-4F98-BDE4-D845F6D06F74}"/>
               </a:ext>
             </a:extLst>
           </p:cNvPr>
@@ -9011,7 +10152,7 @@
           <p:cNvPr id="52" name="矩形 51">
             <a:extLst>
               <a:ext uri="{FF2B5EF4-FFF2-40B4-BE49-F238E27FC236}">
-                <a16:creationId xmlns:a16="http://schemas.microsoft.com/office/drawing/2014/main" xmlns="" id="{849940C1-270B-4DDA-82FD-843CAA8ED7ED}"/>
+                <a16:creationId xmlns:a16="http://schemas.microsoft.com/office/drawing/2014/main" id="{849940C1-270B-4DDA-82FD-843CAA8ED7ED}"/>
               </a:ext>
             </a:extLst>
           </p:cNvPr>
@@ -9057,7 +10198,7 @@
           <p:cNvPr id="55" name="直線單箭頭接點 54">
             <a:extLst>
               <a:ext uri="{FF2B5EF4-FFF2-40B4-BE49-F238E27FC236}">
-                <a16:creationId xmlns:a16="http://schemas.microsoft.com/office/drawing/2014/main" xmlns="" id="{A8AC5B70-F649-4DB5-AE32-A6F5581DFE4C}"/>
+                <a16:creationId xmlns:a16="http://schemas.microsoft.com/office/drawing/2014/main" id="{A8AC5B70-F649-4DB5-AE32-A6F5581DFE4C}"/>
               </a:ext>
             </a:extLst>
           </p:cNvPr>
@@ -9100,7 +10241,7 @@
           <p:cNvPr id="58" name="圓角矩形 6">
             <a:extLst>
               <a:ext uri="{FF2B5EF4-FFF2-40B4-BE49-F238E27FC236}">
-                <a16:creationId xmlns:a16="http://schemas.microsoft.com/office/drawing/2014/main" xmlns="" id="{E0994BA9-38F8-40E8-8EAA-1E120C08B215}"/>
+                <a16:creationId xmlns:a16="http://schemas.microsoft.com/office/drawing/2014/main" id="{E0994BA9-38F8-40E8-8EAA-1E120C08B215}"/>
               </a:ext>
             </a:extLst>
           </p:cNvPr>
@@ -9164,7 +10305,7 @@
             <p:cNvPr id="59" name="文字方塊 58">
               <a:extLst>
                 <a:ext uri="{FF2B5EF4-FFF2-40B4-BE49-F238E27FC236}">
-                  <a16:creationId xmlns:a16="http://schemas.microsoft.com/office/drawing/2014/main" xmlns="" id="{CA8B39F2-1093-4652-9183-59D4A1FA31AE}"/>
+                  <a16:creationId xmlns:a16="http://schemas.microsoft.com/office/drawing/2014/main" id="{CA8B39F2-1093-4652-9183-59D4A1FA31AE}"/>
                 </a:ext>
               </a:extLst>
             </p:cNvPr>
@@ -9218,7 +10359,7 @@
             <p:cNvPr id="60" name="矩形 59">
               <a:extLst>
                 <a:ext uri="{FF2B5EF4-FFF2-40B4-BE49-F238E27FC236}">
-                  <a16:creationId xmlns:a16="http://schemas.microsoft.com/office/drawing/2014/main" xmlns="" id="{3B93D6B4-AAC0-4BDA-8620-5B2577AB6EAB}"/>
+                  <a16:creationId xmlns:a16="http://schemas.microsoft.com/office/drawing/2014/main" id="{3B93D6B4-AAC0-4BDA-8620-5B2577AB6EAB}"/>
                 </a:ext>
               </a:extLst>
             </p:cNvPr>
@@ -9271,7 +10412,7 @@
             <p:cNvPr id="61" name="圖片 60">
               <a:extLst>
                 <a:ext uri="{FF2B5EF4-FFF2-40B4-BE49-F238E27FC236}">
-                  <a16:creationId xmlns:a16="http://schemas.microsoft.com/office/drawing/2014/main" xmlns="" id="{BE73BB19-43C0-469E-8622-D3B22AE9CFCC}"/>
+                  <a16:creationId xmlns:a16="http://schemas.microsoft.com/office/drawing/2014/main" id="{BE73BB19-43C0-469E-8622-D3B22AE9CFCC}"/>
                 </a:ext>
               </a:extLst>
             </p:cNvPr>
@@ -9308,7 +10449,7 @@
           <p:cNvPr id="2" name="圖片 1">
             <a:extLst>
               <a:ext uri="{FF2B5EF4-FFF2-40B4-BE49-F238E27FC236}">
-                <a16:creationId xmlns:a16="http://schemas.microsoft.com/office/drawing/2014/main" xmlns="" id="{9719C86B-CFC1-4A17-B6CA-1F6C48A30850}"/>
+                <a16:creationId xmlns:a16="http://schemas.microsoft.com/office/drawing/2014/main" id="{9719C86B-CFC1-4A17-B6CA-1F6C48A30850}"/>
               </a:ext>
             </a:extLst>
           </p:cNvPr>
@@ -9338,7 +10479,7 @@
           <p:cNvPr id="54" name="直線單箭頭接點 53">
             <a:extLst>
               <a:ext uri="{FF2B5EF4-FFF2-40B4-BE49-F238E27FC236}">
-                <a16:creationId xmlns:a16="http://schemas.microsoft.com/office/drawing/2014/main" xmlns="" id="{9CD041CD-9441-4679-8E66-FF8013D04890}"/>
+                <a16:creationId xmlns:a16="http://schemas.microsoft.com/office/drawing/2014/main" id="{9CD041CD-9441-4679-8E66-FF8013D04890}"/>
               </a:ext>
             </a:extLst>
           </p:cNvPr>
@@ -9381,7 +10522,7 @@
           <p:cNvPr id="22" name="圓角矩形 6">
             <a:extLst>
               <a:ext uri="{FF2B5EF4-FFF2-40B4-BE49-F238E27FC236}">
-                <a16:creationId xmlns:a16="http://schemas.microsoft.com/office/drawing/2014/main" xmlns="" id="{9292555D-6383-47AB-94C4-8C24D05C629F}"/>
+                <a16:creationId xmlns:a16="http://schemas.microsoft.com/office/drawing/2014/main" id="{9292555D-6383-47AB-94C4-8C24D05C629F}"/>
               </a:ext>
             </a:extLst>
           </p:cNvPr>
@@ -9434,7 +10575,7 @@
           <p:cNvPr id="23" name="矩形 22">
             <a:extLst>
               <a:ext uri="{FF2B5EF4-FFF2-40B4-BE49-F238E27FC236}">
-                <a16:creationId xmlns:a16="http://schemas.microsoft.com/office/drawing/2014/main" xmlns="" id="{849940C1-270B-4DDA-82FD-843CAA8ED7ED}"/>
+                <a16:creationId xmlns:a16="http://schemas.microsoft.com/office/drawing/2014/main" id="{849940C1-270B-4DDA-82FD-843CAA8ED7ED}"/>
               </a:ext>
             </a:extLst>
           </p:cNvPr>
@@ -9501,7 +10642,7 @@
               <p:cNvPr id="28" name="文字方塊 27">
                 <a:extLst>
                   <a:ext uri="{FF2B5EF4-FFF2-40B4-BE49-F238E27FC236}">
-                    <a16:creationId xmlns:a16="http://schemas.microsoft.com/office/drawing/2014/main" xmlns="" id="{CA8B39F2-1093-4652-9183-59D4A1FA31AE}"/>
+                    <a16:creationId xmlns:a16="http://schemas.microsoft.com/office/drawing/2014/main" id="{CA8B39F2-1093-4652-9183-59D4A1FA31AE}"/>
                   </a:ext>
                 </a:extLst>
               </p:cNvPr>
@@ -9555,7 +10696,7 @@
               <p:cNvPr id="29" name="矩形 28">
                 <a:extLst>
                   <a:ext uri="{FF2B5EF4-FFF2-40B4-BE49-F238E27FC236}">
-                    <a16:creationId xmlns:a16="http://schemas.microsoft.com/office/drawing/2014/main" xmlns="" id="{3B93D6B4-AAC0-4BDA-8620-5B2577AB6EAB}"/>
+                    <a16:creationId xmlns:a16="http://schemas.microsoft.com/office/drawing/2014/main" id="{3B93D6B4-AAC0-4BDA-8620-5B2577AB6EAB}"/>
                   </a:ext>
                 </a:extLst>
               </p:cNvPr>
@@ -9640,7 +10781,7 @@
           <p:cNvPr id="32" name="直線單箭頭接點 31">
             <a:extLst>
               <a:ext uri="{FF2B5EF4-FFF2-40B4-BE49-F238E27FC236}">
-                <a16:creationId xmlns:a16="http://schemas.microsoft.com/office/drawing/2014/main" xmlns="" id="{9CD041CD-9441-4679-8E66-FF8013D04890}"/>
+                <a16:creationId xmlns:a16="http://schemas.microsoft.com/office/drawing/2014/main" id="{9CD041CD-9441-4679-8E66-FF8013D04890}"/>
               </a:ext>
             </a:extLst>
           </p:cNvPr>
@@ -9681,7 +10822,7 @@
           <p:cNvPr id="36" name="圓角矩形 6">
             <a:extLst>
               <a:ext uri="{FF2B5EF4-FFF2-40B4-BE49-F238E27FC236}">
-                <a16:creationId xmlns:a16="http://schemas.microsoft.com/office/drawing/2014/main" xmlns="" id="{9292555D-6383-47AB-94C4-8C24D05C629F}"/>
+                <a16:creationId xmlns:a16="http://schemas.microsoft.com/office/drawing/2014/main" id="{9292555D-6383-47AB-94C4-8C24D05C629F}"/>
               </a:ext>
             </a:extLst>
           </p:cNvPr>
@@ -9762,7 +10903,7 @@
               <p:cNvPr id="42" name="文字方塊 41">
                 <a:extLst>
                   <a:ext uri="{FF2B5EF4-FFF2-40B4-BE49-F238E27FC236}">
-                    <a16:creationId xmlns:a16="http://schemas.microsoft.com/office/drawing/2014/main" xmlns="" id="{CA8B39F2-1093-4652-9183-59D4A1FA31AE}"/>
+                    <a16:creationId xmlns:a16="http://schemas.microsoft.com/office/drawing/2014/main" id="{CA8B39F2-1093-4652-9183-59D4A1FA31AE}"/>
                   </a:ext>
                 </a:extLst>
               </p:cNvPr>
@@ -9816,7 +10957,7 @@
               <p:cNvPr id="43" name="矩形 42">
                 <a:extLst>
                   <a:ext uri="{FF2B5EF4-FFF2-40B4-BE49-F238E27FC236}">
-                    <a16:creationId xmlns:a16="http://schemas.microsoft.com/office/drawing/2014/main" xmlns="" id="{3B93D6B4-AAC0-4BDA-8620-5B2577AB6EAB}"/>
+                    <a16:creationId xmlns:a16="http://schemas.microsoft.com/office/drawing/2014/main" id="{3B93D6B4-AAC0-4BDA-8620-5B2577AB6EAB}"/>
                   </a:ext>
                 </a:extLst>
               </p:cNvPr>
@@ -9945,7 +11086,7 @@
           <p:cNvPr id="39" name="直線單箭頭接點 38">
             <a:extLst>
               <a:ext uri="{FF2B5EF4-FFF2-40B4-BE49-F238E27FC236}">
-                <a16:creationId xmlns:a16="http://schemas.microsoft.com/office/drawing/2014/main" xmlns="" id="{A8AC5B70-F649-4DB5-AE32-A6F5581DFE4C}"/>
+                <a16:creationId xmlns:a16="http://schemas.microsoft.com/office/drawing/2014/main" id="{A8AC5B70-F649-4DB5-AE32-A6F5581DFE4C}"/>
               </a:ext>
             </a:extLst>
           </p:cNvPr>

</xml_diff>